<commit_message>
adding lme rds', phylogenetic tree, sp list, and new/updated figures
</commit_message>
<xml_diff>
--- a/figures/main-figures.pptx
+++ b/figures/main-figures.pptx
@@ -197,7 +197,7 @@
           <a:p>
             <a:fld id="{B7CE4BC6-D327-1C4F-8429-775CD9D39CD2}" type="datetimeFigureOut">
               <a:rPr lang="en-US" smtClean="0"/>
-              <a:t>2/24/25</a:t>
+              <a:t>8/22/25</a:t>
             </a:fld>
             <a:endParaRPr lang="en-US"/>
           </a:p>
@@ -684,7 +684,7 @@
           <a:p>
             <a:fld id="{3B85B7A5-F096-CF4C-9C20-4BA2556B79B6}" type="datetimeFigureOut">
               <a:rPr lang="en-US" smtClean="0"/>
-              <a:t>2/24/25</a:t>
+              <a:t>8/22/25</a:t>
             </a:fld>
             <a:endParaRPr lang="en-US"/>
           </a:p>
@@ -854,7 +854,7 @@
           <a:p>
             <a:fld id="{3B85B7A5-F096-CF4C-9C20-4BA2556B79B6}" type="datetimeFigureOut">
               <a:rPr lang="en-US" smtClean="0"/>
-              <a:t>2/24/25</a:t>
+              <a:t>8/22/25</a:t>
             </a:fld>
             <a:endParaRPr lang="en-US"/>
           </a:p>
@@ -1034,7 +1034,7 @@
           <a:p>
             <a:fld id="{3B85B7A5-F096-CF4C-9C20-4BA2556B79B6}" type="datetimeFigureOut">
               <a:rPr lang="en-US" smtClean="0"/>
-              <a:t>2/24/25</a:t>
+              <a:t>8/22/25</a:t>
             </a:fld>
             <a:endParaRPr lang="en-US"/>
           </a:p>
@@ -1204,7 +1204,7 @@
           <a:p>
             <a:fld id="{3B85B7A5-F096-CF4C-9C20-4BA2556B79B6}" type="datetimeFigureOut">
               <a:rPr lang="en-US" smtClean="0"/>
-              <a:t>2/24/25</a:t>
+              <a:t>8/22/25</a:t>
             </a:fld>
             <a:endParaRPr lang="en-US"/>
           </a:p>
@@ -1448,7 +1448,7 @@
           <a:p>
             <a:fld id="{3B85B7A5-F096-CF4C-9C20-4BA2556B79B6}" type="datetimeFigureOut">
               <a:rPr lang="en-US" smtClean="0"/>
-              <a:t>2/24/25</a:t>
+              <a:t>8/22/25</a:t>
             </a:fld>
             <a:endParaRPr lang="en-US"/>
           </a:p>
@@ -1680,7 +1680,7 @@
           <a:p>
             <a:fld id="{3B85B7A5-F096-CF4C-9C20-4BA2556B79B6}" type="datetimeFigureOut">
               <a:rPr lang="en-US" smtClean="0"/>
-              <a:t>2/24/25</a:t>
+              <a:t>8/22/25</a:t>
             </a:fld>
             <a:endParaRPr lang="en-US"/>
           </a:p>
@@ -2047,7 +2047,7 @@
           <a:p>
             <a:fld id="{3B85B7A5-F096-CF4C-9C20-4BA2556B79B6}" type="datetimeFigureOut">
               <a:rPr lang="en-US" smtClean="0"/>
-              <a:t>2/24/25</a:t>
+              <a:t>8/22/25</a:t>
             </a:fld>
             <a:endParaRPr lang="en-US"/>
           </a:p>
@@ -2165,7 +2165,7 @@
           <a:p>
             <a:fld id="{3B85B7A5-F096-CF4C-9C20-4BA2556B79B6}" type="datetimeFigureOut">
               <a:rPr lang="en-US" smtClean="0"/>
-              <a:t>2/24/25</a:t>
+              <a:t>8/22/25</a:t>
             </a:fld>
             <a:endParaRPr lang="en-US"/>
           </a:p>
@@ -2260,7 +2260,7 @@
           <a:p>
             <a:fld id="{3B85B7A5-F096-CF4C-9C20-4BA2556B79B6}" type="datetimeFigureOut">
               <a:rPr lang="en-US" smtClean="0"/>
-              <a:t>2/24/25</a:t>
+              <a:t>8/22/25</a:t>
             </a:fld>
             <a:endParaRPr lang="en-US"/>
           </a:p>
@@ -2537,7 +2537,7 @@
           <a:p>
             <a:fld id="{3B85B7A5-F096-CF4C-9C20-4BA2556B79B6}" type="datetimeFigureOut">
               <a:rPr lang="en-US" smtClean="0"/>
-              <a:t>2/24/25</a:t>
+              <a:t>8/22/25</a:t>
             </a:fld>
             <a:endParaRPr lang="en-US"/>
           </a:p>
@@ -2794,7 +2794,7 @@
           <a:p>
             <a:fld id="{3B85B7A5-F096-CF4C-9C20-4BA2556B79B6}" type="datetimeFigureOut">
               <a:rPr lang="en-US" smtClean="0"/>
-              <a:t>2/24/25</a:t>
+              <a:t>8/22/25</a:t>
             </a:fld>
             <a:endParaRPr lang="en-US"/>
           </a:p>
@@ -3007,7 +3007,7 @@
           <a:p>
             <a:fld id="{3B85B7A5-F096-CF4C-9C20-4BA2556B79B6}" type="datetimeFigureOut">
               <a:rPr lang="en-US" smtClean="0"/>
-              <a:t>2/24/25</a:t>
+              <a:t>8/22/25</a:t>
             </a:fld>
             <a:endParaRPr lang="en-US"/>
           </a:p>
@@ -3607,8 +3607,8 @@
         </p:nvSpPr>
         <p:spPr>
           <a:xfrm>
-            <a:off x="2857379" y="8928763"/>
-            <a:ext cx="2900153" cy="338554"/>
+            <a:off x="2778357" y="8928763"/>
+            <a:ext cx="2969083" cy="338554"/>
           </a:xfrm>
           <a:prstGeom prst="rect">
             <a:avLst/>
@@ -3626,7 +3626,7 @@
                 <a:latin typeface="Arial" panose="020B0604020202020204" pitchFamily="34" charset="0"/>
                 <a:cs typeface="Arial" panose="020B0604020202020204" pitchFamily="34" charset="0"/>
               </a:rPr>
-              <a:t>Potential dispersal rate (km/y)</a:t>
+              <a:t>Potential dispersal rate (km/yr)</a:t>
             </a:r>
           </a:p>
         </p:txBody>
@@ -4456,7 +4456,7 @@
                 <a:latin typeface="Arial" panose="020B0604020202020204" pitchFamily="34" charset="0"/>
                 <a:cs typeface="Arial" panose="020B0604020202020204" pitchFamily="34" charset="0"/>
               </a:rPr>
-              <a:t>Minimum of potential dispersal rate and velocity of climate change (km/y)</a:t>
+              <a:t>Minimum of potential dispersal rate and velocity of isotherm shift (km/yr)</a:t>
             </a:r>
           </a:p>
         </p:txBody>
@@ -5420,7 +5420,7 @@
                 <a:latin typeface="Arial" panose="020B0604020202020204" pitchFamily="34" charset="0"/>
                 <a:cs typeface="Arial" panose="020B0604020202020204" pitchFamily="34" charset="0"/>
               </a:rPr>
-              <a:t>Range expansion rate (km/y)</a:t>
+              <a:t>Range expansion rate (km/yr)</a:t>
             </a:r>
           </a:p>
         </p:txBody>
@@ -5499,8 +5499,8 @@
         </p:nvSpPr>
         <p:spPr>
           <a:xfrm>
-            <a:off x="9050855" y="6158783"/>
-            <a:ext cx="1157743" cy="1077218"/>
+            <a:off x="9107299" y="6260382"/>
+            <a:ext cx="1131724" cy="1077218"/>
           </a:xfrm>
           <a:prstGeom prst="rect">
             <a:avLst/>
@@ -5519,143 +5519,11 @@
                 <a:latin typeface="Arial" panose="020B0604020202020204" pitchFamily="34" charset="0"/>
                 <a:cs typeface="Arial" panose="020B0604020202020204" pitchFamily="34" charset="0"/>
               </a:rPr>
-              <a:t>Velocity</a:t>
-            </a:r>
-          </a:p>
-          <a:p>
-            <a:pPr algn="ctr"/>
-            <a:r>
-              <a:rPr lang="en-US" sz="1600" dirty="0">
-                <a:latin typeface="Arial" panose="020B0604020202020204" pitchFamily="34" charset="0"/>
-                <a:cs typeface="Arial" panose="020B0604020202020204" pitchFamily="34" charset="0"/>
-              </a:rPr>
-              <a:t> of climate change (km/y)</a:t>
-            </a:r>
-          </a:p>
-        </p:txBody>
-      </p:sp>
-      <p:sp>
-        <p:nvSpPr>
-          <p:cNvPr id="1038" name="TextBox 1037">
-            <a:extLst>
-              <a:ext uri="{FF2B5EF4-FFF2-40B4-BE49-F238E27FC236}">
-                <a16:creationId xmlns:a16="http://schemas.microsoft.com/office/drawing/2014/main" id="{ED1FCA3A-FBFE-B650-0663-2A8B5E9CC55D}"/>
-              </a:ext>
-            </a:extLst>
-          </p:cNvPr>
-          <p:cNvSpPr txBox="1"/>
-          <p:nvPr/>
-        </p:nvSpPr>
-        <p:spPr>
-          <a:xfrm>
-            <a:off x="9804456" y="7200498"/>
-            <a:ext cx="269626" cy="1754326"/>
-          </a:xfrm>
-          <a:prstGeom prst="rect">
-            <a:avLst/>
-          </a:prstGeom>
-          <a:noFill/>
-        </p:spPr>
-        <p:txBody>
-          <a:bodyPr wrap="none" rtlCol="0">
-            <a:spAutoFit/>
-          </a:bodyPr>
-          <a:lstStyle/>
-          <a:p>
-            <a:r>
-              <a:rPr lang="en-US" sz="1200" dirty="0">
-                <a:latin typeface="Arial" panose="020B0604020202020204" pitchFamily="34" charset="0"/>
-                <a:cs typeface="Arial" panose="020B0604020202020204" pitchFamily="34" charset="0"/>
-              </a:rPr>
-              <a:t>3</a:t>
-            </a:r>
-          </a:p>
-          <a:p>
-            <a:endParaRPr lang="en-US" sz="1200" dirty="0">
-              <a:latin typeface="Arial" panose="020B0604020202020204" pitchFamily="34" charset="0"/>
-              <a:cs typeface="Arial" panose="020B0604020202020204" pitchFamily="34" charset="0"/>
-            </a:endParaRPr>
-          </a:p>
-          <a:p>
-            <a:endParaRPr lang="en-US" sz="1200" dirty="0">
-              <a:latin typeface="Arial" panose="020B0604020202020204" pitchFamily="34" charset="0"/>
-              <a:cs typeface="Arial" panose="020B0604020202020204" pitchFamily="34" charset="0"/>
-            </a:endParaRPr>
-          </a:p>
-          <a:p>
-            <a:r>
-              <a:rPr lang="en-US" sz="1200" dirty="0">
-                <a:latin typeface="Arial" panose="020B0604020202020204" pitchFamily="34" charset="0"/>
-                <a:cs typeface="Arial" panose="020B0604020202020204" pitchFamily="34" charset="0"/>
-              </a:rPr>
-              <a:t>2</a:t>
-            </a:r>
-          </a:p>
-          <a:p>
-            <a:endParaRPr lang="en-US" sz="1200" dirty="0">
-              <a:latin typeface="Arial" panose="020B0604020202020204" pitchFamily="34" charset="0"/>
-              <a:cs typeface="Arial" panose="020B0604020202020204" pitchFamily="34" charset="0"/>
-            </a:endParaRPr>
-          </a:p>
-          <a:p>
-            <a:endParaRPr lang="en-US" sz="1200" dirty="0">
-              <a:latin typeface="Arial" panose="020B0604020202020204" pitchFamily="34" charset="0"/>
-              <a:cs typeface="Arial" panose="020B0604020202020204" pitchFamily="34" charset="0"/>
-            </a:endParaRPr>
-          </a:p>
-          <a:p>
-            <a:r>
-              <a:rPr lang="en-US" sz="1200" dirty="0">
-                <a:latin typeface="Arial" panose="020B0604020202020204" pitchFamily="34" charset="0"/>
-                <a:cs typeface="Arial" panose="020B0604020202020204" pitchFamily="34" charset="0"/>
-              </a:rPr>
-              <a:t>1</a:t>
-            </a:r>
-          </a:p>
-          <a:p>
-            <a:endParaRPr lang="en-US" sz="1200" dirty="0">
-              <a:latin typeface="Arial" panose="020B0604020202020204" pitchFamily="34" charset="0"/>
-              <a:cs typeface="Arial" panose="020B0604020202020204" pitchFamily="34" charset="0"/>
-            </a:endParaRPr>
-          </a:p>
-          <a:p>
-            <a:endParaRPr lang="en-US" sz="1200" dirty="0">
-              <a:latin typeface="Arial" panose="020B0604020202020204" pitchFamily="34" charset="0"/>
-              <a:cs typeface="Arial" panose="020B0604020202020204" pitchFamily="34" charset="0"/>
-            </a:endParaRPr>
-          </a:p>
-        </p:txBody>
-      </p:sp>
-      <p:pic>
-        <p:nvPicPr>
-          <p:cNvPr id="1039" name="Picture 1038">
-            <a:extLst>
-              <a:ext uri="{FF2B5EF4-FFF2-40B4-BE49-F238E27FC236}">
-                <a16:creationId xmlns:a16="http://schemas.microsoft.com/office/drawing/2014/main" id="{542B9DFF-F82D-678B-2B2E-66C4D439A2C4}"/>
-              </a:ext>
-            </a:extLst>
-          </p:cNvPr>
-          <p:cNvPicPr>
-            <a:picLocks noChangeAspect="1"/>
-          </p:cNvPicPr>
-          <p:nvPr/>
-        </p:nvPicPr>
-        <p:blipFill>
-          <a:blip r:embed="rId6"/>
-          <a:stretch>
-            <a:fillRect/>
-          </a:stretch>
-        </p:blipFill>
-        <p:spPr>
-          <a:xfrm>
-            <a:off x="9432140" y="7233684"/>
-            <a:ext cx="347241" cy="1576661"/>
-          </a:xfrm>
-          <a:prstGeom prst="rect">
-            <a:avLst/>
-          </a:prstGeom>
-        </p:spPr>
-      </p:pic>
+              <a:t>Velocity of isotherm shift (km/yr)</a:t>
+            </a:r>
+          </a:p>
+        </p:txBody>
+      </p:sp>
       <p:pic>
         <p:nvPicPr>
           <p:cNvPr id="1041" name="Picture 1040">
@@ -5671,7 +5539,7 @@
           <p:nvPr/>
         </p:nvPicPr>
         <p:blipFill>
-          <a:blip r:embed="rId7"/>
+          <a:blip r:embed="rId6"/>
           <a:stretch>
             <a:fillRect/>
           </a:stretch>
@@ -6560,8 +6428,8 @@
         </p:nvGrpSpPr>
         <p:grpSpPr>
           <a:xfrm>
-            <a:off x="10115910" y="7080058"/>
-            <a:ext cx="2682403" cy="1101530"/>
+            <a:off x="10127199" y="6888147"/>
+            <a:ext cx="3024597" cy="1101530"/>
             <a:chOff x="8524560" y="6991381"/>
             <a:chExt cx="2682403" cy="1101530"/>
           </a:xfrm>
@@ -6620,7 +6488,7 @@
                   <a:latin typeface="Arial" panose="020B0604020202020204" pitchFamily="34" charset="0"/>
                   <a:cs typeface="Arial" panose="020B0604020202020204" pitchFamily="34" charset="0"/>
                 </a:rPr>
-                <a:t>Dispersal rate &lt; velocity of climate change</a:t>
+                <a:t>Dispersal rate &lt; velocity of isotherm shift</a:t>
               </a:r>
             </a:p>
             <a:p>
@@ -6643,7 +6511,7 @@
                   <a:latin typeface="Arial" panose="020B0604020202020204" pitchFamily="34" charset="0"/>
                   <a:cs typeface="Arial" panose="020B0604020202020204" pitchFamily="34" charset="0"/>
                 </a:rPr>
-                <a:t>Dispersal rate &gt; velocity of climate change</a:t>
+                <a:t>Dispersal rate &gt; velocity of isotherm shift</a:t>
               </a:r>
             </a:p>
             <a:p>
@@ -6793,7 +6661,7 @@
         </p:nvSpPr>
         <p:spPr>
           <a:xfrm>
-            <a:off x="10303931" y="7961643"/>
+            <a:off x="10315220" y="7769732"/>
             <a:ext cx="1979542" cy="527839"/>
           </a:xfrm>
           <a:prstGeom prst="ellipse">
@@ -7103,7 +6971,7 @@
             <p:nvPr/>
           </p:nvPicPr>
           <p:blipFill rotWithShape="1">
-            <a:blip r:embed="rId8"/>
+            <a:blip r:embed="rId7"/>
             <a:srcRect t="87532" b="8515"/>
             <a:stretch/>
           </p:blipFill>
@@ -7132,7 +7000,7 @@
             <p:nvPr/>
           </p:nvPicPr>
           <p:blipFill rotWithShape="1">
-            <a:blip r:embed="rId8"/>
+            <a:blip r:embed="rId7"/>
             <a:srcRect t="75486" b="20340"/>
             <a:stretch/>
           </p:blipFill>
@@ -7161,7 +7029,7 @@
             <p:nvPr/>
           </p:nvPicPr>
           <p:blipFill rotWithShape="1">
-            <a:blip r:embed="rId8"/>
+            <a:blip r:embed="rId7"/>
             <a:srcRect t="81857" b="14409"/>
             <a:stretch/>
           </p:blipFill>
@@ -7190,7 +7058,7 @@
             <p:nvPr/>
           </p:nvPicPr>
           <p:blipFill rotWithShape="1">
-            <a:blip r:embed="rId8"/>
+            <a:blip r:embed="rId7"/>
             <a:srcRect t="69636" b="26636"/>
             <a:stretch/>
           </p:blipFill>
@@ -7240,7 +7108,7 @@
             <p:nvPr/>
           </p:nvPicPr>
           <p:blipFill rotWithShape="1">
-            <a:blip r:embed="rId8"/>
+            <a:blip r:embed="rId7"/>
             <a:srcRect t="87532" b="8515"/>
             <a:stretch/>
           </p:blipFill>
@@ -7269,7 +7137,7 @@
             <p:nvPr/>
           </p:nvPicPr>
           <p:blipFill rotWithShape="1">
-            <a:blip r:embed="rId8"/>
+            <a:blip r:embed="rId7"/>
             <a:srcRect t="75486" b="20340"/>
             <a:stretch/>
           </p:blipFill>
@@ -7298,7 +7166,7 @@
             <p:nvPr/>
           </p:nvPicPr>
           <p:blipFill rotWithShape="1">
-            <a:blip r:embed="rId8"/>
+            <a:blip r:embed="rId7"/>
             <a:srcRect t="81857" b="14409"/>
             <a:stretch/>
           </p:blipFill>
@@ -7327,7 +7195,7 @@
             <p:nvPr/>
           </p:nvPicPr>
           <p:blipFill rotWithShape="1">
-            <a:blip r:embed="rId8"/>
+            <a:blip r:embed="rId7"/>
             <a:srcRect t="69636" b="26636"/>
             <a:stretch/>
           </p:blipFill>
@@ -7577,7 +7445,7 @@
           <p:nvPr/>
         </p:nvPicPr>
         <p:blipFill rotWithShape="1">
-          <a:blip r:embed="rId9"/>
+          <a:blip r:embed="rId8"/>
           <a:srcRect r="97191"/>
           <a:stretch/>
         </p:blipFill>
@@ -7606,7 +7474,7 @@
           <p:nvPr/>
         </p:nvPicPr>
         <p:blipFill rotWithShape="1">
-          <a:blip r:embed="rId9"/>
+          <a:blip r:embed="rId8"/>
           <a:srcRect r="97191"/>
           <a:stretch/>
         </p:blipFill>
@@ -8365,6 +8233,287 @@
                 </a:rPr>
                 <a:t>2</a:t>
               </a:r>
+            </a:p>
+          </p:txBody>
+        </p:sp>
+      </p:grpSp>
+      <p:grpSp>
+        <p:nvGrpSpPr>
+          <p:cNvPr id="13" name="Group 12">
+            <a:extLst>
+              <a:ext uri="{FF2B5EF4-FFF2-40B4-BE49-F238E27FC236}">
+                <a16:creationId xmlns:a16="http://schemas.microsoft.com/office/drawing/2014/main" id="{46B50931-B151-8947-205A-2AA548190C55}"/>
+              </a:ext>
+            </a:extLst>
+          </p:cNvPr>
+          <p:cNvGrpSpPr/>
+          <p:nvPr/>
+        </p:nvGrpSpPr>
+        <p:grpSpPr>
+          <a:xfrm>
+            <a:off x="9493954" y="7392408"/>
+            <a:ext cx="444660" cy="1384995"/>
+            <a:chOff x="9460088" y="7144053"/>
+            <a:chExt cx="444660" cy="1384995"/>
+          </a:xfrm>
+        </p:grpSpPr>
+        <p:sp>
+          <p:nvSpPr>
+            <p:cNvPr id="1038" name="TextBox 1037">
+              <a:extLst>
+                <a:ext uri="{FF2B5EF4-FFF2-40B4-BE49-F238E27FC236}">
+                  <a16:creationId xmlns:a16="http://schemas.microsoft.com/office/drawing/2014/main" id="{ED1FCA3A-FBFE-B650-0663-2A8B5E9CC55D}"/>
+                </a:ext>
+              </a:extLst>
+            </p:cNvPr>
+            <p:cNvSpPr txBox="1"/>
+            <p:nvPr/>
+          </p:nvSpPr>
+          <p:spPr>
+            <a:xfrm>
+              <a:off x="9635122" y="7144053"/>
+              <a:ext cx="269626" cy="1384995"/>
+            </a:xfrm>
+            <a:prstGeom prst="rect">
+              <a:avLst/>
+            </a:prstGeom>
+            <a:noFill/>
+          </p:spPr>
+          <p:txBody>
+            <a:bodyPr wrap="none" rtlCol="0">
+              <a:spAutoFit/>
+            </a:bodyPr>
+            <a:lstStyle/>
+            <a:p>
+              <a:r>
+                <a:rPr lang="en-US" sz="1200" dirty="0">
+                  <a:latin typeface="Arial" panose="020B0604020202020204" pitchFamily="34" charset="0"/>
+                  <a:cs typeface="Arial" panose="020B0604020202020204" pitchFamily="34" charset="0"/>
+                </a:rPr>
+                <a:t>3</a:t>
+              </a:r>
+            </a:p>
+            <a:p>
+              <a:endParaRPr lang="en-US" sz="400" dirty="0">
+                <a:latin typeface="Arial" panose="020B0604020202020204" pitchFamily="34" charset="0"/>
+                <a:cs typeface="Arial" panose="020B0604020202020204" pitchFamily="34" charset="0"/>
+              </a:endParaRPr>
+            </a:p>
+            <a:p>
+              <a:endParaRPr lang="en-US" sz="400" dirty="0">
+                <a:latin typeface="Arial" panose="020B0604020202020204" pitchFamily="34" charset="0"/>
+                <a:cs typeface="Arial" panose="020B0604020202020204" pitchFamily="34" charset="0"/>
+              </a:endParaRPr>
+            </a:p>
+            <a:p>
+              <a:endParaRPr lang="en-US" sz="400" dirty="0">
+                <a:latin typeface="Arial" panose="020B0604020202020204" pitchFamily="34" charset="0"/>
+                <a:cs typeface="Arial" panose="020B0604020202020204" pitchFamily="34" charset="0"/>
+              </a:endParaRPr>
+            </a:p>
+            <a:p>
+              <a:r>
+                <a:rPr lang="en-US" sz="1200" dirty="0">
+                  <a:latin typeface="Arial" panose="020B0604020202020204" pitchFamily="34" charset="0"/>
+                  <a:cs typeface="Arial" panose="020B0604020202020204" pitchFamily="34" charset="0"/>
+                </a:rPr>
+                <a:t>2</a:t>
+              </a:r>
+            </a:p>
+            <a:p>
+              <a:endParaRPr lang="en-US" sz="400" dirty="0">
+                <a:latin typeface="Arial" panose="020B0604020202020204" pitchFamily="34" charset="0"/>
+                <a:cs typeface="Arial" panose="020B0604020202020204" pitchFamily="34" charset="0"/>
+              </a:endParaRPr>
+            </a:p>
+            <a:p>
+              <a:endParaRPr lang="en-US" sz="400" dirty="0">
+                <a:latin typeface="Arial" panose="020B0604020202020204" pitchFamily="34" charset="0"/>
+                <a:cs typeface="Arial" panose="020B0604020202020204" pitchFamily="34" charset="0"/>
+              </a:endParaRPr>
+            </a:p>
+            <a:p>
+              <a:endParaRPr lang="en-US" sz="400" dirty="0">
+                <a:latin typeface="Arial" panose="020B0604020202020204" pitchFamily="34" charset="0"/>
+                <a:cs typeface="Arial" panose="020B0604020202020204" pitchFamily="34" charset="0"/>
+              </a:endParaRPr>
+            </a:p>
+            <a:p>
+              <a:r>
+                <a:rPr lang="en-US" sz="1200" dirty="0">
+                  <a:latin typeface="Arial" panose="020B0604020202020204" pitchFamily="34" charset="0"/>
+                  <a:cs typeface="Arial" panose="020B0604020202020204" pitchFamily="34" charset="0"/>
+                </a:rPr>
+                <a:t>1</a:t>
+              </a:r>
+            </a:p>
+            <a:p>
+              <a:endParaRPr lang="en-US" sz="1200" dirty="0">
+                <a:latin typeface="Arial" panose="020B0604020202020204" pitchFamily="34" charset="0"/>
+                <a:cs typeface="Arial" panose="020B0604020202020204" pitchFamily="34" charset="0"/>
+              </a:endParaRPr>
+            </a:p>
+            <a:p>
+              <a:endParaRPr lang="en-US" sz="1200" dirty="0">
+                <a:latin typeface="Arial" panose="020B0604020202020204" pitchFamily="34" charset="0"/>
+                <a:cs typeface="Arial" panose="020B0604020202020204" pitchFamily="34" charset="0"/>
+              </a:endParaRPr>
+            </a:p>
+          </p:txBody>
+        </p:sp>
+        <p:sp>
+          <p:nvSpPr>
+            <p:cNvPr id="9" name="Rectangle 8">
+              <a:extLst>
+                <a:ext uri="{FF2B5EF4-FFF2-40B4-BE49-F238E27FC236}">
+                  <a16:creationId xmlns:a16="http://schemas.microsoft.com/office/drawing/2014/main" id="{092DB8FD-2790-1008-4AF4-7A5403E1A0BB}"/>
+                </a:ext>
+              </a:extLst>
+            </p:cNvPr>
+            <p:cNvSpPr/>
+            <p:nvPr/>
+          </p:nvSpPr>
+          <p:spPr>
+            <a:xfrm>
+              <a:off x="9460088" y="7191021"/>
+              <a:ext cx="180622" cy="191912"/>
+            </a:xfrm>
+            <a:prstGeom prst="rect">
+              <a:avLst/>
+            </a:prstGeom>
+            <a:solidFill>
+              <a:srgbClr val="C00000"/>
+            </a:solidFill>
+            <a:ln>
+              <a:noFill/>
+            </a:ln>
+          </p:spPr>
+          <p:style>
+            <a:lnRef idx="2">
+              <a:schemeClr val="accent1">
+                <a:shade val="50000"/>
+              </a:schemeClr>
+            </a:lnRef>
+            <a:fillRef idx="1">
+              <a:schemeClr val="accent1"/>
+            </a:fillRef>
+            <a:effectRef idx="0">
+              <a:schemeClr val="accent1"/>
+            </a:effectRef>
+            <a:fontRef idx="minor">
+              <a:schemeClr val="lt1"/>
+            </a:fontRef>
+          </p:style>
+          <p:txBody>
+            <a:bodyPr rtlCol="0" anchor="ctr"/>
+            <a:lstStyle/>
+            <a:p>
+              <a:pPr algn="ctr"/>
+              <a:endParaRPr lang="en-US"/>
+            </a:p>
+          </p:txBody>
+        </p:sp>
+        <p:sp>
+          <p:nvSpPr>
+            <p:cNvPr id="11" name="Rectangle 10">
+              <a:extLst>
+                <a:ext uri="{FF2B5EF4-FFF2-40B4-BE49-F238E27FC236}">
+                  <a16:creationId xmlns:a16="http://schemas.microsoft.com/office/drawing/2014/main" id="{0707409E-5172-3234-5783-9DCCC47525DA}"/>
+                </a:ext>
+              </a:extLst>
+            </p:cNvPr>
+            <p:cNvSpPr/>
+            <p:nvPr/>
+          </p:nvSpPr>
+          <p:spPr>
+            <a:xfrm>
+              <a:off x="9465733" y="7557910"/>
+              <a:ext cx="180622" cy="191912"/>
+            </a:xfrm>
+            <a:prstGeom prst="rect">
+              <a:avLst/>
+            </a:prstGeom>
+            <a:solidFill>
+              <a:srgbClr val="9C9EBE"/>
+            </a:solidFill>
+            <a:ln>
+              <a:noFill/>
+            </a:ln>
+          </p:spPr>
+          <p:style>
+            <a:lnRef idx="2">
+              <a:schemeClr val="accent1">
+                <a:shade val="50000"/>
+              </a:schemeClr>
+            </a:lnRef>
+            <a:fillRef idx="1">
+              <a:schemeClr val="accent1"/>
+            </a:fillRef>
+            <a:effectRef idx="0">
+              <a:schemeClr val="accent1"/>
+            </a:effectRef>
+            <a:fontRef idx="minor">
+              <a:schemeClr val="lt1"/>
+            </a:fontRef>
+          </p:style>
+          <p:txBody>
+            <a:bodyPr rtlCol="0" anchor="ctr"/>
+            <a:lstStyle/>
+            <a:p>
+              <a:pPr algn="ctr"/>
+              <a:endParaRPr lang="en-US"/>
+            </a:p>
+          </p:txBody>
+        </p:sp>
+        <p:sp>
+          <p:nvSpPr>
+            <p:cNvPr id="12" name="Rectangle 11">
+              <a:extLst>
+                <a:ext uri="{FF2B5EF4-FFF2-40B4-BE49-F238E27FC236}">
+                  <a16:creationId xmlns:a16="http://schemas.microsoft.com/office/drawing/2014/main" id="{2F02311C-131C-3092-6D15-B447EFFCF088}"/>
+                </a:ext>
+              </a:extLst>
+            </p:cNvPr>
+            <p:cNvSpPr/>
+            <p:nvPr/>
+          </p:nvSpPr>
+          <p:spPr>
+            <a:xfrm>
+              <a:off x="9460089" y="7924798"/>
+              <a:ext cx="180622" cy="191912"/>
+            </a:xfrm>
+            <a:prstGeom prst="rect">
+              <a:avLst/>
+            </a:prstGeom>
+            <a:solidFill>
+              <a:srgbClr val="F3CABA"/>
+            </a:solidFill>
+            <a:ln>
+              <a:noFill/>
+            </a:ln>
+          </p:spPr>
+          <p:style>
+            <a:lnRef idx="2">
+              <a:schemeClr val="accent1">
+                <a:shade val="50000"/>
+              </a:schemeClr>
+            </a:lnRef>
+            <a:fillRef idx="1">
+              <a:schemeClr val="accent1"/>
+            </a:fillRef>
+            <a:effectRef idx="0">
+              <a:schemeClr val="accent1"/>
+            </a:effectRef>
+            <a:fontRef idx="minor">
+              <a:schemeClr val="lt1"/>
+            </a:fontRef>
+          </p:style>
+          <p:txBody>
+            <a:bodyPr rtlCol="0" anchor="ctr"/>
+            <a:lstStyle/>
+            <a:p>
+              <a:pPr algn="ctr"/>
+              <a:endParaRPr lang="en-US"/>
             </a:p>
           </p:txBody>
         </p:sp>

</xml_diff>

<commit_message>
updating R scripts and figures
</commit_message>
<xml_diff>
--- a/figures/main-figures.pptx
+++ b/figures/main-figures.pptx
@@ -5,10 +5,11 @@
     <p:sldMasterId id="2147483684" r:id="rId1"/>
   </p:sldMasterIdLst>
   <p:notesMasterIdLst>
-    <p:notesMasterId r:id="rId3"/>
+    <p:notesMasterId r:id="rId4"/>
   </p:notesMasterIdLst>
   <p:sldIdLst>
     <p:sldId id="256" r:id="rId2"/>
+    <p:sldId id="257" r:id="rId3"/>
   </p:sldIdLst>
   <p:sldSz cx="18000663" cy="14400213"/>
   <p:notesSz cx="6858000" cy="9144000"/>
@@ -197,7 +198,7 @@
           <a:p>
             <a:fld id="{B7CE4BC6-D327-1C4F-8429-775CD9D39CD2}" type="datetimeFigureOut">
               <a:rPr lang="en-US" smtClean="0"/>
-              <a:t>8/22/25</a:t>
+              <a:t>9/30/25</a:t>
             </a:fld>
             <a:endParaRPr lang="en-US"/>
           </a:p>
@@ -553,6 +554,95 @@
 </p:notes>
 </file>
 
+<file path=ppt/notesSlides/notesSlide2.xml><?xml version="1.0" encoding="utf-8"?>
+<p:notes xmlns:a="http://schemas.openxmlformats.org/drawingml/2006/main" xmlns:r="http://schemas.openxmlformats.org/officeDocument/2006/relationships" xmlns:p="http://schemas.openxmlformats.org/presentationml/2006/main">
+  <p:cSld>
+    <p:spTree>
+      <p:nvGrpSpPr>
+        <p:cNvPr id="1" name=""/>
+        <p:cNvGrpSpPr/>
+        <p:nvPr/>
+      </p:nvGrpSpPr>
+      <p:grpSpPr>
+        <a:xfrm>
+          <a:off x="0" y="0"/>
+          <a:ext cx="0" cy="0"/>
+          <a:chOff x="0" y="0"/>
+          <a:chExt cx="0" cy="0"/>
+        </a:xfrm>
+      </p:grpSpPr>
+      <p:sp>
+        <p:nvSpPr>
+          <p:cNvPr id="2" name="Slide Image Placeholder 1"/>
+          <p:cNvSpPr>
+            <a:spLocks noGrp="1" noRot="1" noChangeAspect="1"/>
+          </p:cNvSpPr>
+          <p:nvPr>
+            <p:ph type="sldImg"/>
+          </p:nvPr>
+        </p:nvSpPr>
+        <p:spPr>
+          <a:xfrm>
+            <a:off x="1500188" y="1143000"/>
+            <a:ext cx="3857625" cy="3086100"/>
+          </a:xfrm>
+        </p:spPr>
+      </p:sp>
+      <p:sp>
+        <p:nvSpPr>
+          <p:cNvPr id="3" name="Notes Placeholder 2"/>
+          <p:cNvSpPr>
+            <a:spLocks noGrp="1"/>
+          </p:cNvSpPr>
+          <p:nvPr>
+            <p:ph type="body" idx="1"/>
+          </p:nvPr>
+        </p:nvSpPr>
+        <p:spPr/>
+        <p:txBody>
+          <a:bodyPr/>
+          <a:lstStyle/>
+          <a:p>
+            <a:endParaRPr lang="en-US" dirty="0"/>
+          </a:p>
+        </p:txBody>
+      </p:sp>
+      <p:sp>
+        <p:nvSpPr>
+          <p:cNvPr id="4" name="Slide Number Placeholder 3"/>
+          <p:cNvSpPr>
+            <a:spLocks noGrp="1"/>
+          </p:cNvSpPr>
+          <p:nvPr>
+            <p:ph type="sldNum" sz="quarter" idx="5"/>
+          </p:nvPr>
+        </p:nvSpPr>
+        <p:spPr/>
+        <p:txBody>
+          <a:bodyPr/>
+          <a:lstStyle/>
+          <a:p>
+            <a:fld id="{0EDDD83D-09B1-744F-A4D6-788A40015F47}" type="slidenum">
+              <a:rPr lang="en-US" smtClean="0"/>
+              <a:t>2</a:t>
+            </a:fld>
+            <a:endParaRPr lang="en-US"/>
+          </a:p>
+        </p:txBody>
+      </p:sp>
+    </p:spTree>
+    <p:extLst>
+      <p:ext uri="{BB962C8B-B14F-4D97-AF65-F5344CB8AC3E}">
+        <p14:creationId xmlns:p14="http://schemas.microsoft.com/office/powerpoint/2010/main" val="3434800687"/>
+      </p:ext>
+    </p:extLst>
+  </p:cSld>
+  <p:clrMapOvr>
+    <a:masterClrMapping/>
+  </p:clrMapOvr>
+</p:notes>
+</file>
+
 <file path=ppt/slideLayouts/slideLayout1.xml><?xml version="1.0" encoding="utf-8"?>
 <p:sldLayout xmlns:a="http://schemas.openxmlformats.org/drawingml/2006/main" xmlns:r="http://schemas.openxmlformats.org/officeDocument/2006/relationships" xmlns:p="http://schemas.openxmlformats.org/presentationml/2006/main" type="title" preserve="1">
   <p:cSld name="Title Slide">
@@ -684,7 +774,7 @@
           <a:p>
             <a:fld id="{3B85B7A5-F096-CF4C-9C20-4BA2556B79B6}" type="datetimeFigureOut">
               <a:rPr lang="en-US" smtClean="0"/>
-              <a:t>8/22/25</a:t>
+              <a:t>9/30/25</a:t>
             </a:fld>
             <a:endParaRPr lang="en-US"/>
           </a:p>
@@ -854,7 +944,7 @@
           <a:p>
             <a:fld id="{3B85B7A5-F096-CF4C-9C20-4BA2556B79B6}" type="datetimeFigureOut">
               <a:rPr lang="en-US" smtClean="0"/>
-              <a:t>8/22/25</a:t>
+              <a:t>9/30/25</a:t>
             </a:fld>
             <a:endParaRPr lang="en-US"/>
           </a:p>
@@ -1034,7 +1124,7 @@
           <a:p>
             <a:fld id="{3B85B7A5-F096-CF4C-9C20-4BA2556B79B6}" type="datetimeFigureOut">
               <a:rPr lang="en-US" smtClean="0"/>
-              <a:t>8/22/25</a:t>
+              <a:t>9/30/25</a:t>
             </a:fld>
             <a:endParaRPr lang="en-US"/>
           </a:p>
@@ -1204,7 +1294,7 @@
           <a:p>
             <a:fld id="{3B85B7A5-F096-CF4C-9C20-4BA2556B79B6}" type="datetimeFigureOut">
               <a:rPr lang="en-US" smtClean="0"/>
-              <a:t>8/22/25</a:t>
+              <a:t>9/30/25</a:t>
             </a:fld>
             <a:endParaRPr lang="en-US"/>
           </a:p>
@@ -1448,7 +1538,7 @@
           <a:p>
             <a:fld id="{3B85B7A5-F096-CF4C-9C20-4BA2556B79B6}" type="datetimeFigureOut">
               <a:rPr lang="en-US" smtClean="0"/>
-              <a:t>8/22/25</a:t>
+              <a:t>9/30/25</a:t>
             </a:fld>
             <a:endParaRPr lang="en-US"/>
           </a:p>
@@ -1680,7 +1770,7 @@
           <a:p>
             <a:fld id="{3B85B7A5-F096-CF4C-9C20-4BA2556B79B6}" type="datetimeFigureOut">
               <a:rPr lang="en-US" smtClean="0"/>
-              <a:t>8/22/25</a:t>
+              <a:t>9/30/25</a:t>
             </a:fld>
             <a:endParaRPr lang="en-US"/>
           </a:p>
@@ -2047,7 +2137,7 @@
           <a:p>
             <a:fld id="{3B85B7A5-F096-CF4C-9C20-4BA2556B79B6}" type="datetimeFigureOut">
               <a:rPr lang="en-US" smtClean="0"/>
-              <a:t>8/22/25</a:t>
+              <a:t>9/30/25</a:t>
             </a:fld>
             <a:endParaRPr lang="en-US"/>
           </a:p>
@@ -2165,7 +2255,7 @@
           <a:p>
             <a:fld id="{3B85B7A5-F096-CF4C-9C20-4BA2556B79B6}" type="datetimeFigureOut">
               <a:rPr lang="en-US" smtClean="0"/>
-              <a:t>8/22/25</a:t>
+              <a:t>9/30/25</a:t>
             </a:fld>
             <a:endParaRPr lang="en-US"/>
           </a:p>
@@ -2260,7 +2350,7 @@
           <a:p>
             <a:fld id="{3B85B7A5-F096-CF4C-9C20-4BA2556B79B6}" type="datetimeFigureOut">
               <a:rPr lang="en-US" smtClean="0"/>
-              <a:t>8/22/25</a:t>
+              <a:t>9/30/25</a:t>
             </a:fld>
             <a:endParaRPr lang="en-US"/>
           </a:p>
@@ -2537,7 +2627,7 @@
           <a:p>
             <a:fld id="{3B85B7A5-F096-CF4C-9C20-4BA2556B79B6}" type="datetimeFigureOut">
               <a:rPr lang="en-US" smtClean="0"/>
-              <a:t>8/22/25</a:t>
+              <a:t>9/30/25</a:t>
             </a:fld>
             <a:endParaRPr lang="en-US"/>
           </a:p>
@@ -2794,7 +2884,7 @@
           <a:p>
             <a:fld id="{3B85B7A5-F096-CF4C-9C20-4BA2556B79B6}" type="datetimeFigureOut">
               <a:rPr lang="en-US" smtClean="0"/>
-              <a:t>8/22/25</a:t>
+              <a:t>9/30/25</a:t>
             </a:fld>
             <a:endParaRPr lang="en-US"/>
           </a:p>
@@ -3007,7 +3097,7 @@
           <a:p>
             <a:fld id="{3B85B7A5-F096-CF4C-9C20-4BA2556B79B6}" type="datetimeFigureOut">
               <a:rPr lang="en-US" smtClean="0"/>
-              <a:t>8/22/25</a:t>
+              <a:t>9/30/25</a:t>
             </a:fld>
             <a:endParaRPr lang="en-US"/>
           </a:p>
@@ -8522,6 +8612,4326 @@
     <p:extLst>
       <p:ext uri="{BB962C8B-B14F-4D97-AF65-F5344CB8AC3E}">
         <p14:creationId xmlns:p14="http://schemas.microsoft.com/office/powerpoint/2010/main" val="1320583270"/>
+      </p:ext>
+    </p:extLst>
+  </p:cSld>
+  <p:clrMapOvr>
+    <a:masterClrMapping/>
+  </p:clrMapOvr>
+</p:sld>
+</file>
+
+<file path=ppt/slides/slide2.xml><?xml version="1.0" encoding="utf-8"?>
+<p:sld xmlns:a="http://schemas.openxmlformats.org/drawingml/2006/main" xmlns:r="http://schemas.openxmlformats.org/officeDocument/2006/relationships" xmlns:p="http://schemas.openxmlformats.org/presentationml/2006/main">
+  <p:cSld>
+    <p:spTree>
+      <p:nvGrpSpPr>
+        <p:cNvPr id="1" name=""/>
+        <p:cNvGrpSpPr/>
+        <p:nvPr/>
+      </p:nvGrpSpPr>
+      <p:grpSpPr>
+        <a:xfrm>
+          <a:off x="0" y="0"/>
+          <a:ext cx="0" cy="0"/>
+          <a:chOff x="0" y="0"/>
+          <a:chExt cx="0" cy="0"/>
+        </a:xfrm>
+      </p:grpSpPr>
+      <p:pic>
+        <p:nvPicPr>
+          <p:cNvPr id="1054" name="Picture 1053" descr="A comparison of a graph&#10;&#10;Description automatically generated with medium confidence">
+            <a:extLst>
+              <a:ext uri="{FF2B5EF4-FFF2-40B4-BE49-F238E27FC236}">
+                <a16:creationId xmlns:a16="http://schemas.microsoft.com/office/drawing/2014/main" id="{601CBA8F-E743-A9BD-E797-B7C1458B01BE}"/>
+              </a:ext>
+            </a:extLst>
+          </p:cNvPr>
+          <p:cNvPicPr>
+            <a:picLocks noChangeAspect="1"/>
+          </p:cNvPicPr>
+          <p:nvPr/>
+        </p:nvPicPr>
+        <p:blipFill>
+          <a:blip r:embed="rId3"/>
+          <a:stretch>
+            <a:fillRect/>
+          </a:stretch>
+        </p:blipFill>
+        <p:spPr>
+          <a:xfrm>
+            <a:off x="2626035" y="9926800"/>
+            <a:ext cx="7962451" cy="3704752"/>
+          </a:xfrm>
+          <a:prstGeom prst="rect">
+            <a:avLst/>
+          </a:prstGeom>
+        </p:spPr>
+      </p:pic>
+      <p:cxnSp>
+        <p:nvCxnSpPr>
+          <p:cNvPr id="24" name="Straight Connector 23">
+            <a:extLst>
+              <a:ext uri="{FF2B5EF4-FFF2-40B4-BE49-F238E27FC236}">
+                <a16:creationId xmlns:a16="http://schemas.microsoft.com/office/drawing/2014/main" id="{CB28AF64-5FE2-4177-B896-B673AA63A8AF}"/>
+              </a:ext>
+            </a:extLst>
+          </p:cNvPr>
+          <p:cNvCxnSpPr>
+            <a:cxnSpLocks/>
+          </p:cNvCxnSpPr>
+          <p:nvPr/>
+        </p:nvCxnSpPr>
+        <p:spPr>
+          <a:xfrm flipV="1">
+            <a:off x="2947855" y="6388189"/>
+            <a:ext cx="2338447" cy="2260401"/>
+          </a:xfrm>
+          <a:prstGeom prst="line">
+            <a:avLst/>
+          </a:prstGeom>
+          <a:ln w="28575">
+            <a:solidFill>
+              <a:schemeClr val="bg2">
+                <a:lumMod val="75000"/>
+              </a:schemeClr>
+            </a:solidFill>
+            <a:prstDash val="dash"/>
+          </a:ln>
+        </p:spPr>
+        <p:style>
+          <a:lnRef idx="1">
+            <a:schemeClr val="accent1"/>
+          </a:lnRef>
+          <a:fillRef idx="0">
+            <a:schemeClr val="accent1"/>
+          </a:fillRef>
+          <a:effectRef idx="0">
+            <a:schemeClr val="accent1"/>
+          </a:effectRef>
+          <a:fontRef idx="minor">
+            <a:schemeClr val="tx1"/>
+          </a:fontRef>
+        </p:style>
+      </p:cxnSp>
+      <p:cxnSp>
+        <p:nvCxnSpPr>
+          <p:cNvPr id="25" name="Straight Connector 24">
+            <a:extLst>
+              <a:ext uri="{FF2B5EF4-FFF2-40B4-BE49-F238E27FC236}">
+                <a16:creationId xmlns:a16="http://schemas.microsoft.com/office/drawing/2014/main" id="{915F6282-2B1B-228A-1F2A-09866CEF00ED}"/>
+              </a:ext>
+            </a:extLst>
+          </p:cNvPr>
+          <p:cNvCxnSpPr>
+            <a:cxnSpLocks/>
+          </p:cNvCxnSpPr>
+          <p:nvPr/>
+        </p:nvCxnSpPr>
+        <p:spPr>
+          <a:xfrm flipV="1">
+            <a:off x="6280191" y="6388189"/>
+            <a:ext cx="2338447" cy="2260401"/>
+          </a:xfrm>
+          <a:prstGeom prst="line">
+            <a:avLst/>
+          </a:prstGeom>
+          <a:ln w="28575">
+            <a:solidFill>
+              <a:schemeClr val="bg2">
+                <a:lumMod val="75000"/>
+              </a:schemeClr>
+            </a:solidFill>
+            <a:prstDash val="dash"/>
+          </a:ln>
+        </p:spPr>
+        <p:style>
+          <a:lnRef idx="1">
+            <a:schemeClr val="accent1"/>
+          </a:lnRef>
+          <a:fillRef idx="0">
+            <a:schemeClr val="accent1"/>
+          </a:fillRef>
+          <a:effectRef idx="0">
+            <a:schemeClr val="accent1"/>
+          </a:effectRef>
+          <a:fontRef idx="minor">
+            <a:schemeClr val="tx1"/>
+          </a:fontRef>
+        </p:style>
+      </p:cxnSp>
+      <p:sp>
+        <p:nvSpPr>
+          <p:cNvPr id="26" name="TextBox 25">
+            <a:extLst>
+              <a:ext uri="{FF2B5EF4-FFF2-40B4-BE49-F238E27FC236}">
+                <a16:creationId xmlns:a16="http://schemas.microsoft.com/office/drawing/2014/main" id="{E66A50E0-3856-12B0-11FA-69AE0CB6C6F8}"/>
+              </a:ext>
+            </a:extLst>
+          </p:cNvPr>
+          <p:cNvSpPr txBox="1"/>
+          <p:nvPr/>
+        </p:nvSpPr>
+        <p:spPr>
+          <a:xfrm>
+            <a:off x="2778357" y="8928763"/>
+            <a:ext cx="2969083" cy="338554"/>
+          </a:xfrm>
+          <a:prstGeom prst="rect">
+            <a:avLst/>
+          </a:prstGeom>
+          <a:noFill/>
+        </p:spPr>
+        <p:txBody>
+          <a:bodyPr wrap="none" rtlCol="0">
+            <a:spAutoFit/>
+          </a:bodyPr>
+          <a:lstStyle/>
+          <a:p>
+            <a:r>
+              <a:rPr lang="en-US" sz="1600" dirty="0">
+                <a:latin typeface="Arial" panose="020B0604020202020204" pitchFamily="34" charset="0"/>
+                <a:cs typeface="Arial" panose="020B0604020202020204" pitchFamily="34" charset="0"/>
+              </a:rPr>
+              <a:t>Potential dispersal rate (km/yr)</a:t>
+            </a:r>
+          </a:p>
+        </p:txBody>
+      </p:sp>
+      <p:cxnSp>
+        <p:nvCxnSpPr>
+          <p:cNvPr id="27" name="Straight Connector 26">
+            <a:extLst>
+              <a:ext uri="{FF2B5EF4-FFF2-40B4-BE49-F238E27FC236}">
+                <a16:creationId xmlns:a16="http://schemas.microsoft.com/office/drawing/2014/main" id="{0FA6EB6D-AE5C-F6C5-BA2C-2015A0A54EB3}"/>
+              </a:ext>
+            </a:extLst>
+          </p:cNvPr>
+          <p:cNvCxnSpPr>
+            <a:cxnSpLocks/>
+          </p:cNvCxnSpPr>
+          <p:nvPr/>
+        </p:nvCxnSpPr>
+        <p:spPr>
+          <a:xfrm flipV="1">
+            <a:off x="4041291" y="7030717"/>
+            <a:ext cx="562778" cy="562105"/>
+          </a:xfrm>
+          <a:prstGeom prst="line">
+            <a:avLst/>
+          </a:prstGeom>
+          <a:ln w="38100">
+            <a:solidFill>
+              <a:srgbClr val="B2172B"/>
+            </a:solidFill>
+          </a:ln>
+        </p:spPr>
+        <p:style>
+          <a:lnRef idx="1">
+            <a:schemeClr val="accent1"/>
+          </a:lnRef>
+          <a:fillRef idx="0">
+            <a:schemeClr val="accent1"/>
+          </a:fillRef>
+          <a:effectRef idx="0">
+            <a:schemeClr val="accent1"/>
+          </a:effectRef>
+          <a:fontRef idx="minor">
+            <a:schemeClr val="tx1"/>
+          </a:fontRef>
+        </p:style>
+      </p:cxnSp>
+      <p:cxnSp>
+        <p:nvCxnSpPr>
+          <p:cNvPr id="28" name="Straight Connector 27">
+            <a:extLst>
+              <a:ext uri="{FF2B5EF4-FFF2-40B4-BE49-F238E27FC236}">
+                <a16:creationId xmlns:a16="http://schemas.microsoft.com/office/drawing/2014/main" id="{8BC36E59-43AB-2F5D-BD23-8D8DEC84B4D9}"/>
+              </a:ext>
+            </a:extLst>
+          </p:cNvPr>
+          <p:cNvCxnSpPr>
+            <a:cxnSpLocks/>
+          </p:cNvCxnSpPr>
+          <p:nvPr/>
+        </p:nvCxnSpPr>
+        <p:spPr>
+          <a:xfrm>
+            <a:off x="4601402" y="7044217"/>
+            <a:ext cx="1018602" cy="0"/>
+          </a:xfrm>
+          <a:prstGeom prst="line">
+            <a:avLst/>
+          </a:prstGeom>
+          <a:ln w="38100">
+            <a:solidFill>
+              <a:srgbClr val="B2172B"/>
+            </a:solidFill>
+          </a:ln>
+        </p:spPr>
+        <p:style>
+          <a:lnRef idx="1">
+            <a:schemeClr val="accent1"/>
+          </a:lnRef>
+          <a:fillRef idx="0">
+            <a:schemeClr val="accent1"/>
+          </a:fillRef>
+          <a:effectRef idx="0">
+            <a:schemeClr val="accent1"/>
+          </a:effectRef>
+          <a:fontRef idx="minor">
+            <a:schemeClr val="tx1"/>
+          </a:fontRef>
+        </p:style>
+      </p:cxnSp>
+      <p:cxnSp>
+        <p:nvCxnSpPr>
+          <p:cNvPr id="29" name="Straight Connector 28">
+            <a:extLst>
+              <a:ext uri="{FF2B5EF4-FFF2-40B4-BE49-F238E27FC236}">
+                <a16:creationId xmlns:a16="http://schemas.microsoft.com/office/drawing/2014/main" id="{0508A0BF-C736-0203-97B0-7891F3034E3F}"/>
+              </a:ext>
+            </a:extLst>
+          </p:cNvPr>
+          <p:cNvCxnSpPr>
+            <a:cxnSpLocks/>
+          </p:cNvCxnSpPr>
+          <p:nvPr/>
+        </p:nvCxnSpPr>
+        <p:spPr>
+          <a:xfrm flipV="1">
+            <a:off x="2959354" y="7551575"/>
+            <a:ext cx="1119260" cy="1112760"/>
+          </a:xfrm>
+          <a:prstGeom prst="line">
+            <a:avLst/>
+          </a:prstGeom>
+          <a:ln w="38100">
+            <a:solidFill>
+              <a:srgbClr val="F3CABA"/>
+            </a:solidFill>
+          </a:ln>
+        </p:spPr>
+        <p:style>
+          <a:lnRef idx="1">
+            <a:schemeClr val="accent1"/>
+          </a:lnRef>
+          <a:fillRef idx="0">
+            <a:schemeClr val="accent1"/>
+          </a:fillRef>
+          <a:effectRef idx="0">
+            <a:schemeClr val="accent1"/>
+          </a:effectRef>
+          <a:fontRef idx="minor">
+            <a:schemeClr val="tx1"/>
+          </a:fontRef>
+        </p:style>
+      </p:cxnSp>
+      <p:cxnSp>
+        <p:nvCxnSpPr>
+          <p:cNvPr id="30" name="Straight Connector 29">
+            <a:extLst>
+              <a:ext uri="{FF2B5EF4-FFF2-40B4-BE49-F238E27FC236}">
+                <a16:creationId xmlns:a16="http://schemas.microsoft.com/office/drawing/2014/main" id="{648454D4-21E2-538C-A81D-8504C6155B85}"/>
+              </a:ext>
+            </a:extLst>
+          </p:cNvPr>
+          <p:cNvCxnSpPr>
+            <a:cxnSpLocks/>
+          </p:cNvCxnSpPr>
+          <p:nvPr/>
+        </p:nvCxnSpPr>
+        <p:spPr>
+          <a:xfrm>
+            <a:off x="4059322" y="7563712"/>
+            <a:ext cx="1547982" cy="0"/>
+          </a:xfrm>
+          <a:prstGeom prst="line">
+            <a:avLst/>
+          </a:prstGeom>
+          <a:ln w="38100">
+            <a:solidFill>
+              <a:srgbClr val="F3CABA"/>
+            </a:solidFill>
+          </a:ln>
+        </p:spPr>
+        <p:style>
+          <a:lnRef idx="1">
+            <a:schemeClr val="accent1"/>
+          </a:lnRef>
+          <a:fillRef idx="0">
+            <a:schemeClr val="accent1"/>
+          </a:fillRef>
+          <a:effectRef idx="0">
+            <a:schemeClr val="accent1"/>
+          </a:effectRef>
+          <a:fontRef idx="minor">
+            <a:schemeClr val="tx1"/>
+          </a:fontRef>
+        </p:style>
+      </p:cxnSp>
+      <p:cxnSp>
+        <p:nvCxnSpPr>
+          <p:cNvPr id="31" name="Straight Connector 30">
+            <a:extLst>
+              <a:ext uri="{FF2B5EF4-FFF2-40B4-BE49-F238E27FC236}">
+                <a16:creationId xmlns:a16="http://schemas.microsoft.com/office/drawing/2014/main" id="{5F7C059A-F43D-26E2-8D16-8C364F870365}"/>
+              </a:ext>
+            </a:extLst>
+          </p:cNvPr>
+          <p:cNvCxnSpPr>
+            <a:cxnSpLocks/>
+          </p:cNvCxnSpPr>
+          <p:nvPr/>
+        </p:nvCxnSpPr>
+        <p:spPr>
+          <a:xfrm flipV="1">
+            <a:off x="2941983" y="8118735"/>
+            <a:ext cx="562490" cy="561187"/>
+          </a:xfrm>
+          <a:prstGeom prst="line">
+            <a:avLst/>
+          </a:prstGeom>
+          <a:ln w="38100">
+            <a:solidFill>
+              <a:srgbClr val="9C9EBE"/>
+            </a:solidFill>
+          </a:ln>
+        </p:spPr>
+        <p:style>
+          <a:lnRef idx="1">
+            <a:schemeClr val="accent1"/>
+          </a:lnRef>
+          <a:fillRef idx="0">
+            <a:schemeClr val="accent1"/>
+          </a:fillRef>
+          <a:effectRef idx="0">
+            <a:schemeClr val="accent1"/>
+          </a:effectRef>
+          <a:fontRef idx="minor">
+            <a:schemeClr val="tx1"/>
+          </a:fontRef>
+        </p:style>
+      </p:cxnSp>
+      <p:cxnSp>
+        <p:nvCxnSpPr>
+          <p:cNvPr id="32" name="Straight Connector 31">
+            <a:extLst>
+              <a:ext uri="{FF2B5EF4-FFF2-40B4-BE49-F238E27FC236}">
+                <a16:creationId xmlns:a16="http://schemas.microsoft.com/office/drawing/2014/main" id="{1581D6B6-C1BF-83D0-2BA4-3E84E59A7E0A}"/>
+              </a:ext>
+            </a:extLst>
+          </p:cNvPr>
+          <p:cNvCxnSpPr>
+            <a:cxnSpLocks/>
+          </p:cNvCxnSpPr>
+          <p:nvPr/>
+        </p:nvCxnSpPr>
+        <p:spPr>
+          <a:xfrm>
+            <a:off x="3505666" y="8132800"/>
+            <a:ext cx="2088939" cy="0"/>
+          </a:xfrm>
+          <a:prstGeom prst="line">
+            <a:avLst/>
+          </a:prstGeom>
+          <a:ln w="38100">
+            <a:solidFill>
+              <a:srgbClr val="9C9EBE"/>
+            </a:solidFill>
+          </a:ln>
+        </p:spPr>
+        <p:style>
+          <a:lnRef idx="1">
+            <a:schemeClr val="accent1"/>
+          </a:lnRef>
+          <a:fillRef idx="0">
+            <a:schemeClr val="accent1"/>
+          </a:fillRef>
+          <a:effectRef idx="0">
+            <a:schemeClr val="accent1"/>
+          </a:effectRef>
+          <a:fontRef idx="minor">
+            <a:schemeClr val="tx1"/>
+          </a:fontRef>
+        </p:style>
+      </p:cxnSp>
+      <p:sp>
+        <p:nvSpPr>
+          <p:cNvPr id="33" name="TextBox 32">
+            <a:extLst>
+              <a:ext uri="{FF2B5EF4-FFF2-40B4-BE49-F238E27FC236}">
+                <a16:creationId xmlns:a16="http://schemas.microsoft.com/office/drawing/2014/main" id="{98E855DD-B14A-3F76-08DB-64105E5EBCFF}"/>
+              </a:ext>
+            </a:extLst>
+          </p:cNvPr>
+          <p:cNvSpPr txBox="1"/>
+          <p:nvPr/>
+        </p:nvSpPr>
+        <p:spPr>
+          <a:xfrm>
+            <a:off x="2631776" y="5699627"/>
+            <a:ext cx="269626" cy="2677656"/>
+          </a:xfrm>
+          <a:prstGeom prst="rect">
+            <a:avLst/>
+          </a:prstGeom>
+          <a:noFill/>
+        </p:spPr>
+        <p:txBody>
+          <a:bodyPr wrap="none" rtlCol="0">
+            <a:spAutoFit/>
+          </a:bodyPr>
+          <a:lstStyle/>
+          <a:p>
+            <a:endParaRPr lang="en-US" sz="1200" dirty="0">
+              <a:latin typeface="Arial" panose="020B0604020202020204" pitchFamily="34" charset="0"/>
+              <a:cs typeface="Arial" panose="020B0604020202020204" pitchFamily="34" charset="0"/>
+            </a:endParaRPr>
+          </a:p>
+          <a:p>
+            <a:endParaRPr lang="en-US" sz="1200" dirty="0">
+              <a:latin typeface="Arial" panose="020B0604020202020204" pitchFamily="34" charset="0"/>
+              <a:cs typeface="Arial" panose="020B0604020202020204" pitchFamily="34" charset="0"/>
+            </a:endParaRPr>
+          </a:p>
+          <a:p>
+            <a:endParaRPr lang="en-US" sz="1200" dirty="0">
+              <a:latin typeface="Arial" panose="020B0604020202020204" pitchFamily="34" charset="0"/>
+              <a:cs typeface="Arial" panose="020B0604020202020204" pitchFamily="34" charset="0"/>
+            </a:endParaRPr>
+          </a:p>
+          <a:p>
+            <a:r>
+              <a:rPr lang="en-US" sz="1200" dirty="0">
+                <a:latin typeface="Arial" panose="020B0604020202020204" pitchFamily="34" charset="0"/>
+                <a:cs typeface="Arial" panose="020B0604020202020204" pitchFamily="34" charset="0"/>
+              </a:rPr>
+              <a:t>4</a:t>
+            </a:r>
+          </a:p>
+          <a:p>
+            <a:endParaRPr lang="en-US" sz="1200" dirty="0">
+              <a:latin typeface="Arial" panose="020B0604020202020204" pitchFamily="34" charset="0"/>
+              <a:cs typeface="Arial" panose="020B0604020202020204" pitchFamily="34" charset="0"/>
+            </a:endParaRPr>
+          </a:p>
+          <a:p>
+            <a:endParaRPr lang="en-US" sz="1200" dirty="0">
+              <a:latin typeface="Arial" panose="020B0604020202020204" pitchFamily="34" charset="0"/>
+              <a:cs typeface="Arial" panose="020B0604020202020204" pitchFamily="34" charset="0"/>
+            </a:endParaRPr>
+          </a:p>
+          <a:p>
+            <a:r>
+              <a:rPr lang="en-US" sz="1200" dirty="0">
+                <a:latin typeface="Arial" panose="020B0604020202020204" pitchFamily="34" charset="0"/>
+                <a:cs typeface="Arial" panose="020B0604020202020204" pitchFamily="34" charset="0"/>
+              </a:rPr>
+              <a:t>3</a:t>
+            </a:r>
+          </a:p>
+          <a:p>
+            <a:endParaRPr lang="en-US" sz="1200" dirty="0">
+              <a:latin typeface="Arial" panose="020B0604020202020204" pitchFamily="34" charset="0"/>
+              <a:cs typeface="Arial" panose="020B0604020202020204" pitchFamily="34" charset="0"/>
+            </a:endParaRPr>
+          </a:p>
+          <a:p>
+            <a:endParaRPr lang="en-US" sz="1200" dirty="0">
+              <a:latin typeface="Arial" panose="020B0604020202020204" pitchFamily="34" charset="0"/>
+              <a:cs typeface="Arial" panose="020B0604020202020204" pitchFamily="34" charset="0"/>
+            </a:endParaRPr>
+          </a:p>
+          <a:p>
+            <a:r>
+              <a:rPr lang="en-US" sz="1200" dirty="0">
+                <a:latin typeface="Arial" panose="020B0604020202020204" pitchFamily="34" charset="0"/>
+                <a:cs typeface="Arial" panose="020B0604020202020204" pitchFamily="34" charset="0"/>
+              </a:rPr>
+              <a:t>2</a:t>
+            </a:r>
+          </a:p>
+          <a:p>
+            <a:endParaRPr lang="en-US" sz="1200" dirty="0">
+              <a:latin typeface="Arial" panose="020B0604020202020204" pitchFamily="34" charset="0"/>
+              <a:cs typeface="Arial" panose="020B0604020202020204" pitchFamily="34" charset="0"/>
+            </a:endParaRPr>
+          </a:p>
+          <a:p>
+            <a:endParaRPr lang="en-US" sz="1200" dirty="0">
+              <a:latin typeface="Arial" panose="020B0604020202020204" pitchFamily="34" charset="0"/>
+              <a:cs typeface="Arial" panose="020B0604020202020204" pitchFamily="34" charset="0"/>
+            </a:endParaRPr>
+          </a:p>
+          <a:p>
+            <a:r>
+              <a:rPr lang="en-US" sz="1200" dirty="0">
+                <a:latin typeface="Arial" panose="020B0604020202020204" pitchFamily="34" charset="0"/>
+                <a:cs typeface="Arial" panose="020B0604020202020204" pitchFamily="34" charset="0"/>
+              </a:rPr>
+              <a:t>1</a:t>
+            </a:r>
+          </a:p>
+          <a:p>
+            <a:endParaRPr lang="en-US" sz="1200" dirty="0">
+              <a:latin typeface="Arial" panose="020B0604020202020204" pitchFamily="34" charset="0"/>
+              <a:cs typeface="Arial" panose="020B0604020202020204" pitchFamily="34" charset="0"/>
+            </a:endParaRPr>
+          </a:p>
+        </p:txBody>
+      </p:sp>
+      <p:sp>
+        <p:nvSpPr>
+          <p:cNvPr id="34" name="TextBox 33">
+            <a:extLst>
+              <a:ext uri="{FF2B5EF4-FFF2-40B4-BE49-F238E27FC236}">
+                <a16:creationId xmlns:a16="http://schemas.microsoft.com/office/drawing/2014/main" id="{FCD032D6-7700-C6E6-8D30-DA1490FD0ADF}"/>
+              </a:ext>
+            </a:extLst>
+          </p:cNvPr>
+          <p:cNvSpPr txBox="1"/>
+          <p:nvPr/>
+        </p:nvSpPr>
+        <p:spPr>
+          <a:xfrm>
+            <a:off x="3409210" y="8709045"/>
+            <a:ext cx="2891743" cy="276999"/>
+          </a:xfrm>
+          <a:prstGeom prst="rect">
+            <a:avLst/>
+          </a:prstGeom>
+          <a:noFill/>
+        </p:spPr>
+        <p:txBody>
+          <a:bodyPr wrap="square" rtlCol="0">
+            <a:spAutoFit/>
+          </a:bodyPr>
+          <a:lstStyle/>
+          <a:p>
+            <a:r>
+              <a:rPr lang="en-US" sz="1200" dirty="0">
+                <a:latin typeface="Arial" panose="020B0604020202020204" pitchFamily="34" charset="0"/>
+                <a:cs typeface="Arial" panose="020B0604020202020204" pitchFamily="34" charset="0"/>
+              </a:rPr>
+              <a:t>1            2            3            4             </a:t>
+            </a:r>
+          </a:p>
+        </p:txBody>
+      </p:sp>
+      <p:sp>
+        <p:nvSpPr>
+          <p:cNvPr id="35" name="TextBox 34">
+            <a:extLst>
+              <a:ext uri="{FF2B5EF4-FFF2-40B4-BE49-F238E27FC236}">
+                <a16:creationId xmlns:a16="http://schemas.microsoft.com/office/drawing/2014/main" id="{19791573-3401-4971-ADA8-3AF61D544D21}"/>
+              </a:ext>
+            </a:extLst>
+          </p:cNvPr>
+          <p:cNvSpPr txBox="1"/>
+          <p:nvPr/>
+        </p:nvSpPr>
+        <p:spPr>
+          <a:xfrm>
+            <a:off x="2846459" y="6117213"/>
+            <a:ext cx="569481" cy="338554"/>
+          </a:xfrm>
+          <a:prstGeom prst="rect">
+            <a:avLst/>
+          </a:prstGeom>
+          <a:noFill/>
+        </p:spPr>
+        <p:txBody>
+          <a:bodyPr wrap="square" rtlCol="0">
+            <a:spAutoFit/>
+          </a:bodyPr>
+          <a:lstStyle/>
+          <a:p>
+            <a:pPr algn="ctr"/>
+            <a:r>
+              <a:rPr lang="en-US" sz="1600" dirty="0">
+                <a:solidFill>
+                  <a:schemeClr val="bg2">
+                    <a:lumMod val="75000"/>
+                  </a:schemeClr>
+                </a:solidFill>
+                <a:latin typeface="Arial" panose="020B0604020202020204" pitchFamily="34" charset="0"/>
+                <a:cs typeface="Arial" panose="020B0604020202020204" pitchFamily="34" charset="0"/>
+              </a:rPr>
+              <a:t>a)</a:t>
+            </a:r>
+          </a:p>
+        </p:txBody>
+      </p:sp>
+      <p:sp>
+        <p:nvSpPr>
+          <p:cNvPr id="36" name="Oval 35">
+            <a:extLst>
+              <a:ext uri="{FF2B5EF4-FFF2-40B4-BE49-F238E27FC236}">
+                <a16:creationId xmlns:a16="http://schemas.microsoft.com/office/drawing/2014/main" id="{BEE8699E-F273-6FF7-DC63-85059E130FD0}"/>
+              </a:ext>
+            </a:extLst>
+          </p:cNvPr>
+          <p:cNvSpPr/>
+          <p:nvPr/>
+        </p:nvSpPr>
+        <p:spPr>
+          <a:xfrm>
+            <a:off x="3549478" y="7954657"/>
+            <a:ext cx="141515" cy="130629"/>
+          </a:xfrm>
+          <a:prstGeom prst="ellipse">
+            <a:avLst/>
+          </a:prstGeom>
+          <a:solidFill>
+            <a:srgbClr val="B2172B"/>
+          </a:solidFill>
+          <a:ln w="19050">
+            <a:solidFill>
+              <a:schemeClr val="tx1"/>
+            </a:solidFill>
+          </a:ln>
+        </p:spPr>
+        <p:style>
+          <a:lnRef idx="2">
+            <a:schemeClr val="accent1">
+              <a:shade val="50000"/>
+            </a:schemeClr>
+          </a:lnRef>
+          <a:fillRef idx="1">
+            <a:schemeClr val="accent1"/>
+          </a:fillRef>
+          <a:effectRef idx="0">
+            <a:schemeClr val="accent1"/>
+          </a:effectRef>
+          <a:fontRef idx="minor">
+            <a:schemeClr val="lt1"/>
+          </a:fontRef>
+        </p:style>
+        <p:txBody>
+          <a:bodyPr rtlCol="0" anchor="ctr"/>
+          <a:lstStyle/>
+          <a:p>
+            <a:pPr algn="ctr"/>
+            <a:endParaRPr lang="en-US">
+              <a:solidFill>
+                <a:schemeClr val="accent2">
+                  <a:lumMod val="50000"/>
+                </a:schemeClr>
+              </a:solidFill>
+            </a:endParaRPr>
+          </a:p>
+        </p:txBody>
+      </p:sp>
+      <p:sp>
+        <p:nvSpPr>
+          <p:cNvPr id="37" name="Oval 36">
+            <a:extLst>
+              <a:ext uri="{FF2B5EF4-FFF2-40B4-BE49-F238E27FC236}">
+                <a16:creationId xmlns:a16="http://schemas.microsoft.com/office/drawing/2014/main" id="{354D3C8F-B1BA-6D29-DC90-52EDBF833981}"/>
+              </a:ext>
+            </a:extLst>
+          </p:cNvPr>
+          <p:cNvSpPr/>
+          <p:nvPr/>
+        </p:nvSpPr>
+        <p:spPr>
+          <a:xfrm>
+            <a:off x="4402479" y="7093583"/>
+            <a:ext cx="141515" cy="130629"/>
+          </a:xfrm>
+          <a:prstGeom prst="ellipse">
+            <a:avLst/>
+          </a:prstGeom>
+          <a:solidFill>
+            <a:srgbClr val="B2172B"/>
+          </a:solidFill>
+          <a:ln w="19050">
+            <a:solidFill>
+              <a:schemeClr val="tx1"/>
+            </a:solidFill>
+          </a:ln>
+        </p:spPr>
+        <p:style>
+          <a:lnRef idx="2">
+            <a:schemeClr val="accent1">
+              <a:shade val="50000"/>
+            </a:schemeClr>
+          </a:lnRef>
+          <a:fillRef idx="1">
+            <a:schemeClr val="accent1"/>
+          </a:fillRef>
+          <a:effectRef idx="0">
+            <a:schemeClr val="accent1"/>
+          </a:effectRef>
+          <a:fontRef idx="minor">
+            <a:schemeClr val="lt1"/>
+          </a:fontRef>
+        </p:style>
+        <p:txBody>
+          <a:bodyPr rtlCol="0" anchor="ctr"/>
+          <a:lstStyle/>
+          <a:p>
+            <a:pPr algn="ctr"/>
+            <a:endParaRPr lang="en-US">
+              <a:solidFill>
+                <a:schemeClr val="accent2">
+                  <a:lumMod val="50000"/>
+                </a:schemeClr>
+              </a:solidFill>
+            </a:endParaRPr>
+          </a:p>
+        </p:txBody>
+      </p:sp>
+      <p:sp>
+        <p:nvSpPr>
+          <p:cNvPr id="38" name="Oval 37">
+            <a:extLst>
+              <a:ext uri="{FF2B5EF4-FFF2-40B4-BE49-F238E27FC236}">
+                <a16:creationId xmlns:a16="http://schemas.microsoft.com/office/drawing/2014/main" id="{10BECA27-75D0-9CB3-CB85-06E4F830C2EA}"/>
+              </a:ext>
+            </a:extLst>
+          </p:cNvPr>
+          <p:cNvSpPr/>
+          <p:nvPr/>
+        </p:nvSpPr>
+        <p:spPr>
+          <a:xfrm>
+            <a:off x="5048715" y="6982792"/>
+            <a:ext cx="141515" cy="130629"/>
+          </a:xfrm>
+          <a:prstGeom prst="ellipse">
+            <a:avLst/>
+          </a:prstGeom>
+          <a:solidFill>
+            <a:srgbClr val="B2172B"/>
+          </a:solidFill>
+          <a:ln>
+            <a:solidFill>
+              <a:srgbClr val="B2172B"/>
+            </a:solidFill>
+          </a:ln>
+        </p:spPr>
+        <p:style>
+          <a:lnRef idx="2">
+            <a:schemeClr val="accent1">
+              <a:shade val="50000"/>
+            </a:schemeClr>
+          </a:lnRef>
+          <a:fillRef idx="1">
+            <a:schemeClr val="accent1"/>
+          </a:fillRef>
+          <a:effectRef idx="0">
+            <a:schemeClr val="accent1"/>
+          </a:effectRef>
+          <a:fontRef idx="minor">
+            <a:schemeClr val="lt1"/>
+          </a:fontRef>
+        </p:style>
+        <p:txBody>
+          <a:bodyPr rtlCol="0" anchor="ctr"/>
+          <a:lstStyle/>
+          <a:p>
+            <a:pPr algn="ctr"/>
+            <a:endParaRPr lang="en-US">
+              <a:solidFill>
+                <a:schemeClr val="accent2">
+                  <a:lumMod val="50000"/>
+                </a:schemeClr>
+              </a:solidFill>
+            </a:endParaRPr>
+          </a:p>
+        </p:txBody>
+      </p:sp>
+      <p:sp>
+        <p:nvSpPr>
+          <p:cNvPr id="39" name="Oval 38">
+            <a:extLst>
+              <a:ext uri="{FF2B5EF4-FFF2-40B4-BE49-F238E27FC236}">
+                <a16:creationId xmlns:a16="http://schemas.microsoft.com/office/drawing/2014/main" id="{823A49DE-0586-7321-F6C6-EB2C3AC37273}"/>
+              </a:ext>
+            </a:extLst>
+          </p:cNvPr>
+          <p:cNvSpPr/>
+          <p:nvPr/>
+        </p:nvSpPr>
+        <p:spPr>
+          <a:xfrm>
+            <a:off x="4115552" y="7397558"/>
+            <a:ext cx="141515" cy="130629"/>
+          </a:xfrm>
+          <a:prstGeom prst="ellipse">
+            <a:avLst/>
+          </a:prstGeom>
+          <a:solidFill>
+            <a:srgbClr val="B2172B"/>
+          </a:solidFill>
+          <a:ln w="19050">
+            <a:solidFill>
+              <a:schemeClr val="tx1"/>
+            </a:solidFill>
+          </a:ln>
+        </p:spPr>
+        <p:style>
+          <a:lnRef idx="2">
+            <a:schemeClr val="accent1">
+              <a:shade val="50000"/>
+            </a:schemeClr>
+          </a:lnRef>
+          <a:fillRef idx="1">
+            <a:schemeClr val="accent1"/>
+          </a:fillRef>
+          <a:effectRef idx="0">
+            <a:schemeClr val="accent1"/>
+          </a:effectRef>
+          <a:fontRef idx="minor">
+            <a:schemeClr val="lt1"/>
+          </a:fontRef>
+        </p:style>
+        <p:txBody>
+          <a:bodyPr rtlCol="0" anchor="ctr"/>
+          <a:lstStyle/>
+          <a:p>
+            <a:pPr algn="ctr"/>
+            <a:endParaRPr lang="en-US">
+              <a:solidFill>
+                <a:schemeClr val="accent2">
+                  <a:lumMod val="50000"/>
+                </a:schemeClr>
+              </a:solidFill>
+            </a:endParaRPr>
+          </a:p>
+        </p:txBody>
+      </p:sp>
+      <p:cxnSp>
+        <p:nvCxnSpPr>
+          <p:cNvPr id="40" name="Straight Connector 39">
+            <a:extLst>
+              <a:ext uri="{FF2B5EF4-FFF2-40B4-BE49-F238E27FC236}">
+                <a16:creationId xmlns:a16="http://schemas.microsoft.com/office/drawing/2014/main" id="{238696BA-A5E6-6909-9553-555066BC9A22}"/>
+              </a:ext>
+            </a:extLst>
+          </p:cNvPr>
+          <p:cNvCxnSpPr>
+            <a:cxnSpLocks/>
+          </p:cNvCxnSpPr>
+          <p:nvPr/>
+        </p:nvCxnSpPr>
+        <p:spPr>
+          <a:xfrm>
+            <a:off x="6223287" y="6220741"/>
+            <a:ext cx="0" cy="2491683"/>
+          </a:xfrm>
+          <a:prstGeom prst="line">
+            <a:avLst/>
+          </a:prstGeom>
+          <a:ln w="28575">
+            <a:solidFill>
+              <a:schemeClr val="tx1"/>
+            </a:solidFill>
+          </a:ln>
+        </p:spPr>
+        <p:style>
+          <a:lnRef idx="1">
+            <a:schemeClr val="accent1"/>
+          </a:lnRef>
+          <a:fillRef idx="0">
+            <a:schemeClr val="accent1"/>
+          </a:fillRef>
+          <a:effectRef idx="0">
+            <a:schemeClr val="accent1"/>
+          </a:effectRef>
+          <a:fontRef idx="minor">
+            <a:schemeClr val="tx1"/>
+          </a:fontRef>
+        </p:style>
+      </p:cxnSp>
+      <p:cxnSp>
+        <p:nvCxnSpPr>
+          <p:cNvPr id="41" name="Straight Connector 40">
+            <a:extLst>
+              <a:ext uri="{FF2B5EF4-FFF2-40B4-BE49-F238E27FC236}">
+                <a16:creationId xmlns:a16="http://schemas.microsoft.com/office/drawing/2014/main" id="{BC654A08-4197-1F28-F560-69090ED02B1C}"/>
+              </a:ext>
+            </a:extLst>
+          </p:cNvPr>
+          <p:cNvCxnSpPr>
+            <a:cxnSpLocks/>
+          </p:cNvCxnSpPr>
+          <p:nvPr/>
+        </p:nvCxnSpPr>
+        <p:spPr>
+          <a:xfrm flipH="1">
+            <a:off x="6234173" y="8701537"/>
+            <a:ext cx="2660360" cy="0"/>
+          </a:xfrm>
+          <a:prstGeom prst="line">
+            <a:avLst/>
+          </a:prstGeom>
+          <a:ln w="28575">
+            <a:solidFill>
+              <a:schemeClr val="tx1"/>
+            </a:solidFill>
+          </a:ln>
+        </p:spPr>
+        <p:style>
+          <a:lnRef idx="1">
+            <a:schemeClr val="accent1"/>
+          </a:lnRef>
+          <a:fillRef idx="0">
+            <a:schemeClr val="accent1"/>
+          </a:fillRef>
+          <a:effectRef idx="0">
+            <a:schemeClr val="accent1"/>
+          </a:effectRef>
+          <a:fontRef idx="minor">
+            <a:schemeClr val="tx1"/>
+          </a:fontRef>
+        </p:style>
+      </p:cxnSp>
+      <p:sp>
+        <p:nvSpPr>
+          <p:cNvPr id="42" name="TextBox 41">
+            <a:extLst>
+              <a:ext uri="{FF2B5EF4-FFF2-40B4-BE49-F238E27FC236}">
+                <a16:creationId xmlns:a16="http://schemas.microsoft.com/office/drawing/2014/main" id="{A65315F1-FD2B-9078-9C44-2367AACD6439}"/>
+              </a:ext>
+            </a:extLst>
+          </p:cNvPr>
+          <p:cNvSpPr txBox="1"/>
+          <p:nvPr/>
+        </p:nvSpPr>
+        <p:spPr>
+          <a:xfrm>
+            <a:off x="5806951" y="8910868"/>
+            <a:ext cx="3610227" cy="584775"/>
+          </a:xfrm>
+          <a:prstGeom prst="rect">
+            <a:avLst/>
+          </a:prstGeom>
+          <a:noFill/>
+        </p:spPr>
+        <p:txBody>
+          <a:bodyPr wrap="square" rtlCol="0">
+            <a:spAutoFit/>
+          </a:bodyPr>
+          <a:lstStyle/>
+          <a:p>
+            <a:pPr algn="ctr"/>
+            <a:r>
+              <a:rPr lang="en-US" sz="1600" dirty="0">
+                <a:latin typeface="Arial" panose="020B0604020202020204" pitchFamily="34" charset="0"/>
+                <a:cs typeface="Arial" panose="020B0604020202020204" pitchFamily="34" charset="0"/>
+              </a:rPr>
+              <a:t>Minimum of potential dispersal rate and velocity of isotherm shift (km/yr)</a:t>
+            </a:r>
+          </a:p>
+        </p:txBody>
+      </p:sp>
+      <p:sp>
+        <p:nvSpPr>
+          <p:cNvPr id="43" name="TextBox 42">
+            <a:extLst>
+              <a:ext uri="{FF2B5EF4-FFF2-40B4-BE49-F238E27FC236}">
+                <a16:creationId xmlns:a16="http://schemas.microsoft.com/office/drawing/2014/main" id="{F7E81AD1-9BE2-8851-3F5F-C9A721D7075B}"/>
+              </a:ext>
+            </a:extLst>
+          </p:cNvPr>
+          <p:cNvSpPr txBox="1"/>
+          <p:nvPr/>
+        </p:nvSpPr>
+        <p:spPr>
+          <a:xfrm>
+            <a:off x="5917246" y="5713755"/>
+            <a:ext cx="269626" cy="2677656"/>
+          </a:xfrm>
+          <a:prstGeom prst="rect">
+            <a:avLst/>
+          </a:prstGeom>
+          <a:noFill/>
+        </p:spPr>
+        <p:txBody>
+          <a:bodyPr wrap="none" rtlCol="0">
+            <a:spAutoFit/>
+          </a:bodyPr>
+          <a:lstStyle/>
+          <a:p>
+            <a:endParaRPr lang="en-US" sz="1200" dirty="0">
+              <a:latin typeface="Arial" panose="020B0604020202020204" pitchFamily="34" charset="0"/>
+              <a:cs typeface="Arial" panose="020B0604020202020204" pitchFamily="34" charset="0"/>
+            </a:endParaRPr>
+          </a:p>
+          <a:p>
+            <a:endParaRPr lang="en-US" sz="1200" dirty="0">
+              <a:latin typeface="Arial" panose="020B0604020202020204" pitchFamily="34" charset="0"/>
+              <a:cs typeface="Arial" panose="020B0604020202020204" pitchFamily="34" charset="0"/>
+            </a:endParaRPr>
+          </a:p>
+          <a:p>
+            <a:endParaRPr lang="en-US" sz="1200" dirty="0">
+              <a:latin typeface="Arial" panose="020B0604020202020204" pitchFamily="34" charset="0"/>
+              <a:cs typeface="Arial" panose="020B0604020202020204" pitchFamily="34" charset="0"/>
+            </a:endParaRPr>
+          </a:p>
+          <a:p>
+            <a:r>
+              <a:rPr lang="en-US" sz="1200" dirty="0">
+                <a:latin typeface="Arial" panose="020B0604020202020204" pitchFamily="34" charset="0"/>
+                <a:cs typeface="Arial" panose="020B0604020202020204" pitchFamily="34" charset="0"/>
+              </a:rPr>
+              <a:t>4</a:t>
+            </a:r>
+          </a:p>
+          <a:p>
+            <a:endParaRPr lang="en-US" sz="1200" dirty="0">
+              <a:latin typeface="Arial" panose="020B0604020202020204" pitchFamily="34" charset="0"/>
+              <a:cs typeface="Arial" panose="020B0604020202020204" pitchFamily="34" charset="0"/>
+            </a:endParaRPr>
+          </a:p>
+          <a:p>
+            <a:endParaRPr lang="en-US" sz="1200" dirty="0">
+              <a:latin typeface="Arial" panose="020B0604020202020204" pitchFamily="34" charset="0"/>
+              <a:cs typeface="Arial" panose="020B0604020202020204" pitchFamily="34" charset="0"/>
+            </a:endParaRPr>
+          </a:p>
+          <a:p>
+            <a:r>
+              <a:rPr lang="en-US" sz="1200" dirty="0">
+                <a:latin typeface="Arial" panose="020B0604020202020204" pitchFamily="34" charset="0"/>
+                <a:cs typeface="Arial" panose="020B0604020202020204" pitchFamily="34" charset="0"/>
+              </a:rPr>
+              <a:t>3</a:t>
+            </a:r>
+          </a:p>
+          <a:p>
+            <a:endParaRPr lang="en-US" sz="1200" dirty="0">
+              <a:latin typeface="Arial" panose="020B0604020202020204" pitchFamily="34" charset="0"/>
+              <a:cs typeface="Arial" panose="020B0604020202020204" pitchFamily="34" charset="0"/>
+            </a:endParaRPr>
+          </a:p>
+          <a:p>
+            <a:endParaRPr lang="en-US" sz="1200" dirty="0">
+              <a:latin typeface="Arial" panose="020B0604020202020204" pitchFamily="34" charset="0"/>
+              <a:cs typeface="Arial" panose="020B0604020202020204" pitchFamily="34" charset="0"/>
+            </a:endParaRPr>
+          </a:p>
+          <a:p>
+            <a:r>
+              <a:rPr lang="en-US" sz="1200" dirty="0">
+                <a:latin typeface="Arial" panose="020B0604020202020204" pitchFamily="34" charset="0"/>
+                <a:cs typeface="Arial" panose="020B0604020202020204" pitchFamily="34" charset="0"/>
+              </a:rPr>
+              <a:t>2</a:t>
+            </a:r>
+          </a:p>
+          <a:p>
+            <a:endParaRPr lang="en-US" sz="1200" dirty="0">
+              <a:latin typeface="Arial" panose="020B0604020202020204" pitchFamily="34" charset="0"/>
+              <a:cs typeface="Arial" panose="020B0604020202020204" pitchFamily="34" charset="0"/>
+            </a:endParaRPr>
+          </a:p>
+          <a:p>
+            <a:endParaRPr lang="en-US" sz="1200" dirty="0">
+              <a:latin typeface="Arial" panose="020B0604020202020204" pitchFamily="34" charset="0"/>
+              <a:cs typeface="Arial" panose="020B0604020202020204" pitchFamily="34" charset="0"/>
+            </a:endParaRPr>
+          </a:p>
+          <a:p>
+            <a:r>
+              <a:rPr lang="en-US" sz="1200" dirty="0">
+                <a:latin typeface="Arial" panose="020B0604020202020204" pitchFamily="34" charset="0"/>
+                <a:cs typeface="Arial" panose="020B0604020202020204" pitchFamily="34" charset="0"/>
+              </a:rPr>
+              <a:t>1</a:t>
+            </a:r>
+          </a:p>
+          <a:p>
+            <a:endParaRPr lang="en-US" sz="1200" dirty="0">
+              <a:latin typeface="Arial" panose="020B0604020202020204" pitchFamily="34" charset="0"/>
+              <a:cs typeface="Arial" panose="020B0604020202020204" pitchFamily="34" charset="0"/>
+            </a:endParaRPr>
+          </a:p>
+        </p:txBody>
+      </p:sp>
+      <p:sp>
+        <p:nvSpPr>
+          <p:cNvPr id="44" name="TextBox 43">
+            <a:extLst>
+              <a:ext uri="{FF2B5EF4-FFF2-40B4-BE49-F238E27FC236}">
+                <a16:creationId xmlns:a16="http://schemas.microsoft.com/office/drawing/2014/main" id="{D1618240-1B4F-D3A8-8997-1D703EBC5607}"/>
+              </a:ext>
+            </a:extLst>
+          </p:cNvPr>
+          <p:cNvSpPr txBox="1"/>
+          <p:nvPr/>
+        </p:nvSpPr>
+        <p:spPr>
+          <a:xfrm>
+            <a:off x="6694680" y="8723173"/>
+            <a:ext cx="2891743" cy="276999"/>
+          </a:xfrm>
+          <a:prstGeom prst="rect">
+            <a:avLst/>
+          </a:prstGeom>
+          <a:noFill/>
+        </p:spPr>
+        <p:txBody>
+          <a:bodyPr wrap="square" rtlCol="0">
+            <a:spAutoFit/>
+          </a:bodyPr>
+          <a:lstStyle/>
+          <a:p>
+            <a:r>
+              <a:rPr lang="en-US" sz="1200" dirty="0">
+                <a:latin typeface="Arial" panose="020B0604020202020204" pitchFamily="34" charset="0"/>
+                <a:cs typeface="Arial" panose="020B0604020202020204" pitchFamily="34" charset="0"/>
+              </a:rPr>
+              <a:t>1            2            3            4            </a:t>
+            </a:r>
+          </a:p>
+        </p:txBody>
+      </p:sp>
+      <p:sp>
+        <p:nvSpPr>
+          <p:cNvPr id="59" name="TextBox 58">
+            <a:extLst>
+              <a:ext uri="{FF2B5EF4-FFF2-40B4-BE49-F238E27FC236}">
+                <a16:creationId xmlns:a16="http://schemas.microsoft.com/office/drawing/2014/main" id="{A27BEDD4-7EE8-86A2-AC37-766D65FFEB9F}"/>
+              </a:ext>
+            </a:extLst>
+          </p:cNvPr>
+          <p:cNvSpPr txBox="1"/>
+          <p:nvPr/>
+        </p:nvSpPr>
+        <p:spPr>
+          <a:xfrm>
+            <a:off x="6138762" y="6117213"/>
+            <a:ext cx="569481" cy="338554"/>
+          </a:xfrm>
+          <a:prstGeom prst="rect">
+            <a:avLst/>
+          </a:prstGeom>
+          <a:noFill/>
+        </p:spPr>
+        <p:txBody>
+          <a:bodyPr wrap="square" rtlCol="0">
+            <a:spAutoFit/>
+          </a:bodyPr>
+          <a:lstStyle/>
+          <a:p>
+            <a:pPr algn="ctr"/>
+            <a:r>
+              <a:rPr lang="en-US" sz="1600" dirty="0">
+                <a:solidFill>
+                  <a:schemeClr val="bg2">
+                    <a:lumMod val="75000"/>
+                  </a:schemeClr>
+                </a:solidFill>
+                <a:latin typeface="Arial" panose="020B0604020202020204" pitchFamily="34" charset="0"/>
+                <a:cs typeface="Arial" panose="020B0604020202020204" pitchFamily="34" charset="0"/>
+              </a:rPr>
+              <a:t>b)</a:t>
+            </a:r>
+          </a:p>
+        </p:txBody>
+      </p:sp>
+      <p:sp>
+        <p:nvSpPr>
+          <p:cNvPr id="60" name="Oval 59">
+            <a:extLst>
+              <a:ext uri="{FF2B5EF4-FFF2-40B4-BE49-F238E27FC236}">
+                <a16:creationId xmlns:a16="http://schemas.microsoft.com/office/drawing/2014/main" id="{4C5D6DC3-B351-79DF-ACBA-5621C4D99514}"/>
+              </a:ext>
+            </a:extLst>
+          </p:cNvPr>
+          <p:cNvSpPr/>
+          <p:nvPr/>
+        </p:nvSpPr>
+        <p:spPr>
+          <a:xfrm>
+            <a:off x="3907714" y="7592822"/>
+            <a:ext cx="141515" cy="130629"/>
+          </a:xfrm>
+          <a:prstGeom prst="ellipse">
+            <a:avLst/>
+          </a:prstGeom>
+          <a:solidFill>
+            <a:srgbClr val="F3CABA"/>
+          </a:solidFill>
+          <a:ln w="19050">
+            <a:solidFill>
+              <a:schemeClr val="tx1"/>
+            </a:solidFill>
+          </a:ln>
+        </p:spPr>
+        <p:style>
+          <a:lnRef idx="2">
+            <a:schemeClr val="accent1">
+              <a:shade val="50000"/>
+            </a:schemeClr>
+          </a:lnRef>
+          <a:fillRef idx="1">
+            <a:schemeClr val="accent1"/>
+          </a:fillRef>
+          <a:effectRef idx="0">
+            <a:schemeClr val="accent1"/>
+          </a:effectRef>
+          <a:fontRef idx="minor">
+            <a:schemeClr val="lt1"/>
+          </a:fontRef>
+        </p:style>
+        <p:txBody>
+          <a:bodyPr rtlCol="0" anchor="ctr"/>
+          <a:lstStyle/>
+          <a:p>
+            <a:pPr algn="ctr"/>
+            <a:endParaRPr lang="en-US">
+              <a:solidFill>
+                <a:schemeClr val="accent2">
+                  <a:lumMod val="50000"/>
+                </a:schemeClr>
+              </a:solidFill>
+            </a:endParaRPr>
+          </a:p>
+        </p:txBody>
+      </p:sp>
+      <p:sp>
+        <p:nvSpPr>
+          <p:cNvPr id="61" name="Oval 60">
+            <a:extLst>
+              <a:ext uri="{FF2B5EF4-FFF2-40B4-BE49-F238E27FC236}">
+                <a16:creationId xmlns:a16="http://schemas.microsoft.com/office/drawing/2014/main" id="{EB55F448-5A3A-7678-679C-EF543653C5E6}"/>
+              </a:ext>
+            </a:extLst>
+          </p:cNvPr>
+          <p:cNvSpPr/>
+          <p:nvPr/>
+        </p:nvSpPr>
+        <p:spPr>
+          <a:xfrm>
+            <a:off x="3740550" y="7773797"/>
+            <a:ext cx="141515" cy="130629"/>
+          </a:xfrm>
+          <a:prstGeom prst="ellipse">
+            <a:avLst/>
+          </a:prstGeom>
+          <a:solidFill>
+            <a:srgbClr val="F3CABA"/>
+          </a:solidFill>
+          <a:ln w="19050">
+            <a:solidFill>
+              <a:schemeClr val="tx1"/>
+            </a:solidFill>
+          </a:ln>
+        </p:spPr>
+        <p:style>
+          <a:lnRef idx="2">
+            <a:schemeClr val="accent1">
+              <a:shade val="50000"/>
+            </a:schemeClr>
+          </a:lnRef>
+          <a:fillRef idx="1">
+            <a:schemeClr val="accent1"/>
+          </a:fillRef>
+          <a:effectRef idx="0">
+            <a:schemeClr val="accent1"/>
+          </a:effectRef>
+          <a:fontRef idx="minor">
+            <a:schemeClr val="lt1"/>
+          </a:fontRef>
+        </p:style>
+        <p:txBody>
+          <a:bodyPr rtlCol="0" anchor="ctr"/>
+          <a:lstStyle/>
+          <a:p>
+            <a:pPr algn="ctr"/>
+            <a:endParaRPr lang="en-US">
+              <a:solidFill>
+                <a:schemeClr val="accent2">
+                  <a:lumMod val="50000"/>
+                </a:schemeClr>
+              </a:solidFill>
+            </a:endParaRPr>
+          </a:p>
+        </p:txBody>
+      </p:sp>
+      <p:sp>
+        <p:nvSpPr>
+          <p:cNvPr id="62" name="Oval 61">
+            <a:extLst>
+              <a:ext uri="{FF2B5EF4-FFF2-40B4-BE49-F238E27FC236}">
+                <a16:creationId xmlns:a16="http://schemas.microsoft.com/office/drawing/2014/main" id="{C568E85D-55A1-9036-1E99-C41BE5AA6547}"/>
+              </a:ext>
+            </a:extLst>
+          </p:cNvPr>
+          <p:cNvSpPr/>
+          <p:nvPr/>
+        </p:nvSpPr>
+        <p:spPr>
+          <a:xfrm>
+            <a:off x="2996434" y="8483415"/>
+            <a:ext cx="141515" cy="130629"/>
+          </a:xfrm>
+          <a:prstGeom prst="ellipse">
+            <a:avLst/>
+          </a:prstGeom>
+          <a:solidFill>
+            <a:srgbClr val="F3CABA"/>
+          </a:solidFill>
+          <a:ln w="19050">
+            <a:solidFill>
+              <a:schemeClr val="tx1"/>
+            </a:solidFill>
+          </a:ln>
+        </p:spPr>
+        <p:style>
+          <a:lnRef idx="2">
+            <a:schemeClr val="accent1">
+              <a:shade val="50000"/>
+            </a:schemeClr>
+          </a:lnRef>
+          <a:fillRef idx="1">
+            <a:schemeClr val="accent1"/>
+          </a:fillRef>
+          <a:effectRef idx="0">
+            <a:schemeClr val="accent1"/>
+          </a:effectRef>
+          <a:fontRef idx="minor">
+            <a:schemeClr val="lt1"/>
+          </a:fontRef>
+        </p:style>
+        <p:txBody>
+          <a:bodyPr rtlCol="0" anchor="ctr"/>
+          <a:lstStyle/>
+          <a:p>
+            <a:pPr algn="ctr"/>
+            <a:endParaRPr lang="en-US">
+              <a:solidFill>
+                <a:schemeClr val="accent2">
+                  <a:lumMod val="50000"/>
+                </a:schemeClr>
+              </a:solidFill>
+            </a:endParaRPr>
+          </a:p>
+        </p:txBody>
+      </p:sp>
+      <p:sp>
+        <p:nvSpPr>
+          <p:cNvPr id="63" name="Oval 62">
+            <a:extLst>
+              <a:ext uri="{FF2B5EF4-FFF2-40B4-BE49-F238E27FC236}">
+                <a16:creationId xmlns:a16="http://schemas.microsoft.com/office/drawing/2014/main" id="{EFFD6B70-1A5B-7BE6-2F22-D286152D13B0}"/>
+              </a:ext>
+            </a:extLst>
+          </p:cNvPr>
+          <p:cNvSpPr/>
+          <p:nvPr/>
+        </p:nvSpPr>
+        <p:spPr>
+          <a:xfrm>
+            <a:off x="3243832" y="8235765"/>
+            <a:ext cx="141515" cy="130629"/>
+          </a:xfrm>
+          <a:prstGeom prst="ellipse">
+            <a:avLst/>
+          </a:prstGeom>
+          <a:solidFill>
+            <a:srgbClr val="F3CABA"/>
+          </a:solidFill>
+          <a:ln w="19050">
+            <a:solidFill>
+              <a:schemeClr val="tx1"/>
+            </a:solidFill>
+          </a:ln>
+        </p:spPr>
+        <p:style>
+          <a:lnRef idx="2">
+            <a:schemeClr val="accent1">
+              <a:shade val="50000"/>
+            </a:schemeClr>
+          </a:lnRef>
+          <a:fillRef idx="1">
+            <a:schemeClr val="accent1"/>
+          </a:fillRef>
+          <a:effectRef idx="0">
+            <a:schemeClr val="accent1"/>
+          </a:effectRef>
+          <a:fontRef idx="minor">
+            <a:schemeClr val="lt1"/>
+          </a:fontRef>
+        </p:style>
+        <p:txBody>
+          <a:bodyPr rtlCol="0" anchor="ctr"/>
+          <a:lstStyle/>
+          <a:p>
+            <a:pPr algn="ctr"/>
+            <a:endParaRPr lang="en-US">
+              <a:solidFill>
+                <a:schemeClr val="accent2">
+                  <a:lumMod val="50000"/>
+                </a:schemeClr>
+              </a:solidFill>
+            </a:endParaRPr>
+          </a:p>
+        </p:txBody>
+      </p:sp>
+      <p:sp>
+        <p:nvSpPr>
+          <p:cNvPr id="1024" name="Oval 1023">
+            <a:extLst>
+              <a:ext uri="{FF2B5EF4-FFF2-40B4-BE49-F238E27FC236}">
+                <a16:creationId xmlns:a16="http://schemas.microsoft.com/office/drawing/2014/main" id="{4D051B26-BA83-93C1-3718-04FF78D315FC}"/>
+              </a:ext>
+            </a:extLst>
+          </p:cNvPr>
+          <p:cNvSpPr/>
+          <p:nvPr/>
+        </p:nvSpPr>
+        <p:spPr>
+          <a:xfrm>
+            <a:off x="4523924" y="7491385"/>
+            <a:ext cx="141515" cy="130629"/>
+          </a:xfrm>
+          <a:prstGeom prst="ellipse">
+            <a:avLst/>
+          </a:prstGeom>
+          <a:solidFill>
+            <a:srgbClr val="F3CABA"/>
+          </a:solidFill>
+          <a:ln w="19050">
+            <a:noFill/>
+          </a:ln>
+        </p:spPr>
+        <p:style>
+          <a:lnRef idx="2">
+            <a:schemeClr val="accent1">
+              <a:shade val="50000"/>
+            </a:schemeClr>
+          </a:lnRef>
+          <a:fillRef idx="1">
+            <a:schemeClr val="accent1"/>
+          </a:fillRef>
+          <a:effectRef idx="0">
+            <a:schemeClr val="accent1"/>
+          </a:effectRef>
+          <a:fontRef idx="minor">
+            <a:schemeClr val="lt1"/>
+          </a:fontRef>
+        </p:style>
+        <p:txBody>
+          <a:bodyPr rtlCol="0" anchor="ctr"/>
+          <a:lstStyle/>
+          <a:p>
+            <a:pPr algn="ctr"/>
+            <a:endParaRPr lang="en-US">
+              <a:solidFill>
+                <a:schemeClr val="accent2">
+                  <a:lumMod val="50000"/>
+                </a:schemeClr>
+              </a:solidFill>
+            </a:endParaRPr>
+          </a:p>
+        </p:txBody>
+      </p:sp>
+      <p:sp>
+        <p:nvSpPr>
+          <p:cNvPr id="1025" name="Oval 1024">
+            <a:extLst>
+              <a:ext uri="{FF2B5EF4-FFF2-40B4-BE49-F238E27FC236}">
+                <a16:creationId xmlns:a16="http://schemas.microsoft.com/office/drawing/2014/main" id="{CC525035-B838-0910-CEF9-79A16B107641}"/>
+              </a:ext>
+            </a:extLst>
+          </p:cNvPr>
+          <p:cNvSpPr/>
+          <p:nvPr/>
+        </p:nvSpPr>
+        <p:spPr>
+          <a:xfrm>
+            <a:off x="4921651" y="7497254"/>
+            <a:ext cx="141515" cy="130629"/>
+          </a:xfrm>
+          <a:prstGeom prst="ellipse">
+            <a:avLst/>
+          </a:prstGeom>
+          <a:solidFill>
+            <a:srgbClr val="F3CABA"/>
+          </a:solidFill>
+          <a:ln w="19050">
+            <a:noFill/>
+          </a:ln>
+        </p:spPr>
+        <p:style>
+          <a:lnRef idx="2">
+            <a:schemeClr val="accent1">
+              <a:shade val="50000"/>
+            </a:schemeClr>
+          </a:lnRef>
+          <a:fillRef idx="1">
+            <a:schemeClr val="accent1"/>
+          </a:fillRef>
+          <a:effectRef idx="0">
+            <a:schemeClr val="accent1"/>
+          </a:effectRef>
+          <a:fontRef idx="minor">
+            <a:schemeClr val="lt1"/>
+          </a:fontRef>
+        </p:style>
+        <p:txBody>
+          <a:bodyPr rtlCol="0" anchor="ctr"/>
+          <a:lstStyle/>
+          <a:p>
+            <a:pPr algn="ctr"/>
+            <a:endParaRPr lang="en-US">
+              <a:solidFill>
+                <a:schemeClr val="accent2">
+                  <a:lumMod val="50000"/>
+                </a:schemeClr>
+              </a:solidFill>
+            </a:endParaRPr>
+          </a:p>
+        </p:txBody>
+      </p:sp>
+      <p:sp>
+        <p:nvSpPr>
+          <p:cNvPr id="1027" name="Oval 1026">
+            <a:extLst>
+              <a:ext uri="{FF2B5EF4-FFF2-40B4-BE49-F238E27FC236}">
+                <a16:creationId xmlns:a16="http://schemas.microsoft.com/office/drawing/2014/main" id="{18F2381D-1FE8-6B2B-448E-5F9F6974851A}"/>
+              </a:ext>
+            </a:extLst>
+          </p:cNvPr>
+          <p:cNvSpPr/>
+          <p:nvPr/>
+        </p:nvSpPr>
+        <p:spPr>
+          <a:xfrm>
+            <a:off x="5397436" y="7495102"/>
+            <a:ext cx="141515" cy="130629"/>
+          </a:xfrm>
+          <a:prstGeom prst="ellipse">
+            <a:avLst/>
+          </a:prstGeom>
+          <a:solidFill>
+            <a:srgbClr val="F3CABA"/>
+          </a:solidFill>
+          <a:ln w="19050">
+            <a:noFill/>
+          </a:ln>
+        </p:spPr>
+        <p:style>
+          <a:lnRef idx="2">
+            <a:schemeClr val="accent1">
+              <a:shade val="50000"/>
+            </a:schemeClr>
+          </a:lnRef>
+          <a:fillRef idx="1">
+            <a:schemeClr val="accent1"/>
+          </a:fillRef>
+          <a:effectRef idx="0">
+            <a:schemeClr val="accent1"/>
+          </a:effectRef>
+          <a:fontRef idx="minor">
+            <a:schemeClr val="lt1"/>
+          </a:fontRef>
+        </p:style>
+        <p:txBody>
+          <a:bodyPr rtlCol="0" anchor="ctr"/>
+          <a:lstStyle/>
+          <a:p>
+            <a:pPr algn="ctr"/>
+            <a:endParaRPr lang="en-US">
+              <a:solidFill>
+                <a:schemeClr val="accent2">
+                  <a:lumMod val="50000"/>
+                </a:schemeClr>
+              </a:solidFill>
+            </a:endParaRPr>
+          </a:p>
+        </p:txBody>
+      </p:sp>
+      <p:sp>
+        <p:nvSpPr>
+          <p:cNvPr id="1028" name="Oval 1027">
+            <a:extLst>
+              <a:ext uri="{FF2B5EF4-FFF2-40B4-BE49-F238E27FC236}">
+                <a16:creationId xmlns:a16="http://schemas.microsoft.com/office/drawing/2014/main" id="{21937490-E407-683C-3052-B73439CE7ED2}"/>
+              </a:ext>
+            </a:extLst>
+          </p:cNvPr>
+          <p:cNvSpPr/>
+          <p:nvPr/>
+        </p:nvSpPr>
+        <p:spPr>
+          <a:xfrm>
+            <a:off x="3888305" y="8070138"/>
+            <a:ext cx="141515" cy="130629"/>
+          </a:xfrm>
+          <a:prstGeom prst="ellipse">
+            <a:avLst/>
+          </a:prstGeom>
+          <a:solidFill>
+            <a:srgbClr val="9C9EBE"/>
+          </a:solidFill>
+          <a:ln w="19050">
+            <a:noFill/>
+          </a:ln>
+        </p:spPr>
+        <p:style>
+          <a:lnRef idx="2">
+            <a:schemeClr val="accent1">
+              <a:shade val="50000"/>
+            </a:schemeClr>
+          </a:lnRef>
+          <a:fillRef idx="1">
+            <a:schemeClr val="accent1"/>
+          </a:fillRef>
+          <a:effectRef idx="0">
+            <a:schemeClr val="accent1"/>
+          </a:effectRef>
+          <a:fontRef idx="minor">
+            <a:schemeClr val="lt1"/>
+          </a:fontRef>
+        </p:style>
+        <p:txBody>
+          <a:bodyPr rtlCol="0" anchor="ctr"/>
+          <a:lstStyle/>
+          <a:p>
+            <a:pPr algn="ctr"/>
+            <a:endParaRPr lang="en-US">
+              <a:solidFill>
+                <a:schemeClr val="accent2">
+                  <a:lumMod val="50000"/>
+                </a:schemeClr>
+              </a:solidFill>
+            </a:endParaRPr>
+          </a:p>
+        </p:txBody>
+      </p:sp>
+      <p:sp>
+        <p:nvSpPr>
+          <p:cNvPr id="1029" name="Oval 1028">
+            <a:extLst>
+              <a:ext uri="{FF2B5EF4-FFF2-40B4-BE49-F238E27FC236}">
+                <a16:creationId xmlns:a16="http://schemas.microsoft.com/office/drawing/2014/main" id="{269DEF91-D307-5ADC-DE88-857F4A707774}"/>
+              </a:ext>
+            </a:extLst>
+          </p:cNvPr>
+          <p:cNvSpPr/>
+          <p:nvPr/>
+        </p:nvSpPr>
+        <p:spPr>
+          <a:xfrm>
+            <a:off x="4427280" y="8063814"/>
+            <a:ext cx="141515" cy="130629"/>
+          </a:xfrm>
+          <a:prstGeom prst="ellipse">
+            <a:avLst/>
+          </a:prstGeom>
+          <a:solidFill>
+            <a:srgbClr val="9C9EBE"/>
+          </a:solidFill>
+          <a:ln w="19050">
+            <a:noFill/>
+          </a:ln>
+        </p:spPr>
+        <p:style>
+          <a:lnRef idx="2">
+            <a:schemeClr val="accent1">
+              <a:shade val="50000"/>
+            </a:schemeClr>
+          </a:lnRef>
+          <a:fillRef idx="1">
+            <a:schemeClr val="accent1"/>
+          </a:fillRef>
+          <a:effectRef idx="0">
+            <a:schemeClr val="accent1"/>
+          </a:effectRef>
+          <a:fontRef idx="minor">
+            <a:schemeClr val="lt1"/>
+          </a:fontRef>
+        </p:style>
+        <p:txBody>
+          <a:bodyPr rtlCol="0" anchor="ctr"/>
+          <a:lstStyle/>
+          <a:p>
+            <a:pPr algn="ctr"/>
+            <a:endParaRPr lang="en-US">
+              <a:solidFill>
+                <a:schemeClr val="accent2">
+                  <a:lumMod val="50000"/>
+                </a:schemeClr>
+              </a:solidFill>
+            </a:endParaRPr>
+          </a:p>
+        </p:txBody>
+      </p:sp>
+      <p:sp>
+        <p:nvSpPr>
+          <p:cNvPr id="1030" name="Oval 1029">
+            <a:extLst>
+              <a:ext uri="{FF2B5EF4-FFF2-40B4-BE49-F238E27FC236}">
+                <a16:creationId xmlns:a16="http://schemas.microsoft.com/office/drawing/2014/main" id="{A87EEE3C-B534-3721-4898-0D709A2EB822}"/>
+              </a:ext>
+            </a:extLst>
+          </p:cNvPr>
+          <p:cNvSpPr/>
+          <p:nvPr/>
+        </p:nvSpPr>
+        <p:spPr>
+          <a:xfrm>
+            <a:off x="5230168" y="8058534"/>
+            <a:ext cx="141515" cy="130629"/>
+          </a:xfrm>
+          <a:prstGeom prst="ellipse">
+            <a:avLst/>
+          </a:prstGeom>
+          <a:solidFill>
+            <a:srgbClr val="9C9EBE"/>
+          </a:solidFill>
+          <a:ln w="19050">
+            <a:noFill/>
+          </a:ln>
+        </p:spPr>
+        <p:style>
+          <a:lnRef idx="2">
+            <a:schemeClr val="accent1">
+              <a:shade val="50000"/>
+            </a:schemeClr>
+          </a:lnRef>
+          <a:fillRef idx="1">
+            <a:schemeClr val="accent1"/>
+          </a:fillRef>
+          <a:effectRef idx="0">
+            <a:schemeClr val="accent1"/>
+          </a:effectRef>
+          <a:fontRef idx="minor">
+            <a:schemeClr val="lt1"/>
+          </a:fontRef>
+        </p:style>
+        <p:txBody>
+          <a:bodyPr rtlCol="0" anchor="ctr"/>
+          <a:lstStyle/>
+          <a:p>
+            <a:pPr algn="ctr"/>
+            <a:endParaRPr lang="en-US">
+              <a:solidFill>
+                <a:schemeClr val="accent2">
+                  <a:lumMod val="50000"/>
+                </a:schemeClr>
+              </a:solidFill>
+            </a:endParaRPr>
+          </a:p>
+        </p:txBody>
+      </p:sp>
+      <p:cxnSp>
+        <p:nvCxnSpPr>
+          <p:cNvPr id="1031" name="Straight Connector 1030">
+            <a:extLst>
+              <a:ext uri="{FF2B5EF4-FFF2-40B4-BE49-F238E27FC236}">
+                <a16:creationId xmlns:a16="http://schemas.microsoft.com/office/drawing/2014/main" id="{9DC352BB-5D5F-FD38-8565-9B9F0DB1A9CF}"/>
+              </a:ext>
+            </a:extLst>
+          </p:cNvPr>
+          <p:cNvCxnSpPr>
+            <a:cxnSpLocks/>
+          </p:cNvCxnSpPr>
+          <p:nvPr/>
+        </p:nvCxnSpPr>
+        <p:spPr>
+          <a:xfrm flipH="1">
+            <a:off x="2948704" y="8687409"/>
+            <a:ext cx="2645901" cy="0"/>
+          </a:xfrm>
+          <a:prstGeom prst="line">
+            <a:avLst/>
+          </a:prstGeom>
+          <a:ln w="28575">
+            <a:solidFill>
+              <a:schemeClr val="tx1"/>
+            </a:solidFill>
+          </a:ln>
+        </p:spPr>
+        <p:style>
+          <a:lnRef idx="1">
+            <a:schemeClr val="accent1"/>
+          </a:lnRef>
+          <a:fillRef idx="0">
+            <a:schemeClr val="accent1"/>
+          </a:fillRef>
+          <a:effectRef idx="0">
+            <a:schemeClr val="accent1"/>
+          </a:effectRef>
+          <a:fontRef idx="minor">
+            <a:schemeClr val="tx1"/>
+          </a:fontRef>
+        </p:style>
+      </p:cxnSp>
+      <p:cxnSp>
+        <p:nvCxnSpPr>
+          <p:cNvPr id="1032" name="Straight Connector 1031">
+            <a:extLst>
+              <a:ext uri="{FF2B5EF4-FFF2-40B4-BE49-F238E27FC236}">
+                <a16:creationId xmlns:a16="http://schemas.microsoft.com/office/drawing/2014/main" id="{FFADD811-A3E1-5070-9969-4ACD8E3346DD}"/>
+              </a:ext>
+            </a:extLst>
+          </p:cNvPr>
+          <p:cNvCxnSpPr>
+            <a:cxnSpLocks/>
+          </p:cNvCxnSpPr>
+          <p:nvPr/>
+        </p:nvCxnSpPr>
+        <p:spPr>
+          <a:xfrm>
+            <a:off x="2937817" y="6194185"/>
+            <a:ext cx="0" cy="2504110"/>
+          </a:xfrm>
+          <a:prstGeom prst="line">
+            <a:avLst/>
+          </a:prstGeom>
+          <a:ln w="28575">
+            <a:solidFill>
+              <a:schemeClr val="tx1"/>
+            </a:solidFill>
+          </a:ln>
+        </p:spPr>
+        <p:style>
+          <a:lnRef idx="1">
+            <a:schemeClr val="accent1"/>
+          </a:lnRef>
+          <a:fillRef idx="0">
+            <a:schemeClr val="accent1"/>
+          </a:fillRef>
+          <a:effectRef idx="0">
+            <a:schemeClr val="accent1"/>
+          </a:effectRef>
+          <a:fontRef idx="minor">
+            <a:schemeClr val="tx1"/>
+          </a:fontRef>
+        </p:style>
+      </p:cxnSp>
+      <p:sp>
+        <p:nvSpPr>
+          <p:cNvPr id="1033" name="TextBox 1032">
+            <a:extLst>
+              <a:ext uri="{FF2B5EF4-FFF2-40B4-BE49-F238E27FC236}">
+                <a16:creationId xmlns:a16="http://schemas.microsoft.com/office/drawing/2014/main" id="{AFAB3690-8F19-403D-1359-8FF4B9F82E8B}"/>
+              </a:ext>
+            </a:extLst>
+          </p:cNvPr>
+          <p:cNvSpPr txBox="1"/>
+          <p:nvPr/>
+        </p:nvSpPr>
+        <p:spPr>
+          <a:xfrm>
+            <a:off x="3749812" y="6362265"/>
+            <a:ext cx="2032232" cy="338554"/>
+          </a:xfrm>
+          <a:prstGeom prst="rect">
+            <a:avLst/>
+          </a:prstGeom>
+          <a:noFill/>
+        </p:spPr>
+        <p:txBody>
+          <a:bodyPr wrap="square" rtlCol="0">
+            <a:spAutoFit/>
+          </a:bodyPr>
+          <a:lstStyle/>
+          <a:p>
+            <a:pPr algn="ctr"/>
+            <a:r>
+              <a:rPr lang="en-US" sz="1600" i="1" dirty="0">
+                <a:solidFill>
+                  <a:schemeClr val="bg2">
+                    <a:lumMod val="75000"/>
+                  </a:schemeClr>
+                </a:solidFill>
+                <a:latin typeface="Arial" panose="020B0604020202020204" pitchFamily="34" charset="0"/>
+                <a:cs typeface="Arial" panose="020B0604020202020204" pitchFamily="34" charset="0"/>
+              </a:rPr>
+              <a:t>1:1</a:t>
+            </a:r>
+          </a:p>
+        </p:txBody>
+      </p:sp>
+      <p:sp>
+        <p:nvSpPr>
+          <p:cNvPr id="1035" name="TextBox 1034">
+            <a:extLst>
+              <a:ext uri="{FF2B5EF4-FFF2-40B4-BE49-F238E27FC236}">
+                <a16:creationId xmlns:a16="http://schemas.microsoft.com/office/drawing/2014/main" id="{401F6452-4BCF-D391-4EE7-FBE4E6C7DB24}"/>
+              </a:ext>
+            </a:extLst>
+          </p:cNvPr>
+          <p:cNvSpPr txBox="1"/>
+          <p:nvPr/>
+        </p:nvSpPr>
+        <p:spPr>
+          <a:xfrm rot="16200000">
+            <a:off x="1029999" y="7277521"/>
+            <a:ext cx="2900904" cy="338554"/>
+          </a:xfrm>
+          <a:prstGeom prst="rect">
+            <a:avLst/>
+          </a:prstGeom>
+          <a:noFill/>
+        </p:spPr>
+        <p:txBody>
+          <a:bodyPr wrap="square" rtlCol="0">
+            <a:spAutoFit/>
+          </a:bodyPr>
+          <a:lstStyle/>
+          <a:p>
+            <a:pPr algn="ctr"/>
+            <a:r>
+              <a:rPr lang="en-US" sz="1600" dirty="0">
+                <a:latin typeface="Arial" panose="020B0604020202020204" pitchFamily="34" charset="0"/>
+                <a:cs typeface="Arial" panose="020B0604020202020204" pitchFamily="34" charset="0"/>
+              </a:rPr>
+              <a:t>Range expansion rate (km/yr)</a:t>
+            </a:r>
+          </a:p>
+        </p:txBody>
+      </p:sp>
+      <p:sp>
+        <p:nvSpPr>
+          <p:cNvPr id="1036" name="Oval 1035">
+            <a:extLst>
+              <a:ext uri="{FF2B5EF4-FFF2-40B4-BE49-F238E27FC236}">
+                <a16:creationId xmlns:a16="http://schemas.microsoft.com/office/drawing/2014/main" id="{D2AA29B6-45C0-D1E7-02BF-7B7437742845}"/>
+              </a:ext>
+            </a:extLst>
+          </p:cNvPr>
+          <p:cNvSpPr/>
+          <p:nvPr/>
+        </p:nvSpPr>
+        <p:spPr>
+          <a:xfrm>
+            <a:off x="4977350" y="5780323"/>
+            <a:ext cx="141515" cy="130629"/>
+          </a:xfrm>
+          <a:prstGeom prst="ellipse">
+            <a:avLst/>
+          </a:prstGeom>
+          <a:solidFill>
+            <a:schemeClr val="bg1"/>
+          </a:solidFill>
+          <a:ln w="19050">
+            <a:solidFill>
+              <a:schemeClr val="bg1"/>
+            </a:solidFill>
+          </a:ln>
+        </p:spPr>
+        <p:style>
+          <a:lnRef idx="2">
+            <a:schemeClr val="accent1">
+              <a:shade val="50000"/>
+            </a:schemeClr>
+          </a:lnRef>
+          <a:fillRef idx="1">
+            <a:schemeClr val="accent1"/>
+          </a:fillRef>
+          <a:effectRef idx="0">
+            <a:schemeClr val="accent1"/>
+          </a:effectRef>
+          <a:fontRef idx="minor">
+            <a:schemeClr val="lt1"/>
+          </a:fontRef>
+        </p:style>
+        <p:txBody>
+          <a:bodyPr rtlCol="0" anchor="ctr"/>
+          <a:lstStyle/>
+          <a:p>
+            <a:pPr algn="ctr"/>
+            <a:endParaRPr lang="en-US">
+              <a:solidFill>
+                <a:schemeClr val="accent2">
+                  <a:lumMod val="50000"/>
+                </a:schemeClr>
+              </a:solidFill>
+            </a:endParaRPr>
+          </a:p>
+        </p:txBody>
+      </p:sp>
+      <p:sp>
+        <p:nvSpPr>
+          <p:cNvPr id="1037" name="TextBox 1036">
+            <a:extLst>
+              <a:ext uri="{FF2B5EF4-FFF2-40B4-BE49-F238E27FC236}">
+                <a16:creationId xmlns:a16="http://schemas.microsoft.com/office/drawing/2014/main" id="{4F7285F9-E473-3351-BF40-14F3A0626619}"/>
+              </a:ext>
+            </a:extLst>
+          </p:cNvPr>
+          <p:cNvSpPr txBox="1"/>
+          <p:nvPr/>
+        </p:nvSpPr>
+        <p:spPr>
+          <a:xfrm>
+            <a:off x="9107299" y="6260382"/>
+            <a:ext cx="1131724" cy="1077218"/>
+          </a:xfrm>
+          <a:prstGeom prst="rect">
+            <a:avLst/>
+          </a:prstGeom>
+          <a:noFill/>
+        </p:spPr>
+        <p:txBody>
+          <a:bodyPr wrap="square" rtlCol="0">
+            <a:spAutoFit/>
+          </a:bodyPr>
+          <a:lstStyle/>
+          <a:p>
+            <a:pPr algn="ctr"/>
+            <a:r>
+              <a:rPr lang="en-US" sz="1600" dirty="0">
+                <a:latin typeface="Arial" panose="020B0604020202020204" pitchFamily="34" charset="0"/>
+                <a:cs typeface="Arial" panose="020B0604020202020204" pitchFamily="34" charset="0"/>
+              </a:rPr>
+              <a:t>Velocity of isotherm shift (km/yr)</a:t>
+            </a:r>
+          </a:p>
+        </p:txBody>
+      </p:sp>
+      <p:sp>
+        <p:nvSpPr>
+          <p:cNvPr id="1049" name="TextBox 1048">
+            <a:extLst>
+              <a:ext uri="{FF2B5EF4-FFF2-40B4-BE49-F238E27FC236}">
+                <a16:creationId xmlns:a16="http://schemas.microsoft.com/office/drawing/2014/main" id="{35574FFE-88A9-EBA9-93A0-8D480D091E6E}"/>
+              </a:ext>
+            </a:extLst>
+          </p:cNvPr>
+          <p:cNvSpPr txBox="1"/>
+          <p:nvPr/>
+        </p:nvSpPr>
+        <p:spPr>
+          <a:xfrm>
+            <a:off x="7104673" y="10174620"/>
+            <a:ext cx="569481" cy="338554"/>
+          </a:xfrm>
+          <a:prstGeom prst="rect">
+            <a:avLst/>
+          </a:prstGeom>
+          <a:noFill/>
+        </p:spPr>
+        <p:txBody>
+          <a:bodyPr wrap="square" rtlCol="0">
+            <a:spAutoFit/>
+          </a:bodyPr>
+          <a:lstStyle/>
+          <a:p>
+            <a:pPr algn="ctr"/>
+            <a:r>
+              <a:rPr lang="en-US" sz="1600" dirty="0">
+                <a:solidFill>
+                  <a:schemeClr val="bg2">
+                    <a:lumMod val="75000"/>
+                  </a:schemeClr>
+                </a:solidFill>
+                <a:latin typeface="Arial" panose="020B0604020202020204" pitchFamily="34" charset="0"/>
+                <a:cs typeface="Arial" panose="020B0604020202020204" pitchFamily="34" charset="0"/>
+              </a:rPr>
+              <a:t>b)</a:t>
+            </a:r>
+          </a:p>
+        </p:txBody>
+      </p:sp>
+      <p:sp>
+        <p:nvSpPr>
+          <p:cNvPr id="1050" name="TextBox 1049">
+            <a:extLst>
+              <a:ext uri="{FF2B5EF4-FFF2-40B4-BE49-F238E27FC236}">
+                <a16:creationId xmlns:a16="http://schemas.microsoft.com/office/drawing/2014/main" id="{AE510EC9-F2D5-C6FB-6A49-9E5238F66796}"/>
+              </a:ext>
+            </a:extLst>
+          </p:cNvPr>
+          <p:cNvSpPr txBox="1"/>
+          <p:nvPr/>
+        </p:nvSpPr>
+        <p:spPr>
+          <a:xfrm>
+            <a:off x="4992575" y="11604734"/>
+            <a:ext cx="2032232" cy="338554"/>
+          </a:xfrm>
+          <a:prstGeom prst="rect">
+            <a:avLst/>
+          </a:prstGeom>
+          <a:noFill/>
+        </p:spPr>
+        <p:txBody>
+          <a:bodyPr wrap="square" rtlCol="0">
+            <a:spAutoFit/>
+          </a:bodyPr>
+          <a:lstStyle/>
+          <a:p>
+            <a:pPr algn="ctr"/>
+            <a:r>
+              <a:rPr lang="en-US" sz="1600" i="1" dirty="0">
+                <a:solidFill>
+                  <a:schemeClr val="bg2">
+                    <a:lumMod val="75000"/>
+                  </a:schemeClr>
+                </a:solidFill>
+                <a:latin typeface="Arial" panose="020B0604020202020204" pitchFamily="34" charset="0"/>
+                <a:cs typeface="Arial" panose="020B0604020202020204" pitchFamily="34" charset="0"/>
+              </a:rPr>
+              <a:t>1:1</a:t>
+            </a:r>
+          </a:p>
+        </p:txBody>
+      </p:sp>
+      <p:sp>
+        <p:nvSpPr>
+          <p:cNvPr id="1058" name="Oval 1057">
+            <a:extLst>
+              <a:ext uri="{FF2B5EF4-FFF2-40B4-BE49-F238E27FC236}">
+                <a16:creationId xmlns:a16="http://schemas.microsoft.com/office/drawing/2014/main" id="{E3449B27-44B5-366E-79CA-9E0AB9FEE90B}"/>
+              </a:ext>
+            </a:extLst>
+          </p:cNvPr>
+          <p:cNvSpPr/>
+          <p:nvPr/>
+        </p:nvSpPr>
+        <p:spPr>
+          <a:xfrm>
+            <a:off x="6849927" y="7967454"/>
+            <a:ext cx="141515" cy="130629"/>
+          </a:xfrm>
+          <a:prstGeom prst="ellipse">
+            <a:avLst/>
+          </a:prstGeom>
+          <a:solidFill>
+            <a:srgbClr val="B2172B"/>
+          </a:solidFill>
+          <a:ln w="19050">
+            <a:solidFill>
+              <a:schemeClr val="tx1"/>
+            </a:solidFill>
+          </a:ln>
+        </p:spPr>
+        <p:style>
+          <a:lnRef idx="2">
+            <a:schemeClr val="accent1">
+              <a:shade val="50000"/>
+            </a:schemeClr>
+          </a:lnRef>
+          <a:fillRef idx="1">
+            <a:schemeClr val="accent1"/>
+          </a:fillRef>
+          <a:effectRef idx="0">
+            <a:schemeClr val="accent1"/>
+          </a:effectRef>
+          <a:fontRef idx="minor">
+            <a:schemeClr val="lt1"/>
+          </a:fontRef>
+        </p:style>
+        <p:txBody>
+          <a:bodyPr rtlCol="0" anchor="ctr"/>
+          <a:lstStyle/>
+          <a:p>
+            <a:pPr algn="ctr"/>
+            <a:endParaRPr lang="en-US">
+              <a:solidFill>
+                <a:schemeClr val="accent2">
+                  <a:lumMod val="50000"/>
+                </a:schemeClr>
+              </a:solidFill>
+            </a:endParaRPr>
+          </a:p>
+        </p:txBody>
+      </p:sp>
+      <p:sp>
+        <p:nvSpPr>
+          <p:cNvPr id="1059" name="Oval 1058">
+            <a:extLst>
+              <a:ext uri="{FF2B5EF4-FFF2-40B4-BE49-F238E27FC236}">
+                <a16:creationId xmlns:a16="http://schemas.microsoft.com/office/drawing/2014/main" id="{5326EFE2-3069-3A3F-A7B0-003952C2FDAD}"/>
+              </a:ext>
+            </a:extLst>
+          </p:cNvPr>
+          <p:cNvSpPr/>
+          <p:nvPr/>
+        </p:nvSpPr>
+        <p:spPr>
+          <a:xfrm>
+            <a:off x="7702928" y="7106380"/>
+            <a:ext cx="141515" cy="130629"/>
+          </a:xfrm>
+          <a:prstGeom prst="ellipse">
+            <a:avLst/>
+          </a:prstGeom>
+          <a:solidFill>
+            <a:srgbClr val="B2172B"/>
+          </a:solidFill>
+          <a:ln w="19050">
+            <a:solidFill>
+              <a:schemeClr val="tx1"/>
+            </a:solidFill>
+          </a:ln>
+        </p:spPr>
+        <p:style>
+          <a:lnRef idx="2">
+            <a:schemeClr val="accent1">
+              <a:shade val="50000"/>
+            </a:schemeClr>
+          </a:lnRef>
+          <a:fillRef idx="1">
+            <a:schemeClr val="accent1"/>
+          </a:fillRef>
+          <a:effectRef idx="0">
+            <a:schemeClr val="accent1"/>
+          </a:effectRef>
+          <a:fontRef idx="minor">
+            <a:schemeClr val="lt1"/>
+          </a:fontRef>
+        </p:style>
+        <p:txBody>
+          <a:bodyPr rtlCol="0" anchor="ctr"/>
+          <a:lstStyle/>
+          <a:p>
+            <a:pPr algn="ctr"/>
+            <a:endParaRPr lang="en-US">
+              <a:solidFill>
+                <a:schemeClr val="accent2">
+                  <a:lumMod val="50000"/>
+                </a:schemeClr>
+              </a:solidFill>
+            </a:endParaRPr>
+          </a:p>
+        </p:txBody>
+      </p:sp>
+      <p:sp>
+        <p:nvSpPr>
+          <p:cNvPr id="1060" name="Oval 1059">
+            <a:extLst>
+              <a:ext uri="{FF2B5EF4-FFF2-40B4-BE49-F238E27FC236}">
+                <a16:creationId xmlns:a16="http://schemas.microsoft.com/office/drawing/2014/main" id="{98D03691-5D17-7DCC-547A-E87BD48D8222}"/>
+              </a:ext>
+            </a:extLst>
+          </p:cNvPr>
+          <p:cNvSpPr/>
+          <p:nvPr/>
+        </p:nvSpPr>
+        <p:spPr>
+          <a:xfrm>
+            <a:off x="7832635" y="6995589"/>
+            <a:ext cx="141515" cy="130629"/>
+          </a:xfrm>
+          <a:prstGeom prst="ellipse">
+            <a:avLst/>
+          </a:prstGeom>
+          <a:solidFill>
+            <a:srgbClr val="B2172B"/>
+          </a:solidFill>
+          <a:ln>
+            <a:solidFill>
+              <a:srgbClr val="B2172B"/>
+            </a:solidFill>
+          </a:ln>
+        </p:spPr>
+        <p:style>
+          <a:lnRef idx="2">
+            <a:schemeClr val="accent1">
+              <a:shade val="50000"/>
+            </a:schemeClr>
+          </a:lnRef>
+          <a:fillRef idx="1">
+            <a:schemeClr val="accent1"/>
+          </a:fillRef>
+          <a:effectRef idx="0">
+            <a:schemeClr val="accent1"/>
+          </a:effectRef>
+          <a:fontRef idx="minor">
+            <a:schemeClr val="lt1"/>
+          </a:fontRef>
+        </p:style>
+        <p:txBody>
+          <a:bodyPr rtlCol="0" anchor="ctr"/>
+          <a:lstStyle/>
+          <a:p>
+            <a:pPr algn="ctr"/>
+            <a:endParaRPr lang="en-US">
+              <a:solidFill>
+                <a:schemeClr val="accent2">
+                  <a:lumMod val="50000"/>
+                </a:schemeClr>
+              </a:solidFill>
+            </a:endParaRPr>
+          </a:p>
+        </p:txBody>
+      </p:sp>
+      <p:sp>
+        <p:nvSpPr>
+          <p:cNvPr id="1061" name="Oval 1060">
+            <a:extLst>
+              <a:ext uri="{FF2B5EF4-FFF2-40B4-BE49-F238E27FC236}">
+                <a16:creationId xmlns:a16="http://schemas.microsoft.com/office/drawing/2014/main" id="{125C68A8-7EDD-D896-51A7-9A6DE998D4CB}"/>
+              </a:ext>
+            </a:extLst>
+          </p:cNvPr>
+          <p:cNvSpPr/>
+          <p:nvPr/>
+        </p:nvSpPr>
+        <p:spPr>
+          <a:xfrm>
+            <a:off x="7416001" y="7410355"/>
+            <a:ext cx="141515" cy="130629"/>
+          </a:xfrm>
+          <a:prstGeom prst="ellipse">
+            <a:avLst/>
+          </a:prstGeom>
+          <a:solidFill>
+            <a:srgbClr val="B2172B"/>
+          </a:solidFill>
+          <a:ln w="19050">
+            <a:solidFill>
+              <a:schemeClr val="tx1"/>
+            </a:solidFill>
+          </a:ln>
+        </p:spPr>
+        <p:style>
+          <a:lnRef idx="2">
+            <a:schemeClr val="accent1">
+              <a:shade val="50000"/>
+            </a:schemeClr>
+          </a:lnRef>
+          <a:fillRef idx="1">
+            <a:schemeClr val="accent1"/>
+          </a:fillRef>
+          <a:effectRef idx="0">
+            <a:schemeClr val="accent1"/>
+          </a:effectRef>
+          <a:fontRef idx="minor">
+            <a:schemeClr val="lt1"/>
+          </a:fontRef>
+        </p:style>
+        <p:txBody>
+          <a:bodyPr rtlCol="0" anchor="ctr"/>
+          <a:lstStyle/>
+          <a:p>
+            <a:pPr algn="ctr"/>
+            <a:endParaRPr lang="en-US">
+              <a:solidFill>
+                <a:schemeClr val="accent2">
+                  <a:lumMod val="50000"/>
+                </a:schemeClr>
+              </a:solidFill>
+            </a:endParaRPr>
+          </a:p>
+        </p:txBody>
+      </p:sp>
+      <p:sp>
+        <p:nvSpPr>
+          <p:cNvPr id="1062" name="Oval 1061">
+            <a:extLst>
+              <a:ext uri="{FF2B5EF4-FFF2-40B4-BE49-F238E27FC236}">
+                <a16:creationId xmlns:a16="http://schemas.microsoft.com/office/drawing/2014/main" id="{746D4208-CECA-D292-2444-98499F23E5DD}"/>
+              </a:ext>
+            </a:extLst>
+          </p:cNvPr>
+          <p:cNvSpPr/>
+          <p:nvPr/>
+        </p:nvSpPr>
+        <p:spPr>
+          <a:xfrm>
+            <a:off x="7208163" y="7605619"/>
+            <a:ext cx="141515" cy="130629"/>
+          </a:xfrm>
+          <a:prstGeom prst="ellipse">
+            <a:avLst/>
+          </a:prstGeom>
+          <a:solidFill>
+            <a:srgbClr val="F3CABA"/>
+          </a:solidFill>
+          <a:ln w="19050">
+            <a:solidFill>
+              <a:schemeClr val="tx1"/>
+            </a:solidFill>
+          </a:ln>
+        </p:spPr>
+        <p:style>
+          <a:lnRef idx="2">
+            <a:schemeClr val="accent1">
+              <a:shade val="50000"/>
+            </a:schemeClr>
+          </a:lnRef>
+          <a:fillRef idx="1">
+            <a:schemeClr val="accent1"/>
+          </a:fillRef>
+          <a:effectRef idx="0">
+            <a:schemeClr val="accent1"/>
+          </a:effectRef>
+          <a:fontRef idx="minor">
+            <a:schemeClr val="lt1"/>
+          </a:fontRef>
+        </p:style>
+        <p:txBody>
+          <a:bodyPr rtlCol="0" anchor="ctr"/>
+          <a:lstStyle/>
+          <a:p>
+            <a:pPr algn="ctr"/>
+            <a:endParaRPr lang="en-US">
+              <a:solidFill>
+                <a:schemeClr val="accent2">
+                  <a:lumMod val="50000"/>
+                </a:schemeClr>
+              </a:solidFill>
+            </a:endParaRPr>
+          </a:p>
+        </p:txBody>
+      </p:sp>
+      <p:sp>
+        <p:nvSpPr>
+          <p:cNvPr id="1063" name="Oval 1062">
+            <a:extLst>
+              <a:ext uri="{FF2B5EF4-FFF2-40B4-BE49-F238E27FC236}">
+                <a16:creationId xmlns:a16="http://schemas.microsoft.com/office/drawing/2014/main" id="{EA92D02E-331B-B6B8-5247-1AFA99ABDC45}"/>
+              </a:ext>
+            </a:extLst>
+          </p:cNvPr>
+          <p:cNvSpPr/>
+          <p:nvPr/>
+        </p:nvSpPr>
+        <p:spPr>
+          <a:xfrm>
+            <a:off x="7040999" y="7786594"/>
+            <a:ext cx="141515" cy="130629"/>
+          </a:xfrm>
+          <a:prstGeom prst="ellipse">
+            <a:avLst/>
+          </a:prstGeom>
+          <a:solidFill>
+            <a:srgbClr val="F3CABA"/>
+          </a:solidFill>
+          <a:ln w="19050">
+            <a:solidFill>
+              <a:schemeClr val="tx1"/>
+            </a:solidFill>
+          </a:ln>
+        </p:spPr>
+        <p:style>
+          <a:lnRef idx="2">
+            <a:schemeClr val="accent1">
+              <a:shade val="50000"/>
+            </a:schemeClr>
+          </a:lnRef>
+          <a:fillRef idx="1">
+            <a:schemeClr val="accent1"/>
+          </a:fillRef>
+          <a:effectRef idx="0">
+            <a:schemeClr val="accent1"/>
+          </a:effectRef>
+          <a:fontRef idx="minor">
+            <a:schemeClr val="lt1"/>
+          </a:fontRef>
+        </p:style>
+        <p:txBody>
+          <a:bodyPr rtlCol="0" anchor="ctr"/>
+          <a:lstStyle/>
+          <a:p>
+            <a:pPr algn="ctr"/>
+            <a:endParaRPr lang="en-US">
+              <a:solidFill>
+                <a:schemeClr val="accent2">
+                  <a:lumMod val="50000"/>
+                </a:schemeClr>
+              </a:solidFill>
+            </a:endParaRPr>
+          </a:p>
+        </p:txBody>
+      </p:sp>
+      <p:sp>
+        <p:nvSpPr>
+          <p:cNvPr id="1064" name="Oval 1063">
+            <a:extLst>
+              <a:ext uri="{FF2B5EF4-FFF2-40B4-BE49-F238E27FC236}">
+                <a16:creationId xmlns:a16="http://schemas.microsoft.com/office/drawing/2014/main" id="{4DB40CC1-3434-CAA9-DD60-C2C6017D5675}"/>
+              </a:ext>
+            </a:extLst>
+          </p:cNvPr>
+          <p:cNvSpPr/>
+          <p:nvPr/>
+        </p:nvSpPr>
+        <p:spPr>
+          <a:xfrm>
+            <a:off x="6296883" y="8496212"/>
+            <a:ext cx="141515" cy="130629"/>
+          </a:xfrm>
+          <a:prstGeom prst="ellipse">
+            <a:avLst/>
+          </a:prstGeom>
+          <a:solidFill>
+            <a:srgbClr val="F3CABA"/>
+          </a:solidFill>
+          <a:ln w="19050">
+            <a:solidFill>
+              <a:schemeClr val="tx1"/>
+            </a:solidFill>
+          </a:ln>
+        </p:spPr>
+        <p:style>
+          <a:lnRef idx="2">
+            <a:schemeClr val="accent1">
+              <a:shade val="50000"/>
+            </a:schemeClr>
+          </a:lnRef>
+          <a:fillRef idx="1">
+            <a:schemeClr val="accent1"/>
+          </a:fillRef>
+          <a:effectRef idx="0">
+            <a:schemeClr val="accent1"/>
+          </a:effectRef>
+          <a:fontRef idx="minor">
+            <a:schemeClr val="lt1"/>
+          </a:fontRef>
+        </p:style>
+        <p:txBody>
+          <a:bodyPr rtlCol="0" anchor="ctr"/>
+          <a:lstStyle/>
+          <a:p>
+            <a:pPr algn="ctr"/>
+            <a:endParaRPr lang="en-US">
+              <a:solidFill>
+                <a:schemeClr val="accent2">
+                  <a:lumMod val="50000"/>
+                </a:schemeClr>
+              </a:solidFill>
+            </a:endParaRPr>
+          </a:p>
+        </p:txBody>
+      </p:sp>
+      <p:sp>
+        <p:nvSpPr>
+          <p:cNvPr id="1065" name="Oval 1064">
+            <a:extLst>
+              <a:ext uri="{FF2B5EF4-FFF2-40B4-BE49-F238E27FC236}">
+                <a16:creationId xmlns:a16="http://schemas.microsoft.com/office/drawing/2014/main" id="{4481A440-9345-0746-716B-94CC8F474C85}"/>
+              </a:ext>
+            </a:extLst>
+          </p:cNvPr>
+          <p:cNvSpPr/>
+          <p:nvPr/>
+        </p:nvSpPr>
+        <p:spPr>
+          <a:xfrm>
+            <a:off x="6544281" y="8248562"/>
+            <a:ext cx="141515" cy="130629"/>
+          </a:xfrm>
+          <a:prstGeom prst="ellipse">
+            <a:avLst/>
+          </a:prstGeom>
+          <a:solidFill>
+            <a:srgbClr val="F3CABA"/>
+          </a:solidFill>
+          <a:ln w="19050">
+            <a:solidFill>
+              <a:schemeClr val="tx1"/>
+            </a:solidFill>
+          </a:ln>
+        </p:spPr>
+        <p:style>
+          <a:lnRef idx="2">
+            <a:schemeClr val="accent1">
+              <a:shade val="50000"/>
+            </a:schemeClr>
+          </a:lnRef>
+          <a:fillRef idx="1">
+            <a:schemeClr val="accent1"/>
+          </a:fillRef>
+          <a:effectRef idx="0">
+            <a:schemeClr val="accent1"/>
+          </a:effectRef>
+          <a:fontRef idx="minor">
+            <a:schemeClr val="lt1"/>
+          </a:fontRef>
+        </p:style>
+        <p:txBody>
+          <a:bodyPr rtlCol="0" anchor="ctr"/>
+          <a:lstStyle/>
+          <a:p>
+            <a:pPr algn="ctr"/>
+            <a:endParaRPr lang="en-US">
+              <a:solidFill>
+                <a:schemeClr val="accent2">
+                  <a:lumMod val="50000"/>
+                </a:schemeClr>
+              </a:solidFill>
+            </a:endParaRPr>
+          </a:p>
+        </p:txBody>
+      </p:sp>
+      <p:sp>
+        <p:nvSpPr>
+          <p:cNvPr id="1066" name="Oval 1065">
+            <a:extLst>
+              <a:ext uri="{FF2B5EF4-FFF2-40B4-BE49-F238E27FC236}">
+                <a16:creationId xmlns:a16="http://schemas.microsoft.com/office/drawing/2014/main" id="{81CBDB01-C765-7672-492F-326061403CEB}"/>
+              </a:ext>
+            </a:extLst>
+          </p:cNvPr>
+          <p:cNvSpPr/>
+          <p:nvPr/>
+        </p:nvSpPr>
+        <p:spPr>
+          <a:xfrm>
+            <a:off x="7307844" y="7504182"/>
+            <a:ext cx="141515" cy="130629"/>
+          </a:xfrm>
+          <a:prstGeom prst="ellipse">
+            <a:avLst/>
+          </a:prstGeom>
+          <a:solidFill>
+            <a:srgbClr val="F3CABA"/>
+          </a:solidFill>
+          <a:ln w="19050">
+            <a:noFill/>
+          </a:ln>
+        </p:spPr>
+        <p:style>
+          <a:lnRef idx="2">
+            <a:schemeClr val="accent1">
+              <a:shade val="50000"/>
+            </a:schemeClr>
+          </a:lnRef>
+          <a:fillRef idx="1">
+            <a:schemeClr val="accent1"/>
+          </a:fillRef>
+          <a:effectRef idx="0">
+            <a:schemeClr val="accent1"/>
+          </a:effectRef>
+          <a:fontRef idx="minor">
+            <a:schemeClr val="lt1"/>
+          </a:fontRef>
+        </p:style>
+        <p:txBody>
+          <a:bodyPr rtlCol="0" anchor="ctr"/>
+          <a:lstStyle/>
+          <a:p>
+            <a:pPr algn="ctr"/>
+            <a:endParaRPr lang="en-US">
+              <a:solidFill>
+                <a:schemeClr val="accent2">
+                  <a:lumMod val="50000"/>
+                </a:schemeClr>
+              </a:solidFill>
+            </a:endParaRPr>
+          </a:p>
+        </p:txBody>
+      </p:sp>
+      <p:sp>
+        <p:nvSpPr>
+          <p:cNvPr id="1069" name="Oval 1068">
+            <a:extLst>
+              <a:ext uri="{FF2B5EF4-FFF2-40B4-BE49-F238E27FC236}">
+                <a16:creationId xmlns:a16="http://schemas.microsoft.com/office/drawing/2014/main" id="{59A71674-4F09-0D22-11D4-43D7926733FF}"/>
+              </a:ext>
+            </a:extLst>
+          </p:cNvPr>
+          <p:cNvSpPr/>
+          <p:nvPr/>
+        </p:nvSpPr>
+        <p:spPr>
+          <a:xfrm>
+            <a:off x="6728067" y="8082935"/>
+            <a:ext cx="141515" cy="130629"/>
+          </a:xfrm>
+          <a:prstGeom prst="ellipse">
+            <a:avLst/>
+          </a:prstGeom>
+          <a:solidFill>
+            <a:srgbClr val="9C9EBE"/>
+          </a:solidFill>
+          <a:ln w="19050">
+            <a:noFill/>
+          </a:ln>
+        </p:spPr>
+        <p:style>
+          <a:lnRef idx="2">
+            <a:schemeClr val="accent1">
+              <a:shade val="50000"/>
+            </a:schemeClr>
+          </a:lnRef>
+          <a:fillRef idx="1">
+            <a:schemeClr val="accent1"/>
+          </a:fillRef>
+          <a:effectRef idx="0">
+            <a:schemeClr val="accent1"/>
+          </a:effectRef>
+          <a:fontRef idx="minor">
+            <a:schemeClr val="lt1"/>
+          </a:fontRef>
+        </p:style>
+        <p:txBody>
+          <a:bodyPr rtlCol="0" anchor="ctr"/>
+          <a:lstStyle/>
+          <a:p>
+            <a:pPr algn="ctr"/>
+            <a:endParaRPr lang="en-US">
+              <a:solidFill>
+                <a:schemeClr val="accent2">
+                  <a:lumMod val="50000"/>
+                </a:schemeClr>
+              </a:solidFill>
+            </a:endParaRPr>
+          </a:p>
+        </p:txBody>
+      </p:sp>
+      <p:grpSp>
+        <p:nvGrpSpPr>
+          <p:cNvPr id="5" name="Group 4">
+            <a:extLst>
+              <a:ext uri="{FF2B5EF4-FFF2-40B4-BE49-F238E27FC236}">
+                <a16:creationId xmlns:a16="http://schemas.microsoft.com/office/drawing/2014/main" id="{09AC191C-F5C3-E748-3D26-6FF757FE93A5}"/>
+              </a:ext>
+            </a:extLst>
+          </p:cNvPr>
+          <p:cNvGrpSpPr/>
+          <p:nvPr/>
+        </p:nvGrpSpPr>
+        <p:grpSpPr>
+          <a:xfrm>
+            <a:off x="10127199" y="6888147"/>
+            <a:ext cx="3024597" cy="1101530"/>
+            <a:chOff x="8524560" y="6991381"/>
+            <a:chExt cx="2682403" cy="1101530"/>
+          </a:xfrm>
+        </p:grpSpPr>
+        <p:sp>
+          <p:nvSpPr>
+            <p:cNvPr id="1044" name="Oval 1043">
+              <a:extLst>
+                <a:ext uri="{FF2B5EF4-FFF2-40B4-BE49-F238E27FC236}">
+                  <a16:creationId xmlns:a16="http://schemas.microsoft.com/office/drawing/2014/main" id="{F8E8711A-24F1-A5FF-40E4-B7A5E16F723A}"/>
+                </a:ext>
+              </a:extLst>
+            </p:cNvPr>
+            <p:cNvSpPr/>
+            <p:nvPr/>
+          </p:nvSpPr>
+          <p:spPr>
+            <a:xfrm>
+              <a:off x="8524560" y="7462734"/>
+              <a:ext cx="2682403" cy="355600"/>
+            </a:xfrm>
+            <a:prstGeom prst="ellipse">
+              <a:avLst/>
+            </a:prstGeom>
+            <a:noFill/>
+            <a:ln>
+              <a:noFill/>
+            </a:ln>
+          </p:spPr>
+          <p:style>
+            <a:lnRef idx="2">
+              <a:schemeClr val="accent1">
+                <a:shade val="50000"/>
+              </a:schemeClr>
+            </a:lnRef>
+            <a:fillRef idx="1">
+              <a:schemeClr val="accent1"/>
+            </a:fillRef>
+            <a:effectRef idx="0">
+              <a:schemeClr val="accent1"/>
+            </a:effectRef>
+            <a:fontRef idx="minor">
+              <a:schemeClr val="lt1"/>
+            </a:fontRef>
+          </p:style>
+          <p:txBody>
+            <a:bodyPr rtlCol="0" anchor="ctr"/>
+            <a:lstStyle/>
+            <a:p>
+              <a:pPr algn="ctr"/>
+              <a:r>
+                <a:rPr lang="en-US" sz="1600" dirty="0">
+                  <a:solidFill>
+                    <a:sysClr val="windowText" lastClr="000000"/>
+                  </a:solidFill>
+                  <a:latin typeface="Arial" panose="020B0604020202020204" pitchFamily="34" charset="0"/>
+                  <a:cs typeface="Arial" panose="020B0604020202020204" pitchFamily="34" charset="0"/>
+                </a:rPr>
+                <a:t>Dispersal rate &lt; velocity of isotherm shift</a:t>
+              </a:r>
+            </a:p>
+            <a:p>
+              <a:pPr algn="ctr"/>
+              <a:endParaRPr lang="en-US" sz="1600" dirty="0">
+                <a:solidFill>
+                  <a:sysClr val="windowText" lastClr="000000"/>
+                </a:solidFill>
+                <a:latin typeface="Arial" panose="020B0604020202020204" pitchFamily="34" charset="0"/>
+                <a:cs typeface="Arial" panose="020B0604020202020204" pitchFamily="34" charset="0"/>
+              </a:endParaRPr>
+            </a:p>
+            <a:p>
+              <a:pPr algn="ctr"/>
+              <a:r>
+                <a:rPr lang="en-US" sz="1600" dirty="0">
+                  <a:solidFill>
+                    <a:sysClr val="windowText" lastClr="000000"/>
+                  </a:solidFill>
+                  <a:latin typeface="Arial" panose="020B0604020202020204" pitchFamily="34" charset="0"/>
+                  <a:cs typeface="Arial" panose="020B0604020202020204" pitchFamily="34" charset="0"/>
+                </a:rPr>
+                <a:t>Dispersal rate &gt; velocity of isotherm shift</a:t>
+              </a:r>
+            </a:p>
+            <a:p>
+              <a:pPr algn="ctr"/>
+              <a:endParaRPr lang="en-US" sz="1600" dirty="0">
+                <a:solidFill>
+                  <a:sysClr val="windowText" lastClr="000000"/>
+                </a:solidFill>
+                <a:latin typeface="Arial" panose="020B0604020202020204" pitchFamily="34" charset="0"/>
+                <a:cs typeface="Arial" panose="020B0604020202020204" pitchFamily="34" charset="0"/>
+              </a:endParaRPr>
+            </a:p>
+          </p:txBody>
+        </p:sp>
+        <p:sp>
+          <p:nvSpPr>
+            <p:cNvPr id="2" name="Oval 1">
+              <a:extLst>
+                <a:ext uri="{FF2B5EF4-FFF2-40B4-BE49-F238E27FC236}">
+                  <a16:creationId xmlns:a16="http://schemas.microsoft.com/office/drawing/2014/main" id="{5602B72B-26CA-0DEC-2B2B-2C80503C2ECD}"/>
+                </a:ext>
+              </a:extLst>
+            </p:cNvPr>
+            <p:cNvSpPr/>
+            <p:nvPr/>
+          </p:nvSpPr>
+          <p:spPr>
+            <a:xfrm>
+              <a:off x="8812638" y="6991381"/>
+              <a:ext cx="141515" cy="130629"/>
+            </a:xfrm>
+            <a:prstGeom prst="ellipse">
+              <a:avLst/>
+            </a:prstGeom>
+            <a:solidFill>
+              <a:schemeClr val="bg2"/>
+            </a:solidFill>
+            <a:ln w="19050">
+              <a:solidFill>
+                <a:schemeClr val="tx1"/>
+              </a:solidFill>
+            </a:ln>
+          </p:spPr>
+          <p:style>
+            <a:lnRef idx="2">
+              <a:schemeClr val="accent1">
+                <a:shade val="50000"/>
+              </a:schemeClr>
+            </a:lnRef>
+            <a:fillRef idx="1">
+              <a:schemeClr val="accent1"/>
+            </a:fillRef>
+            <a:effectRef idx="0">
+              <a:schemeClr val="accent1"/>
+            </a:effectRef>
+            <a:fontRef idx="minor">
+              <a:schemeClr val="lt1"/>
+            </a:fontRef>
+          </p:style>
+          <p:txBody>
+            <a:bodyPr rtlCol="0" anchor="ctr"/>
+            <a:lstStyle/>
+            <a:p>
+              <a:pPr algn="ctr"/>
+              <a:endParaRPr lang="en-US" sz="1600">
+                <a:solidFill>
+                  <a:schemeClr val="accent2">
+                    <a:lumMod val="50000"/>
+                  </a:schemeClr>
+                </a:solidFill>
+              </a:endParaRPr>
+            </a:p>
+          </p:txBody>
+        </p:sp>
+        <p:sp>
+          <p:nvSpPr>
+            <p:cNvPr id="3" name="Oval 2">
+              <a:extLst>
+                <a:ext uri="{FF2B5EF4-FFF2-40B4-BE49-F238E27FC236}">
+                  <a16:creationId xmlns:a16="http://schemas.microsoft.com/office/drawing/2014/main" id="{A1DCEAFC-4D9D-A13F-39AB-CB6642335A58}"/>
+                </a:ext>
+              </a:extLst>
+            </p:cNvPr>
+            <p:cNvSpPr/>
+            <p:nvPr/>
+          </p:nvSpPr>
+          <p:spPr>
+            <a:xfrm>
+              <a:off x="8812638" y="7962282"/>
+              <a:ext cx="141515" cy="130629"/>
+            </a:xfrm>
+            <a:prstGeom prst="ellipse">
+              <a:avLst/>
+            </a:prstGeom>
+            <a:solidFill>
+              <a:schemeClr val="bg2"/>
+            </a:solidFill>
+            <a:ln>
+              <a:solidFill>
+                <a:schemeClr val="bg2"/>
+              </a:solidFill>
+            </a:ln>
+          </p:spPr>
+          <p:style>
+            <a:lnRef idx="2">
+              <a:schemeClr val="accent1">
+                <a:shade val="50000"/>
+              </a:schemeClr>
+            </a:lnRef>
+            <a:fillRef idx="1">
+              <a:schemeClr val="accent1"/>
+            </a:fillRef>
+            <a:effectRef idx="0">
+              <a:schemeClr val="accent1"/>
+            </a:effectRef>
+            <a:fontRef idx="minor">
+              <a:schemeClr val="lt1"/>
+            </a:fontRef>
+          </p:style>
+          <p:txBody>
+            <a:bodyPr rtlCol="0" anchor="ctr"/>
+            <a:lstStyle/>
+            <a:p>
+              <a:pPr algn="ctr"/>
+              <a:endParaRPr lang="en-US" sz="1600">
+                <a:solidFill>
+                  <a:schemeClr val="accent2">
+                    <a:lumMod val="50000"/>
+                  </a:schemeClr>
+                </a:solidFill>
+              </a:endParaRPr>
+            </a:p>
+          </p:txBody>
+        </p:sp>
+      </p:grpSp>
+      <p:sp>
+        <p:nvSpPr>
+          <p:cNvPr id="4" name="Oval 3">
+            <a:extLst>
+              <a:ext uri="{FF2B5EF4-FFF2-40B4-BE49-F238E27FC236}">
+                <a16:creationId xmlns:a16="http://schemas.microsoft.com/office/drawing/2014/main" id="{104C1C41-E8EF-C18F-8F13-FF04C9603BD2}"/>
+              </a:ext>
+            </a:extLst>
+          </p:cNvPr>
+          <p:cNvSpPr/>
+          <p:nvPr/>
+        </p:nvSpPr>
+        <p:spPr>
+          <a:xfrm>
+            <a:off x="10315220" y="7769732"/>
+            <a:ext cx="1979542" cy="527839"/>
+          </a:xfrm>
+          <a:prstGeom prst="ellipse">
+            <a:avLst/>
+          </a:prstGeom>
+          <a:noFill/>
+          <a:ln>
+            <a:noFill/>
+          </a:ln>
+        </p:spPr>
+        <p:style>
+          <a:lnRef idx="2">
+            <a:schemeClr val="accent1">
+              <a:shade val="50000"/>
+            </a:schemeClr>
+          </a:lnRef>
+          <a:fillRef idx="1">
+            <a:schemeClr val="accent1"/>
+          </a:fillRef>
+          <a:effectRef idx="0">
+            <a:schemeClr val="accent1"/>
+          </a:effectRef>
+          <a:fontRef idx="minor">
+            <a:schemeClr val="lt1"/>
+          </a:fontRef>
+        </p:style>
+        <p:txBody>
+          <a:bodyPr rtlCol="0" anchor="ctr"/>
+          <a:lstStyle/>
+          <a:p>
+            <a:pPr algn="ctr"/>
+            <a:endParaRPr lang="en-US" sz="1200" dirty="0">
+              <a:solidFill>
+                <a:sysClr val="windowText" lastClr="000000"/>
+              </a:solidFill>
+              <a:latin typeface="Arial" panose="020B0604020202020204" pitchFamily="34" charset="0"/>
+              <a:cs typeface="Arial" panose="020B0604020202020204" pitchFamily="34" charset="0"/>
+            </a:endParaRPr>
+          </a:p>
+        </p:txBody>
+      </p:sp>
+      <p:grpSp>
+        <p:nvGrpSpPr>
+          <p:cNvPr id="10" name="Group 9">
+            <a:extLst>
+              <a:ext uri="{FF2B5EF4-FFF2-40B4-BE49-F238E27FC236}">
+                <a16:creationId xmlns:a16="http://schemas.microsoft.com/office/drawing/2014/main" id="{A227FAF9-4CE5-FC2F-6272-ABB21E8B44F0}"/>
+              </a:ext>
+            </a:extLst>
+          </p:cNvPr>
+          <p:cNvGrpSpPr/>
+          <p:nvPr/>
+        </p:nvGrpSpPr>
+        <p:grpSpPr>
+          <a:xfrm>
+            <a:off x="13735341" y="1023213"/>
+            <a:ext cx="3394419" cy="896594"/>
+            <a:chOff x="8524560" y="7105104"/>
+            <a:chExt cx="2682403" cy="760350"/>
+          </a:xfrm>
+        </p:grpSpPr>
+        <p:sp>
+          <p:nvSpPr>
+            <p:cNvPr id="18" name="Oval 17">
+              <a:extLst>
+                <a:ext uri="{FF2B5EF4-FFF2-40B4-BE49-F238E27FC236}">
+                  <a16:creationId xmlns:a16="http://schemas.microsoft.com/office/drawing/2014/main" id="{9400B455-E943-3D43-C23B-701C34526CE8}"/>
+                </a:ext>
+              </a:extLst>
+            </p:cNvPr>
+            <p:cNvSpPr/>
+            <p:nvPr/>
+          </p:nvSpPr>
+          <p:spPr>
+            <a:xfrm>
+              <a:off x="8524560" y="7462734"/>
+              <a:ext cx="2682403" cy="355600"/>
+            </a:xfrm>
+            <a:prstGeom prst="ellipse">
+              <a:avLst/>
+            </a:prstGeom>
+            <a:noFill/>
+            <a:ln>
+              <a:noFill/>
+            </a:ln>
+          </p:spPr>
+          <p:style>
+            <a:lnRef idx="2">
+              <a:schemeClr val="accent1">
+                <a:shade val="50000"/>
+              </a:schemeClr>
+            </a:lnRef>
+            <a:fillRef idx="1">
+              <a:schemeClr val="accent1"/>
+            </a:fillRef>
+            <a:effectRef idx="0">
+              <a:schemeClr val="accent1"/>
+            </a:effectRef>
+            <a:fontRef idx="minor">
+              <a:schemeClr val="lt1"/>
+            </a:fontRef>
+          </p:style>
+          <p:txBody>
+            <a:bodyPr rtlCol="0" anchor="ctr"/>
+            <a:lstStyle/>
+            <a:p>
+              <a:pPr algn="ctr"/>
+              <a:r>
+                <a:rPr lang="en-US" sz="1600" dirty="0">
+                  <a:solidFill>
+                    <a:sysClr val="windowText" lastClr="000000"/>
+                  </a:solidFill>
+                  <a:latin typeface="Arial" panose="020B0604020202020204" pitchFamily="34" charset="0"/>
+                  <a:cs typeface="Arial" panose="020B0604020202020204" pitchFamily="34" charset="0"/>
+                </a:rPr>
+                <a:t>Dispersal rate &lt; velocity of isotherm shift</a:t>
+              </a:r>
+            </a:p>
+            <a:p>
+              <a:pPr algn="ctr"/>
+              <a:endParaRPr lang="en-US" sz="1600" dirty="0">
+                <a:solidFill>
+                  <a:sysClr val="windowText" lastClr="000000"/>
+                </a:solidFill>
+                <a:latin typeface="Arial" panose="020B0604020202020204" pitchFamily="34" charset="0"/>
+                <a:cs typeface="Arial" panose="020B0604020202020204" pitchFamily="34" charset="0"/>
+              </a:endParaRPr>
+            </a:p>
+            <a:p>
+              <a:pPr algn="ctr"/>
+              <a:r>
+                <a:rPr lang="en-US" sz="1600" dirty="0">
+                  <a:solidFill>
+                    <a:sysClr val="windowText" lastClr="000000"/>
+                  </a:solidFill>
+                  <a:latin typeface="Arial" panose="020B0604020202020204" pitchFamily="34" charset="0"/>
+                  <a:cs typeface="Arial" panose="020B0604020202020204" pitchFamily="34" charset="0"/>
+                </a:rPr>
+                <a:t>Dispersal rate &gt; velocity of isotherm shift</a:t>
+              </a:r>
+            </a:p>
+            <a:p>
+              <a:pPr algn="ctr"/>
+              <a:endParaRPr lang="en-US" sz="1600" dirty="0">
+                <a:solidFill>
+                  <a:sysClr val="windowText" lastClr="000000"/>
+                </a:solidFill>
+                <a:latin typeface="Arial" panose="020B0604020202020204" pitchFamily="34" charset="0"/>
+                <a:cs typeface="Arial" panose="020B0604020202020204" pitchFamily="34" charset="0"/>
+              </a:endParaRPr>
+            </a:p>
+          </p:txBody>
+        </p:sp>
+        <p:sp>
+          <p:nvSpPr>
+            <p:cNvPr id="45" name="Oval 44">
+              <a:extLst>
+                <a:ext uri="{FF2B5EF4-FFF2-40B4-BE49-F238E27FC236}">
+                  <a16:creationId xmlns:a16="http://schemas.microsoft.com/office/drawing/2014/main" id="{84721976-1D4E-83C8-D22B-92322A378D95}"/>
+                </a:ext>
+              </a:extLst>
+            </p:cNvPr>
+            <p:cNvSpPr/>
+            <p:nvPr/>
+          </p:nvSpPr>
+          <p:spPr>
+            <a:xfrm>
+              <a:off x="8812638" y="7105104"/>
+              <a:ext cx="141515" cy="130629"/>
+            </a:xfrm>
+            <a:prstGeom prst="ellipse">
+              <a:avLst/>
+            </a:prstGeom>
+            <a:solidFill>
+              <a:schemeClr val="bg2"/>
+            </a:solidFill>
+            <a:ln w="19050">
+              <a:solidFill>
+                <a:schemeClr val="tx1"/>
+              </a:solidFill>
+            </a:ln>
+          </p:spPr>
+          <p:style>
+            <a:lnRef idx="2">
+              <a:schemeClr val="accent1">
+                <a:shade val="50000"/>
+              </a:schemeClr>
+            </a:lnRef>
+            <a:fillRef idx="1">
+              <a:schemeClr val="accent1"/>
+            </a:fillRef>
+            <a:effectRef idx="0">
+              <a:schemeClr val="accent1"/>
+            </a:effectRef>
+            <a:fontRef idx="minor">
+              <a:schemeClr val="lt1"/>
+            </a:fontRef>
+          </p:style>
+          <p:txBody>
+            <a:bodyPr rtlCol="0" anchor="ctr"/>
+            <a:lstStyle/>
+            <a:p>
+              <a:pPr algn="ctr"/>
+              <a:endParaRPr lang="en-US" sz="1600">
+                <a:solidFill>
+                  <a:schemeClr val="accent2">
+                    <a:lumMod val="50000"/>
+                  </a:schemeClr>
+                </a:solidFill>
+                <a:latin typeface="Arial" panose="020B0604020202020204" pitchFamily="34" charset="0"/>
+                <a:cs typeface="Arial" panose="020B0604020202020204" pitchFamily="34" charset="0"/>
+              </a:endParaRPr>
+            </a:p>
+          </p:txBody>
+        </p:sp>
+        <p:sp>
+          <p:nvSpPr>
+            <p:cNvPr id="46" name="Oval 45">
+              <a:extLst>
+                <a:ext uri="{FF2B5EF4-FFF2-40B4-BE49-F238E27FC236}">
+                  <a16:creationId xmlns:a16="http://schemas.microsoft.com/office/drawing/2014/main" id="{938E23D0-3BCD-5400-D453-D41CC8AEFCFC}"/>
+                </a:ext>
+              </a:extLst>
+            </p:cNvPr>
+            <p:cNvSpPr/>
+            <p:nvPr/>
+          </p:nvSpPr>
+          <p:spPr>
+            <a:xfrm>
+              <a:off x="8812638" y="7734825"/>
+              <a:ext cx="141515" cy="130629"/>
+            </a:xfrm>
+            <a:prstGeom prst="ellipse">
+              <a:avLst/>
+            </a:prstGeom>
+            <a:solidFill>
+              <a:schemeClr val="bg2"/>
+            </a:solidFill>
+            <a:ln>
+              <a:solidFill>
+                <a:schemeClr val="bg2"/>
+              </a:solidFill>
+            </a:ln>
+          </p:spPr>
+          <p:style>
+            <a:lnRef idx="2">
+              <a:schemeClr val="accent1">
+                <a:shade val="50000"/>
+              </a:schemeClr>
+            </a:lnRef>
+            <a:fillRef idx="1">
+              <a:schemeClr val="accent1"/>
+            </a:fillRef>
+            <a:effectRef idx="0">
+              <a:schemeClr val="accent1"/>
+            </a:effectRef>
+            <a:fontRef idx="minor">
+              <a:schemeClr val="lt1"/>
+            </a:fontRef>
+          </p:style>
+          <p:txBody>
+            <a:bodyPr rtlCol="0" anchor="ctr"/>
+            <a:lstStyle/>
+            <a:p>
+              <a:pPr algn="ctr"/>
+              <a:endParaRPr lang="en-US" sz="1600" dirty="0">
+                <a:solidFill>
+                  <a:schemeClr val="accent2">
+                    <a:lumMod val="50000"/>
+                  </a:schemeClr>
+                </a:solidFill>
+                <a:latin typeface="Arial" panose="020B0604020202020204" pitchFamily="34" charset="0"/>
+                <a:cs typeface="Arial" panose="020B0604020202020204" pitchFamily="34" charset="0"/>
+              </a:endParaRPr>
+            </a:p>
+          </p:txBody>
+        </p:sp>
+      </p:grpSp>
+      <p:sp>
+        <p:nvSpPr>
+          <p:cNvPr id="1055" name="TextBox 1054">
+            <a:extLst>
+              <a:ext uri="{FF2B5EF4-FFF2-40B4-BE49-F238E27FC236}">
+                <a16:creationId xmlns:a16="http://schemas.microsoft.com/office/drawing/2014/main" id="{79F4CD25-E8D1-2659-3A9A-9B46C2CEEB21}"/>
+              </a:ext>
+            </a:extLst>
+          </p:cNvPr>
+          <p:cNvSpPr txBox="1"/>
+          <p:nvPr/>
+        </p:nvSpPr>
+        <p:spPr>
+          <a:xfrm>
+            <a:off x="9426530" y="12837105"/>
+            <a:ext cx="989437" cy="307777"/>
+          </a:xfrm>
+          <a:prstGeom prst="rect">
+            <a:avLst/>
+          </a:prstGeom>
+          <a:noFill/>
+        </p:spPr>
+        <p:txBody>
+          <a:bodyPr wrap="square" rtlCol="0">
+            <a:spAutoFit/>
+          </a:bodyPr>
+          <a:lstStyle/>
+          <a:p>
+            <a:pPr algn="ctr"/>
+            <a:r>
+              <a:rPr lang="en-US" sz="1400" dirty="0">
+                <a:solidFill>
+                  <a:schemeClr val="bg2">
+                    <a:lumMod val="75000"/>
+                  </a:schemeClr>
+                </a:solidFill>
+                <a:latin typeface="Arial" panose="020B0604020202020204" pitchFamily="34" charset="0"/>
+                <a:cs typeface="Arial" panose="020B0604020202020204" pitchFamily="34" charset="0"/>
+              </a:rPr>
+              <a:t>n = 189</a:t>
+            </a:r>
+          </a:p>
+        </p:txBody>
+      </p:sp>
+      <p:sp>
+        <p:nvSpPr>
+          <p:cNvPr id="1056" name="TextBox 1055">
+            <a:extLst>
+              <a:ext uri="{FF2B5EF4-FFF2-40B4-BE49-F238E27FC236}">
+                <a16:creationId xmlns:a16="http://schemas.microsoft.com/office/drawing/2014/main" id="{F2236158-84C7-54AA-0753-313B735A4922}"/>
+              </a:ext>
+            </a:extLst>
+          </p:cNvPr>
+          <p:cNvSpPr txBox="1"/>
+          <p:nvPr/>
+        </p:nvSpPr>
+        <p:spPr>
+          <a:xfrm>
+            <a:off x="5436051" y="12807362"/>
+            <a:ext cx="989437" cy="307777"/>
+          </a:xfrm>
+          <a:prstGeom prst="rect">
+            <a:avLst/>
+          </a:prstGeom>
+          <a:noFill/>
+        </p:spPr>
+        <p:txBody>
+          <a:bodyPr wrap="square" rtlCol="0">
+            <a:spAutoFit/>
+          </a:bodyPr>
+          <a:lstStyle/>
+          <a:p>
+            <a:pPr algn="ctr"/>
+            <a:r>
+              <a:rPr lang="en-US" sz="1400" dirty="0">
+                <a:solidFill>
+                  <a:schemeClr val="bg2">
+                    <a:lumMod val="75000"/>
+                  </a:schemeClr>
+                </a:solidFill>
+                <a:latin typeface="Arial" panose="020B0604020202020204" pitchFamily="34" charset="0"/>
+                <a:cs typeface="Arial" panose="020B0604020202020204" pitchFamily="34" charset="0"/>
+              </a:rPr>
+              <a:t>n = 189</a:t>
+            </a:r>
+          </a:p>
+        </p:txBody>
+      </p:sp>
+      <p:sp>
+        <p:nvSpPr>
+          <p:cNvPr id="1078" name="TextBox 1077">
+            <a:extLst>
+              <a:ext uri="{FF2B5EF4-FFF2-40B4-BE49-F238E27FC236}">
+                <a16:creationId xmlns:a16="http://schemas.microsoft.com/office/drawing/2014/main" id="{C0846134-3466-B727-5B64-3E62964A4D6E}"/>
+              </a:ext>
+            </a:extLst>
+          </p:cNvPr>
+          <p:cNvSpPr txBox="1"/>
+          <p:nvPr/>
+        </p:nvSpPr>
+        <p:spPr>
+          <a:xfrm>
+            <a:off x="3145492" y="10185623"/>
+            <a:ext cx="569481" cy="338554"/>
+          </a:xfrm>
+          <a:prstGeom prst="rect">
+            <a:avLst/>
+          </a:prstGeom>
+          <a:noFill/>
+        </p:spPr>
+        <p:txBody>
+          <a:bodyPr wrap="square" rtlCol="0">
+            <a:spAutoFit/>
+          </a:bodyPr>
+          <a:lstStyle/>
+          <a:p>
+            <a:pPr algn="ctr"/>
+            <a:r>
+              <a:rPr lang="en-US" sz="1600" dirty="0">
+                <a:solidFill>
+                  <a:schemeClr val="bg2">
+                    <a:lumMod val="75000"/>
+                  </a:schemeClr>
+                </a:solidFill>
+                <a:latin typeface="Arial" panose="020B0604020202020204" pitchFamily="34" charset="0"/>
+                <a:cs typeface="Arial" panose="020B0604020202020204" pitchFamily="34" charset="0"/>
+              </a:rPr>
+              <a:t>a)</a:t>
+            </a:r>
+          </a:p>
+        </p:txBody>
+      </p:sp>
+      <p:grpSp>
+        <p:nvGrpSpPr>
+          <p:cNvPr id="1089" name="Group 1088">
+            <a:extLst>
+              <a:ext uri="{FF2B5EF4-FFF2-40B4-BE49-F238E27FC236}">
+                <a16:creationId xmlns:a16="http://schemas.microsoft.com/office/drawing/2014/main" id="{5E8B1D24-7A10-D71B-E33B-E7B33AA73721}"/>
+              </a:ext>
+            </a:extLst>
+          </p:cNvPr>
+          <p:cNvGrpSpPr/>
+          <p:nvPr/>
+        </p:nvGrpSpPr>
+        <p:grpSpPr>
+          <a:xfrm>
+            <a:off x="5087037" y="10514261"/>
+            <a:ext cx="251992" cy="251942"/>
+            <a:chOff x="4474118" y="766354"/>
+            <a:chExt cx="251992" cy="251942"/>
+          </a:xfrm>
+        </p:grpSpPr>
+        <p:sp>
+          <p:nvSpPr>
+            <p:cNvPr id="1090" name="Rectangle 1089">
+              <a:extLst>
+                <a:ext uri="{FF2B5EF4-FFF2-40B4-BE49-F238E27FC236}">
+                  <a16:creationId xmlns:a16="http://schemas.microsoft.com/office/drawing/2014/main" id="{3F6056D7-8145-6A26-308A-283903E9BAB6}"/>
+                </a:ext>
+              </a:extLst>
+            </p:cNvPr>
+            <p:cNvSpPr/>
+            <p:nvPr/>
+          </p:nvSpPr>
+          <p:spPr>
+            <a:xfrm>
+              <a:off x="4558937" y="766354"/>
+              <a:ext cx="121920" cy="235132"/>
+            </a:xfrm>
+            <a:prstGeom prst="rect">
+              <a:avLst/>
+            </a:prstGeom>
+            <a:solidFill>
+              <a:schemeClr val="bg1"/>
+            </a:solidFill>
+            <a:ln>
+              <a:noFill/>
+            </a:ln>
+          </p:spPr>
+          <p:style>
+            <a:lnRef idx="2">
+              <a:schemeClr val="accent1">
+                <a:shade val="50000"/>
+              </a:schemeClr>
+            </a:lnRef>
+            <a:fillRef idx="1">
+              <a:schemeClr val="accent1"/>
+            </a:fillRef>
+            <a:effectRef idx="0">
+              <a:schemeClr val="accent1"/>
+            </a:effectRef>
+            <a:fontRef idx="minor">
+              <a:schemeClr val="lt1"/>
+            </a:fontRef>
+          </p:style>
+          <p:txBody>
+            <a:bodyPr rtlCol="0" anchor="ctr"/>
+            <a:lstStyle/>
+            <a:p>
+              <a:pPr algn="ctr"/>
+              <a:endParaRPr lang="en-US"/>
+            </a:p>
+          </p:txBody>
+        </p:sp>
+        <p:sp>
+          <p:nvSpPr>
+            <p:cNvPr id="1091" name="TextBox 1090">
+              <a:extLst>
+                <a:ext uri="{FF2B5EF4-FFF2-40B4-BE49-F238E27FC236}">
+                  <a16:creationId xmlns:a16="http://schemas.microsoft.com/office/drawing/2014/main" id="{6F5587B4-1D97-771E-5B88-271B96D0D078}"/>
+                </a:ext>
+              </a:extLst>
+            </p:cNvPr>
+            <p:cNvSpPr txBox="1"/>
+            <p:nvPr/>
+          </p:nvSpPr>
+          <p:spPr>
+            <a:xfrm>
+              <a:off x="4474118" y="782334"/>
+              <a:ext cx="251992" cy="235962"/>
+            </a:xfrm>
+            <a:prstGeom prst="rect">
+              <a:avLst/>
+            </a:prstGeom>
+            <a:noFill/>
+          </p:spPr>
+          <p:txBody>
+            <a:bodyPr wrap="none" rtlCol="0">
+              <a:spAutoFit/>
+            </a:bodyPr>
+            <a:lstStyle/>
+            <a:p>
+              <a:r>
+                <a:rPr lang="en-US" sz="1400" baseline="30000" dirty="0">
+                  <a:highlight>
+                    <a:srgbClr val="FFFFFF"/>
+                  </a:highlight>
+                  <a:latin typeface="Arial" panose="020B0604020202020204" pitchFamily="34" charset="0"/>
+                  <a:cs typeface="Arial" panose="020B0604020202020204" pitchFamily="34" charset="0"/>
+                </a:rPr>
+                <a:t>2</a:t>
+              </a:r>
+            </a:p>
+          </p:txBody>
+        </p:sp>
+      </p:grpSp>
+      <p:grpSp>
+        <p:nvGrpSpPr>
+          <p:cNvPr id="1094" name="Group 1093">
+            <a:extLst>
+              <a:ext uri="{FF2B5EF4-FFF2-40B4-BE49-F238E27FC236}">
+                <a16:creationId xmlns:a16="http://schemas.microsoft.com/office/drawing/2014/main" id="{E07788E3-A122-9477-B12B-FC9A9304086F}"/>
+              </a:ext>
+            </a:extLst>
+          </p:cNvPr>
+          <p:cNvGrpSpPr/>
+          <p:nvPr/>
+        </p:nvGrpSpPr>
+        <p:grpSpPr>
+          <a:xfrm>
+            <a:off x="9061778" y="10515283"/>
+            <a:ext cx="251992" cy="251942"/>
+            <a:chOff x="4474118" y="766354"/>
+            <a:chExt cx="251992" cy="251942"/>
+          </a:xfrm>
+        </p:grpSpPr>
+        <p:sp>
+          <p:nvSpPr>
+            <p:cNvPr id="1095" name="Rectangle 1094">
+              <a:extLst>
+                <a:ext uri="{FF2B5EF4-FFF2-40B4-BE49-F238E27FC236}">
+                  <a16:creationId xmlns:a16="http://schemas.microsoft.com/office/drawing/2014/main" id="{B8599089-12F5-9449-560A-0D0D4D111882}"/>
+                </a:ext>
+              </a:extLst>
+            </p:cNvPr>
+            <p:cNvSpPr/>
+            <p:nvPr/>
+          </p:nvSpPr>
+          <p:spPr>
+            <a:xfrm>
+              <a:off x="4558937" y="766354"/>
+              <a:ext cx="121920" cy="235132"/>
+            </a:xfrm>
+            <a:prstGeom prst="rect">
+              <a:avLst/>
+            </a:prstGeom>
+            <a:solidFill>
+              <a:schemeClr val="bg1"/>
+            </a:solidFill>
+            <a:ln>
+              <a:noFill/>
+            </a:ln>
+          </p:spPr>
+          <p:style>
+            <a:lnRef idx="2">
+              <a:schemeClr val="accent1">
+                <a:shade val="50000"/>
+              </a:schemeClr>
+            </a:lnRef>
+            <a:fillRef idx="1">
+              <a:schemeClr val="accent1"/>
+            </a:fillRef>
+            <a:effectRef idx="0">
+              <a:schemeClr val="accent1"/>
+            </a:effectRef>
+            <a:fontRef idx="minor">
+              <a:schemeClr val="lt1"/>
+            </a:fontRef>
+          </p:style>
+          <p:txBody>
+            <a:bodyPr rtlCol="0" anchor="ctr"/>
+            <a:lstStyle/>
+            <a:p>
+              <a:pPr algn="ctr"/>
+              <a:endParaRPr lang="en-US"/>
+            </a:p>
+          </p:txBody>
+        </p:sp>
+        <p:sp>
+          <p:nvSpPr>
+            <p:cNvPr id="1096" name="TextBox 1095">
+              <a:extLst>
+                <a:ext uri="{FF2B5EF4-FFF2-40B4-BE49-F238E27FC236}">
+                  <a16:creationId xmlns:a16="http://schemas.microsoft.com/office/drawing/2014/main" id="{44CB2D26-6CE4-7CB2-0D64-1314C00A07AA}"/>
+                </a:ext>
+              </a:extLst>
+            </p:cNvPr>
+            <p:cNvSpPr txBox="1"/>
+            <p:nvPr/>
+          </p:nvSpPr>
+          <p:spPr>
+            <a:xfrm>
+              <a:off x="4474118" y="782334"/>
+              <a:ext cx="251992" cy="235962"/>
+            </a:xfrm>
+            <a:prstGeom prst="rect">
+              <a:avLst/>
+            </a:prstGeom>
+            <a:noFill/>
+          </p:spPr>
+          <p:txBody>
+            <a:bodyPr wrap="none" rtlCol="0">
+              <a:spAutoFit/>
+            </a:bodyPr>
+            <a:lstStyle/>
+            <a:p>
+              <a:r>
+                <a:rPr lang="en-US" sz="1400" baseline="30000" dirty="0">
+                  <a:highlight>
+                    <a:srgbClr val="FFFFFF"/>
+                  </a:highlight>
+                  <a:latin typeface="Arial" panose="020B0604020202020204" pitchFamily="34" charset="0"/>
+                  <a:cs typeface="Arial" panose="020B0604020202020204" pitchFamily="34" charset="0"/>
+                </a:rPr>
+                <a:t>2</a:t>
+              </a:r>
+            </a:p>
+          </p:txBody>
+        </p:sp>
+      </p:grpSp>
+      <p:grpSp>
+        <p:nvGrpSpPr>
+          <p:cNvPr id="13" name="Group 12">
+            <a:extLst>
+              <a:ext uri="{FF2B5EF4-FFF2-40B4-BE49-F238E27FC236}">
+                <a16:creationId xmlns:a16="http://schemas.microsoft.com/office/drawing/2014/main" id="{46B50931-B151-8947-205A-2AA548190C55}"/>
+              </a:ext>
+            </a:extLst>
+          </p:cNvPr>
+          <p:cNvGrpSpPr/>
+          <p:nvPr/>
+        </p:nvGrpSpPr>
+        <p:grpSpPr>
+          <a:xfrm>
+            <a:off x="9493954" y="7392408"/>
+            <a:ext cx="444660" cy="1384995"/>
+            <a:chOff x="9460088" y="7144053"/>
+            <a:chExt cx="444660" cy="1384995"/>
+          </a:xfrm>
+        </p:grpSpPr>
+        <p:sp>
+          <p:nvSpPr>
+            <p:cNvPr id="1038" name="TextBox 1037">
+              <a:extLst>
+                <a:ext uri="{FF2B5EF4-FFF2-40B4-BE49-F238E27FC236}">
+                  <a16:creationId xmlns:a16="http://schemas.microsoft.com/office/drawing/2014/main" id="{ED1FCA3A-FBFE-B650-0663-2A8B5E9CC55D}"/>
+                </a:ext>
+              </a:extLst>
+            </p:cNvPr>
+            <p:cNvSpPr txBox="1"/>
+            <p:nvPr/>
+          </p:nvSpPr>
+          <p:spPr>
+            <a:xfrm>
+              <a:off x="9635122" y="7144053"/>
+              <a:ext cx="269626" cy="1384995"/>
+            </a:xfrm>
+            <a:prstGeom prst="rect">
+              <a:avLst/>
+            </a:prstGeom>
+            <a:noFill/>
+          </p:spPr>
+          <p:txBody>
+            <a:bodyPr wrap="none" rtlCol="0">
+              <a:spAutoFit/>
+            </a:bodyPr>
+            <a:lstStyle/>
+            <a:p>
+              <a:r>
+                <a:rPr lang="en-US" sz="1200" dirty="0">
+                  <a:latin typeface="Arial" panose="020B0604020202020204" pitchFamily="34" charset="0"/>
+                  <a:cs typeface="Arial" panose="020B0604020202020204" pitchFamily="34" charset="0"/>
+                </a:rPr>
+                <a:t>3</a:t>
+              </a:r>
+            </a:p>
+            <a:p>
+              <a:endParaRPr lang="en-US" sz="400" dirty="0">
+                <a:latin typeface="Arial" panose="020B0604020202020204" pitchFamily="34" charset="0"/>
+                <a:cs typeface="Arial" panose="020B0604020202020204" pitchFamily="34" charset="0"/>
+              </a:endParaRPr>
+            </a:p>
+            <a:p>
+              <a:endParaRPr lang="en-US" sz="400" dirty="0">
+                <a:latin typeface="Arial" panose="020B0604020202020204" pitchFamily="34" charset="0"/>
+                <a:cs typeface="Arial" panose="020B0604020202020204" pitchFamily="34" charset="0"/>
+              </a:endParaRPr>
+            </a:p>
+            <a:p>
+              <a:endParaRPr lang="en-US" sz="400" dirty="0">
+                <a:latin typeface="Arial" panose="020B0604020202020204" pitchFamily="34" charset="0"/>
+                <a:cs typeface="Arial" panose="020B0604020202020204" pitchFamily="34" charset="0"/>
+              </a:endParaRPr>
+            </a:p>
+            <a:p>
+              <a:r>
+                <a:rPr lang="en-US" sz="1200" dirty="0">
+                  <a:latin typeface="Arial" panose="020B0604020202020204" pitchFamily="34" charset="0"/>
+                  <a:cs typeface="Arial" panose="020B0604020202020204" pitchFamily="34" charset="0"/>
+                </a:rPr>
+                <a:t>2</a:t>
+              </a:r>
+            </a:p>
+            <a:p>
+              <a:endParaRPr lang="en-US" sz="400" dirty="0">
+                <a:latin typeface="Arial" panose="020B0604020202020204" pitchFamily="34" charset="0"/>
+                <a:cs typeface="Arial" panose="020B0604020202020204" pitchFamily="34" charset="0"/>
+              </a:endParaRPr>
+            </a:p>
+            <a:p>
+              <a:endParaRPr lang="en-US" sz="400" dirty="0">
+                <a:latin typeface="Arial" panose="020B0604020202020204" pitchFamily="34" charset="0"/>
+                <a:cs typeface="Arial" panose="020B0604020202020204" pitchFamily="34" charset="0"/>
+              </a:endParaRPr>
+            </a:p>
+            <a:p>
+              <a:endParaRPr lang="en-US" sz="400" dirty="0">
+                <a:latin typeface="Arial" panose="020B0604020202020204" pitchFamily="34" charset="0"/>
+                <a:cs typeface="Arial" panose="020B0604020202020204" pitchFamily="34" charset="0"/>
+              </a:endParaRPr>
+            </a:p>
+            <a:p>
+              <a:r>
+                <a:rPr lang="en-US" sz="1200" dirty="0">
+                  <a:latin typeface="Arial" panose="020B0604020202020204" pitchFamily="34" charset="0"/>
+                  <a:cs typeface="Arial" panose="020B0604020202020204" pitchFamily="34" charset="0"/>
+                </a:rPr>
+                <a:t>1</a:t>
+              </a:r>
+            </a:p>
+            <a:p>
+              <a:endParaRPr lang="en-US" sz="1200" dirty="0">
+                <a:latin typeface="Arial" panose="020B0604020202020204" pitchFamily="34" charset="0"/>
+                <a:cs typeface="Arial" panose="020B0604020202020204" pitchFamily="34" charset="0"/>
+              </a:endParaRPr>
+            </a:p>
+            <a:p>
+              <a:endParaRPr lang="en-US" sz="1200" dirty="0">
+                <a:latin typeface="Arial" panose="020B0604020202020204" pitchFamily="34" charset="0"/>
+                <a:cs typeface="Arial" panose="020B0604020202020204" pitchFamily="34" charset="0"/>
+              </a:endParaRPr>
+            </a:p>
+          </p:txBody>
+        </p:sp>
+        <p:sp>
+          <p:nvSpPr>
+            <p:cNvPr id="9" name="Rectangle 8">
+              <a:extLst>
+                <a:ext uri="{FF2B5EF4-FFF2-40B4-BE49-F238E27FC236}">
+                  <a16:creationId xmlns:a16="http://schemas.microsoft.com/office/drawing/2014/main" id="{092DB8FD-2790-1008-4AF4-7A5403E1A0BB}"/>
+                </a:ext>
+              </a:extLst>
+            </p:cNvPr>
+            <p:cNvSpPr/>
+            <p:nvPr/>
+          </p:nvSpPr>
+          <p:spPr>
+            <a:xfrm>
+              <a:off x="9460088" y="7191021"/>
+              <a:ext cx="180622" cy="191912"/>
+            </a:xfrm>
+            <a:prstGeom prst="rect">
+              <a:avLst/>
+            </a:prstGeom>
+            <a:solidFill>
+              <a:srgbClr val="C00000"/>
+            </a:solidFill>
+            <a:ln>
+              <a:noFill/>
+            </a:ln>
+          </p:spPr>
+          <p:style>
+            <a:lnRef idx="2">
+              <a:schemeClr val="accent1">
+                <a:shade val="50000"/>
+              </a:schemeClr>
+            </a:lnRef>
+            <a:fillRef idx="1">
+              <a:schemeClr val="accent1"/>
+            </a:fillRef>
+            <a:effectRef idx="0">
+              <a:schemeClr val="accent1"/>
+            </a:effectRef>
+            <a:fontRef idx="minor">
+              <a:schemeClr val="lt1"/>
+            </a:fontRef>
+          </p:style>
+          <p:txBody>
+            <a:bodyPr rtlCol="0" anchor="ctr"/>
+            <a:lstStyle/>
+            <a:p>
+              <a:pPr algn="ctr"/>
+              <a:endParaRPr lang="en-US"/>
+            </a:p>
+          </p:txBody>
+        </p:sp>
+        <p:sp>
+          <p:nvSpPr>
+            <p:cNvPr id="11" name="Rectangle 10">
+              <a:extLst>
+                <a:ext uri="{FF2B5EF4-FFF2-40B4-BE49-F238E27FC236}">
+                  <a16:creationId xmlns:a16="http://schemas.microsoft.com/office/drawing/2014/main" id="{0707409E-5172-3234-5783-9DCCC47525DA}"/>
+                </a:ext>
+              </a:extLst>
+            </p:cNvPr>
+            <p:cNvSpPr/>
+            <p:nvPr/>
+          </p:nvSpPr>
+          <p:spPr>
+            <a:xfrm>
+              <a:off x="9465733" y="7557910"/>
+              <a:ext cx="180622" cy="191912"/>
+            </a:xfrm>
+            <a:prstGeom prst="rect">
+              <a:avLst/>
+            </a:prstGeom>
+            <a:solidFill>
+              <a:srgbClr val="9C9EBE"/>
+            </a:solidFill>
+            <a:ln>
+              <a:noFill/>
+            </a:ln>
+          </p:spPr>
+          <p:style>
+            <a:lnRef idx="2">
+              <a:schemeClr val="accent1">
+                <a:shade val="50000"/>
+              </a:schemeClr>
+            </a:lnRef>
+            <a:fillRef idx="1">
+              <a:schemeClr val="accent1"/>
+            </a:fillRef>
+            <a:effectRef idx="0">
+              <a:schemeClr val="accent1"/>
+            </a:effectRef>
+            <a:fontRef idx="minor">
+              <a:schemeClr val="lt1"/>
+            </a:fontRef>
+          </p:style>
+          <p:txBody>
+            <a:bodyPr rtlCol="0" anchor="ctr"/>
+            <a:lstStyle/>
+            <a:p>
+              <a:pPr algn="ctr"/>
+              <a:endParaRPr lang="en-US"/>
+            </a:p>
+          </p:txBody>
+        </p:sp>
+        <p:sp>
+          <p:nvSpPr>
+            <p:cNvPr id="12" name="Rectangle 11">
+              <a:extLst>
+                <a:ext uri="{FF2B5EF4-FFF2-40B4-BE49-F238E27FC236}">
+                  <a16:creationId xmlns:a16="http://schemas.microsoft.com/office/drawing/2014/main" id="{2F02311C-131C-3092-6D15-B447EFFCF088}"/>
+                </a:ext>
+              </a:extLst>
+            </p:cNvPr>
+            <p:cNvSpPr/>
+            <p:nvPr/>
+          </p:nvSpPr>
+          <p:spPr>
+            <a:xfrm>
+              <a:off x="9460089" y="7924798"/>
+              <a:ext cx="180622" cy="191912"/>
+            </a:xfrm>
+            <a:prstGeom prst="rect">
+              <a:avLst/>
+            </a:prstGeom>
+            <a:solidFill>
+              <a:srgbClr val="F3CABA"/>
+            </a:solidFill>
+            <a:ln>
+              <a:noFill/>
+            </a:ln>
+          </p:spPr>
+          <p:style>
+            <a:lnRef idx="2">
+              <a:schemeClr val="accent1">
+                <a:shade val="50000"/>
+              </a:schemeClr>
+            </a:lnRef>
+            <a:fillRef idx="1">
+              <a:schemeClr val="accent1"/>
+            </a:fillRef>
+            <a:effectRef idx="0">
+              <a:schemeClr val="accent1"/>
+            </a:effectRef>
+            <a:fontRef idx="minor">
+              <a:schemeClr val="lt1"/>
+            </a:fontRef>
+          </p:style>
+          <p:txBody>
+            <a:bodyPr rtlCol="0" anchor="ctr"/>
+            <a:lstStyle/>
+            <a:p>
+              <a:pPr algn="ctr"/>
+              <a:endParaRPr lang="en-US"/>
+            </a:p>
+          </p:txBody>
+        </p:sp>
+      </p:grpSp>
+      <p:pic>
+        <p:nvPicPr>
+          <p:cNvPr id="14" name="Picture 13" descr="A diagram of a number of red dots&#10;&#10;Description automatically generated">
+            <a:extLst>
+              <a:ext uri="{FF2B5EF4-FFF2-40B4-BE49-F238E27FC236}">
+                <a16:creationId xmlns:a16="http://schemas.microsoft.com/office/drawing/2014/main" id="{ADED19A7-84E8-CE2A-ACFB-A5008212BF2D}"/>
+              </a:ext>
+            </a:extLst>
+          </p:cNvPr>
+          <p:cNvPicPr>
+            <a:picLocks noChangeAspect="1"/>
+          </p:cNvPicPr>
+          <p:nvPr/>
+        </p:nvPicPr>
+        <p:blipFill>
+          <a:blip r:embed="rId4"/>
+          <a:stretch>
+            <a:fillRect/>
+          </a:stretch>
+        </p:blipFill>
+        <p:spPr>
+          <a:xfrm>
+            <a:off x="8464751" y="808058"/>
+            <a:ext cx="5600871" cy="4718683"/>
+          </a:xfrm>
+          <a:prstGeom prst="rect">
+            <a:avLst/>
+          </a:prstGeom>
+        </p:spPr>
+      </p:pic>
+      <p:sp>
+        <p:nvSpPr>
+          <p:cNvPr id="17" name="TextBox 16">
+            <a:extLst>
+              <a:ext uri="{FF2B5EF4-FFF2-40B4-BE49-F238E27FC236}">
+                <a16:creationId xmlns:a16="http://schemas.microsoft.com/office/drawing/2014/main" id="{302576C4-FDC6-5DE8-36B3-127FA6105CAE}"/>
+              </a:ext>
+            </a:extLst>
+          </p:cNvPr>
+          <p:cNvSpPr txBox="1"/>
+          <p:nvPr/>
+        </p:nvSpPr>
+        <p:spPr>
+          <a:xfrm>
+            <a:off x="12863690" y="4399118"/>
+            <a:ext cx="989437" cy="338554"/>
+          </a:xfrm>
+          <a:prstGeom prst="rect">
+            <a:avLst/>
+          </a:prstGeom>
+          <a:noFill/>
+        </p:spPr>
+        <p:txBody>
+          <a:bodyPr wrap="square" rtlCol="0">
+            <a:spAutoFit/>
+          </a:bodyPr>
+          <a:lstStyle/>
+          <a:p>
+            <a:pPr algn="ctr"/>
+            <a:r>
+              <a:rPr lang="en-US" sz="1600" dirty="0">
+                <a:solidFill>
+                  <a:schemeClr val="bg2">
+                    <a:lumMod val="75000"/>
+                  </a:schemeClr>
+                </a:solidFill>
+                <a:latin typeface="Arial" panose="020B0604020202020204" pitchFamily="34" charset="0"/>
+                <a:cs typeface="Arial" panose="020B0604020202020204" pitchFamily="34" charset="0"/>
+              </a:rPr>
+              <a:t>n = 421</a:t>
+            </a:r>
+          </a:p>
+        </p:txBody>
+      </p:sp>
+      <p:pic>
+        <p:nvPicPr>
+          <p:cNvPr id="20" name="Picture 19" descr="A diagram of a number of birds&#10;&#10;Description automatically generated with medium confidence">
+            <a:extLst>
+              <a:ext uri="{FF2B5EF4-FFF2-40B4-BE49-F238E27FC236}">
+                <a16:creationId xmlns:a16="http://schemas.microsoft.com/office/drawing/2014/main" id="{D40606D2-676B-3117-36AD-4829CFCF165C}"/>
+              </a:ext>
+            </a:extLst>
+          </p:cNvPr>
+          <p:cNvPicPr>
+            <a:picLocks noChangeAspect="1"/>
+          </p:cNvPicPr>
+          <p:nvPr/>
+        </p:nvPicPr>
+        <p:blipFill>
+          <a:blip r:embed="rId5"/>
+          <a:stretch>
+            <a:fillRect/>
+          </a:stretch>
+        </p:blipFill>
+        <p:spPr>
+          <a:xfrm>
+            <a:off x="1196180" y="530363"/>
+            <a:ext cx="7373155" cy="5090507"/>
+          </a:xfrm>
+          <a:prstGeom prst="rect">
+            <a:avLst/>
+          </a:prstGeom>
+        </p:spPr>
+      </p:pic>
+      <p:sp>
+        <p:nvSpPr>
+          <p:cNvPr id="21" name="TextBox 20">
+            <a:extLst>
+              <a:ext uri="{FF2B5EF4-FFF2-40B4-BE49-F238E27FC236}">
+                <a16:creationId xmlns:a16="http://schemas.microsoft.com/office/drawing/2014/main" id="{2927037C-2455-5579-89A5-9148D55B4A1C}"/>
+              </a:ext>
+            </a:extLst>
+          </p:cNvPr>
+          <p:cNvSpPr txBox="1"/>
+          <p:nvPr/>
+        </p:nvSpPr>
+        <p:spPr>
+          <a:xfrm>
+            <a:off x="2391160" y="1738627"/>
+            <a:ext cx="661322" cy="338554"/>
+          </a:xfrm>
+          <a:prstGeom prst="rect">
+            <a:avLst/>
+          </a:prstGeom>
+          <a:solidFill>
+            <a:schemeClr val="bg1"/>
+          </a:solidFill>
+        </p:spPr>
+        <p:txBody>
+          <a:bodyPr wrap="square" rtlCol="0">
+            <a:spAutoFit/>
+          </a:bodyPr>
+          <a:lstStyle/>
+          <a:p>
+            <a:r>
+              <a:rPr lang="en-US" sz="1600" i="1" dirty="0">
+                <a:solidFill>
+                  <a:schemeClr val="bg2">
+                    <a:lumMod val="75000"/>
+                  </a:schemeClr>
+                </a:solidFill>
+                <a:latin typeface="Arial" panose="020B0604020202020204" pitchFamily="34" charset="0"/>
+                <a:cs typeface="Arial" panose="020B0604020202020204" pitchFamily="34" charset="0"/>
+              </a:rPr>
+              <a:t>1:1</a:t>
+            </a:r>
+          </a:p>
+        </p:txBody>
+      </p:sp>
+      <p:sp>
+        <p:nvSpPr>
+          <p:cNvPr id="23" name="TextBox 22">
+            <a:extLst>
+              <a:ext uri="{FF2B5EF4-FFF2-40B4-BE49-F238E27FC236}">
+                <a16:creationId xmlns:a16="http://schemas.microsoft.com/office/drawing/2014/main" id="{387095A4-E390-4C28-08B0-023D077343E1}"/>
+              </a:ext>
+            </a:extLst>
+          </p:cNvPr>
+          <p:cNvSpPr txBox="1"/>
+          <p:nvPr/>
+        </p:nvSpPr>
+        <p:spPr>
+          <a:xfrm>
+            <a:off x="11674113" y="2657509"/>
+            <a:ext cx="508923" cy="338554"/>
+          </a:xfrm>
+          <a:prstGeom prst="rect">
+            <a:avLst/>
+          </a:prstGeom>
+          <a:solidFill>
+            <a:schemeClr val="bg1"/>
+          </a:solidFill>
+        </p:spPr>
+        <p:txBody>
+          <a:bodyPr wrap="square" rtlCol="0">
+            <a:spAutoFit/>
+          </a:bodyPr>
+          <a:lstStyle/>
+          <a:p>
+            <a:r>
+              <a:rPr lang="en-US" sz="1600" i="1" dirty="0">
+                <a:solidFill>
+                  <a:schemeClr val="bg2">
+                    <a:lumMod val="75000"/>
+                  </a:schemeClr>
+                </a:solidFill>
+                <a:latin typeface="Arial" panose="020B0604020202020204" pitchFamily="34" charset="0"/>
+                <a:cs typeface="Arial" panose="020B0604020202020204" pitchFamily="34" charset="0"/>
+              </a:rPr>
+              <a:t>1:1</a:t>
+            </a:r>
+          </a:p>
+        </p:txBody>
+      </p:sp>
+      <p:sp>
+        <p:nvSpPr>
+          <p:cNvPr id="47" name="TextBox 46">
+            <a:extLst>
+              <a:ext uri="{FF2B5EF4-FFF2-40B4-BE49-F238E27FC236}">
+                <a16:creationId xmlns:a16="http://schemas.microsoft.com/office/drawing/2014/main" id="{3A05D1CC-ADAE-DA59-3D2A-CD44C0CCBE6E}"/>
+              </a:ext>
+            </a:extLst>
+          </p:cNvPr>
+          <p:cNvSpPr txBox="1"/>
+          <p:nvPr/>
+        </p:nvSpPr>
+        <p:spPr>
+          <a:xfrm>
+            <a:off x="5727784" y="4551519"/>
+            <a:ext cx="989437" cy="338554"/>
+          </a:xfrm>
+          <a:prstGeom prst="rect">
+            <a:avLst/>
+          </a:prstGeom>
+          <a:noFill/>
+        </p:spPr>
+        <p:txBody>
+          <a:bodyPr wrap="square" rtlCol="0">
+            <a:spAutoFit/>
+          </a:bodyPr>
+          <a:lstStyle/>
+          <a:p>
+            <a:pPr algn="ctr"/>
+            <a:r>
+              <a:rPr lang="en-US" sz="1600" dirty="0">
+                <a:solidFill>
+                  <a:schemeClr val="bg2">
+                    <a:lumMod val="75000"/>
+                  </a:schemeClr>
+                </a:solidFill>
+                <a:latin typeface="Arial" panose="020B0604020202020204" pitchFamily="34" charset="0"/>
+                <a:cs typeface="Arial" panose="020B0604020202020204" pitchFamily="34" charset="0"/>
+              </a:rPr>
+              <a:t>n = 421</a:t>
+            </a:r>
+          </a:p>
+        </p:txBody>
+      </p:sp>
+      <p:pic>
+        <p:nvPicPr>
+          <p:cNvPr id="51" name="Picture 50" descr="A diagram of a number of birds&#10;&#10;Description automatically generated with medium confidence">
+            <a:extLst>
+              <a:ext uri="{FF2B5EF4-FFF2-40B4-BE49-F238E27FC236}">
+                <a16:creationId xmlns:a16="http://schemas.microsoft.com/office/drawing/2014/main" id="{FC6B891B-AC9C-C01F-30F0-8C52CC8E62DA}"/>
+              </a:ext>
+            </a:extLst>
+          </p:cNvPr>
+          <p:cNvPicPr>
+            <a:picLocks noChangeAspect="1"/>
+          </p:cNvPicPr>
+          <p:nvPr/>
+        </p:nvPicPr>
+        <p:blipFill rotWithShape="1">
+          <a:blip r:embed="rId5"/>
+          <a:srcRect l="77641" t="29549" r="839" b="17847"/>
+          <a:stretch/>
+        </p:blipFill>
+        <p:spPr>
+          <a:xfrm>
+            <a:off x="13924879" y="2316480"/>
+            <a:ext cx="1454649" cy="2454895"/>
+          </a:xfrm>
+          <a:prstGeom prst="rect">
+            <a:avLst/>
+          </a:prstGeom>
+        </p:spPr>
+      </p:pic>
+      <p:pic>
+        <p:nvPicPr>
+          <p:cNvPr id="1039" name="Picture 1038" descr="A diagram of a number of birds&#10;&#10;Description automatically generated with medium confidence">
+            <a:extLst>
+              <a:ext uri="{FF2B5EF4-FFF2-40B4-BE49-F238E27FC236}">
+                <a16:creationId xmlns:a16="http://schemas.microsoft.com/office/drawing/2014/main" id="{13142BF3-004A-7313-C0E7-9EDCFC00D604}"/>
+              </a:ext>
+            </a:extLst>
+          </p:cNvPr>
+          <p:cNvPicPr>
+            <a:picLocks noChangeAspect="1"/>
+          </p:cNvPicPr>
+          <p:nvPr/>
+        </p:nvPicPr>
+        <p:blipFill rotWithShape="1">
+          <a:blip r:embed="rId5"/>
+          <a:srcRect l="79499" t="15321" r="6284" b="79206"/>
+          <a:stretch/>
+        </p:blipFill>
+        <p:spPr>
+          <a:xfrm>
+            <a:off x="11900648" y="891987"/>
+            <a:ext cx="944489" cy="251013"/>
+          </a:xfrm>
+          <a:prstGeom prst="rect">
+            <a:avLst/>
+          </a:prstGeom>
+        </p:spPr>
+      </p:pic>
+      <p:pic>
+        <p:nvPicPr>
+          <p:cNvPr id="1040" name="Picture 1039" descr="A diagram of a number of birds&#10;&#10;Description automatically generated with medium confidence">
+            <a:extLst>
+              <a:ext uri="{FF2B5EF4-FFF2-40B4-BE49-F238E27FC236}">
+                <a16:creationId xmlns:a16="http://schemas.microsoft.com/office/drawing/2014/main" id="{ADFCBEDB-009A-5C28-7460-D531F2340DD3}"/>
+              </a:ext>
+            </a:extLst>
+          </p:cNvPr>
+          <p:cNvPicPr>
+            <a:picLocks noChangeAspect="1"/>
+          </p:cNvPicPr>
+          <p:nvPr/>
+        </p:nvPicPr>
+        <p:blipFill rotWithShape="1">
+          <a:blip r:embed="rId5"/>
+          <a:srcRect l="79499" t="21815" r="6284" b="73640"/>
+          <a:stretch/>
+        </p:blipFill>
+        <p:spPr>
+          <a:xfrm>
+            <a:off x="12711952" y="914399"/>
+            <a:ext cx="995082" cy="219637"/>
+          </a:xfrm>
+          <a:prstGeom prst="rect">
+            <a:avLst/>
+          </a:prstGeom>
+        </p:spPr>
+      </p:pic>
+      <p:sp>
+        <p:nvSpPr>
+          <p:cNvPr id="1057" name="TextBox 1056">
+            <a:extLst>
+              <a:ext uri="{FF2B5EF4-FFF2-40B4-BE49-F238E27FC236}">
+                <a16:creationId xmlns:a16="http://schemas.microsoft.com/office/drawing/2014/main" id="{16E2F88A-F72E-BC61-20FC-68DE57209733}"/>
+              </a:ext>
+            </a:extLst>
+          </p:cNvPr>
+          <p:cNvSpPr txBox="1"/>
+          <p:nvPr/>
+        </p:nvSpPr>
+        <p:spPr>
+          <a:xfrm>
+            <a:off x="15584557" y="11847443"/>
+            <a:ext cx="184731" cy="369332"/>
+          </a:xfrm>
+          <a:prstGeom prst="rect">
+            <a:avLst/>
+          </a:prstGeom>
+          <a:noFill/>
+        </p:spPr>
+        <p:txBody>
+          <a:bodyPr wrap="none" rtlCol="0">
+            <a:spAutoFit/>
+          </a:bodyPr>
+          <a:lstStyle/>
+          <a:p>
+            <a:endParaRPr lang="en-US" dirty="0"/>
+          </a:p>
+        </p:txBody>
+      </p:sp>
+      <p:pic>
+        <p:nvPicPr>
+          <p:cNvPr id="1073" name="Picture 1072" descr="A graph of a speed limit&#10;&#10;Description automatically generated with medium confidence">
+            <a:extLst>
+              <a:ext uri="{FF2B5EF4-FFF2-40B4-BE49-F238E27FC236}">
+                <a16:creationId xmlns:a16="http://schemas.microsoft.com/office/drawing/2014/main" id="{6CA5A2AE-49CB-680D-CF79-036B2B7AED59}"/>
+              </a:ext>
+            </a:extLst>
+          </p:cNvPr>
+          <p:cNvPicPr>
+            <a:picLocks noChangeAspect="1"/>
+          </p:cNvPicPr>
+          <p:nvPr/>
+        </p:nvPicPr>
+        <p:blipFill rotWithShape="1">
+          <a:blip r:embed="rId6"/>
+          <a:srcRect t="38995" r="9760"/>
+          <a:stretch/>
+        </p:blipFill>
+        <p:spPr>
+          <a:xfrm>
+            <a:off x="10491058" y="10478666"/>
+            <a:ext cx="1091342" cy="2951082"/>
+          </a:xfrm>
+          <a:prstGeom prst="rect">
+            <a:avLst/>
+          </a:prstGeom>
+        </p:spPr>
+      </p:pic>
+    </p:spTree>
+    <p:extLst>
+      <p:ext uri="{BB962C8B-B14F-4D97-AF65-F5344CB8AC3E}">
+        <p14:creationId xmlns:p14="http://schemas.microsoft.com/office/powerpoint/2010/main" val="2974795568"/>
       </p:ext>
     </p:extLst>
   </p:cSld>

</xml_diff>

<commit_message>
updating scripts & figures (with new methodological figure!)
</commit_message>
<xml_diff>
--- a/figures/main-figures.pptx
+++ b/figures/main-figures.pptx
@@ -5,11 +5,12 @@
     <p:sldMasterId id="2147483684" r:id="rId1"/>
   </p:sldMasterIdLst>
   <p:notesMasterIdLst>
-    <p:notesMasterId r:id="rId4"/>
+    <p:notesMasterId r:id="rId5"/>
   </p:notesMasterIdLst>
   <p:sldIdLst>
     <p:sldId id="256" r:id="rId2"/>
     <p:sldId id="257" r:id="rId3"/>
+    <p:sldId id="258" r:id="rId4"/>
   </p:sldIdLst>
   <p:sldSz cx="18000663" cy="14400213"/>
   <p:notesSz cx="6858000" cy="9144000"/>
@@ -198,7 +199,7 @@
           <a:p>
             <a:fld id="{B7CE4BC6-D327-1C4F-8429-775CD9D39CD2}" type="datetimeFigureOut">
               <a:rPr lang="en-US" smtClean="0"/>
-              <a:t>9/30/25</a:t>
+              <a:t>10/5/25</a:t>
             </a:fld>
             <a:endParaRPr lang="en-US"/>
           </a:p>
@@ -774,7 +775,7 @@
           <a:p>
             <a:fld id="{3B85B7A5-F096-CF4C-9C20-4BA2556B79B6}" type="datetimeFigureOut">
               <a:rPr lang="en-US" smtClean="0"/>
-              <a:t>9/30/25</a:t>
+              <a:t>10/5/25</a:t>
             </a:fld>
             <a:endParaRPr lang="en-US"/>
           </a:p>
@@ -944,7 +945,7 @@
           <a:p>
             <a:fld id="{3B85B7A5-F096-CF4C-9C20-4BA2556B79B6}" type="datetimeFigureOut">
               <a:rPr lang="en-US" smtClean="0"/>
-              <a:t>9/30/25</a:t>
+              <a:t>10/5/25</a:t>
             </a:fld>
             <a:endParaRPr lang="en-US"/>
           </a:p>
@@ -1124,7 +1125,7 @@
           <a:p>
             <a:fld id="{3B85B7A5-F096-CF4C-9C20-4BA2556B79B6}" type="datetimeFigureOut">
               <a:rPr lang="en-US" smtClean="0"/>
-              <a:t>9/30/25</a:t>
+              <a:t>10/5/25</a:t>
             </a:fld>
             <a:endParaRPr lang="en-US"/>
           </a:p>
@@ -1294,7 +1295,7 @@
           <a:p>
             <a:fld id="{3B85B7A5-F096-CF4C-9C20-4BA2556B79B6}" type="datetimeFigureOut">
               <a:rPr lang="en-US" smtClean="0"/>
-              <a:t>9/30/25</a:t>
+              <a:t>10/5/25</a:t>
             </a:fld>
             <a:endParaRPr lang="en-US"/>
           </a:p>
@@ -1538,7 +1539,7 @@
           <a:p>
             <a:fld id="{3B85B7A5-F096-CF4C-9C20-4BA2556B79B6}" type="datetimeFigureOut">
               <a:rPr lang="en-US" smtClean="0"/>
-              <a:t>9/30/25</a:t>
+              <a:t>10/5/25</a:t>
             </a:fld>
             <a:endParaRPr lang="en-US"/>
           </a:p>
@@ -1770,7 +1771,7 @@
           <a:p>
             <a:fld id="{3B85B7A5-F096-CF4C-9C20-4BA2556B79B6}" type="datetimeFigureOut">
               <a:rPr lang="en-US" smtClean="0"/>
-              <a:t>9/30/25</a:t>
+              <a:t>10/5/25</a:t>
             </a:fld>
             <a:endParaRPr lang="en-US"/>
           </a:p>
@@ -2137,7 +2138,7 @@
           <a:p>
             <a:fld id="{3B85B7A5-F096-CF4C-9C20-4BA2556B79B6}" type="datetimeFigureOut">
               <a:rPr lang="en-US" smtClean="0"/>
-              <a:t>9/30/25</a:t>
+              <a:t>10/5/25</a:t>
             </a:fld>
             <a:endParaRPr lang="en-US"/>
           </a:p>
@@ -2255,7 +2256,7 @@
           <a:p>
             <a:fld id="{3B85B7A5-F096-CF4C-9C20-4BA2556B79B6}" type="datetimeFigureOut">
               <a:rPr lang="en-US" smtClean="0"/>
-              <a:t>9/30/25</a:t>
+              <a:t>10/5/25</a:t>
             </a:fld>
             <a:endParaRPr lang="en-US"/>
           </a:p>
@@ -2350,7 +2351,7 @@
           <a:p>
             <a:fld id="{3B85B7A5-F096-CF4C-9C20-4BA2556B79B6}" type="datetimeFigureOut">
               <a:rPr lang="en-US" smtClean="0"/>
-              <a:t>9/30/25</a:t>
+              <a:t>10/5/25</a:t>
             </a:fld>
             <a:endParaRPr lang="en-US"/>
           </a:p>
@@ -2627,7 +2628,7 @@
           <a:p>
             <a:fld id="{3B85B7A5-F096-CF4C-9C20-4BA2556B79B6}" type="datetimeFigureOut">
               <a:rPr lang="en-US" smtClean="0"/>
-              <a:t>9/30/25</a:t>
+              <a:t>10/5/25</a:t>
             </a:fld>
             <a:endParaRPr lang="en-US"/>
           </a:p>
@@ -2884,7 +2885,7 @@
           <a:p>
             <a:fld id="{3B85B7A5-F096-CF4C-9C20-4BA2556B79B6}" type="datetimeFigureOut">
               <a:rPr lang="en-US" smtClean="0"/>
-              <a:t>9/30/25</a:t>
+              <a:t>10/5/25</a:t>
             </a:fld>
             <a:endParaRPr lang="en-US"/>
           </a:p>
@@ -3097,7 +3098,7 @@
           <a:p>
             <a:fld id="{3B85B7A5-F096-CF4C-9C20-4BA2556B79B6}" type="datetimeFigureOut">
               <a:rPr lang="en-US" smtClean="0"/>
-              <a:t>9/30/25</a:t>
+              <a:t>10/5/25</a:t>
             </a:fld>
             <a:endParaRPr lang="en-US"/>
           </a:p>
@@ -3554,7 +3555,7 @@
         </p:blipFill>
         <p:spPr>
           <a:xfrm>
-            <a:off x="2576446" y="10035252"/>
+            <a:off x="333989" y="8511252"/>
             <a:ext cx="7800454" cy="3629378"/>
           </a:xfrm>
           <a:prstGeom prst="rect">
@@ -3607,7 +3608,7 @@
         </p:nvCxnSpPr>
         <p:spPr>
           <a:xfrm flipV="1">
-            <a:off x="2947855" y="6388189"/>
+            <a:off x="1293226" y="4951275"/>
             <a:ext cx="2338447" cy="2260401"/>
           </a:xfrm>
           <a:prstGeom prst="line">
@@ -3653,7 +3654,7 @@
         </p:nvCxnSpPr>
         <p:spPr>
           <a:xfrm flipV="1">
-            <a:off x="6280191" y="6388189"/>
+            <a:off x="4625562" y="4951275"/>
             <a:ext cx="2338447" cy="2260401"/>
           </a:xfrm>
           <a:prstGeom prst="line">
@@ -3697,7 +3698,7 @@
         </p:nvSpPr>
         <p:spPr>
           <a:xfrm>
-            <a:off x="2778357" y="8928763"/>
+            <a:off x="1123728" y="7491849"/>
             <a:ext cx="2969083" cy="338554"/>
           </a:xfrm>
           <a:prstGeom prst="rect">
@@ -3737,7 +3738,7 @@
         </p:nvCxnSpPr>
         <p:spPr>
           <a:xfrm flipV="1">
-            <a:off x="4041291" y="7030717"/>
+            <a:off x="2386662" y="5593803"/>
             <a:ext cx="562778" cy="562105"/>
           </a:xfrm>
           <a:prstGeom prst="line">
@@ -3780,7 +3781,7 @@
         </p:nvCxnSpPr>
         <p:spPr>
           <a:xfrm>
-            <a:off x="4601402" y="7044217"/>
+            <a:off x="2946773" y="5607303"/>
             <a:ext cx="1018602" cy="0"/>
           </a:xfrm>
           <a:prstGeom prst="line">
@@ -3823,7 +3824,7 @@
         </p:nvCxnSpPr>
         <p:spPr>
           <a:xfrm flipV="1">
-            <a:off x="2959354" y="7551575"/>
+            <a:off x="1304725" y="6114661"/>
             <a:ext cx="1119260" cy="1112760"/>
           </a:xfrm>
           <a:prstGeom prst="line">
@@ -3866,7 +3867,7 @@
         </p:nvCxnSpPr>
         <p:spPr>
           <a:xfrm>
-            <a:off x="4059322" y="7563712"/>
+            <a:off x="2404693" y="6126798"/>
             <a:ext cx="1547982" cy="0"/>
           </a:xfrm>
           <a:prstGeom prst="line">
@@ -3909,7 +3910,7 @@
         </p:nvCxnSpPr>
         <p:spPr>
           <a:xfrm flipV="1">
-            <a:off x="2941983" y="8118735"/>
+            <a:off x="1287354" y="6681821"/>
             <a:ext cx="562490" cy="561187"/>
           </a:xfrm>
           <a:prstGeom prst="line">
@@ -3952,7 +3953,7 @@
         </p:nvCxnSpPr>
         <p:spPr>
           <a:xfrm>
-            <a:off x="3505666" y="8132800"/>
+            <a:off x="1851037" y="6695886"/>
             <a:ext cx="2088939" cy="0"/>
           </a:xfrm>
           <a:prstGeom prst="line">
@@ -3993,7 +3994,7 @@
         </p:nvSpPr>
         <p:spPr>
           <a:xfrm>
-            <a:off x="2631776" y="5699627"/>
+            <a:off x="977147" y="4262713"/>
             <a:ext cx="269626" cy="2677656"/>
           </a:xfrm>
           <a:prstGeom prst="rect">
@@ -4118,7 +4119,7 @@
         </p:nvSpPr>
         <p:spPr>
           <a:xfrm>
-            <a:off x="3409210" y="8709045"/>
+            <a:off x="1754581" y="7272131"/>
             <a:ext cx="2891743" cy="276999"/>
           </a:xfrm>
           <a:prstGeom prst="rect">
@@ -4156,7 +4157,7 @@
         </p:nvSpPr>
         <p:spPr>
           <a:xfrm>
-            <a:off x="2846459" y="6117213"/>
+            <a:off x="1191830" y="4680299"/>
             <a:ext cx="569481" cy="338554"/>
           </a:xfrm>
           <a:prstGeom prst="rect">
@@ -4200,7 +4201,7 @@
         </p:nvSpPr>
         <p:spPr>
           <a:xfrm>
-            <a:off x="3549478" y="7954657"/>
+            <a:off x="1894849" y="6517743"/>
             <a:ext cx="141515" cy="130629"/>
           </a:xfrm>
           <a:prstGeom prst="ellipse">
@@ -4260,7 +4261,7 @@
         </p:nvSpPr>
         <p:spPr>
           <a:xfrm>
-            <a:off x="4402479" y="7093583"/>
+            <a:off x="2747850" y="5656669"/>
             <a:ext cx="141515" cy="130629"/>
           </a:xfrm>
           <a:prstGeom prst="ellipse">
@@ -4320,7 +4321,7 @@
         </p:nvSpPr>
         <p:spPr>
           <a:xfrm>
-            <a:off x="5048715" y="6982792"/>
+            <a:off x="3394086" y="5545878"/>
             <a:ext cx="141515" cy="130629"/>
           </a:xfrm>
           <a:prstGeom prst="ellipse">
@@ -4380,7 +4381,7 @@
         </p:nvSpPr>
         <p:spPr>
           <a:xfrm>
-            <a:off x="4115552" y="7397558"/>
+            <a:off x="2460923" y="5960644"/>
             <a:ext cx="141515" cy="130629"/>
           </a:xfrm>
           <a:prstGeom prst="ellipse">
@@ -4442,7 +4443,7 @@
         </p:nvCxnSpPr>
         <p:spPr>
           <a:xfrm>
-            <a:off x="6223287" y="6220741"/>
+            <a:off x="4568658" y="4783827"/>
             <a:ext cx="0" cy="2491683"/>
           </a:xfrm>
           <a:prstGeom prst="line">
@@ -4485,7 +4486,7 @@
         </p:nvCxnSpPr>
         <p:spPr>
           <a:xfrm flipH="1">
-            <a:off x="6234173" y="8701537"/>
+            <a:off x="4579544" y="7264623"/>
             <a:ext cx="2660360" cy="0"/>
           </a:xfrm>
           <a:prstGeom prst="line">
@@ -4526,7 +4527,7 @@
         </p:nvSpPr>
         <p:spPr>
           <a:xfrm>
-            <a:off x="5806951" y="8910868"/>
+            <a:off x="4152322" y="7473954"/>
             <a:ext cx="3610227" cy="584775"/>
           </a:xfrm>
           <a:prstGeom prst="rect">
@@ -4546,7 +4547,7 @@
                 <a:latin typeface="Arial" panose="020B0604020202020204" pitchFamily="34" charset="0"/>
                 <a:cs typeface="Arial" panose="020B0604020202020204" pitchFamily="34" charset="0"/>
               </a:rPr>
-              <a:t>Minimum of potential dispersal rate and velocity of isotherm shift (km/yr)</a:t>
+              <a:t>Minimum of potential dispersal rate and velocity of climate change (km/yr)</a:t>
             </a:r>
           </a:p>
         </p:txBody>
@@ -4565,7 +4566,7 @@
         </p:nvSpPr>
         <p:spPr>
           <a:xfrm>
-            <a:off x="5917246" y="5713755"/>
+            <a:off x="4262617" y="4276841"/>
             <a:ext cx="269626" cy="2677656"/>
           </a:xfrm>
           <a:prstGeom prst="rect">
@@ -4690,7 +4691,7 @@
         </p:nvSpPr>
         <p:spPr>
           <a:xfrm>
-            <a:off x="6694680" y="8723173"/>
+            <a:off x="5040051" y="7286259"/>
             <a:ext cx="2891743" cy="276999"/>
           </a:xfrm>
           <a:prstGeom prst="rect">
@@ -4728,7 +4729,7 @@
         </p:nvSpPr>
         <p:spPr>
           <a:xfrm>
-            <a:off x="6138762" y="6117213"/>
+            <a:off x="4484133" y="4680299"/>
             <a:ext cx="569481" cy="338554"/>
           </a:xfrm>
           <a:prstGeom prst="rect">
@@ -4772,7 +4773,7 @@
         </p:nvSpPr>
         <p:spPr>
           <a:xfrm>
-            <a:off x="3907714" y="7592822"/>
+            <a:off x="2253085" y="6155908"/>
             <a:ext cx="141515" cy="130629"/>
           </a:xfrm>
           <a:prstGeom prst="ellipse">
@@ -4832,7 +4833,7 @@
         </p:nvSpPr>
         <p:spPr>
           <a:xfrm>
-            <a:off x="3740550" y="7773797"/>
+            <a:off x="2085921" y="6336883"/>
             <a:ext cx="141515" cy="130629"/>
           </a:xfrm>
           <a:prstGeom prst="ellipse">
@@ -4892,7 +4893,7 @@
         </p:nvSpPr>
         <p:spPr>
           <a:xfrm>
-            <a:off x="2996434" y="8483415"/>
+            <a:off x="1341805" y="7046501"/>
             <a:ext cx="141515" cy="130629"/>
           </a:xfrm>
           <a:prstGeom prst="ellipse">
@@ -4952,7 +4953,7 @@
         </p:nvSpPr>
         <p:spPr>
           <a:xfrm>
-            <a:off x="3243832" y="8235765"/>
+            <a:off x="1589203" y="6798851"/>
             <a:ext cx="141515" cy="130629"/>
           </a:xfrm>
           <a:prstGeom prst="ellipse">
@@ -5012,7 +5013,7 @@
         </p:nvSpPr>
         <p:spPr>
           <a:xfrm>
-            <a:off x="4523924" y="7491385"/>
+            <a:off x="2869295" y="6054471"/>
             <a:ext cx="141515" cy="130629"/>
           </a:xfrm>
           <a:prstGeom prst="ellipse">
@@ -5070,7 +5071,7 @@
         </p:nvSpPr>
         <p:spPr>
           <a:xfrm>
-            <a:off x="4921651" y="7497254"/>
+            <a:off x="3267022" y="6060340"/>
             <a:ext cx="141515" cy="130629"/>
           </a:xfrm>
           <a:prstGeom prst="ellipse">
@@ -5128,7 +5129,7 @@
         </p:nvSpPr>
         <p:spPr>
           <a:xfrm>
-            <a:off x="5397436" y="7495102"/>
+            <a:off x="3742807" y="6058188"/>
             <a:ext cx="141515" cy="130629"/>
           </a:xfrm>
           <a:prstGeom prst="ellipse">
@@ -5186,7 +5187,7 @@
         </p:nvSpPr>
         <p:spPr>
           <a:xfrm>
-            <a:off x="3888305" y="8070138"/>
+            <a:off x="2233676" y="6633224"/>
             <a:ext cx="141515" cy="130629"/>
           </a:xfrm>
           <a:prstGeom prst="ellipse">
@@ -5244,7 +5245,7 @@
         </p:nvSpPr>
         <p:spPr>
           <a:xfrm>
-            <a:off x="4427280" y="8063814"/>
+            <a:off x="2772651" y="6626900"/>
             <a:ext cx="141515" cy="130629"/>
           </a:xfrm>
           <a:prstGeom prst="ellipse">
@@ -5302,7 +5303,7 @@
         </p:nvSpPr>
         <p:spPr>
           <a:xfrm>
-            <a:off x="5230168" y="8058534"/>
+            <a:off x="3575539" y="6621620"/>
             <a:ext cx="141515" cy="130629"/>
           </a:xfrm>
           <a:prstGeom prst="ellipse">
@@ -5362,7 +5363,7 @@
         </p:nvCxnSpPr>
         <p:spPr>
           <a:xfrm flipH="1">
-            <a:off x="2948704" y="8687409"/>
+            <a:off x="1294075" y="7250495"/>
             <a:ext cx="2645901" cy="0"/>
           </a:xfrm>
           <a:prstGeom prst="line">
@@ -5405,7 +5406,7 @@
         </p:nvCxnSpPr>
         <p:spPr>
           <a:xfrm>
-            <a:off x="2937817" y="6194185"/>
+            <a:off x="1283188" y="4757271"/>
             <a:ext cx="0" cy="2504110"/>
           </a:xfrm>
           <a:prstGeom prst="line">
@@ -5446,7 +5447,7 @@
         </p:nvSpPr>
         <p:spPr>
           <a:xfrm>
-            <a:off x="3749812" y="6362265"/>
+            <a:off x="2095183" y="4925351"/>
             <a:ext cx="2032232" cy="338554"/>
           </a:xfrm>
           <a:prstGeom prst="rect">
@@ -5490,7 +5491,7 @@
         </p:nvSpPr>
         <p:spPr>
           <a:xfrm rot="16200000">
-            <a:off x="1029999" y="7277521"/>
+            <a:off x="-624630" y="5840607"/>
             <a:ext cx="2900904" cy="338554"/>
           </a:xfrm>
           <a:prstGeom prst="rect">
@@ -5529,7 +5530,7 @@
         </p:nvSpPr>
         <p:spPr>
           <a:xfrm>
-            <a:off x="4977350" y="5780323"/>
+            <a:off x="3322721" y="4343409"/>
             <a:ext cx="141515" cy="130629"/>
           </a:xfrm>
           <a:prstGeom prst="ellipse">
@@ -5589,8 +5590,8 @@
         </p:nvSpPr>
         <p:spPr>
           <a:xfrm>
-            <a:off x="9107299" y="6260382"/>
-            <a:ext cx="1131724" cy="1077218"/>
+            <a:off x="7189911" y="5012654"/>
+            <a:ext cx="1655294" cy="830997"/>
           </a:xfrm>
           <a:prstGeom prst="rect">
             <a:avLst/>
@@ -5609,7 +5610,7 @@
                 <a:latin typeface="Arial" panose="020B0604020202020204" pitchFamily="34" charset="0"/>
                 <a:cs typeface="Arial" panose="020B0604020202020204" pitchFamily="34" charset="0"/>
               </a:rPr>
-              <a:t>Velocity of isotherm shift (km/yr)</a:t>
+              <a:t>Velocity of climate change (km/yr)</a:t>
             </a:r>
           </a:p>
         </p:txBody>
@@ -5636,7 +5637,7 @@
         </p:blipFill>
         <p:spPr>
           <a:xfrm>
-            <a:off x="10476234" y="10405407"/>
+            <a:off x="8233777" y="8881407"/>
             <a:ext cx="1004705" cy="2466095"/>
           </a:xfrm>
           <a:prstGeom prst="rect">
@@ -5834,7 +5835,7 @@
         </p:nvSpPr>
         <p:spPr>
           <a:xfrm>
-            <a:off x="6962630" y="10121354"/>
+            <a:off x="4720173" y="8597354"/>
             <a:ext cx="569481" cy="338554"/>
           </a:xfrm>
           <a:prstGeom prst="rect">
@@ -5878,7 +5879,7 @@
         </p:nvSpPr>
         <p:spPr>
           <a:xfrm>
-            <a:off x="4948187" y="11569223"/>
+            <a:off x="2705730" y="10045223"/>
             <a:ext cx="2032232" cy="338554"/>
           </a:xfrm>
           <a:prstGeom prst="rect">
@@ -5922,7 +5923,7 @@
         </p:nvSpPr>
         <p:spPr>
           <a:xfrm>
-            <a:off x="6849927" y="7967454"/>
+            <a:off x="5195298" y="6530540"/>
             <a:ext cx="141515" cy="130629"/>
           </a:xfrm>
           <a:prstGeom prst="ellipse">
@@ -5982,7 +5983,7 @@
         </p:nvSpPr>
         <p:spPr>
           <a:xfrm>
-            <a:off x="7702928" y="7106380"/>
+            <a:off x="6048299" y="5669466"/>
             <a:ext cx="141515" cy="130629"/>
           </a:xfrm>
           <a:prstGeom prst="ellipse">
@@ -6042,7 +6043,7 @@
         </p:nvSpPr>
         <p:spPr>
           <a:xfrm>
-            <a:off x="7832635" y="6995589"/>
+            <a:off x="6178006" y="5558675"/>
             <a:ext cx="141515" cy="130629"/>
           </a:xfrm>
           <a:prstGeom prst="ellipse">
@@ -6102,7 +6103,7 @@
         </p:nvSpPr>
         <p:spPr>
           <a:xfrm>
-            <a:off x="7416001" y="7410355"/>
+            <a:off x="5761372" y="5973441"/>
             <a:ext cx="141515" cy="130629"/>
           </a:xfrm>
           <a:prstGeom prst="ellipse">
@@ -6162,7 +6163,7 @@
         </p:nvSpPr>
         <p:spPr>
           <a:xfrm>
-            <a:off x="7208163" y="7605619"/>
+            <a:off x="5553534" y="6168705"/>
             <a:ext cx="141515" cy="130629"/>
           </a:xfrm>
           <a:prstGeom prst="ellipse">
@@ -6222,7 +6223,7 @@
         </p:nvSpPr>
         <p:spPr>
           <a:xfrm>
-            <a:off x="7040999" y="7786594"/>
+            <a:off x="5386370" y="6349680"/>
             <a:ext cx="141515" cy="130629"/>
           </a:xfrm>
           <a:prstGeom prst="ellipse">
@@ -6282,7 +6283,7 @@
         </p:nvSpPr>
         <p:spPr>
           <a:xfrm>
-            <a:off x="6296883" y="8496212"/>
+            <a:off x="4642254" y="7059298"/>
             <a:ext cx="141515" cy="130629"/>
           </a:xfrm>
           <a:prstGeom prst="ellipse">
@@ -6342,7 +6343,7 @@
         </p:nvSpPr>
         <p:spPr>
           <a:xfrm>
-            <a:off x="6544281" y="8248562"/>
+            <a:off x="4889652" y="6811648"/>
             <a:ext cx="141515" cy="130629"/>
           </a:xfrm>
           <a:prstGeom prst="ellipse">
@@ -6402,7 +6403,7 @@
         </p:nvSpPr>
         <p:spPr>
           <a:xfrm>
-            <a:off x="7307844" y="7504182"/>
+            <a:off x="5653215" y="6067268"/>
             <a:ext cx="141515" cy="130629"/>
           </a:xfrm>
           <a:prstGeom prst="ellipse">
@@ -6460,7 +6461,7 @@
         </p:nvSpPr>
         <p:spPr>
           <a:xfrm>
-            <a:off x="6728067" y="8082935"/>
+            <a:off x="5073438" y="6646021"/>
             <a:ext cx="141515" cy="130629"/>
           </a:xfrm>
           <a:prstGeom prst="ellipse">
@@ -6518,10 +6519,10 @@
         </p:nvGrpSpPr>
         <p:grpSpPr>
           <a:xfrm>
-            <a:off x="10127199" y="6888147"/>
-            <a:ext cx="3024597" cy="1101530"/>
-            <a:chOff x="8524560" y="6991381"/>
-            <a:chExt cx="2682403" cy="1101530"/>
+            <a:off x="8630225" y="5499892"/>
+            <a:ext cx="3024597" cy="1136931"/>
+            <a:chOff x="8524560" y="7193781"/>
+            <a:chExt cx="2682403" cy="951930"/>
           </a:xfrm>
         </p:grpSpPr>
         <p:sp>
@@ -6578,7 +6579,7 @@
                   <a:latin typeface="Arial" panose="020B0604020202020204" pitchFamily="34" charset="0"/>
                   <a:cs typeface="Arial" panose="020B0604020202020204" pitchFamily="34" charset="0"/>
                 </a:rPr>
-                <a:t>Dispersal rate &lt; velocity of isotherm shift</a:t>
+                <a:t>Dispersal rate &lt; velocity of climate change</a:t>
               </a:r>
             </a:p>
             <a:p>
@@ -6601,18 +6602,8 @@
                   <a:latin typeface="Arial" panose="020B0604020202020204" pitchFamily="34" charset="0"/>
                   <a:cs typeface="Arial" panose="020B0604020202020204" pitchFamily="34" charset="0"/>
                 </a:rPr>
-                <a:t>Dispersal rate &gt; velocity of isotherm shift</a:t>
+                <a:t>Dispersal rate &gt; velocity of climate change</a:t>
               </a:r>
-            </a:p>
-            <a:p>
-              <a:pPr algn="ctr"/>
-              <a:endParaRPr lang="en-US" sz="1600" dirty="0">
-                <a:solidFill>
-                  <a:sysClr val="windowText" lastClr="000000"/>
-                </a:solidFill>
-                <a:latin typeface="Arial" panose="020B0604020202020204" pitchFamily="34" charset="0"/>
-                <a:cs typeface="Arial" panose="020B0604020202020204" pitchFamily="34" charset="0"/>
-              </a:endParaRPr>
             </a:p>
           </p:txBody>
         </p:sp>
@@ -6630,7 +6621,7 @@
           </p:nvSpPr>
           <p:spPr>
             <a:xfrm>
-              <a:off x="8812638" y="6991381"/>
+              <a:off x="8877886" y="7193781"/>
               <a:ext cx="141515" cy="130629"/>
             </a:xfrm>
             <a:prstGeom prst="ellipse">
@@ -6690,7 +6681,7 @@
           </p:nvSpPr>
           <p:spPr>
             <a:xfrm>
-              <a:off x="8812638" y="7962282"/>
+              <a:off x="8877888" y="8015082"/>
               <a:ext cx="141515" cy="130629"/>
             </a:xfrm>
             <a:prstGeom prst="ellipse">
@@ -6751,7 +6742,7 @@
         </p:nvSpPr>
         <p:spPr>
           <a:xfrm>
-            <a:off x="10315220" y="7769732"/>
+            <a:off x="8660591" y="6332818"/>
             <a:ext cx="1979542" cy="527839"/>
           </a:xfrm>
           <a:prstGeom prst="ellipse">
@@ -7177,7 +7168,7 @@
         </p:nvGrpSpPr>
         <p:grpSpPr>
           <a:xfrm>
-            <a:off x="3349276" y="10235447"/>
+            <a:off x="1106819" y="8711447"/>
             <a:ext cx="1476462" cy="800029"/>
             <a:chOff x="4245026" y="1035170"/>
             <a:chExt cx="1476462" cy="800029"/>
@@ -7446,7 +7437,7 @@
         </p:nvSpPr>
         <p:spPr>
           <a:xfrm>
-            <a:off x="9426530" y="12792716"/>
+            <a:off x="7184073" y="11268716"/>
             <a:ext cx="989437" cy="307777"/>
           </a:xfrm>
           <a:prstGeom prst="rect">
@@ -7490,7 +7481,7 @@
         </p:nvSpPr>
         <p:spPr>
           <a:xfrm>
-            <a:off x="5551461" y="12780729"/>
+            <a:off x="3309004" y="11256729"/>
             <a:ext cx="989437" cy="307777"/>
           </a:xfrm>
           <a:prstGeom prst="rect">
@@ -7541,7 +7532,7 @@
         </p:blipFill>
         <p:spPr>
           <a:xfrm>
-            <a:off x="2599716" y="9976467"/>
+            <a:off x="357259" y="8452467"/>
             <a:ext cx="328420" cy="4061806"/>
           </a:xfrm>
           <a:prstGeom prst="rect">
@@ -7570,7 +7561,7 @@
         </p:blipFill>
         <p:spPr>
           <a:xfrm>
-            <a:off x="6461088" y="9976467"/>
+            <a:off x="4218631" y="8452467"/>
             <a:ext cx="328420" cy="4061806"/>
           </a:xfrm>
           <a:prstGeom prst="rect">
@@ -7637,7 +7628,7 @@
         </p:nvSpPr>
         <p:spPr>
           <a:xfrm>
-            <a:off x="5851284" y="13103219"/>
+            <a:off x="3608827" y="11579219"/>
             <a:ext cx="989437" cy="292388"/>
           </a:xfrm>
           <a:prstGeom prst="rect">
@@ -7682,7 +7673,7 @@
         </p:nvSpPr>
         <p:spPr>
           <a:xfrm>
-            <a:off x="9744412" y="13103219"/>
+            <a:off x="7501955" y="11579219"/>
             <a:ext cx="989437" cy="292388"/>
           </a:xfrm>
           <a:prstGeom prst="rect">
@@ -7727,7 +7718,7 @@
         </p:nvSpPr>
         <p:spPr>
           <a:xfrm>
-            <a:off x="3056715" y="10096847"/>
+            <a:off x="814258" y="8572847"/>
             <a:ext cx="569481" cy="338554"/>
           </a:xfrm>
           <a:prstGeom prst="rect">
@@ -8113,7 +8104,7 @@
         </p:nvGrpSpPr>
         <p:grpSpPr>
           <a:xfrm>
-            <a:off x="5069281" y="10452118"/>
+            <a:off x="2826824" y="8928118"/>
             <a:ext cx="251992" cy="251942"/>
             <a:chOff x="4474118" y="766354"/>
             <a:chExt cx="251992" cy="251942"/>
@@ -8227,7 +8218,7 @@
         </p:nvGrpSpPr>
         <p:grpSpPr>
           <a:xfrm>
-            <a:off x="8964123" y="10444262"/>
+            <a:off x="6721666" y="8920262"/>
             <a:ext cx="251992" cy="251942"/>
             <a:chOff x="4474118" y="766354"/>
             <a:chExt cx="251992" cy="251942"/>
@@ -8341,7 +8332,7 @@
         </p:nvGrpSpPr>
         <p:grpSpPr>
           <a:xfrm>
-            <a:off x="9493954" y="7392408"/>
+            <a:off x="7839325" y="5955494"/>
             <a:ext cx="444660" cy="1384995"/>
             <a:chOff x="9460088" y="7144053"/>
             <a:chExt cx="444660" cy="1384995"/>
@@ -12932,6 +12923,1454 @@
     <p:extLst>
       <p:ext uri="{BB962C8B-B14F-4D97-AF65-F5344CB8AC3E}">
         <p14:creationId xmlns:p14="http://schemas.microsoft.com/office/powerpoint/2010/main" val="2974795568"/>
+      </p:ext>
+    </p:extLst>
+  </p:cSld>
+  <p:clrMapOvr>
+    <a:masterClrMapping/>
+  </p:clrMapOvr>
+</p:sld>
+</file>
+
+<file path=ppt/slides/slide3.xml><?xml version="1.0" encoding="utf-8"?>
+<p:sld xmlns:a="http://schemas.openxmlformats.org/drawingml/2006/main" xmlns:r="http://schemas.openxmlformats.org/officeDocument/2006/relationships" xmlns:p="http://schemas.openxmlformats.org/presentationml/2006/main">
+  <p:cSld>
+    <p:spTree>
+      <p:nvGrpSpPr>
+        <p:cNvPr id="1" name=""/>
+        <p:cNvGrpSpPr/>
+        <p:nvPr/>
+      </p:nvGrpSpPr>
+      <p:grpSpPr>
+        <a:xfrm>
+          <a:off x="0" y="0"/>
+          <a:ext cx="0" cy="0"/>
+          <a:chOff x="0" y="0"/>
+          <a:chExt cx="0" cy="0"/>
+        </a:xfrm>
+      </p:grpSpPr>
+      <p:pic>
+        <p:nvPicPr>
+          <p:cNvPr id="63" name="Picture 62" descr="A comparison of a number of objects&#10;&#10;Description automatically generated with medium confidence">
+            <a:extLst>
+              <a:ext uri="{FF2B5EF4-FFF2-40B4-BE49-F238E27FC236}">
+                <a16:creationId xmlns:a16="http://schemas.microsoft.com/office/drawing/2014/main" id="{5A1BFFD5-FFA3-1934-DC4A-4FB8DB4749DC}"/>
+              </a:ext>
+            </a:extLst>
+          </p:cNvPr>
+          <p:cNvPicPr>
+            <a:picLocks noChangeAspect="1"/>
+          </p:cNvPicPr>
+          <p:nvPr/>
+        </p:nvPicPr>
+        <p:blipFill rotWithShape="1">
+          <a:blip r:embed="rId2"/>
+          <a:srcRect l="53972"/>
+          <a:stretch/>
+        </p:blipFill>
+        <p:spPr>
+          <a:xfrm>
+            <a:off x="5443369" y="9905654"/>
+            <a:ext cx="3621350" cy="3810346"/>
+          </a:xfrm>
+          <a:prstGeom prst="rect">
+            <a:avLst/>
+          </a:prstGeom>
+        </p:spPr>
+      </p:pic>
+      <p:pic>
+        <p:nvPicPr>
+          <p:cNvPr id="62" name="Picture 61" descr="A comparison of a number of objects&#10;&#10;Description automatically generated with medium confidence">
+            <a:extLst>
+              <a:ext uri="{FF2B5EF4-FFF2-40B4-BE49-F238E27FC236}">
+                <a16:creationId xmlns:a16="http://schemas.microsoft.com/office/drawing/2014/main" id="{5F3B0331-B4AC-A356-07DA-E370DC138332}"/>
+              </a:ext>
+            </a:extLst>
+          </p:cNvPr>
+          <p:cNvPicPr>
+            <a:picLocks noChangeAspect="1"/>
+          </p:cNvPicPr>
+          <p:nvPr/>
+        </p:nvPicPr>
+        <p:blipFill rotWithShape="1">
+          <a:blip r:embed="rId2"/>
+          <a:srcRect r="50928"/>
+          <a:stretch/>
+        </p:blipFill>
+        <p:spPr>
+          <a:xfrm>
+            <a:off x="1593300" y="9905654"/>
+            <a:ext cx="3860827" cy="3810346"/>
+          </a:xfrm>
+          <a:prstGeom prst="rect">
+            <a:avLst/>
+          </a:prstGeom>
+        </p:spPr>
+      </p:pic>
+      <p:grpSp>
+        <p:nvGrpSpPr>
+          <p:cNvPr id="4" name="Group 3">
+            <a:extLst>
+              <a:ext uri="{FF2B5EF4-FFF2-40B4-BE49-F238E27FC236}">
+                <a16:creationId xmlns:a16="http://schemas.microsoft.com/office/drawing/2014/main" id="{5A977331-3A10-2AA2-4159-A41771328D12}"/>
+              </a:ext>
+            </a:extLst>
+          </p:cNvPr>
+          <p:cNvGrpSpPr/>
+          <p:nvPr/>
+        </p:nvGrpSpPr>
+        <p:grpSpPr>
+          <a:xfrm>
+            <a:off x="1532186" y="5608977"/>
+            <a:ext cx="7973267" cy="3942721"/>
+            <a:chOff x="9605032" y="8887755"/>
+            <a:chExt cx="7973267" cy="3942721"/>
+          </a:xfrm>
+        </p:grpSpPr>
+        <p:pic>
+          <p:nvPicPr>
+            <p:cNvPr id="5" name="Picture 4" descr="A comparison of a number of numbers&#10;&#10;Description automatically generated with medium confidence">
+              <a:extLst>
+                <a:ext uri="{FF2B5EF4-FFF2-40B4-BE49-F238E27FC236}">
+                  <a16:creationId xmlns:a16="http://schemas.microsoft.com/office/drawing/2014/main" id="{D66EF849-EEA1-95C3-43D5-8A8403E45E43}"/>
+                </a:ext>
+              </a:extLst>
+            </p:cNvPr>
+            <p:cNvPicPr>
+              <a:picLocks noChangeAspect="1"/>
+            </p:cNvPicPr>
+            <p:nvPr/>
+          </p:nvPicPr>
+          <p:blipFill rotWithShape="1">
+            <a:blip r:embed="rId3"/>
+            <a:srcRect r="50802"/>
+            <a:stretch/>
+          </p:blipFill>
+          <p:spPr>
+            <a:xfrm>
+              <a:off x="9605032" y="8887755"/>
+              <a:ext cx="4124031" cy="3942721"/>
+            </a:xfrm>
+            <a:prstGeom prst="rect">
+              <a:avLst/>
+            </a:prstGeom>
+          </p:spPr>
+        </p:pic>
+        <p:pic>
+          <p:nvPicPr>
+            <p:cNvPr id="6" name="Picture 5" descr="A comparison of a number of numbers&#10;&#10;Description automatically generated with medium confidence">
+              <a:extLst>
+                <a:ext uri="{FF2B5EF4-FFF2-40B4-BE49-F238E27FC236}">
+                  <a16:creationId xmlns:a16="http://schemas.microsoft.com/office/drawing/2014/main" id="{090CD19D-8A6D-BAC7-8064-B5ECD60EE85D}"/>
+                </a:ext>
+              </a:extLst>
+            </p:cNvPr>
+            <p:cNvPicPr>
+              <a:picLocks noChangeAspect="1"/>
+            </p:cNvPicPr>
+            <p:nvPr/>
+          </p:nvPicPr>
+          <p:blipFill rotWithShape="1">
+            <a:blip r:embed="rId3"/>
+            <a:srcRect l="53769"/>
+            <a:stretch/>
+          </p:blipFill>
+          <p:spPr>
+            <a:xfrm>
+              <a:off x="13702939" y="8887755"/>
+              <a:ext cx="3875360" cy="3942721"/>
+            </a:xfrm>
+            <a:prstGeom prst="rect">
+              <a:avLst/>
+            </a:prstGeom>
+          </p:spPr>
+        </p:pic>
+      </p:grpSp>
+      <p:sp>
+        <p:nvSpPr>
+          <p:cNvPr id="7" name="TextBox 6">
+            <a:extLst>
+              <a:ext uri="{FF2B5EF4-FFF2-40B4-BE49-F238E27FC236}">
+                <a16:creationId xmlns:a16="http://schemas.microsoft.com/office/drawing/2014/main" id="{C5DCB04A-1679-181A-C48A-5C8976A33C98}"/>
+              </a:ext>
+            </a:extLst>
+          </p:cNvPr>
+          <p:cNvSpPr txBox="1"/>
+          <p:nvPr/>
+        </p:nvSpPr>
+        <p:spPr>
+          <a:xfrm>
+            <a:off x="1982898" y="5587496"/>
+            <a:ext cx="569481" cy="338554"/>
+          </a:xfrm>
+          <a:prstGeom prst="rect">
+            <a:avLst/>
+          </a:prstGeom>
+          <a:noFill/>
+        </p:spPr>
+        <p:txBody>
+          <a:bodyPr wrap="square" rtlCol="0">
+            <a:spAutoFit/>
+          </a:bodyPr>
+          <a:lstStyle/>
+          <a:p>
+            <a:pPr algn="ctr"/>
+            <a:r>
+              <a:rPr lang="en-US" sz="1600" dirty="0">
+                <a:solidFill>
+                  <a:schemeClr val="bg2">
+                    <a:lumMod val="75000"/>
+                  </a:schemeClr>
+                </a:solidFill>
+                <a:latin typeface="Arial" panose="020B0604020202020204" pitchFamily="34" charset="0"/>
+                <a:cs typeface="Arial" panose="020B0604020202020204" pitchFamily="34" charset="0"/>
+              </a:rPr>
+              <a:t>a)</a:t>
+            </a:r>
+          </a:p>
+        </p:txBody>
+      </p:sp>
+      <p:sp>
+        <p:nvSpPr>
+          <p:cNvPr id="8" name="TextBox 7">
+            <a:extLst>
+              <a:ext uri="{FF2B5EF4-FFF2-40B4-BE49-F238E27FC236}">
+                <a16:creationId xmlns:a16="http://schemas.microsoft.com/office/drawing/2014/main" id="{DAFA91EC-2692-A102-B567-CA96379F9A10}"/>
+              </a:ext>
+            </a:extLst>
+          </p:cNvPr>
+          <p:cNvSpPr txBox="1"/>
+          <p:nvPr/>
+        </p:nvSpPr>
+        <p:spPr>
+          <a:xfrm>
+            <a:off x="5772261" y="5589557"/>
+            <a:ext cx="569481" cy="338554"/>
+          </a:xfrm>
+          <a:prstGeom prst="rect">
+            <a:avLst/>
+          </a:prstGeom>
+          <a:noFill/>
+        </p:spPr>
+        <p:txBody>
+          <a:bodyPr wrap="square" rtlCol="0">
+            <a:spAutoFit/>
+          </a:bodyPr>
+          <a:lstStyle/>
+          <a:p>
+            <a:pPr algn="ctr"/>
+            <a:r>
+              <a:rPr lang="en-US" sz="1600" dirty="0">
+                <a:solidFill>
+                  <a:schemeClr val="bg2">
+                    <a:lumMod val="75000"/>
+                  </a:schemeClr>
+                </a:solidFill>
+                <a:latin typeface="Arial" panose="020B0604020202020204" pitchFamily="34" charset="0"/>
+                <a:cs typeface="Arial" panose="020B0604020202020204" pitchFamily="34" charset="0"/>
+              </a:rPr>
+              <a:t>b)</a:t>
+            </a:r>
+          </a:p>
+        </p:txBody>
+      </p:sp>
+      <p:sp>
+        <p:nvSpPr>
+          <p:cNvPr id="27" name="TextBox 26">
+            <a:extLst>
+              <a:ext uri="{FF2B5EF4-FFF2-40B4-BE49-F238E27FC236}">
+                <a16:creationId xmlns:a16="http://schemas.microsoft.com/office/drawing/2014/main" id="{6ABD2FF3-C6BB-E532-BED6-20A96FDB6371}"/>
+              </a:ext>
+            </a:extLst>
+          </p:cNvPr>
+          <p:cNvSpPr txBox="1"/>
+          <p:nvPr/>
+        </p:nvSpPr>
+        <p:spPr>
+          <a:xfrm>
+            <a:off x="1491729" y="6288152"/>
+            <a:ext cx="2032232" cy="323165"/>
+          </a:xfrm>
+          <a:prstGeom prst="rect">
+            <a:avLst/>
+          </a:prstGeom>
+          <a:noFill/>
+        </p:spPr>
+        <p:txBody>
+          <a:bodyPr wrap="square" rtlCol="0">
+            <a:spAutoFit/>
+          </a:bodyPr>
+          <a:lstStyle/>
+          <a:p>
+            <a:pPr algn="ctr"/>
+            <a:r>
+              <a:rPr lang="en-US" sz="1500" i="1" dirty="0">
+                <a:solidFill>
+                  <a:schemeClr val="bg2">
+                    <a:lumMod val="75000"/>
+                  </a:schemeClr>
+                </a:solidFill>
+                <a:latin typeface="Arial" panose="020B0604020202020204" pitchFamily="34" charset="0"/>
+                <a:cs typeface="Arial" panose="020B0604020202020204" pitchFamily="34" charset="0"/>
+              </a:rPr>
+              <a:t>1:1</a:t>
+            </a:r>
+          </a:p>
+        </p:txBody>
+      </p:sp>
+      <p:sp>
+        <p:nvSpPr>
+          <p:cNvPr id="28" name="TextBox 27">
+            <a:extLst>
+              <a:ext uri="{FF2B5EF4-FFF2-40B4-BE49-F238E27FC236}">
+                <a16:creationId xmlns:a16="http://schemas.microsoft.com/office/drawing/2014/main" id="{BDDB2A1A-B631-E8BE-93BD-E0B5FE6E52BD}"/>
+              </a:ext>
+            </a:extLst>
+          </p:cNvPr>
+          <p:cNvSpPr txBox="1"/>
+          <p:nvPr/>
+        </p:nvSpPr>
+        <p:spPr>
+          <a:xfrm>
+            <a:off x="6830083" y="7185135"/>
+            <a:ext cx="2032232" cy="323165"/>
+          </a:xfrm>
+          <a:prstGeom prst="rect">
+            <a:avLst/>
+          </a:prstGeom>
+          <a:noFill/>
+        </p:spPr>
+        <p:txBody>
+          <a:bodyPr wrap="square" rtlCol="0">
+            <a:spAutoFit/>
+          </a:bodyPr>
+          <a:lstStyle/>
+          <a:p>
+            <a:pPr algn="ctr"/>
+            <a:r>
+              <a:rPr lang="en-US" sz="1500" i="1" dirty="0">
+                <a:solidFill>
+                  <a:schemeClr val="bg2">
+                    <a:lumMod val="75000"/>
+                  </a:schemeClr>
+                </a:solidFill>
+                <a:latin typeface="Arial" panose="020B0604020202020204" pitchFamily="34" charset="0"/>
+                <a:cs typeface="Arial" panose="020B0604020202020204" pitchFamily="34" charset="0"/>
+              </a:rPr>
+              <a:t>1:1</a:t>
+            </a:r>
+          </a:p>
+        </p:txBody>
+      </p:sp>
+      <p:grpSp>
+        <p:nvGrpSpPr>
+          <p:cNvPr id="38" name="Group 37">
+            <a:extLst>
+              <a:ext uri="{FF2B5EF4-FFF2-40B4-BE49-F238E27FC236}">
+                <a16:creationId xmlns:a16="http://schemas.microsoft.com/office/drawing/2014/main" id="{C8B0B9F7-3836-9606-EDEA-7A85282427A6}"/>
+              </a:ext>
+            </a:extLst>
+          </p:cNvPr>
+          <p:cNvGrpSpPr/>
+          <p:nvPr/>
+        </p:nvGrpSpPr>
+        <p:grpSpPr>
+          <a:xfrm>
+            <a:off x="9440113" y="6095999"/>
+            <a:ext cx="1491510" cy="2329544"/>
+            <a:chOff x="9440113" y="6095999"/>
+            <a:chExt cx="1491510" cy="2329544"/>
+          </a:xfrm>
+        </p:grpSpPr>
+        <p:pic>
+          <p:nvPicPr>
+            <p:cNvPr id="34" name="Picture 33" descr="A graph of a speed limit&#10;&#10;Description automatically generated">
+              <a:extLst>
+                <a:ext uri="{FF2B5EF4-FFF2-40B4-BE49-F238E27FC236}">
+                  <a16:creationId xmlns:a16="http://schemas.microsoft.com/office/drawing/2014/main" id="{70F231E0-1B11-9F23-802C-3CB67D99E9E4}"/>
+                </a:ext>
+              </a:extLst>
+            </p:cNvPr>
+            <p:cNvPicPr>
+              <a:picLocks noChangeAspect="1"/>
+            </p:cNvPicPr>
+            <p:nvPr/>
+          </p:nvPicPr>
+          <p:blipFill rotWithShape="1">
+            <a:blip r:embed="rId4"/>
+            <a:srcRect t="53824" b="14354"/>
+            <a:stretch/>
+          </p:blipFill>
+          <p:spPr>
+            <a:xfrm>
+              <a:off x="9679599" y="6831874"/>
+              <a:ext cx="1252024" cy="1593669"/>
+            </a:xfrm>
+            <a:prstGeom prst="rect">
+              <a:avLst/>
+            </a:prstGeom>
+          </p:spPr>
+        </p:pic>
+        <p:grpSp>
+          <p:nvGrpSpPr>
+            <p:cNvPr id="37" name="Group 36">
+              <a:extLst>
+                <a:ext uri="{FF2B5EF4-FFF2-40B4-BE49-F238E27FC236}">
+                  <a16:creationId xmlns:a16="http://schemas.microsoft.com/office/drawing/2014/main" id="{C14F6EAF-4C7F-0DC9-73AF-1AA925F15BBF}"/>
+                </a:ext>
+              </a:extLst>
+            </p:cNvPr>
+            <p:cNvGrpSpPr/>
+            <p:nvPr/>
+          </p:nvGrpSpPr>
+          <p:grpSpPr>
+            <a:xfrm>
+              <a:off x="9440113" y="6095999"/>
+              <a:ext cx="1339109" cy="683623"/>
+              <a:chOff x="9440113" y="6095999"/>
+              <a:chExt cx="1339109" cy="683623"/>
+            </a:xfrm>
+          </p:grpSpPr>
+          <p:pic>
+            <p:nvPicPr>
+              <p:cNvPr id="35" name="Picture 34" descr="A graph of a speed limit&#10;&#10;Description automatically generated">
+                <a:extLst>
+                  <a:ext uri="{FF2B5EF4-FFF2-40B4-BE49-F238E27FC236}">
+                    <a16:creationId xmlns:a16="http://schemas.microsoft.com/office/drawing/2014/main" id="{79801BCA-5B9B-66E9-6334-16FE4AE5B98F}"/>
+                  </a:ext>
+                </a:extLst>
+              </p:cNvPr>
+              <p:cNvPicPr>
+                <a:picLocks noChangeAspect="1"/>
+              </p:cNvPicPr>
+              <p:nvPr/>
+            </p:nvPicPr>
+            <p:blipFill rotWithShape="1">
+              <a:blip r:embed="rId4"/>
+              <a:srcRect t="39218" b="47132"/>
+              <a:stretch/>
+            </p:blipFill>
+            <p:spPr>
+              <a:xfrm>
+                <a:off x="9440113" y="6095999"/>
+                <a:ext cx="1252024" cy="683623"/>
+              </a:xfrm>
+              <a:prstGeom prst="rect">
+                <a:avLst/>
+              </a:prstGeom>
+            </p:spPr>
+          </p:pic>
+          <p:pic>
+            <p:nvPicPr>
+              <p:cNvPr id="36" name="Picture 35" descr="A graph of a speed limit&#10;&#10;Description automatically generated">
+                <a:extLst>
+                  <a:ext uri="{FF2B5EF4-FFF2-40B4-BE49-F238E27FC236}">
+                    <a16:creationId xmlns:a16="http://schemas.microsoft.com/office/drawing/2014/main" id="{882A5B41-C2FB-360A-47DF-59250925F092}"/>
+                  </a:ext>
+                </a:extLst>
+              </p:cNvPr>
+              <p:cNvPicPr>
+                <a:picLocks noChangeAspect="1"/>
+              </p:cNvPicPr>
+              <p:nvPr/>
+            </p:nvPicPr>
+            <p:blipFill rotWithShape="1">
+              <a:blip r:embed="rId4"/>
+              <a:srcRect t="44870" b="50957"/>
+              <a:stretch/>
+            </p:blipFill>
+            <p:spPr>
+              <a:xfrm>
+                <a:off x="9527198" y="6374673"/>
+                <a:ext cx="1252024" cy="209005"/>
+              </a:xfrm>
+              <a:prstGeom prst="rect">
+                <a:avLst/>
+              </a:prstGeom>
+            </p:spPr>
+          </p:pic>
+        </p:grpSp>
+      </p:grpSp>
+      <p:grpSp>
+        <p:nvGrpSpPr>
+          <p:cNvPr id="39" name="Group 38">
+            <a:extLst>
+              <a:ext uri="{FF2B5EF4-FFF2-40B4-BE49-F238E27FC236}">
+                <a16:creationId xmlns:a16="http://schemas.microsoft.com/office/drawing/2014/main" id="{DBFA5765-5379-C65F-1ADE-7CA7118C7A72}"/>
+              </a:ext>
+            </a:extLst>
+          </p:cNvPr>
+          <p:cNvGrpSpPr/>
+          <p:nvPr/>
+        </p:nvGrpSpPr>
+        <p:grpSpPr>
+          <a:xfrm>
+            <a:off x="10325935" y="7032127"/>
+            <a:ext cx="3394419" cy="896594"/>
+            <a:chOff x="8524560" y="7105104"/>
+            <a:chExt cx="2682403" cy="760350"/>
+          </a:xfrm>
+        </p:grpSpPr>
+        <p:sp>
+          <p:nvSpPr>
+            <p:cNvPr id="40" name="Oval 39">
+              <a:extLst>
+                <a:ext uri="{FF2B5EF4-FFF2-40B4-BE49-F238E27FC236}">
+                  <a16:creationId xmlns:a16="http://schemas.microsoft.com/office/drawing/2014/main" id="{84E38108-195F-3969-7BD2-B2A38B7FCCB0}"/>
+                </a:ext>
+              </a:extLst>
+            </p:cNvPr>
+            <p:cNvSpPr/>
+            <p:nvPr/>
+          </p:nvSpPr>
+          <p:spPr>
+            <a:xfrm>
+              <a:off x="8524560" y="7462734"/>
+              <a:ext cx="2682403" cy="355600"/>
+            </a:xfrm>
+            <a:prstGeom prst="ellipse">
+              <a:avLst/>
+            </a:prstGeom>
+            <a:noFill/>
+            <a:ln>
+              <a:noFill/>
+            </a:ln>
+          </p:spPr>
+          <p:style>
+            <a:lnRef idx="2">
+              <a:schemeClr val="accent1">
+                <a:shade val="50000"/>
+              </a:schemeClr>
+            </a:lnRef>
+            <a:fillRef idx="1">
+              <a:schemeClr val="accent1"/>
+            </a:fillRef>
+            <a:effectRef idx="0">
+              <a:schemeClr val="accent1"/>
+            </a:effectRef>
+            <a:fontRef idx="minor">
+              <a:schemeClr val="lt1"/>
+            </a:fontRef>
+          </p:style>
+          <p:txBody>
+            <a:bodyPr rtlCol="0" anchor="ctr"/>
+            <a:lstStyle/>
+            <a:p>
+              <a:pPr algn="ctr"/>
+              <a:r>
+                <a:rPr lang="en-US" sz="1500" dirty="0">
+                  <a:solidFill>
+                    <a:sysClr val="windowText" lastClr="000000"/>
+                  </a:solidFill>
+                  <a:latin typeface="Arial" panose="020B0604020202020204" pitchFamily="34" charset="0"/>
+                  <a:cs typeface="Arial" panose="020B0604020202020204" pitchFamily="34" charset="0"/>
+                </a:rPr>
+                <a:t>Dispersal rate &lt; velocity of isotherm shift</a:t>
+              </a:r>
+            </a:p>
+            <a:p>
+              <a:pPr algn="ctr"/>
+              <a:endParaRPr lang="en-US" sz="1500" dirty="0">
+                <a:solidFill>
+                  <a:sysClr val="windowText" lastClr="000000"/>
+                </a:solidFill>
+                <a:latin typeface="Arial" panose="020B0604020202020204" pitchFamily="34" charset="0"/>
+                <a:cs typeface="Arial" panose="020B0604020202020204" pitchFamily="34" charset="0"/>
+              </a:endParaRPr>
+            </a:p>
+            <a:p>
+              <a:pPr algn="ctr"/>
+              <a:r>
+                <a:rPr lang="en-US" sz="1500" dirty="0">
+                  <a:solidFill>
+                    <a:sysClr val="windowText" lastClr="000000"/>
+                  </a:solidFill>
+                  <a:latin typeface="Arial" panose="020B0604020202020204" pitchFamily="34" charset="0"/>
+                  <a:cs typeface="Arial" panose="020B0604020202020204" pitchFamily="34" charset="0"/>
+                </a:rPr>
+                <a:t>Dispersal rate &gt; velocity of isotherm shift</a:t>
+              </a:r>
+            </a:p>
+            <a:p>
+              <a:pPr algn="ctr"/>
+              <a:endParaRPr lang="en-US" sz="1500" dirty="0">
+                <a:solidFill>
+                  <a:sysClr val="windowText" lastClr="000000"/>
+                </a:solidFill>
+                <a:latin typeface="Arial" panose="020B0604020202020204" pitchFamily="34" charset="0"/>
+                <a:cs typeface="Arial" panose="020B0604020202020204" pitchFamily="34" charset="0"/>
+              </a:endParaRPr>
+            </a:p>
+          </p:txBody>
+        </p:sp>
+        <p:sp>
+          <p:nvSpPr>
+            <p:cNvPr id="41" name="Oval 40">
+              <a:extLst>
+                <a:ext uri="{FF2B5EF4-FFF2-40B4-BE49-F238E27FC236}">
+                  <a16:creationId xmlns:a16="http://schemas.microsoft.com/office/drawing/2014/main" id="{EF1D8C11-FFF0-DAFE-A764-4D905687D305}"/>
+                </a:ext>
+              </a:extLst>
+            </p:cNvPr>
+            <p:cNvSpPr/>
+            <p:nvPr/>
+          </p:nvSpPr>
+          <p:spPr>
+            <a:xfrm>
+              <a:off x="8812638" y="7105104"/>
+              <a:ext cx="141515" cy="130629"/>
+            </a:xfrm>
+            <a:prstGeom prst="ellipse">
+              <a:avLst/>
+            </a:prstGeom>
+            <a:solidFill>
+              <a:schemeClr val="bg2"/>
+            </a:solidFill>
+            <a:ln w="19050">
+              <a:solidFill>
+                <a:schemeClr val="tx1"/>
+              </a:solidFill>
+            </a:ln>
+          </p:spPr>
+          <p:style>
+            <a:lnRef idx="2">
+              <a:schemeClr val="accent1">
+                <a:shade val="50000"/>
+              </a:schemeClr>
+            </a:lnRef>
+            <a:fillRef idx="1">
+              <a:schemeClr val="accent1"/>
+            </a:fillRef>
+            <a:effectRef idx="0">
+              <a:schemeClr val="accent1"/>
+            </a:effectRef>
+            <a:fontRef idx="minor">
+              <a:schemeClr val="lt1"/>
+            </a:fontRef>
+          </p:style>
+          <p:txBody>
+            <a:bodyPr rtlCol="0" anchor="ctr"/>
+            <a:lstStyle/>
+            <a:p>
+              <a:pPr algn="ctr"/>
+              <a:endParaRPr lang="en-US" sz="1500">
+                <a:solidFill>
+                  <a:schemeClr val="accent2">
+                    <a:lumMod val="50000"/>
+                  </a:schemeClr>
+                </a:solidFill>
+                <a:latin typeface="Arial" panose="020B0604020202020204" pitchFamily="34" charset="0"/>
+                <a:cs typeface="Arial" panose="020B0604020202020204" pitchFamily="34" charset="0"/>
+              </a:endParaRPr>
+            </a:p>
+          </p:txBody>
+        </p:sp>
+        <p:sp>
+          <p:nvSpPr>
+            <p:cNvPr id="42" name="Oval 41">
+              <a:extLst>
+                <a:ext uri="{FF2B5EF4-FFF2-40B4-BE49-F238E27FC236}">
+                  <a16:creationId xmlns:a16="http://schemas.microsoft.com/office/drawing/2014/main" id="{C34A499D-0A55-36AD-5AC1-DC726DC315A8}"/>
+                </a:ext>
+              </a:extLst>
+            </p:cNvPr>
+            <p:cNvSpPr/>
+            <p:nvPr/>
+          </p:nvSpPr>
+          <p:spPr>
+            <a:xfrm>
+              <a:off x="8812638" y="7734825"/>
+              <a:ext cx="141515" cy="130629"/>
+            </a:xfrm>
+            <a:prstGeom prst="ellipse">
+              <a:avLst/>
+            </a:prstGeom>
+            <a:solidFill>
+              <a:schemeClr val="bg2"/>
+            </a:solidFill>
+            <a:ln>
+              <a:solidFill>
+                <a:schemeClr val="bg2"/>
+              </a:solidFill>
+            </a:ln>
+          </p:spPr>
+          <p:style>
+            <a:lnRef idx="2">
+              <a:schemeClr val="accent1">
+                <a:shade val="50000"/>
+              </a:schemeClr>
+            </a:lnRef>
+            <a:fillRef idx="1">
+              <a:schemeClr val="accent1"/>
+            </a:fillRef>
+            <a:effectRef idx="0">
+              <a:schemeClr val="accent1"/>
+            </a:effectRef>
+            <a:fontRef idx="minor">
+              <a:schemeClr val="lt1"/>
+            </a:fontRef>
+          </p:style>
+          <p:txBody>
+            <a:bodyPr rtlCol="0" anchor="ctr"/>
+            <a:lstStyle/>
+            <a:p>
+              <a:pPr algn="ctr"/>
+              <a:endParaRPr lang="en-US" sz="1500" dirty="0">
+                <a:solidFill>
+                  <a:schemeClr val="accent2">
+                    <a:lumMod val="50000"/>
+                  </a:schemeClr>
+                </a:solidFill>
+                <a:latin typeface="Arial" panose="020B0604020202020204" pitchFamily="34" charset="0"/>
+                <a:cs typeface="Arial" panose="020B0604020202020204" pitchFamily="34" charset="0"/>
+              </a:endParaRPr>
+            </a:p>
+          </p:txBody>
+        </p:sp>
+      </p:grpSp>
+      <p:sp>
+        <p:nvSpPr>
+          <p:cNvPr id="44" name="TextBox 43">
+            <a:extLst>
+              <a:ext uri="{FF2B5EF4-FFF2-40B4-BE49-F238E27FC236}">
+                <a16:creationId xmlns:a16="http://schemas.microsoft.com/office/drawing/2014/main" id="{6C85EF0D-91E4-F66F-44A9-FB56D4B42C90}"/>
+              </a:ext>
+            </a:extLst>
+          </p:cNvPr>
+          <p:cNvSpPr txBox="1"/>
+          <p:nvPr/>
+        </p:nvSpPr>
+        <p:spPr>
+          <a:xfrm>
+            <a:off x="5598603" y="10142347"/>
+            <a:ext cx="569481" cy="338554"/>
+          </a:xfrm>
+          <a:prstGeom prst="rect">
+            <a:avLst/>
+          </a:prstGeom>
+          <a:noFill/>
+        </p:spPr>
+        <p:txBody>
+          <a:bodyPr wrap="square" rtlCol="0">
+            <a:spAutoFit/>
+          </a:bodyPr>
+          <a:lstStyle/>
+          <a:p>
+            <a:pPr algn="ctr"/>
+            <a:r>
+              <a:rPr lang="en-US" sz="1600" dirty="0">
+                <a:solidFill>
+                  <a:schemeClr val="bg2">
+                    <a:lumMod val="75000"/>
+                  </a:schemeClr>
+                </a:solidFill>
+                <a:latin typeface="Arial" panose="020B0604020202020204" pitchFamily="34" charset="0"/>
+                <a:cs typeface="Arial" panose="020B0604020202020204" pitchFamily="34" charset="0"/>
+              </a:rPr>
+              <a:t>b)</a:t>
+            </a:r>
+          </a:p>
+        </p:txBody>
+      </p:sp>
+      <p:sp>
+        <p:nvSpPr>
+          <p:cNvPr id="45" name="TextBox 44">
+            <a:extLst>
+              <a:ext uri="{FF2B5EF4-FFF2-40B4-BE49-F238E27FC236}">
+                <a16:creationId xmlns:a16="http://schemas.microsoft.com/office/drawing/2014/main" id="{46117A35-79FA-97BD-DFC8-B3D9C0FCF0CB}"/>
+              </a:ext>
+            </a:extLst>
+          </p:cNvPr>
+          <p:cNvSpPr txBox="1"/>
+          <p:nvPr/>
+        </p:nvSpPr>
+        <p:spPr>
+          <a:xfrm>
+            <a:off x="3680142" y="11690796"/>
+            <a:ext cx="2032232" cy="323165"/>
+          </a:xfrm>
+          <a:prstGeom prst="rect">
+            <a:avLst/>
+          </a:prstGeom>
+          <a:noFill/>
+        </p:spPr>
+        <p:txBody>
+          <a:bodyPr wrap="square" rtlCol="0">
+            <a:spAutoFit/>
+          </a:bodyPr>
+          <a:lstStyle/>
+          <a:p>
+            <a:pPr algn="ctr"/>
+            <a:r>
+              <a:rPr lang="en-US" sz="1500" i="1" dirty="0">
+                <a:solidFill>
+                  <a:schemeClr val="bg2">
+                    <a:lumMod val="75000"/>
+                  </a:schemeClr>
+                </a:solidFill>
+                <a:latin typeface="Arial" panose="020B0604020202020204" pitchFamily="34" charset="0"/>
+                <a:cs typeface="Arial" panose="020B0604020202020204" pitchFamily="34" charset="0"/>
+              </a:rPr>
+              <a:t>1:1</a:t>
+            </a:r>
+          </a:p>
+        </p:txBody>
+      </p:sp>
+      <p:sp>
+        <p:nvSpPr>
+          <p:cNvPr id="46" name="TextBox 45">
+            <a:extLst>
+              <a:ext uri="{FF2B5EF4-FFF2-40B4-BE49-F238E27FC236}">
+                <a16:creationId xmlns:a16="http://schemas.microsoft.com/office/drawing/2014/main" id="{A74F646B-4A7A-FA9E-BDE7-531CCBB0639D}"/>
+              </a:ext>
+            </a:extLst>
+          </p:cNvPr>
+          <p:cNvSpPr txBox="1"/>
+          <p:nvPr/>
+        </p:nvSpPr>
+        <p:spPr>
+          <a:xfrm>
+            <a:off x="7974248" y="12966197"/>
+            <a:ext cx="989437" cy="307777"/>
+          </a:xfrm>
+          <a:prstGeom prst="rect">
+            <a:avLst/>
+          </a:prstGeom>
+          <a:noFill/>
+        </p:spPr>
+        <p:txBody>
+          <a:bodyPr wrap="square" rtlCol="0">
+            <a:spAutoFit/>
+          </a:bodyPr>
+          <a:lstStyle/>
+          <a:p>
+            <a:pPr algn="ctr"/>
+            <a:r>
+              <a:rPr lang="en-US" sz="1400" dirty="0">
+                <a:solidFill>
+                  <a:schemeClr val="bg2">
+                    <a:lumMod val="75000"/>
+                  </a:schemeClr>
+                </a:solidFill>
+                <a:latin typeface="Arial" panose="020B0604020202020204" pitchFamily="34" charset="0"/>
+                <a:cs typeface="Arial" panose="020B0604020202020204" pitchFamily="34" charset="0"/>
+              </a:rPr>
+              <a:t>n = 189</a:t>
+            </a:r>
+          </a:p>
+        </p:txBody>
+      </p:sp>
+      <p:sp>
+        <p:nvSpPr>
+          <p:cNvPr id="47" name="TextBox 46">
+            <a:extLst>
+              <a:ext uri="{FF2B5EF4-FFF2-40B4-BE49-F238E27FC236}">
+                <a16:creationId xmlns:a16="http://schemas.microsoft.com/office/drawing/2014/main" id="{B499E649-1029-DBEB-2BED-D897BC4DD20E}"/>
+              </a:ext>
+            </a:extLst>
+          </p:cNvPr>
+          <p:cNvSpPr txBox="1"/>
+          <p:nvPr/>
+        </p:nvSpPr>
+        <p:spPr>
+          <a:xfrm>
+            <a:off x="4424832" y="12968727"/>
+            <a:ext cx="989437" cy="307777"/>
+          </a:xfrm>
+          <a:prstGeom prst="rect">
+            <a:avLst/>
+          </a:prstGeom>
+          <a:noFill/>
+        </p:spPr>
+        <p:txBody>
+          <a:bodyPr wrap="square" rtlCol="0">
+            <a:spAutoFit/>
+          </a:bodyPr>
+          <a:lstStyle/>
+          <a:p>
+            <a:pPr algn="ctr"/>
+            <a:r>
+              <a:rPr lang="en-US" sz="1400" dirty="0">
+                <a:solidFill>
+                  <a:schemeClr val="bg2">
+                    <a:lumMod val="75000"/>
+                  </a:schemeClr>
+                </a:solidFill>
+                <a:latin typeface="Arial" panose="020B0604020202020204" pitchFamily="34" charset="0"/>
+                <a:cs typeface="Arial" panose="020B0604020202020204" pitchFamily="34" charset="0"/>
+              </a:rPr>
+              <a:t>n = 189</a:t>
+            </a:r>
+          </a:p>
+        </p:txBody>
+      </p:sp>
+      <p:sp>
+        <p:nvSpPr>
+          <p:cNvPr id="48" name="TextBox 47">
+            <a:extLst>
+              <a:ext uri="{FF2B5EF4-FFF2-40B4-BE49-F238E27FC236}">
+                <a16:creationId xmlns:a16="http://schemas.microsoft.com/office/drawing/2014/main" id="{672BF206-B97C-FC73-10B5-41A217B357C3}"/>
+              </a:ext>
+            </a:extLst>
+          </p:cNvPr>
+          <p:cNvSpPr txBox="1"/>
+          <p:nvPr/>
+        </p:nvSpPr>
+        <p:spPr>
+          <a:xfrm>
+            <a:off x="2058970" y="10131835"/>
+            <a:ext cx="569481" cy="338554"/>
+          </a:xfrm>
+          <a:prstGeom prst="rect">
+            <a:avLst/>
+          </a:prstGeom>
+          <a:noFill/>
+        </p:spPr>
+        <p:txBody>
+          <a:bodyPr wrap="square" rtlCol="0">
+            <a:spAutoFit/>
+          </a:bodyPr>
+          <a:lstStyle/>
+          <a:p>
+            <a:pPr algn="ctr"/>
+            <a:r>
+              <a:rPr lang="en-US" sz="1600" dirty="0">
+                <a:solidFill>
+                  <a:schemeClr val="bg2">
+                    <a:lumMod val="75000"/>
+                  </a:schemeClr>
+                </a:solidFill>
+                <a:latin typeface="Arial" panose="020B0604020202020204" pitchFamily="34" charset="0"/>
+                <a:cs typeface="Arial" panose="020B0604020202020204" pitchFamily="34" charset="0"/>
+              </a:rPr>
+              <a:t>a)</a:t>
+            </a:r>
+          </a:p>
+        </p:txBody>
+      </p:sp>
+      <p:grpSp>
+        <p:nvGrpSpPr>
+          <p:cNvPr id="49" name="Group 48">
+            <a:extLst>
+              <a:ext uri="{FF2B5EF4-FFF2-40B4-BE49-F238E27FC236}">
+                <a16:creationId xmlns:a16="http://schemas.microsoft.com/office/drawing/2014/main" id="{19F5A916-91E7-14CC-E288-C1F880241F46}"/>
+              </a:ext>
+            </a:extLst>
+          </p:cNvPr>
+          <p:cNvGrpSpPr/>
+          <p:nvPr/>
+        </p:nvGrpSpPr>
+        <p:grpSpPr>
+          <a:xfrm>
+            <a:off x="4000515" y="10481988"/>
+            <a:ext cx="251992" cy="251942"/>
+            <a:chOff x="4474118" y="766354"/>
+            <a:chExt cx="251992" cy="251942"/>
+          </a:xfrm>
+        </p:grpSpPr>
+        <p:sp>
+          <p:nvSpPr>
+            <p:cNvPr id="50" name="Rectangle 49">
+              <a:extLst>
+                <a:ext uri="{FF2B5EF4-FFF2-40B4-BE49-F238E27FC236}">
+                  <a16:creationId xmlns:a16="http://schemas.microsoft.com/office/drawing/2014/main" id="{68D143C4-45EF-90F2-DCFE-FAC3E9AED632}"/>
+                </a:ext>
+              </a:extLst>
+            </p:cNvPr>
+            <p:cNvSpPr/>
+            <p:nvPr/>
+          </p:nvSpPr>
+          <p:spPr>
+            <a:xfrm>
+              <a:off x="4558937" y="766354"/>
+              <a:ext cx="121920" cy="235132"/>
+            </a:xfrm>
+            <a:prstGeom prst="rect">
+              <a:avLst/>
+            </a:prstGeom>
+            <a:solidFill>
+              <a:schemeClr val="bg1"/>
+            </a:solidFill>
+            <a:ln>
+              <a:noFill/>
+            </a:ln>
+          </p:spPr>
+          <p:style>
+            <a:lnRef idx="2">
+              <a:schemeClr val="accent1">
+                <a:shade val="50000"/>
+              </a:schemeClr>
+            </a:lnRef>
+            <a:fillRef idx="1">
+              <a:schemeClr val="accent1"/>
+            </a:fillRef>
+            <a:effectRef idx="0">
+              <a:schemeClr val="accent1"/>
+            </a:effectRef>
+            <a:fontRef idx="minor">
+              <a:schemeClr val="lt1"/>
+            </a:fontRef>
+          </p:style>
+          <p:txBody>
+            <a:bodyPr rtlCol="0" anchor="ctr"/>
+            <a:lstStyle/>
+            <a:p>
+              <a:pPr algn="ctr"/>
+              <a:endParaRPr lang="en-US"/>
+            </a:p>
+          </p:txBody>
+        </p:sp>
+        <p:sp>
+          <p:nvSpPr>
+            <p:cNvPr id="51" name="TextBox 50">
+              <a:extLst>
+                <a:ext uri="{FF2B5EF4-FFF2-40B4-BE49-F238E27FC236}">
+                  <a16:creationId xmlns:a16="http://schemas.microsoft.com/office/drawing/2014/main" id="{5142AC8A-96E6-66FA-1E33-07EFC802AE5A}"/>
+                </a:ext>
+              </a:extLst>
+            </p:cNvPr>
+            <p:cNvSpPr txBox="1"/>
+            <p:nvPr/>
+          </p:nvSpPr>
+          <p:spPr>
+            <a:xfrm>
+              <a:off x="4474118" y="782334"/>
+              <a:ext cx="251992" cy="235962"/>
+            </a:xfrm>
+            <a:prstGeom prst="rect">
+              <a:avLst/>
+            </a:prstGeom>
+            <a:noFill/>
+          </p:spPr>
+          <p:txBody>
+            <a:bodyPr wrap="none" rtlCol="0">
+              <a:spAutoFit/>
+            </a:bodyPr>
+            <a:lstStyle/>
+            <a:p>
+              <a:r>
+                <a:rPr lang="en-US" sz="1400" baseline="30000" dirty="0">
+                  <a:highlight>
+                    <a:srgbClr val="FFFFFF"/>
+                  </a:highlight>
+                  <a:latin typeface="Arial" panose="020B0604020202020204" pitchFamily="34" charset="0"/>
+                  <a:cs typeface="Arial" panose="020B0604020202020204" pitchFamily="34" charset="0"/>
+                </a:rPr>
+                <a:t>2</a:t>
+              </a:r>
+            </a:p>
+          </p:txBody>
+        </p:sp>
+      </p:grpSp>
+      <p:grpSp>
+        <p:nvGrpSpPr>
+          <p:cNvPr id="52" name="Group 51">
+            <a:extLst>
+              <a:ext uri="{FF2B5EF4-FFF2-40B4-BE49-F238E27FC236}">
+                <a16:creationId xmlns:a16="http://schemas.microsoft.com/office/drawing/2014/main" id="{03A10A4B-F7CE-FD79-C19D-8533AF380C14}"/>
+              </a:ext>
+            </a:extLst>
+          </p:cNvPr>
+          <p:cNvGrpSpPr/>
+          <p:nvPr/>
+        </p:nvGrpSpPr>
+        <p:grpSpPr>
+          <a:xfrm>
+            <a:off x="7534192" y="10472253"/>
+            <a:ext cx="251992" cy="251942"/>
+            <a:chOff x="4474118" y="766354"/>
+            <a:chExt cx="251992" cy="251942"/>
+          </a:xfrm>
+        </p:grpSpPr>
+        <p:sp>
+          <p:nvSpPr>
+            <p:cNvPr id="53" name="Rectangle 52">
+              <a:extLst>
+                <a:ext uri="{FF2B5EF4-FFF2-40B4-BE49-F238E27FC236}">
+                  <a16:creationId xmlns:a16="http://schemas.microsoft.com/office/drawing/2014/main" id="{A0EDA8B7-22D3-4D87-453F-794B13814ACD}"/>
+                </a:ext>
+              </a:extLst>
+            </p:cNvPr>
+            <p:cNvSpPr/>
+            <p:nvPr/>
+          </p:nvSpPr>
+          <p:spPr>
+            <a:xfrm>
+              <a:off x="4558937" y="766354"/>
+              <a:ext cx="121920" cy="235132"/>
+            </a:xfrm>
+            <a:prstGeom prst="rect">
+              <a:avLst/>
+            </a:prstGeom>
+            <a:solidFill>
+              <a:schemeClr val="bg1"/>
+            </a:solidFill>
+            <a:ln>
+              <a:noFill/>
+            </a:ln>
+          </p:spPr>
+          <p:style>
+            <a:lnRef idx="2">
+              <a:schemeClr val="accent1">
+                <a:shade val="50000"/>
+              </a:schemeClr>
+            </a:lnRef>
+            <a:fillRef idx="1">
+              <a:schemeClr val="accent1"/>
+            </a:fillRef>
+            <a:effectRef idx="0">
+              <a:schemeClr val="accent1"/>
+            </a:effectRef>
+            <a:fontRef idx="minor">
+              <a:schemeClr val="lt1"/>
+            </a:fontRef>
+          </p:style>
+          <p:txBody>
+            <a:bodyPr rtlCol="0" anchor="ctr"/>
+            <a:lstStyle/>
+            <a:p>
+              <a:pPr algn="ctr"/>
+              <a:endParaRPr lang="en-US"/>
+            </a:p>
+          </p:txBody>
+        </p:sp>
+        <p:sp>
+          <p:nvSpPr>
+            <p:cNvPr id="54" name="TextBox 53">
+              <a:extLst>
+                <a:ext uri="{FF2B5EF4-FFF2-40B4-BE49-F238E27FC236}">
+                  <a16:creationId xmlns:a16="http://schemas.microsoft.com/office/drawing/2014/main" id="{819BF3D3-3654-CBF7-2F6C-A6F6A2216E79}"/>
+                </a:ext>
+              </a:extLst>
+            </p:cNvPr>
+            <p:cNvSpPr txBox="1"/>
+            <p:nvPr/>
+          </p:nvSpPr>
+          <p:spPr>
+            <a:xfrm>
+              <a:off x="4474118" y="782334"/>
+              <a:ext cx="251992" cy="235962"/>
+            </a:xfrm>
+            <a:prstGeom prst="rect">
+              <a:avLst/>
+            </a:prstGeom>
+            <a:noFill/>
+          </p:spPr>
+          <p:txBody>
+            <a:bodyPr wrap="none" rtlCol="0">
+              <a:spAutoFit/>
+            </a:bodyPr>
+            <a:lstStyle/>
+            <a:p>
+              <a:r>
+                <a:rPr lang="en-US" sz="1400" baseline="30000" dirty="0">
+                  <a:highlight>
+                    <a:srgbClr val="FFFFFF"/>
+                  </a:highlight>
+                  <a:latin typeface="Arial" panose="020B0604020202020204" pitchFamily="34" charset="0"/>
+                  <a:cs typeface="Arial" panose="020B0604020202020204" pitchFamily="34" charset="0"/>
+                </a:rPr>
+                <a:t>2</a:t>
+              </a:r>
+            </a:p>
+          </p:txBody>
+        </p:sp>
+      </p:grpSp>
+      <p:pic>
+        <p:nvPicPr>
+          <p:cNvPr id="55" name="Picture 54" descr="A graph of a speed limit&#10;&#10;Description automatically generated with medium confidence">
+            <a:extLst>
+              <a:ext uri="{FF2B5EF4-FFF2-40B4-BE49-F238E27FC236}">
+                <a16:creationId xmlns:a16="http://schemas.microsoft.com/office/drawing/2014/main" id="{6342B4BB-991E-657C-AD57-84E173C767A1}"/>
+              </a:ext>
+            </a:extLst>
+          </p:cNvPr>
+          <p:cNvPicPr>
+            <a:picLocks noChangeAspect="1"/>
+          </p:cNvPicPr>
+          <p:nvPr/>
+        </p:nvPicPr>
+        <p:blipFill rotWithShape="1">
+          <a:blip r:embed="rId5"/>
+          <a:srcRect t="52768" r="9760"/>
+          <a:stretch/>
+        </p:blipFill>
+        <p:spPr>
+          <a:xfrm>
+            <a:off x="9167866" y="11241742"/>
+            <a:ext cx="1091342" cy="2284826"/>
+          </a:xfrm>
+          <a:prstGeom prst="rect">
+            <a:avLst/>
+          </a:prstGeom>
+        </p:spPr>
+      </p:pic>
+      <p:sp>
+        <p:nvSpPr>
+          <p:cNvPr id="64" name="TextBox 63">
+            <a:extLst>
+              <a:ext uri="{FF2B5EF4-FFF2-40B4-BE49-F238E27FC236}">
+                <a16:creationId xmlns:a16="http://schemas.microsoft.com/office/drawing/2014/main" id="{3281B7CB-EF65-171B-811C-FF87BDC4ED6B}"/>
+              </a:ext>
+            </a:extLst>
+          </p:cNvPr>
+          <p:cNvSpPr txBox="1"/>
+          <p:nvPr/>
+        </p:nvSpPr>
+        <p:spPr>
+          <a:xfrm>
+            <a:off x="4652535" y="8613673"/>
+            <a:ext cx="989437" cy="307777"/>
+          </a:xfrm>
+          <a:prstGeom prst="rect">
+            <a:avLst/>
+          </a:prstGeom>
+          <a:noFill/>
+        </p:spPr>
+        <p:txBody>
+          <a:bodyPr wrap="square" rtlCol="0">
+            <a:spAutoFit/>
+          </a:bodyPr>
+          <a:lstStyle/>
+          <a:p>
+            <a:pPr algn="ctr"/>
+            <a:r>
+              <a:rPr lang="en-US" sz="1400" dirty="0">
+                <a:solidFill>
+                  <a:schemeClr val="bg2">
+                    <a:lumMod val="75000"/>
+                  </a:schemeClr>
+                </a:solidFill>
+                <a:latin typeface="Arial" panose="020B0604020202020204" pitchFamily="34" charset="0"/>
+                <a:cs typeface="Arial" panose="020B0604020202020204" pitchFamily="34" charset="0"/>
+              </a:rPr>
+              <a:t>n = 421</a:t>
+            </a:r>
+          </a:p>
+        </p:txBody>
+      </p:sp>
+      <p:sp>
+        <p:nvSpPr>
+          <p:cNvPr id="65" name="TextBox 64">
+            <a:extLst>
+              <a:ext uri="{FF2B5EF4-FFF2-40B4-BE49-F238E27FC236}">
+                <a16:creationId xmlns:a16="http://schemas.microsoft.com/office/drawing/2014/main" id="{B338CEBE-B365-9E90-2280-43AD0E4BECC6}"/>
+              </a:ext>
+            </a:extLst>
+          </p:cNvPr>
+          <p:cNvSpPr txBox="1"/>
+          <p:nvPr/>
+        </p:nvSpPr>
+        <p:spPr>
+          <a:xfrm>
+            <a:off x="8419504" y="8604708"/>
+            <a:ext cx="989437" cy="307777"/>
+          </a:xfrm>
+          <a:prstGeom prst="rect">
+            <a:avLst/>
+          </a:prstGeom>
+          <a:noFill/>
+        </p:spPr>
+        <p:txBody>
+          <a:bodyPr wrap="square" rtlCol="0">
+            <a:spAutoFit/>
+          </a:bodyPr>
+          <a:lstStyle/>
+          <a:p>
+            <a:pPr algn="ctr"/>
+            <a:r>
+              <a:rPr lang="en-US" sz="1400" dirty="0">
+                <a:solidFill>
+                  <a:schemeClr val="bg2">
+                    <a:lumMod val="75000"/>
+                  </a:schemeClr>
+                </a:solidFill>
+                <a:latin typeface="Arial" panose="020B0604020202020204" pitchFamily="34" charset="0"/>
+                <a:cs typeface="Arial" panose="020B0604020202020204" pitchFamily="34" charset="0"/>
+              </a:rPr>
+              <a:t>n = 421</a:t>
+            </a:r>
+          </a:p>
+        </p:txBody>
+      </p:sp>
+      <p:pic>
+        <p:nvPicPr>
+          <p:cNvPr id="67" name="Picture 66" descr="A graph of a speed limit&#10;&#10;Description automatically generated">
+            <a:extLst>
+              <a:ext uri="{FF2B5EF4-FFF2-40B4-BE49-F238E27FC236}">
+                <a16:creationId xmlns:a16="http://schemas.microsoft.com/office/drawing/2014/main" id="{79D98A51-28D8-4F0A-4C51-72763FC8A8DC}"/>
+              </a:ext>
+            </a:extLst>
+          </p:cNvPr>
+          <p:cNvPicPr>
+            <a:picLocks noChangeAspect="1"/>
+          </p:cNvPicPr>
+          <p:nvPr/>
+        </p:nvPicPr>
+        <p:blipFill rotWithShape="1">
+          <a:blip r:embed="rId4"/>
+          <a:srcRect t="39218" b="47132"/>
+          <a:stretch/>
+        </p:blipFill>
+        <p:spPr>
+          <a:xfrm>
+            <a:off x="8914781" y="10572974"/>
+            <a:ext cx="1252024" cy="683623"/>
+          </a:xfrm>
+          <a:prstGeom prst="rect">
+            <a:avLst/>
+          </a:prstGeom>
+        </p:spPr>
+      </p:pic>
+      <p:pic>
+        <p:nvPicPr>
+          <p:cNvPr id="68" name="Picture 67" descr="A graph of a speed limit&#10;&#10;Description automatically generated">
+            <a:extLst>
+              <a:ext uri="{FF2B5EF4-FFF2-40B4-BE49-F238E27FC236}">
+                <a16:creationId xmlns:a16="http://schemas.microsoft.com/office/drawing/2014/main" id="{CD61F50E-CD07-FD12-D0D5-9DAAEA0CFA45}"/>
+              </a:ext>
+            </a:extLst>
+          </p:cNvPr>
+          <p:cNvPicPr>
+            <a:picLocks noChangeAspect="1"/>
+          </p:cNvPicPr>
+          <p:nvPr/>
+        </p:nvPicPr>
+        <p:blipFill rotWithShape="1">
+          <a:blip r:embed="rId4"/>
+          <a:srcRect t="44870" b="50957"/>
+          <a:stretch/>
+        </p:blipFill>
+        <p:spPr>
+          <a:xfrm>
+            <a:off x="9001866" y="10851648"/>
+            <a:ext cx="1252024" cy="209005"/>
+          </a:xfrm>
+          <a:prstGeom prst="rect">
+            <a:avLst/>
+          </a:prstGeom>
+        </p:spPr>
+      </p:pic>
+      <p:pic>
+        <p:nvPicPr>
+          <p:cNvPr id="69" name="Picture 68" descr="A diagram of a number of birds&#10;&#10;Description automatically generated with medium confidence">
+            <a:extLst>
+              <a:ext uri="{FF2B5EF4-FFF2-40B4-BE49-F238E27FC236}">
+                <a16:creationId xmlns:a16="http://schemas.microsoft.com/office/drawing/2014/main" id="{64B7A782-5DDE-AADB-BFD5-4C7D0F662CB0}"/>
+              </a:ext>
+            </a:extLst>
+          </p:cNvPr>
+          <p:cNvPicPr>
+            <a:picLocks noChangeAspect="1"/>
+          </p:cNvPicPr>
+          <p:nvPr/>
+        </p:nvPicPr>
+        <p:blipFill rotWithShape="1">
+          <a:blip r:embed="rId6"/>
+          <a:srcRect l="79499" t="15321" r="6284" b="79206"/>
+          <a:stretch/>
+        </p:blipFill>
+        <p:spPr>
+          <a:xfrm>
+            <a:off x="2523246" y="10214514"/>
+            <a:ext cx="821610" cy="218356"/>
+          </a:xfrm>
+          <a:prstGeom prst="rect">
+            <a:avLst/>
+          </a:prstGeom>
+        </p:spPr>
+      </p:pic>
+      <p:pic>
+        <p:nvPicPr>
+          <p:cNvPr id="70" name="Picture 69" descr="A diagram of a number of birds&#10;&#10;Description automatically generated with medium confidence">
+            <a:extLst>
+              <a:ext uri="{FF2B5EF4-FFF2-40B4-BE49-F238E27FC236}">
+                <a16:creationId xmlns:a16="http://schemas.microsoft.com/office/drawing/2014/main" id="{2C06BEAD-C479-82E6-79FE-0E6360EA2FF9}"/>
+              </a:ext>
+            </a:extLst>
+          </p:cNvPr>
+          <p:cNvPicPr>
+            <a:picLocks noChangeAspect="1"/>
+          </p:cNvPicPr>
+          <p:nvPr/>
+        </p:nvPicPr>
+        <p:blipFill rotWithShape="1">
+          <a:blip r:embed="rId6"/>
+          <a:srcRect l="79499" t="21815" r="6284" b="73640"/>
+          <a:stretch/>
+        </p:blipFill>
+        <p:spPr>
+          <a:xfrm>
+            <a:off x="2511255" y="10428258"/>
+            <a:ext cx="809986" cy="178782"/>
+          </a:xfrm>
+          <a:prstGeom prst="rect">
+            <a:avLst/>
+          </a:prstGeom>
+        </p:spPr>
+      </p:pic>
+      <p:pic>
+        <p:nvPicPr>
+          <p:cNvPr id="71" name="Picture 70" descr="A diagram of a number of birds&#10;&#10;Description automatically generated with medium confidence">
+            <a:extLst>
+              <a:ext uri="{FF2B5EF4-FFF2-40B4-BE49-F238E27FC236}">
+                <a16:creationId xmlns:a16="http://schemas.microsoft.com/office/drawing/2014/main" id="{B5029ABA-5DF9-E029-A8F0-F30AD8F4BDD8}"/>
+              </a:ext>
+            </a:extLst>
+          </p:cNvPr>
+          <p:cNvPicPr>
+            <a:picLocks noChangeAspect="1"/>
+          </p:cNvPicPr>
+          <p:nvPr/>
+        </p:nvPicPr>
+        <p:blipFill rotWithShape="1">
+          <a:blip r:embed="rId6"/>
+          <a:srcRect l="79499" t="15321" r="6284" b="79206"/>
+          <a:stretch/>
+        </p:blipFill>
+        <p:spPr>
+          <a:xfrm>
+            <a:off x="4655053" y="5665822"/>
+            <a:ext cx="821610" cy="218356"/>
+          </a:xfrm>
+          <a:prstGeom prst="rect">
+            <a:avLst/>
+          </a:prstGeom>
+        </p:spPr>
+      </p:pic>
+      <p:pic>
+        <p:nvPicPr>
+          <p:cNvPr id="72" name="Picture 71" descr="A diagram of a number of birds&#10;&#10;Description automatically generated with medium confidence">
+            <a:extLst>
+              <a:ext uri="{FF2B5EF4-FFF2-40B4-BE49-F238E27FC236}">
+                <a16:creationId xmlns:a16="http://schemas.microsoft.com/office/drawing/2014/main" id="{4D882B4D-A6EF-269D-9FAC-156AD0B1B28A}"/>
+              </a:ext>
+            </a:extLst>
+          </p:cNvPr>
+          <p:cNvPicPr>
+            <a:picLocks noChangeAspect="1"/>
+          </p:cNvPicPr>
+          <p:nvPr/>
+        </p:nvPicPr>
+        <p:blipFill rotWithShape="1">
+          <a:blip r:embed="rId6"/>
+          <a:srcRect l="79499" t="21815" r="6284" b="73640"/>
+          <a:stretch/>
+        </p:blipFill>
+        <p:spPr>
+          <a:xfrm>
+            <a:off x="4643062" y="5879566"/>
+            <a:ext cx="809986" cy="178782"/>
+          </a:xfrm>
+          <a:prstGeom prst="rect">
+            <a:avLst/>
+          </a:prstGeom>
+        </p:spPr>
+      </p:pic>
+    </p:spTree>
+    <p:extLst>
+      <p:ext uri="{BB962C8B-B14F-4D97-AF65-F5344CB8AC3E}">
+        <p14:creationId xmlns:p14="http://schemas.microsoft.com/office/powerpoint/2010/main" val="3099801697"/>
       </p:ext>
     </p:extLst>
   </p:cSld>

</xml_diff>

<commit_message>
adding new figures and updating scripts
</commit_message>
<xml_diff>
--- a/figures/main-figures.pptx
+++ b/figures/main-figures.pptx
@@ -199,7 +199,7 @@
           <a:p>
             <a:fld id="{B7CE4BC6-D327-1C4F-8429-775CD9D39CD2}" type="datetimeFigureOut">
               <a:rPr lang="en-US" smtClean="0"/>
-              <a:t>10/8/25</a:t>
+              <a:t>10/22/25</a:t>
             </a:fld>
             <a:endParaRPr lang="en-US"/>
           </a:p>
@@ -859,7 +859,7 @@
           <a:p>
             <a:fld id="{3B85B7A5-F096-CF4C-9C20-4BA2556B79B6}" type="datetimeFigureOut">
               <a:rPr lang="en-US" smtClean="0"/>
-              <a:t>10/8/25</a:t>
+              <a:t>10/22/25</a:t>
             </a:fld>
             <a:endParaRPr lang="en-US"/>
           </a:p>
@@ -1029,7 +1029,7 @@
           <a:p>
             <a:fld id="{3B85B7A5-F096-CF4C-9C20-4BA2556B79B6}" type="datetimeFigureOut">
               <a:rPr lang="en-US" smtClean="0"/>
-              <a:t>10/8/25</a:t>
+              <a:t>10/22/25</a:t>
             </a:fld>
             <a:endParaRPr lang="en-US"/>
           </a:p>
@@ -1209,7 +1209,7 @@
           <a:p>
             <a:fld id="{3B85B7A5-F096-CF4C-9C20-4BA2556B79B6}" type="datetimeFigureOut">
               <a:rPr lang="en-US" smtClean="0"/>
-              <a:t>10/8/25</a:t>
+              <a:t>10/22/25</a:t>
             </a:fld>
             <a:endParaRPr lang="en-US"/>
           </a:p>
@@ -1379,7 +1379,7 @@
           <a:p>
             <a:fld id="{3B85B7A5-F096-CF4C-9C20-4BA2556B79B6}" type="datetimeFigureOut">
               <a:rPr lang="en-US" smtClean="0"/>
-              <a:t>10/8/25</a:t>
+              <a:t>10/22/25</a:t>
             </a:fld>
             <a:endParaRPr lang="en-US"/>
           </a:p>
@@ -1623,7 +1623,7 @@
           <a:p>
             <a:fld id="{3B85B7A5-F096-CF4C-9C20-4BA2556B79B6}" type="datetimeFigureOut">
               <a:rPr lang="en-US" smtClean="0"/>
-              <a:t>10/8/25</a:t>
+              <a:t>10/22/25</a:t>
             </a:fld>
             <a:endParaRPr lang="en-US"/>
           </a:p>
@@ -1855,7 +1855,7 @@
           <a:p>
             <a:fld id="{3B85B7A5-F096-CF4C-9C20-4BA2556B79B6}" type="datetimeFigureOut">
               <a:rPr lang="en-US" smtClean="0"/>
-              <a:t>10/8/25</a:t>
+              <a:t>10/22/25</a:t>
             </a:fld>
             <a:endParaRPr lang="en-US"/>
           </a:p>
@@ -2222,7 +2222,7 @@
           <a:p>
             <a:fld id="{3B85B7A5-F096-CF4C-9C20-4BA2556B79B6}" type="datetimeFigureOut">
               <a:rPr lang="en-US" smtClean="0"/>
-              <a:t>10/8/25</a:t>
+              <a:t>10/22/25</a:t>
             </a:fld>
             <a:endParaRPr lang="en-US"/>
           </a:p>
@@ -2340,7 +2340,7 @@
           <a:p>
             <a:fld id="{3B85B7A5-F096-CF4C-9C20-4BA2556B79B6}" type="datetimeFigureOut">
               <a:rPr lang="en-US" smtClean="0"/>
-              <a:t>10/8/25</a:t>
+              <a:t>10/22/25</a:t>
             </a:fld>
             <a:endParaRPr lang="en-US"/>
           </a:p>
@@ -2435,7 +2435,7 @@
           <a:p>
             <a:fld id="{3B85B7A5-F096-CF4C-9C20-4BA2556B79B6}" type="datetimeFigureOut">
               <a:rPr lang="en-US" smtClean="0"/>
-              <a:t>10/8/25</a:t>
+              <a:t>10/22/25</a:t>
             </a:fld>
             <a:endParaRPr lang="en-US"/>
           </a:p>
@@ -2712,7 +2712,7 @@
           <a:p>
             <a:fld id="{3B85B7A5-F096-CF4C-9C20-4BA2556B79B6}" type="datetimeFigureOut">
               <a:rPr lang="en-US" smtClean="0"/>
-              <a:t>10/8/25</a:t>
+              <a:t>10/22/25</a:t>
             </a:fld>
             <a:endParaRPr lang="en-US"/>
           </a:p>
@@ -2969,7 +2969,7 @@
           <a:p>
             <a:fld id="{3B85B7A5-F096-CF4C-9C20-4BA2556B79B6}" type="datetimeFigureOut">
               <a:rPr lang="en-US" smtClean="0"/>
-              <a:t>10/8/25</a:t>
+              <a:t>10/22/25</a:t>
             </a:fld>
             <a:endParaRPr lang="en-US"/>
           </a:p>
@@ -3182,7 +3182,7 @@
           <a:p>
             <a:fld id="{3B85B7A5-F096-CF4C-9C20-4BA2556B79B6}" type="datetimeFigureOut">
               <a:rPr lang="en-US" smtClean="0"/>
-              <a:t>10/8/25</a:t>
+              <a:t>10/22/25</a:t>
             </a:fld>
             <a:endParaRPr lang="en-US"/>
           </a:p>
@@ -3738,7 +3738,7 @@
         </p:nvCxnSpPr>
         <p:spPr>
           <a:xfrm flipV="1">
-            <a:off x="4625562" y="4951275"/>
+            <a:off x="4860695" y="4951275"/>
             <a:ext cx="2338447" cy="2260401"/>
           </a:xfrm>
           <a:prstGeom prst="line">
@@ -4078,7 +4078,7 @@
         </p:nvSpPr>
         <p:spPr>
           <a:xfrm>
-            <a:off x="977147" y="4262713"/>
+            <a:off x="995315" y="4274825"/>
             <a:ext cx="269626" cy="2677656"/>
           </a:xfrm>
           <a:prstGeom prst="rect">
@@ -4203,7 +4203,7 @@
         </p:nvSpPr>
         <p:spPr>
           <a:xfrm>
-            <a:off x="1754581" y="7272131"/>
+            <a:off x="1742469" y="7272131"/>
             <a:ext cx="2891743" cy="276999"/>
           </a:xfrm>
           <a:prstGeom prst="rect">
@@ -4222,7 +4222,7 @@
                 <a:latin typeface="Arial" panose="020B0604020202020204" pitchFamily="34" charset="0"/>
                 <a:cs typeface="Arial" panose="020B0604020202020204" pitchFamily="34" charset="0"/>
               </a:rPr>
-              <a:t>1            2            3            4             </a:t>
+              <a:t>1           2          3           4             </a:t>
             </a:r>
           </a:p>
         </p:txBody>
@@ -4242,6 +4242,1498 @@
         <p:spPr>
           <a:xfrm>
             <a:off x="1191830" y="4680299"/>
+            <a:ext cx="569481" cy="338554"/>
+          </a:xfrm>
+          <a:prstGeom prst="rect">
+            <a:avLst/>
+          </a:prstGeom>
+          <a:noFill/>
+        </p:spPr>
+        <p:txBody>
+          <a:bodyPr wrap="square" rtlCol="0">
+            <a:spAutoFit/>
+          </a:bodyPr>
+          <a:lstStyle/>
+          <a:p>
+            <a:pPr algn="ctr"/>
+            <a:r>
+              <a:rPr lang="en-US" sz="1600" dirty="0">
+                <a:latin typeface="Arial" panose="020B0604020202020204" pitchFamily="34" charset="0"/>
+                <a:cs typeface="Arial" panose="020B0604020202020204" pitchFamily="34" charset="0"/>
+              </a:rPr>
+              <a:t>(a)</a:t>
+            </a:r>
+          </a:p>
+        </p:txBody>
+      </p:sp>
+      <p:sp>
+        <p:nvSpPr>
+          <p:cNvPr id="36" name="Oval 35">
+            <a:extLst>
+              <a:ext uri="{FF2B5EF4-FFF2-40B4-BE49-F238E27FC236}">
+                <a16:creationId xmlns:a16="http://schemas.microsoft.com/office/drawing/2014/main" id="{BEE8699E-F273-6FF7-DC63-85059E130FD0}"/>
+              </a:ext>
+            </a:extLst>
+          </p:cNvPr>
+          <p:cNvSpPr/>
+          <p:nvPr/>
+        </p:nvSpPr>
+        <p:spPr>
+          <a:xfrm>
+            <a:off x="1894849" y="6517743"/>
+            <a:ext cx="141515" cy="130629"/>
+          </a:xfrm>
+          <a:prstGeom prst="ellipse">
+            <a:avLst/>
+          </a:prstGeom>
+          <a:solidFill>
+            <a:srgbClr val="B2172B"/>
+          </a:solidFill>
+          <a:ln w="19050">
+            <a:solidFill>
+              <a:schemeClr val="tx1"/>
+            </a:solidFill>
+          </a:ln>
+        </p:spPr>
+        <p:style>
+          <a:lnRef idx="2">
+            <a:schemeClr val="accent1">
+              <a:shade val="50000"/>
+            </a:schemeClr>
+          </a:lnRef>
+          <a:fillRef idx="1">
+            <a:schemeClr val="accent1"/>
+          </a:fillRef>
+          <a:effectRef idx="0">
+            <a:schemeClr val="accent1"/>
+          </a:effectRef>
+          <a:fontRef idx="minor">
+            <a:schemeClr val="lt1"/>
+          </a:fontRef>
+        </p:style>
+        <p:txBody>
+          <a:bodyPr rtlCol="0" anchor="ctr"/>
+          <a:lstStyle/>
+          <a:p>
+            <a:pPr algn="ctr"/>
+            <a:endParaRPr lang="en-US">
+              <a:solidFill>
+                <a:schemeClr val="accent2">
+                  <a:lumMod val="50000"/>
+                </a:schemeClr>
+              </a:solidFill>
+            </a:endParaRPr>
+          </a:p>
+        </p:txBody>
+      </p:sp>
+      <p:sp>
+        <p:nvSpPr>
+          <p:cNvPr id="37" name="Oval 36">
+            <a:extLst>
+              <a:ext uri="{FF2B5EF4-FFF2-40B4-BE49-F238E27FC236}">
+                <a16:creationId xmlns:a16="http://schemas.microsoft.com/office/drawing/2014/main" id="{354D3C8F-B1BA-6D29-DC90-52EDBF833981}"/>
+              </a:ext>
+            </a:extLst>
+          </p:cNvPr>
+          <p:cNvSpPr/>
+          <p:nvPr/>
+        </p:nvSpPr>
+        <p:spPr>
+          <a:xfrm>
+            <a:off x="2747850" y="5656669"/>
+            <a:ext cx="141515" cy="130629"/>
+          </a:xfrm>
+          <a:prstGeom prst="ellipse">
+            <a:avLst/>
+          </a:prstGeom>
+          <a:solidFill>
+            <a:srgbClr val="B2172B"/>
+          </a:solidFill>
+          <a:ln w="19050">
+            <a:solidFill>
+              <a:schemeClr val="tx1"/>
+            </a:solidFill>
+          </a:ln>
+        </p:spPr>
+        <p:style>
+          <a:lnRef idx="2">
+            <a:schemeClr val="accent1">
+              <a:shade val="50000"/>
+            </a:schemeClr>
+          </a:lnRef>
+          <a:fillRef idx="1">
+            <a:schemeClr val="accent1"/>
+          </a:fillRef>
+          <a:effectRef idx="0">
+            <a:schemeClr val="accent1"/>
+          </a:effectRef>
+          <a:fontRef idx="minor">
+            <a:schemeClr val="lt1"/>
+          </a:fontRef>
+        </p:style>
+        <p:txBody>
+          <a:bodyPr rtlCol="0" anchor="ctr"/>
+          <a:lstStyle/>
+          <a:p>
+            <a:pPr algn="ctr"/>
+            <a:endParaRPr lang="en-US">
+              <a:solidFill>
+                <a:schemeClr val="accent2">
+                  <a:lumMod val="50000"/>
+                </a:schemeClr>
+              </a:solidFill>
+            </a:endParaRPr>
+          </a:p>
+        </p:txBody>
+      </p:sp>
+      <p:sp>
+        <p:nvSpPr>
+          <p:cNvPr id="38" name="Oval 37">
+            <a:extLst>
+              <a:ext uri="{FF2B5EF4-FFF2-40B4-BE49-F238E27FC236}">
+                <a16:creationId xmlns:a16="http://schemas.microsoft.com/office/drawing/2014/main" id="{10BECA27-75D0-9CB3-CB85-06E4F830C2EA}"/>
+              </a:ext>
+            </a:extLst>
+          </p:cNvPr>
+          <p:cNvSpPr/>
+          <p:nvPr/>
+        </p:nvSpPr>
+        <p:spPr>
+          <a:xfrm>
+            <a:off x="3394086" y="5545878"/>
+            <a:ext cx="141515" cy="130629"/>
+          </a:xfrm>
+          <a:prstGeom prst="ellipse">
+            <a:avLst/>
+          </a:prstGeom>
+          <a:solidFill>
+            <a:srgbClr val="B2172B"/>
+          </a:solidFill>
+          <a:ln>
+            <a:solidFill>
+              <a:srgbClr val="B2172B"/>
+            </a:solidFill>
+          </a:ln>
+        </p:spPr>
+        <p:style>
+          <a:lnRef idx="2">
+            <a:schemeClr val="accent1">
+              <a:shade val="50000"/>
+            </a:schemeClr>
+          </a:lnRef>
+          <a:fillRef idx="1">
+            <a:schemeClr val="accent1"/>
+          </a:fillRef>
+          <a:effectRef idx="0">
+            <a:schemeClr val="accent1"/>
+          </a:effectRef>
+          <a:fontRef idx="minor">
+            <a:schemeClr val="lt1"/>
+          </a:fontRef>
+        </p:style>
+        <p:txBody>
+          <a:bodyPr rtlCol="0" anchor="ctr"/>
+          <a:lstStyle/>
+          <a:p>
+            <a:pPr algn="ctr"/>
+            <a:endParaRPr lang="en-US">
+              <a:solidFill>
+                <a:schemeClr val="accent2">
+                  <a:lumMod val="50000"/>
+                </a:schemeClr>
+              </a:solidFill>
+            </a:endParaRPr>
+          </a:p>
+        </p:txBody>
+      </p:sp>
+      <p:sp>
+        <p:nvSpPr>
+          <p:cNvPr id="39" name="Oval 38">
+            <a:extLst>
+              <a:ext uri="{FF2B5EF4-FFF2-40B4-BE49-F238E27FC236}">
+                <a16:creationId xmlns:a16="http://schemas.microsoft.com/office/drawing/2014/main" id="{823A49DE-0586-7321-F6C6-EB2C3AC37273}"/>
+              </a:ext>
+            </a:extLst>
+          </p:cNvPr>
+          <p:cNvSpPr/>
+          <p:nvPr/>
+        </p:nvSpPr>
+        <p:spPr>
+          <a:xfrm>
+            <a:off x="2460923" y="5960644"/>
+            <a:ext cx="141515" cy="130629"/>
+          </a:xfrm>
+          <a:prstGeom prst="ellipse">
+            <a:avLst/>
+          </a:prstGeom>
+          <a:solidFill>
+            <a:srgbClr val="B2172B"/>
+          </a:solidFill>
+          <a:ln w="19050">
+            <a:solidFill>
+              <a:schemeClr val="tx1"/>
+            </a:solidFill>
+          </a:ln>
+        </p:spPr>
+        <p:style>
+          <a:lnRef idx="2">
+            <a:schemeClr val="accent1">
+              <a:shade val="50000"/>
+            </a:schemeClr>
+          </a:lnRef>
+          <a:fillRef idx="1">
+            <a:schemeClr val="accent1"/>
+          </a:fillRef>
+          <a:effectRef idx="0">
+            <a:schemeClr val="accent1"/>
+          </a:effectRef>
+          <a:fontRef idx="minor">
+            <a:schemeClr val="lt1"/>
+          </a:fontRef>
+        </p:style>
+        <p:txBody>
+          <a:bodyPr rtlCol="0" anchor="ctr"/>
+          <a:lstStyle/>
+          <a:p>
+            <a:pPr algn="ctr"/>
+            <a:endParaRPr lang="en-US">
+              <a:solidFill>
+                <a:schemeClr val="accent2">
+                  <a:lumMod val="50000"/>
+                </a:schemeClr>
+              </a:solidFill>
+            </a:endParaRPr>
+          </a:p>
+        </p:txBody>
+      </p:sp>
+      <p:cxnSp>
+        <p:nvCxnSpPr>
+          <p:cNvPr id="40" name="Straight Connector 39">
+            <a:extLst>
+              <a:ext uri="{FF2B5EF4-FFF2-40B4-BE49-F238E27FC236}">
+                <a16:creationId xmlns:a16="http://schemas.microsoft.com/office/drawing/2014/main" id="{238696BA-A5E6-6909-9553-555066BC9A22}"/>
+              </a:ext>
+            </a:extLst>
+          </p:cNvPr>
+          <p:cNvCxnSpPr>
+            <a:cxnSpLocks/>
+          </p:cNvCxnSpPr>
+          <p:nvPr/>
+        </p:nvCxnSpPr>
+        <p:spPr>
+          <a:xfrm>
+            <a:off x="4803791" y="4783827"/>
+            <a:ext cx="0" cy="2491683"/>
+          </a:xfrm>
+          <a:prstGeom prst="line">
+            <a:avLst/>
+          </a:prstGeom>
+          <a:ln w="28575">
+            <a:solidFill>
+              <a:schemeClr val="tx1"/>
+            </a:solidFill>
+          </a:ln>
+        </p:spPr>
+        <p:style>
+          <a:lnRef idx="1">
+            <a:schemeClr val="accent1"/>
+          </a:lnRef>
+          <a:fillRef idx="0">
+            <a:schemeClr val="accent1"/>
+          </a:fillRef>
+          <a:effectRef idx="0">
+            <a:schemeClr val="accent1"/>
+          </a:effectRef>
+          <a:fontRef idx="minor">
+            <a:schemeClr val="tx1"/>
+          </a:fontRef>
+        </p:style>
+      </p:cxnSp>
+      <p:cxnSp>
+        <p:nvCxnSpPr>
+          <p:cNvPr id="41" name="Straight Connector 40">
+            <a:extLst>
+              <a:ext uri="{FF2B5EF4-FFF2-40B4-BE49-F238E27FC236}">
+                <a16:creationId xmlns:a16="http://schemas.microsoft.com/office/drawing/2014/main" id="{BC654A08-4197-1F28-F560-69090ED02B1C}"/>
+              </a:ext>
+            </a:extLst>
+          </p:cNvPr>
+          <p:cNvCxnSpPr>
+            <a:cxnSpLocks/>
+          </p:cNvCxnSpPr>
+          <p:nvPr/>
+        </p:nvCxnSpPr>
+        <p:spPr>
+          <a:xfrm flipH="1">
+            <a:off x="4814677" y="7264623"/>
+            <a:ext cx="2660360" cy="0"/>
+          </a:xfrm>
+          <a:prstGeom prst="line">
+            <a:avLst/>
+          </a:prstGeom>
+          <a:ln w="28575">
+            <a:solidFill>
+              <a:schemeClr val="tx1"/>
+            </a:solidFill>
+          </a:ln>
+        </p:spPr>
+        <p:style>
+          <a:lnRef idx="1">
+            <a:schemeClr val="accent1"/>
+          </a:lnRef>
+          <a:fillRef idx="0">
+            <a:schemeClr val="accent1"/>
+          </a:fillRef>
+          <a:effectRef idx="0">
+            <a:schemeClr val="accent1"/>
+          </a:effectRef>
+          <a:fontRef idx="minor">
+            <a:schemeClr val="tx1"/>
+          </a:fontRef>
+        </p:style>
+      </p:cxnSp>
+      <p:sp>
+        <p:nvSpPr>
+          <p:cNvPr id="42" name="TextBox 41">
+            <a:extLst>
+              <a:ext uri="{FF2B5EF4-FFF2-40B4-BE49-F238E27FC236}">
+                <a16:creationId xmlns:a16="http://schemas.microsoft.com/office/drawing/2014/main" id="{A65315F1-FD2B-9078-9C44-2367AACD6439}"/>
+              </a:ext>
+            </a:extLst>
+          </p:cNvPr>
+          <p:cNvSpPr txBox="1"/>
+          <p:nvPr/>
+        </p:nvSpPr>
+        <p:spPr>
+          <a:xfrm>
+            <a:off x="4387455" y="7473954"/>
+            <a:ext cx="3610227" cy="584775"/>
+          </a:xfrm>
+          <a:prstGeom prst="rect">
+            <a:avLst/>
+          </a:prstGeom>
+          <a:noFill/>
+        </p:spPr>
+        <p:txBody>
+          <a:bodyPr wrap="square" rtlCol="0">
+            <a:spAutoFit/>
+          </a:bodyPr>
+          <a:lstStyle/>
+          <a:p>
+            <a:pPr algn="ctr"/>
+            <a:r>
+              <a:rPr lang="en-US" sz="1600" dirty="0">
+                <a:latin typeface="Arial" panose="020B0604020202020204" pitchFamily="34" charset="0"/>
+                <a:cs typeface="Arial" panose="020B0604020202020204" pitchFamily="34" charset="0"/>
+              </a:rPr>
+              <a:t>Minimum of potential dispersal rate and velocity of climate change (km/yr)</a:t>
+            </a:r>
+          </a:p>
+        </p:txBody>
+      </p:sp>
+      <p:sp>
+        <p:nvSpPr>
+          <p:cNvPr id="43" name="TextBox 42">
+            <a:extLst>
+              <a:ext uri="{FF2B5EF4-FFF2-40B4-BE49-F238E27FC236}">
+                <a16:creationId xmlns:a16="http://schemas.microsoft.com/office/drawing/2014/main" id="{F7E81AD1-9BE2-8851-3F5F-C9A721D7075B}"/>
+              </a:ext>
+            </a:extLst>
+          </p:cNvPr>
+          <p:cNvSpPr txBox="1"/>
+          <p:nvPr/>
+        </p:nvSpPr>
+        <p:spPr>
+          <a:xfrm>
+            <a:off x="4497750" y="4274825"/>
+            <a:ext cx="269626" cy="2677656"/>
+          </a:xfrm>
+          <a:prstGeom prst="rect">
+            <a:avLst/>
+          </a:prstGeom>
+          <a:noFill/>
+        </p:spPr>
+        <p:txBody>
+          <a:bodyPr wrap="none" rtlCol="0">
+            <a:spAutoFit/>
+          </a:bodyPr>
+          <a:lstStyle/>
+          <a:p>
+            <a:endParaRPr lang="en-US" sz="1200" dirty="0">
+              <a:latin typeface="Arial" panose="020B0604020202020204" pitchFamily="34" charset="0"/>
+              <a:cs typeface="Arial" panose="020B0604020202020204" pitchFamily="34" charset="0"/>
+            </a:endParaRPr>
+          </a:p>
+          <a:p>
+            <a:endParaRPr lang="en-US" sz="1200" dirty="0">
+              <a:latin typeface="Arial" panose="020B0604020202020204" pitchFamily="34" charset="0"/>
+              <a:cs typeface="Arial" panose="020B0604020202020204" pitchFamily="34" charset="0"/>
+            </a:endParaRPr>
+          </a:p>
+          <a:p>
+            <a:endParaRPr lang="en-US" sz="1200" dirty="0">
+              <a:latin typeface="Arial" panose="020B0604020202020204" pitchFamily="34" charset="0"/>
+              <a:cs typeface="Arial" panose="020B0604020202020204" pitchFamily="34" charset="0"/>
+            </a:endParaRPr>
+          </a:p>
+          <a:p>
+            <a:r>
+              <a:rPr lang="en-US" sz="1200" dirty="0">
+                <a:latin typeface="Arial" panose="020B0604020202020204" pitchFamily="34" charset="0"/>
+                <a:cs typeface="Arial" panose="020B0604020202020204" pitchFamily="34" charset="0"/>
+              </a:rPr>
+              <a:t>4</a:t>
+            </a:r>
+          </a:p>
+          <a:p>
+            <a:endParaRPr lang="en-US" sz="1200" dirty="0">
+              <a:latin typeface="Arial" panose="020B0604020202020204" pitchFamily="34" charset="0"/>
+              <a:cs typeface="Arial" panose="020B0604020202020204" pitchFamily="34" charset="0"/>
+            </a:endParaRPr>
+          </a:p>
+          <a:p>
+            <a:endParaRPr lang="en-US" sz="1200" dirty="0">
+              <a:latin typeface="Arial" panose="020B0604020202020204" pitchFamily="34" charset="0"/>
+              <a:cs typeface="Arial" panose="020B0604020202020204" pitchFamily="34" charset="0"/>
+            </a:endParaRPr>
+          </a:p>
+          <a:p>
+            <a:r>
+              <a:rPr lang="en-US" sz="1200" dirty="0">
+                <a:latin typeface="Arial" panose="020B0604020202020204" pitchFamily="34" charset="0"/>
+                <a:cs typeface="Arial" panose="020B0604020202020204" pitchFamily="34" charset="0"/>
+              </a:rPr>
+              <a:t>3</a:t>
+            </a:r>
+          </a:p>
+          <a:p>
+            <a:endParaRPr lang="en-US" sz="1200" dirty="0">
+              <a:latin typeface="Arial" panose="020B0604020202020204" pitchFamily="34" charset="0"/>
+              <a:cs typeface="Arial" panose="020B0604020202020204" pitchFamily="34" charset="0"/>
+            </a:endParaRPr>
+          </a:p>
+          <a:p>
+            <a:endParaRPr lang="en-US" sz="1200" dirty="0">
+              <a:latin typeface="Arial" panose="020B0604020202020204" pitchFamily="34" charset="0"/>
+              <a:cs typeface="Arial" panose="020B0604020202020204" pitchFamily="34" charset="0"/>
+            </a:endParaRPr>
+          </a:p>
+          <a:p>
+            <a:r>
+              <a:rPr lang="en-US" sz="1200" dirty="0">
+                <a:latin typeface="Arial" panose="020B0604020202020204" pitchFamily="34" charset="0"/>
+                <a:cs typeface="Arial" panose="020B0604020202020204" pitchFamily="34" charset="0"/>
+              </a:rPr>
+              <a:t>2</a:t>
+            </a:r>
+          </a:p>
+          <a:p>
+            <a:endParaRPr lang="en-US" sz="1200" dirty="0">
+              <a:latin typeface="Arial" panose="020B0604020202020204" pitchFamily="34" charset="0"/>
+              <a:cs typeface="Arial" panose="020B0604020202020204" pitchFamily="34" charset="0"/>
+            </a:endParaRPr>
+          </a:p>
+          <a:p>
+            <a:endParaRPr lang="en-US" sz="1200" dirty="0">
+              <a:latin typeface="Arial" panose="020B0604020202020204" pitchFamily="34" charset="0"/>
+              <a:cs typeface="Arial" panose="020B0604020202020204" pitchFamily="34" charset="0"/>
+            </a:endParaRPr>
+          </a:p>
+          <a:p>
+            <a:r>
+              <a:rPr lang="en-US" sz="1200" dirty="0">
+                <a:latin typeface="Arial" panose="020B0604020202020204" pitchFamily="34" charset="0"/>
+                <a:cs typeface="Arial" panose="020B0604020202020204" pitchFamily="34" charset="0"/>
+              </a:rPr>
+              <a:t>1</a:t>
+            </a:r>
+          </a:p>
+          <a:p>
+            <a:endParaRPr lang="en-US" sz="1200" dirty="0">
+              <a:latin typeface="Arial" panose="020B0604020202020204" pitchFamily="34" charset="0"/>
+              <a:cs typeface="Arial" panose="020B0604020202020204" pitchFamily="34" charset="0"/>
+            </a:endParaRPr>
+          </a:p>
+        </p:txBody>
+      </p:sp>
+      <p:sp>
+        <p:nvSpPr>
+          <p:cNvPr id="44" name="TextBox 43">
+            <a:extLst>
+              <a:ext uri="{FF2B5EF4-FFF2-40B4-BE49-F238E27FC236}">
+                <a16:creationId xmlns:a16="http://schemas.microsoft.com/office/drawing/2014/main" id="{D1618240-1B4F-D3A8-8997-1D703EBC5607}"/>
+              </a:ext>
+            </a:extLst>
+          </p:cNvPr>
+          <p:cNvSpPr txBox="1"/>
+          <p:nvPr/>
+        </p:nvSpPr>
+        <p:spPr>
+          <a:xfrm>
+            <a:off x="5253752" y="7286259"/>
+            <a:ext cx="2891743" cy="276999"/>
+          </a:xfrm>
+          <a:prstGeom prst="rect">
+            <a:avLst/>
+          </a:prstGeom>
+          <a:noFill/>
+        </p:spPr>
+        <p:txBody>
+          <a:bodyPr wrap="square" rtlCol="0">
+            <a:spAutoFit/>
+          </a:bodyPr>
+          <a:lstStyle/>
+          <a:p>
+            <a:r>
+              <a:rPr lang="en-US" sz="1200" dirty="0">
+                <a:latin typeface="Arial" panose="020B0604020202020204" pitchFamily="34" charset="0"/>
+                <a:cs typeface="Arial" panose="020B0604020202020204" pitchFamily="34" charset="0"/>
+              </a:rPr>
+              <a:t>1           2          3           4            </a:t>
+            </a:r>
+          </a:p>
+        </p:txBody>
+      </p:sp>
+      <p:sp>
+        <p:nvSpPr>
+          <p:cNvPr id="59" name="TextBox 58">
+            <a:extLst>
+              <a:ext uri="{FF2B5EF4-FFF2-40B4-BE49-F238E27FC236}">
+                <a16:creationId xmlns:a16="http://schemas.microsoft.com/office/drawing/2014/main" id="{A27BEDD4-7EE8-86A2-AC37-766D65FFEB9F}"/>
+              </a:ext>
+            </a:extLst>
+          </p:cNvPr>
+          <p:cNvSpPr txBox="1"/>
+          <p:nvPr/>
+        </p:nvSpPr>
+        <p:spPr>
+          <a:xfrm>
+            <a:off x="4719266" y="4690459"/>
+            <a:ext cx="569481" cy="338554"/>
+          </a:xfrm>
+          <a:prstGeom prst="rect">
+            <a:avLst/>
+          </a:prstGeom>
+          <a:noFill/>
+        </p:spPr>
+        <p:txBody>
+          <a:bodyPr wrap="square" rtlCol="0">
+            <a:spAutoFit/>
+          </a:bodyPr>
+          <a:lstStyle/>
+          <a:p>
+            <a:pPr algn="ctr"/>
+            <a:r>
+              <a:rPr lang="en-US" sz="1600" dirty="0">
+                <a:latin typeface="Arial" panose="020B0604020202020204" pitchFamily="34" charset="0"/>
+                <a:cs typeface="Arial" panose="020B0604020202020204" pitchFamily="34" charset="0"/>
+              </a:rPr>
+              <a:t>(b)</a:t>
+            </a:r>
+          </a:p>
+        </p:txBody>
+      </p:sp>
+      <p:sp>
+        <p:nvSpPr>
+          <p:cNvPr id="60" name="Oval 59">
+            <a:extLst>
+              <a:ext uri="{FF2B5EF4-FFF2-40B4-BE49-F238E27FC236}">
+                <a16:creationId xmlns:a16="http://schemas.microsoft.com/office/drawing/2014/main" id="{4C5D6DC3-B351-79DF-ACBA-5621C4D99514}"/>
+              </a:ext>
+            </a:extLst>
+          </p:cNvPr>
+          <p:cNvSpPr/>
+          <p:nvPr/>
+        </p:nvSpPr>
+        <p:spPr>
+          <a:xfrm>
+            <a:off x="2253085" y="6155908"/>
+            <a:ext cx="141515" cy="130629"/>
+          </a:xfrm>
+          <a:prstGeom prst="ellipse">
+            <a:avLst/>
+          </a:prstGeom>
+          <a:solidFill>
+            <a:srgbClr val="F3CABA"/>
+          </a:solidFill>
+          <a:ln w="19050">
+            <a:solidFill>
+              <a:schemeClr val="tx1"/>
+            </a:solidFill>
+          </a:ln>
+        </p:spPr>
+        <p:style>
+          <a:lnRef idx="2">
+            <a:schemeClr val="accent1">
+              <a:shade val="50000"/>
+            </a:schemeClr>
+          </a:lnRef>
+          <a:fillRef idx="1">
+            <a:schemeClr val="accent1"/>
+          </a:fillRef>
+          <a:effectRef idx="0">
+            <a:schemeClr val="accent1"/>
+          </a:effectRef>
+          <a:fontRef idx="minor">
+            <a:schemeClr val="lt1"/>
+          </a:fontRef>
+        </p:style>
+        <p:txBody>
+          <a:bodyPr rtlCol="0" anchor="ctr"/>
+          <a:lstStyle/>
+          <a:p>
+            <a:pPr algn="ctr"/>
+            <a:endParaRPr lang="en-US">
+              <a:solidFill>
+                <a:schemeClr val="accent2">
+                  <a:lumMod val="50000"/>
+                </a:schemeClr>
+              </a:solidFill>
+            </a:endParaRPr>
+          </a:p>
+        </p:txBody>
+      </p:sp>
+      <p:sp>
+        <p:nvSpPr>
+          <p:cNvPr id="61" name="Oval 60">
+            <a:extLst>
+              <a:ext uri="{FF2B5EF4-FFF2-40B4-BE49-F238E27FC236}">
+                <a16:creationId xmlns:a16="http://schemas.microsoft.com/office/drawing/2014/main" id="{EB55F448-5A3A-7678-679C-EF543653C5E6}"/>
+              </a:ext>
+            </a:extLst>
+          </p:cNvPr>
+          <p:cNvSpPr/>
+          <p:nvPr/>
+        </p:nvSpPr>
+        <p:spPr>
+          <a:xfrm>
+            <a:off x="2085921" y="6336883"/>
+            <a:ext cx="141515" cy="130629"/>
+          </a:xfrm>
+          <a:prstGeom prst="ellipse">
+            <a:avLst/>
+          </a:prstGeom>
+          <a:solidFill>
+            <a:srgbClr val="F3CABA"/>
+          </a:solidFill>
+          <a:ln w="19050">
+            <a:solidFill>
+              <a:schemeClr val="tx1"/>
+            </a:solidFill>
+          </a:ln>
+        </p:spPr>
+        <p:style>
+          <a:lnRef idx="2">
+            <a:schemeClr val="accent1">
+              <a:shade val="50000"/>
+            </a:schemeClr>
+          </a:lnRef>
+          <a:fillRef idx="1">
+            <a:schemeClr val="accent1"/>
+          </a:fillRef>
+          <a:effectRef idx="0">
+            <a:schemeClr val="accent1"/>
+          </a:effectRef>
+          <a:fontRef idx="minor">
+            <a:schemeClr val="lt1"/>
+          </a:fontRef>
+        </p:style>
+        <p:txBody>
+          <a:bodyPr rtlCol="0" anchor="ctr"/>
+          <a:lstStyle/>
+          <a:p>
+            <a:pPr algn="ctr"/>
+            <a:endParaRPr lang="en-US">
+              <a:solidFill>
+                <a:schemeClr val="accent2">
+                  <a:lumMod val="50000"/>
+                </a:schemeClr>
+              </a:solidFill>
+            </a:endParaRPr>
+          </a:p>
+        </p:txBody>
+      </p:sp>
+      <p:sp>
+        <p:nvSpPr>
+          <p:cNvPr id="62" name="Oval 61">
+            <a:extLst>
+              <a:ext uri="{FF2B5EF4-FFF2-40B4-BE49-F238E27FC236}">
+                <a16:creationId xmlns:a16="http://schemas.microsoft.com/office/drawing/2014/main" id="{C568E85D-55A1-9036-1E99-C41BE5AA6547}"/>
+              </a:ext>
+            </a:extLst>
+          </p:cNvPr>
+          <p:cNvSpPr/>
+          <p:nvPr/>
+        </p:nvSpPr>
+        <p:spPr>
+          <a:xfrm>
+            <a:off x="1341805" y="7046501"/>
+            <a:ext cx="141515" cy="130629"/>
+          </a:xfrm>
+          <a:prstGeom prst="ellipse">
+            <a:avLst/>
+          </a:prstGeom>
+          <a:solidFill>
+            <a:srgbClr val="F3CABA"/>
+          </a:solidFill>
+          <a:ln w="19050">
+            <a:solidFill>
+              <a:schemeClr val="tx1"/>
+            </a:solidFill>
+          </a:ln>
+        </p:spPr>
+        <p:style>
+          <a:lnRef idx="2">
+            <a:schemeClr val="accent1">
+              <a:shade val="50000"/>
+            </a:schemeClr>
+          </a:lnRef>
+          <a:fillRef idx="1">
+            <a:schemeClr val="accent1"/>
+          </a:fillRef>
+          <a:effectRef idx="0">
+            <a:schemeClr val="accent1"/>
+          </a:effectRef>
+          <a:fontRef idx="minor">
+            <a:schemeClr val="lt1"/>
+          </a:fontRef>
+        </p:style>
+        <p:txBody>
+          <a:bodyPr rtlCol="0" anchor="ctr"/>
+          <a:lstStyle/>
+          <a:p>
+            <a:pPr algn="ctr"/>
+            <a:endParaRPr lang="en-US">
+              <a:solidFill>
+                <a:schemeClr val="accent2">
+                  <a:lumMod val="50000"/>
+                </a:schemeClr>
+              </a:solidFill>
+            </a:endParaRPr>
+          </a:p>
+        </p:txBody>
+      </p:sp>
+      <p:sp>
+        <p:nvSpPr>
+          <p:cNvPr id="63" name="Oval 62">
+            <a:extLst>
+              <a:ext uri="{FF2B5EF4-FFF2-40B4-BE49-F238E27FC236}">
+                <a16:creationId xmlns:a16="http://schemas.microsoft.com/office/drawing/2014/main" id="{EFFD6B70-1A5B-7BE6-2F22-D286152D13B0}"/>
+              </a:ext>
+            </a:extLst>
+          </p:cNvPr>
+          <p:cNvSpPr/>
+          <p:nvPr/>
+        </p:nvSpPr>
+        <p:spPr>
+          <a:xfrm>
+            <a:off x="1589203" y="6798851"/>
+            <a:ext cx="141515" cy="130629"/>
+          </a:xfrm>
+          <a:prstGeom prst="ellipse">
+            <a:avLst/>
+          </a:prstGeom>
+          <a:solidFill>
+            <a:srgbClr val="F3CABA"/>
+          </a:solidFill>
+          <a:ln w="19050">
+            <a:solidFill>
+              <a:schemeClr val="tx1"/>
+            </a:solidFill>
+          </a:ln>
+        </p:spPr>
+        <p:style>
+          <a:lnRef idx="2">
+            <a:schemeClr val="accent1">
+              <a:shade val="50000"/>
+            </a:schemeClr>
+          </a:lnRef>
+          <a:fillRef idx="1">
+            <a:schemeClr val="accent1"/>
+          </a:fillRef>
+          <a:effectRef idx="0">
+            <a:schemeClr val="accent1"/>
+          </a:effectRef>
+          <a:fontRef idx="minor">
+            <a:schemeClr val="lt1"/>
+          </a:fontRef>
+        </p:style>
+        <p:txBody>
+          <a:bodyPr rtlCol="0" anchor="ctr"/>
+          <a:lstStyle/>
+          <a:p>
+            <a:pPr algn="ctr"/>
+            <a:endParaRPr lang="en-US">
+              <a:solidFill>
+                <a:schemeClr val="accent2">
+                  <a:lumMod val="50000"/>
+                </a:schemeClr>
+              </a:solidFill>
+            </a:endParaRPr>
+          </a:p>
+        </p:txBody>
+      </p:sp>
+      <p:sp>
+        <p:nvSpPr>
+          <p:cNvPr id="1024" name="Oval 1023">
+            <a:extLst>
+              <a:ext uri="{FF2B5EF4-FFF2-40B4-BE49-F238E27FC236}">
+                <a16:creationId xmlns:a16="http://schemas.microsoft.com/office/drawing/2014/main" id="{4D051B26-BA83-93C1-3718-04FF78D315FC}"/>
+              </a:ext>
+            </a:extLst>
+          </p:cNvPr>
+          <p:cNvSpPr/>
+          <p:nvPr/>
+        </p:nvSpPr>
+        <p:spPr>
+          <a:xfrm>
+            <a:off x="2869295" y="6054471"/>
+            <a:ext cx="141515" cy="130629"/>
+          </a:xfrm>
+          <a:prstGeom prst="ellipse">
+            <a:avLst/>
+          </a:prstGeom>
+          <a:solidFill>
+            <a:srgbClr val="F3CABA"/>
+          </a:solidFill>
+          <a:ln w="19050">
+            <a:noFill/>
+          </a:ln>
+        </p:spPr>
+        <p:style>
+          <a:lnRef idx="2">
+            <a:schemeClr val="accent1">
+              <a:shade val="50000"/>
+            </a:schemeClr>
+          </a:lnRef>
+          <a:fillRef idx="1">
+            <a:schemeClr val="accent1"/>
+          </a:fillRef>
+          <a:effectRef idx="0">
+            <a:schemeClr val="accent1"/>
+          </a:effectRef>
+          <a:fontRef idx="minor">
+            <a:schemeClr val="lt1"/>
+          </a:fontRef>
+        </p:style>
+        <p:txBody>
+          <a:bodyPr rtlCol="0" anchor="ctr"/>
+          <a:lstStyle/>
+          <a:p>
+            <a:pPr algn="ctr"/>
+            <a:endParaRPr lang="en-US">
+              <a:solidFill>
+                <a:schemeClr val="accent2">
+                  <a:lumMod val="50000"/>
+                </a:schemeClr>
+              </a:solidFill>
+            </a:endParaRPr>
+          </a:p>
+        </p:txBody>
+      </p:sp>
+      <p:sp>
+        <p:nvSpPr>
+          <p:cNvPr id="1025" name="Oval 1024">
+            <a:extLst>
+              <a:ext uri="{FF2B5EF4-FFF2-40B4-BE49-F238E27FC236}">
+                <a16:creationId xmlns:a16="http://schemas.microsoft.com/office/drawing/2014/main" id="{CC525035-B838-0910-CEF9-79A16B107641}"/>
+              </a:ext>
+            </a:extLst>
+          </p:cNvPr>
+          <p:cNvSpPr/>
+          <p:nvPr/>
+        </p:nvSpPr>
+        <p:spPr>
+          <a:xfrm>
+            <a:off x="3267022" y="6060340"/>
+            <a:ext cx="141515" cy="130629"/>
+          </a:xfrm>
+          <a:prstGeom prst="ellipse">
+            <a:avLst/>
+          </a:prstGeom>
+          <a:solidFill>
+            <a:srgbClr val="F3CABA"/>
+          </a:solidFill>
+          <a:ln w="19050">
+            <a:noFill/>
+          </a:ln>
+        </p:spPr>
+        <p:style>
+          <a:lnRef idx="2">
+            <a:schemeClr val="accent1">
+              <a:shade val="50000"/>
+            </a:schemeClr>
+          </a:lnRef>
+          <a:fillRef idx="1">
+            <a:schemeClr val="accent1"/>
+          </a:fillRef>
+          <a:effectRef idx="0">
+            <a:schemeClr val="accent1"/>
+          </a:effectRef>
+          <a:fontRef idx="minor">
+            <a:schemeClr val="lt1"/>
+          </a:fontRef>
+        </p:style>
+        <p:txBody>
+          <a:bodyPr rtlCol="0" anchor="ctr"/>
+          <a:lstStyle/>
+          <a:p>
+            <a:pPr algn="ctr"/>
+            <a:endParaRPr lang="en-US">
+              <a:solidFill>
+                <a:schemeClr val="accent2">
+                  <a:lumMod val="50000"/>
+                </a:schemeClr>
+              </a:solidFill>
+            </a:endParaRPr>
+          </a:p>
+        </p:txBody>
+      </p:sp>
+      <p:sp>
+        <p:nvSpPr>
+          <p:cNvPr id="1027" name="Oval 1026">
+            <a:extLst>
+              <a:ext uri="{FF2B5EF4-FFF2-40B4-BE49-F238E27FC236}">
+                <a16:creationId xmlns:a16="http://schemas.microsoft.com/office/drawing/2014/main" id="{18F2381D-1FE8-6B2B-448E-5F9F6974851A}"/>
+              </a:ext>
+            </a:extLst>
+          </p:cNvPr>
+          <p:cNvSpPr/>
+          <p:nvPr/>
+        </p:nvSpPr>
+        <p:spPr>
+          <a:xfrm>
+            <a:off x="3742807" y="6058188"/>
+            <a:ext cx="141515" cy="130629"/>
+          </a:xfrm>
+          <a:prstGeom prst="ellipse">
+            <a:avLst/>
+          </a:prstGeom>
+          <a:solidFill>
+            <a:srgbClr val="F3CABA"/>
+          </a:solidFill>
+          <a:ln w="19050">
+            <a:noFill/>
+          </a:ln>
+        </p:spPr>
+        <p:style>
+          <a:lnRef idx="2">
+            <a:schemeClr val="accent1">
+              <a:shade val="50000"/>
+            </a:schemeClr>
+          </a:lnRef>
+          <a:fillRef idx="1">
+            <a:schemeClr val="accent1"/>
+          </a:fillRef>
+          <a:effectRef idx="0">
+            <a:schemeClr val="accent1"/>
+          </a:effectRef>
+          <a:fontRef idx="minor">
+            <a:schemeClr val="lt1"/>
+          </a:fontRef>
+        </p:style>
+        <p:txBody>
+          <a:bodyPr rtlCol="0" anchor="ctr"/>
+          <a:lstStyle/>
+          <a:p>
+            <a:pPr algn="ctr"/>
+            <a:endParaRPr lang="en-US">
+              <a:solidFill>
+                <a:schemeClr val="accent2">
+                  <a:lumMod val="50000"/>
+                </a:schemeClr>
+              </a:solidFill>
+            </a:endParaRPr>
+          </a:p>
+        </p:txBody>
+      </p:sp>
+      <p:sp>
+        <p:nvSpPr>
+          <p:cNvPr id="1028" name="Oval 1027">
+            <a:extLst>
+              <a:ext uri="{FF2B5EF4-FFF2-40B4-BE49-F238E27FC236}">
+                <a16:creationId xmlns:a16="http://schemas.microsoft.com/office/drawing/2014/main" id="{21937490-E407-683C-3052-B73439CE7ED2}"/>
+              </a:ext>
+            </a:extLst>
+          </p:cNvPr>
+          <p:cNvSpPr/>
+          <p:nvPr/>
+        </p:nvSpPr>
+        <p:spPr>
+          <a:xfrm>
+            <a:off x="2233676" y="6633224"/>
+            <a:ext cx="141515" cy="130629"/>
+          </a:xfrm>
+          <a:prstGeom prst="ellipse">
+            <a:avLst/>
+          </a:prstGeom>
+          <a:solidFill>
+            <a:srgbClr val="9C9EBE"/>
+          </a:solidFill>
+          <a:ln w="19050">
+            <a:noFill/>
+          </a:ln>
+        </p:spPr>
+        <p:style>
+          <a:lnRef idx="2">
+            <a:schemeClr val="accent1">
+              <a:shade val="50000"/>
+            </a:schemeClr>
+          </a:lnRef>
+          <a:fillRef idx="1">
+            <a:schemeClr val="accent1"/>
+          </a:fillRef>
+          <a:effectRef idx="0">
+            <a:schemeClr val="accent1"/>
+          </a:effectRef>
+          <a:fontRef idx="minor">
+            <a:schemeClr val="lt1"/>
+          </a:fontRef>
+        </p:style>
+        <p:txBody>
+          <a:bodyPr rtlCol="0" anchor="ctr"/>
+          <a:lstStyle/>
+          <a:p>
+            <a:pPr algn="ctr"/>
+            <a:endParaRPr lang="en-US">
+              <a:solidFill>
+                <a:schemeClr val="accent2">
+                  <a:lumMod val="50000"/>
+                </a:schemeClr>
+              </a:solidFill>
+            </a:endParaRPr>
+          </a:p>
+        </p:txBody>
+      </p:sp>
+      <p:sp>
+        <p:nvSpPr>
+          <p:cNvPr id="1029" name="Oval 1028">
+            <a:extLst>
+              <a:ext uri="{FF2B5EF4-FFF2-40B4-BE49-F238E27FC236}">
+                <a16:creationId xmlns:a16="http://schemas.microsoft.com/office/drawing/2014/main" id="{269DEF91-D307-5ADC-DE88-857F4A707774}"/>
+              </a:ext>
+            </a:extLst>
+          </p:cNvPr>
+          <p:cNvSpPr/>
+          <p:nvPr/>
+        </p:nvSpPr>
+        <p:spPr>
+          <a:xfrm>
+            <a:off x="2772651" y="6626900"/>
+            <a:ext cx="141515" cy="130629"/>
+          </a:xfrm>
+          <a:prstGeom prst="ellipse">
+            <a:avLst/>
+          </a:prstGeom>
+          <a:solidFill>
+            <a:srgbClr val="9C9EBE"/>
+          </a:solidFill>
+          <a:ln w="19050">
+            <a:noFill/>
+          </a:ln>
+        </p:spPr>
+        <p:style>
+          <a:lnRef idx="2">
+            <a:schemeClr val="accent1">
+              <a:shade val="50000"/>
+            </a:schemeClr>
+          </a:lnRef>
+          <a:fillRef idx="1">
+            <a:schemeClr val="accent1"/>
+          </a:fillRef>
+          <a:effectRef idx="0">
+            <a:schemeClr val="accent1"/>
+          </a:effectRef>
+          <a:fontRef idx="minor">
+            <a:schemeClr val="lt1"/>
+          </a:fontRef>
+        </p:style>
+        <p:txBody>
+          <a:bodyPr rtlCol="0" anchor="ctr"/>
+          <a:lstStyle/>
+          <a:p>
+            <a:pPr algn="ctr"/>
+            <a:endParaRPr lang="en-US">
+              <a:solidFill>
+                <a:schemeClr val="accent2">
+                  <a:lumMod val="50000"/>
+                </a:schemeClr>
+              </a:solidFill>
+            </a:endParaRPr>
+          </a:p>
+        </p:txBody>
+      </p:sp>
+      <p:sp>
+        <p:nvSpPr>
+          <p:cNvPr id="1030" name="Oval 1029">
+            <a:extLst>
+              <a:ext uri="{FF2B5EF4-FFF2-40B4-BE49-F238E27FC236}">
+                <a16:creationId xmlns:a16="http://schemas.microsoft.com/office/drawing/2014/main" id="{A87EEE3C-B534-3721-4898-0D709A2EB822}"/>
+              </a:ext>
+            </a:extLst>
+          </p:cNvPr>
+          <p:cNvSpPr/>
+          <p:nvPr/>
+        </p:nvSpPr>
+        <p:spPr>
+          <a:xfrm>
+            <a:off x="3575539" y="6621620"/>
+            <a:ext cx="141515" cy="130629"/>
+          </a:xfrm>
+          <a:prstGeom prst="ellipse">
+            <a:avLst/>
+          </a:prstGeom>
+          <a:solidFill>
+            <a:srgbClr val="9C9EBE"/>
+          </a:solidFill>
+          <a:ln w="19050">
+            <a:noFill/>
+          </a:ln>
+        </p:spPr>
+        <p:style>
+          <a:lnRef idx="2">
+            <a:schemeClr val="accent1">
+              <a:shade val="50000"/>
+            </a:schemeClr>
+          </a:lnRef>
+          <a:fillRef idx="1">
+            <a:schemeClr val="accent1"/>
+          </a:fillRef>
+          <a:effectRef idx="0">
+            <a:schemeClr val="accent1"/>
+          </a:effectRef>
+          <a:fontRef idx="minor">
+            <a:schemeClr val="lt1"/>
+          </a:fontRef>
+        </p:style>
+        <p:txBody>
+          <a:bodyPr rtlCol="0" anchor="ctr"/>
+          <a:lstStyle/>
+          <a:p>
+            <a:pPr algn="ctr"/>
+            <a:endParaRPr lang="en-US">
+              <a:solidFill>
+                <a:schemeClr val="accent2">
+                  <a:lumMod val="50000"/>
+                </a:schemeClr>
+              </a:solidFill>
+            </a:endParaRPr>
+          </a:p>
+        </p:txBody>
+      </p:sp>
+      <p:cxnSp>
+        <p:nvCxnSpPr>
+          <p:cNvPr id="1031" name="Straight Connector 1030">
+            <a:extLst>
+              <a:ext uri="{FF2B5EF4-FFF2-40B4-BE49-F238E27FC236}">
+                <a16:creationId xmlns:a16="http://schemas.microsoft.com/office/drawing/2014/main" id="{9DC352BB-5D5F-FD38-8565-9B9F0DB1A9CF}"/>
+              </a:ext>
+            </a:extLst>
+          </p:cNvPr>
+          <p:cNvCxnSpPr>
+            <a:cxnSpLocks/>
+          </p:cNvCxnSpPr>
+          <p:nvPr/>
+        </p:nvCxnSpPr>
+        <p:spPr>
+          <a:xfrm flipH="1">
+            <a:off x="1294075" y="7250495"/>
+            <a:ext cx="2645901" cy="0"/>
+          </a:xfrm>
+          <a:prstGeom prst="line">
+            <a:avLst/>
+          </a:prstGeom>
+          <a:ln w="28575">
+            <a:solidFill>
+              <a:schemeClr val="tx1"/>
+            </a:solidFill>
+          </a:ln>
+        </p:spPr>
+        <p:style>
+          <a:lnRef idx="1">
+            <a:schemeClr val="accent1"/>
+          </a:lnRef>
+          <a:fillRef idx="0">
+            <a:schemeClr val="accent1"/>
+          </a:fillRef>
+          <a:effectRef idx="0">
+            <a:schemeClr val="accent1"/>
+          </a:effectRef>
+          <a:fontRef idx="minor">
+            <a:schemeClr val="tx1"/>
+          </a:fontRef>
+        </p:style>
+      </p:cxnSp>
+      <p:cxnSp>
+        <p:nvCxnSpPr>
+          <p:cNvPr id="1032" name="Straight Connector 1031">
+            <a:extLst>
+              <a:ext uri="{FF2B5EF4-FFF2-40B4-BE49-F238E27FC236}">
+                <a16:creationId xmlns:a16="http://schemas.microsoft.com/office/drawing/2014/main" id="{FFADD811-A3E1-5070-9969-4ACD8E3346DD}"/>
+              </a:ext>
+            </a:extLst>
+          </p:cNvPr>
+          <p:cNvCxnSpPr>
+            <a:cxnSpLocks/>
+          </p:cNvCxnSpPr>
+          <p:nvPr/>
+        </p:nvCxnSpPr>
+        <p:spPr>
+          <a:xfrm>
+            <a:off x="1283188" y="4757271"/>
+            <a:ext cx="0" cy="2504110"/>
+          </a:xfrm>
+          <a:prstGeom prst="line">
+            <a:avLst/>
+          </a:prstGeom>
+          <a:ln w="28575">
+            <a:solidFill>
+              <a:schemeClr val="tx1"/>
+            </a:solidFill>
+          </a:ln>
+        </p:spPr>
+        <p:style>
+          <a:lnRef idx="1">
+            <a:schemeClr val="accent1"/>
+          </a:lnRef>
+          <a:fillRef idx="0">
+            <a:schemeClr val="accent1"/>
+          </a:fillRef>
+          <a:effectRef idx="0">
+            <a:schemeClr val="accent1"/>
+          </a:effectRef>
+          <a:fontRef idx="minor">
+            <a:schemeClr val="tx1"/>
+          </a:fontRef>
+        </p:style>
+      </p:cxnSp>
+      <p:sp>
+        <p:nvSpPr>
+          <p:cNvPr id="1033" name="TextBox 1032">
+            <a:extLst>
+              <a:ext uri="{FF2B5EF4-FFF2-40B4-BE49-F238E27FC236}">
+                <a16:creationId xmlns:a16="http://schemas.microsoft.com/office/drawing/2014/main" id="{AFAB3690-8F19-403D-1359-8FF4B9F82E8B}"/>
+              </a:ext>
+            </a:extLst>
+          </p:cNvPr>
+          <p:cNvSpPr txBox="1"/>
+          <p:nvPr/>
+        </p:nvSpPr>
+        <p:spPr>
+          <a:xfrm>
+            <a:off x="2095183" y="4925351"/>
+            <a:ext cx="2032232" cy="338554"/>
+          </a:xfrm>
+          <a:prstGeom prst="rect">
+            <a:avLst/>
+          </a:prstGeom>
+          <a:noFill/>
+        </p:spPr>
+        <p:txBody>
+          <a:bodyPr wrap="square" rtlCol="0">
+            <a:spAutoFit/>
+          </a:bodyPr>
+          <a:lstStyle/>
+          <a:p>
+            <a:pPr algn="ctr"/>
+            <a:r>
+              <a:rPr lang="en-US" sz="1600" i="1" dirty="0">
+                <a:solidFill>
+                  <a:schemeClr val="bg2">
+                    <a:lumMod val="75000"/>
+                  </a:schemeClr>
+                </a:solidFill>
+                <a:latin typeface="Arial" panose="020B0604020202020204" pitchFamily="34" charset="0"/>
+                <a:cs typeface="Arial" panose="020B0604020202020204" pitchFamily="34" charset="0"/>
+              </a:rPr>
+              <a:t>1:1</a:t>
+            </a:r>
+          </a:p>
+        </p:txBody>
+      </p:sp>
+      <p:sp>
+        <p:nvSpPr>
+          <p:cNvPr id="1035" name="TextBox 1034">
+            <a:extLst>
+              <a:ext uri="{FF2B5EF4-FFF2-40B4-BE49-F238E27FC236}">
+                <a16:creationId xmlns:a16="http://schemas.microsoft.com/office/drawing/2014/main" id="{401F6452-4BCF-D391-4EE7-FBE4E6C7DB24}"/>
+              </a:ext>
+            </a:extLst>
+          </p:cNvPr>
+          <p:cNvSpPr txBox="1"/>
+          <p:nvPr/>
+        </p:nvSpPr>
+        <p:spPr>
+          <a:xfrm rot="16200000">
+            <a:off x="-624630" y="5840607"/>
+            <a:ext cx="2900904" cy="338554"/>
+          </a:xfrm>
+          <a:prstGeom prst="rect">
+            <a:avLst/>
+          </a:prstGeom>
+          <a:noFill/>
+        </p:spPr>
+        <p:txBody>
+          <a:bodyPr wrap="square" rtlCol="0">
+            <a:spAutoFit/>
+          </a:bodyPr>
+          <a:lstStyle/>
+          <a:p>
+            <a:pPr algn="ctr"/>
+            <a:r>
+              <a:rPr lang="en-US" sz="1600" dirty="0">
+                <a:latin typeface="Arial" panose="020B0604020202020204" pitchFamily="34" charset="0"/>
+                <a:cs typeface="Arial" panose="020B0604020202020204" pitchFamily="34" charset="0"/>
+              </a:rPr>
+              <a:t>Range expansion rate (km/yr)</a:t>
+            </a:r>
+          </a:p>
+        </p:txBody>
+      </p:sp>
+      <p:sp>
+        <p:nvSpPr>
+          <p:cNvPr id="1036" name="Oval 1035">
+            <a:extLst>
+              <a:ext uri="{FF2B5EF4-FFF2-40B4-BE49-F238E27FC236}">
+                <a16:creationId xmlns:a16="http://schemas.microsoft.com/office/drawing/2014/main" id="{D2AA29B6-45C0-D1E7-02BF-7B7437742845}"/>
+              </a:ext>
+            </a:extLst>
+          </p:cNvPr>
+          <p:cNvSpPr/>
+          <p:nvPr/>
+        </p:nvSpPr>
+        <p:spPr>
+          <a:xfrm>
+            <a:off x="3322721" y="4343409"/>
+            <a:ext cx="141515" cy="130629"/>
+          </a:xfrm>
+          <a:prstGeom prst="ellipse">
+            <a:avLst/>
+          </a:prstGeom>
+          <a:solidFill>
+            <a:schemeClr val="bg1"/>
+          </a:solidFill>
+          <a:ln w="19050">
+            <a:solidFill>
+              <a:schemeClr val="bg1"/>
+            </a:solidFill>
+          </a:ln>
+        </p:spPr>
+        <p:style>
+          <a:lnRef idx="2">
+            <a:schemeClr val="accent1">
+              <a:shade val="50000"/>
+            </a:schemeClr>
+          </a:lnRef>
+          <a:fillRef idx="1">
+            <a:schemeClr val="accent1"/>
+          </a:fillRef>
+          <a:effectRef idx="0">
+            <a:schemeClr val="accent1"/>
+          </a:effectRef>
+          <a:fontRef idx="minor">
+            <a:schemeClr val="lt1"/>
+          </a:fontRef>
+        </p:style>
+        <p:txBody>
+          <a:bodyPr rtlCol="0" anchor="ctr"/>
+          <a:lstStyle/>
+          <a:p>
+            <a:pPr algn="ctr"/>
+            <a:endParaRPr lang="en-US">
+              <a:solidFill>
+                <a:schemeClr val="accent2">
+                  <a:lumMod val="50000"/>
+                </a:schemeClr>
+              </a:solidFill>
+            </a:endParaRPr>
+          </a:p>
+        </p:txBody>
+      </p:sp>
+      <p:sp>
+        <p:nvSpPr>
+          <p:cNvPr id="1037" name="TextBox 1036">
+            <a:extLst>
+              <a:ext uri="{FF2B5EF4-FFF2-40B4-BE49-F238E27FC236}">
+                <a16:creationId xmlns:a16="http://schemas.microsoft.com/office/drawing/2014/main" id="{4F7285F9-E473-3351-BF40-14F3A0626619}"/>
+              </a:ext>
+            </a:extLst>
+          </p:cNvPr>
+          <p:cNvSpPr txBox="1"/>
+          <p:nvPr/>
+        </p:nvSpPr>
+        <p:spPr>
+          <a:xfrm>
+            <a:off x="7425044" y="5012654"/>
+            <a:ext cx="1655294" cy="830997"/>
+          </a:xfrm>
+          <a:prstGeom prst="rect">
+            <a:avLst/>
+          </a:prstGeom>
+          <a:noFill/>
+        </p:spPr>
+        <p:txBody>
+          <a:bodyPr wrap="square" rtlCol="0">
+            <a:spAutoFit/>
+          </a:bodyPr>
+          <a:lstStyle/>
+          <a:p>
+            <a:pPr algn="ctr"/>
+            <a:r>
+              <a:rPr lang="en-US" sz="1600" dirty="0">
+                <a:latin typeface="Arial" panose="020B0604020202020204" pitchFamily="34" charset="0"/>
+                <a:cs typeface="Arial" panose="020B0604020202020204" pitchFamily="34" charset="0"/>
+              </a:rPr>
+              <a:t>Velocity of climate change (km/yr)</a:t>
+            </a:r>
+          </a:p>
+        </p:txBody>
+      </p:sp>
+      <p:pic>
+        <p:nvPicPr>
+          <p:cNvPr id="1041" name="Picture 1040">
+            <a:extLst>
+              <a:ext uri="{FF2B5EF4-FFF2-40B4-BE49-F238E27FC236}">
+                <a16:creationId xmlns:a16="http://schemas.microsoft.com/office/drawing/2014/main" id="{F9E775AE-8FE8-E0E4-329B-53DF68A23EB7}"/>
+              </a:ext>
+            </a:extLst>
+          </p:cNvPr>
+          <p:cNvPicPr>
+            <a:picLocks noChangeAspect="1"/>
+          </p:cNvPicPr>
+          <p:nvPr/>
+        </p:nvPicPr>
+        <p:blipFill>
+          <a:blip r:embed="rId6"/>
+          <a:stretch>
+            <a:fillRect/>
+          </a:stretch>
+        </p:blipFill>
+        <p:spPr>
+          <a:xfrm>
+            <a:off x="8233777" y="8881407"/>
+            <a:ext cx="1004705" cy="2466095"/>
+          </a:xfrm>
+          <a:prstGeom prst="rect">
+            <a:avLst/>
+          </a:prstGeom>
+        </p:spPr>
+      </p:pic>
+      <p:sp>
+        <p:nvSpPr>
+          <p:cNvPr id="1042" name="TextBox 1041">
+            <a:extLst>
+              <a:ext uri="{FF2B5EF4-FFF2-40B4-BE49-F238E27FC236}">
+                <a16:creationId xmlns:a16="http://schemas.microsoft.com/office/drawing/2014/main" id="{59A37552-565B-73B7-D48B-0D208304874F}"/>
+              </a:ext>
+            </a:extLst>
+          </p:cNvPr>
+          <p:cNvSpPr txBox="1"/>
+          <p:nvPr/>
+        </p:nvSpPr>
+        <p:spPr>
+          <a:xfrm>
+            <a:off x="2484857" y="409168"/>
             <a:ext cx="569481" cy="338554"/>
           </a:xfrm>
           <a:prstGeom prst="rect">
@@ -4273,336 +5765,10 @@
       </p:sp>
       <p:sp>
         <p:nvSpPr>
-          <p:cNvPr id="36" name="Oval 35">
-            <a:extLst>
-              <a:ext uri="{FF2B5EF4-FFF2-40B4-BE49-F238E27FC236}">
-                <a16:creationId xmlns:a16="http://schemas.microsoft.com/office/drawing/2014/main" id="{BEE8699E-F273-6FF7-DC63-85059E130FD0}"/>
-              </a:ext>
-            </a:extLst>
-          </p:cNvPr>
-          <p:cNvSpPr/>
-          <p:nvPr/>
-        </p:nvSpPr>
-        <p:spPr>
-          <a:xfrm>
-            <a:off x="1894849" y="6517743"/>
-            <a:ext cx="141515" cy="130629"/>
-          </a:xfrm>
-          <a:prstGeom prst="ellipse">
-            <a:avLst/>
-          </a:prstGeom>
-          <a:solidFill>
-            <a:srgbClr val="B2172B"/>
-          </a:solidFill>
-          <a:ln w="19050">
-            <a:solidFill>
-              <a:schemeClr val="tx1"/>
-            </a:solidFill>
-          </a:ln>
-        </p:spPr>
-        <p:style>
-          <a:lnRef idx="2">
-            <a:schemeClr val="accent1">
-              <a:shade val="50000"/>
-            </a:schemeClr>
-          </a:lnRef>
-          <a:fillRef idx="1">
-            <a:schemeClr val="accent1"/>
-          </a:fillRef>
-          <a:effectRef idx="0">
-            <a:schemeClr val="accent1"/>
-          </a:effectRef>
-          <a:fontRef idx="minor">
-            <a:schemeClr val="lt1"/>
-          </a:fontRef>
-        </p:style>
-        <p:txBody>
-          <a:bodyPr rtlCol="0" anchor="ctr"/>
-          <a:lstStyle/>
-          <a:p>
-            <a:pPr algn="ctr"/>
-            <a:endParaRPr lang="en-US">
-              <a:solidFill>
-                <a:schemeClr val="accent2">
-                  <a:lumMod val="50000"/>
-                </a:schemeClr>
-              </a:solidFill>
-            </a:endParaRPr>
-          </a:p>
-        </p:txBody>
-      </p:sp>
-      <p:sp>
-        <p:nvSpPr>
-          <p:cNvPr id="37" name="Oval 36">
-            <a:extLst>
-              <a:ext uri="{FF2B5EF4-FFF2-40B4-BE49-F238E27FC236}">
-                <a16:creationId xmlns:a16="http://schemas.microsoft.com/office/drawing/2014/main" id="{354D3C8F-B1BA-6D29-DC90-52EDBF833981}"/>
-              </a:ext>
-            </a:extLst>
-          </p:cNvPr>
-          <p:cNvSpPr/>
-          <p:nvPr/>
-        </p:nvSpPr>
-        <p:spPr>
-          <a:xfrm>
-            <a:off x="2747850" y="5656669"/>
-            <a:ext cx="141515" cy="130629"/>
-          </a:xfrm>
-          <a:prstGeom prst="ellipse">
-            <a:avLst/>
-          </a:prstGeom>
-          <a:solidFill>
-            <a:srgbClr val="B2172B"/>
-          </a:solidFill>
-          <a:ln w="19050">
-            <a:solidFill>
-              <a:schemeClr val="tx1"/>
-            </a:solidFill>
-          </a:ln>
-        </p:spPr>
-        <p:style>
-          <a:lnRef idx="2">
-            <a:schemeClr val="accent1">
-              <a:shade val="50000"/>
-            </a:schemeClr>
-          </a:lnRef>
-          <a:fillRef idx="1">
-            <a:schemeClr val="accent1"/>
-          </a:fillRef>
-          <a:effectRef idx="0">
-            <a:schemeClr val="accent1"/>
-          </a:effectRef>
-          <a:fontRef idx="minor">
-            <a:schemeClr val="lt1"/>
-          </a:fontRef>
-        </p:style>
-        <p:txBody>
-          <a:bodyPr rtlCol="0" anchor="ctr"/>
-          <a:lstStyle/>
-          <a:p>
-            <a:pPr algn="ctr"/>
-            <a:endParaRPr lang="en-US">
-              <a:solidFill>
-                <a:schemeClr val="accent2">
-                  <a:lumMod val="50000"/>
-                </a:schemeClr>
-              </a:solidFill>
-            </a:endParaRPr>
-          </a:p>
-        </p:txBody>
-      </p:sp>
-      <p:sp>
-        <p:nvSpPr>
-          <p:cNvPr id="38" name="Oval 37">
-            <a:extLst>
-              <a:ext uri="{FF2B5EF4-FFF2-40B4-BE49-F238E27FC236}">
-                <a16:creationId xmlns:a16="http://schemas.microsoft.com/office/drawing/2014/main" id="{10BECA27-75D0-9CB3-CB85-06E4F830C2EA}"/>
-              </a:ext>
-            </a:extLst>
-          </p:cNvPr>
-          <p:cNvSpPr/>
-          <p:nvPr/>
-        </p:nvSpPr>
-        <p:spPr>
-          <a:xfrm>
-            <a:off x="3394086" y="5545878"/>
-            <a:ext cx="141515" cy="130629"/>
-          </a:xfrm>
-          <a:prstGeom prst="ellipse">
-            <a:avLst/>
-          </a:prstGeom>
-          <a:solidFill>
-            <a:srgbClr val="B2172B"/>
-          </a:solidFill>
-          <a:ln>
-            <a:solidFill>
-              <a:srgbClr val="B2172B"/>
-            </a:solidFill>
-          </a:ln>
-        </p:spPr>
-        <p:style>
-          <a:lnRef idx="2">
-            <a:schemeClr val="accent1">
-              <a:shade val="50000"/>
-            </a:schemeClr>
-          </a:lnRef>
-          <a:fillRef idx="1">
-            <a:schemeClr val="accent1"/>
-          </a:fillRef>
-          <a:effectRef idx="0">
-            <a:schemeClr val="accent1"/>
-          </a:effectRef>
-          <a:fontRef idx="minor">
-            <a:schemeClr val="lt1"/>
-          </a:fontRef>
-        </p:style>
-        <p:txBody>
-          <a:bodyPr rtlCol="0" anchor="ctr"/>
-          <a:lstStyle/>
-          <a:p>
-            <a:pPr algn="ctr"/>
-            <a:endParaRPr lang="en-US">
-              <a:solidFill>
-                <a:schemeClr val="accent2">
-                  <a:lumMod val="50000"/>
-                </a:schemeClr>
-              </a:solidFill>
-            </a:endParaRPr>
-          </a:p>
-        </p:txBody>
-      </p:sp>
-      <p:sp>
-        <p:nvSpPr>
-          <p:cNvPr id="39" name="Oval 38">
-            <a:extLst>
-              <a:ext uri="{FF2B5EF4-FFF2-40B4-BE49-F238E27FC236}">
-                <a16:creationId xmlns:a16="http://schemas.microsoft.com/office/drawing/2014/main" id="{823A49DE-0586-7321-F6C6-EB2C3AC37273}"/>
-              </a:ext>
-            </a:extLst>
-          </p:cNvPr>
-          <p:cNvSpPr/>
-          <p:nvPr/>
-        </p:nvSpPr>
-        <p:spPr>
-          <a:xfrm>
-            <a:off x="2460923" y="5960644"/>
-            <a:ext cx="141515" cy="130629"/>
-          </a:xfrm>
-          <a:prstGeom prst="ellipse">
-            <a:avLst/>
-          </a:prstGeom>
-          <a:solidFill>
-            <a:srgbClr val="B2172B"/>
-          </a:solidFill>
-          <a:ln w="19050">
-            <a:solidFill>
-              <a:schemeClr val="tx1"/>
-            </a:solidFill>
-          </a:ln>
-        </p:spPr>
-        <p:style>
-          <a:lnRef idx="2">
-            <a:schemeClr val="accent1">
-              <a:shade val="50000"/>
-            </a:schemeClr>
-          </a:lnRef>
-          <a:fillRef idx="1">
-            <a:schemeClr val="accent1"/>
-          </a:fillRef>
-          <a:effectRef idx="0">
-            <a:schemeClr val="accent1"/>
-          </a:effectRef>
-          <a:fontRef idx="minor">
-            <a:schemeClr val="lt1"/>
-          </a:fontRef>
-        </p:style>
-        <p:txBody>
-          <a:bodyPr rtlCol="0" anchor="ctr"/>
-          <a:lstStyle/>
-          <a:p>
-            <a:pPr algn="ctr"/>
-            <a:endParaRPr lang="en-US">
-              <a:solidFill>
-                <a:schemeClr val="accent2">
-                  <a:lumMod val="50000"/>
-                </a:schemeClr>
-              </a:solidFill>
-            </a:endParaRPr>
-          </a:p>
-        </p:txBody>
-      </p:sp>
-      <p:cxnSp>
-        <p:nvCxnSpPr>
-          <p:cNvPr id="40" name="Straight Connector 39">
-            <a:extLst>
-              <a:ext uri="{FF2B5EF4-FFF2-40B4-BE49-F238E27FC236}">
-                <a16:creationId xmlns:a16="http://schemas.microsoft.com/office/drawing/2014/main" id="{238696BA-A5E6-6909-9553-555066BC9A22}"/>
-              </a:ext>
-            </a:extLst>
-          </p:cNvPr>
-          <p:cNvCxnSpPr>
-            <a:cxnSpLocks/>
-          </p:cNvCxnSpPr>
-          <p:nvPr/>
-        </p:nvCxnSpPr>
-        <p:spPr>
-          <a:xfrm>
-            <a:off x="4568658" y="4783827"/>
-            <a:ext cx="0" cy="2491683"/>
-          </a:xfrm>
-          <a:prstGeom prst="line">
-            <a:avLst/>
-          </a:prstGeom>
-          <a:ln w="28575">
-            <a:solidFill>
-              <a:schemeClr val="tx1"/>
-            </a:solidFill>
-          </a:ln>
-        </p:spPr>
-        <p:style>
-          <a:lnRef idx="1">
-            <a:schemeClr val="accent1"/>
-          </a:lnRef>
-          <a:fillRef idx="0">
-            <a:schemeClr val="accent1"/>
-          </a:fillRef>
-          <a:effectRef idx="0">
-            <a:schemeClr val="accent1"/>
-          </a:effectRef>
-          <a:fontRef idx="minor">
-            <a:schemeClr val="tx1"/>
-          </a:fontRef>
-        </p:style>
-      </p:cxnSp>
-      <p:cxnSp>
-        <p:nvCxnSpPr>
-          <p:cNvPr id="41" name="Straight Connector 40">
-            <a:extLst>
-              <a:ext uri="{FF2B5EF4-FFF2-40B4-BE49-F238E27FC236}">
-                <a16:creationId xmlns:a16="http://schemas.microsoft.com/office/drawing/2014/main" id="{BC654A08-4197-1F28-F560-69090ED02B1C}"/>
-              </a:ext>
-            </a:extLst>
-          </p:cNvPr>
-          <p:cNvCxnSpPr>
-            <a:cxnSpLocks/>
-          </p:cNvCxnSpPr>
-          <p:nvPr/>
-        </p:nvCxnSpPr>
-        <p:spPr>
-          <a:xfrm flipH="1">
-            <a:off x="4579544" y="7264623"/>
-            <a:ext cx="2660360" cy="0"/>
-          </a:xfrm>
-          <a:prstGeom prst="line">
-            <a:avLst/>
-          </a:prstGeom>
-          <a:ln w="28575">
-            <a:solidFill>
-              <a:schemeClr val="tx1"/>
-            </a:solidFill>
-          </a:ln>
-        </p:spPr>
-        <p:style>
-          <a:lnRef idx="1">
-            <a:schemeClr val="accent1"/>
-          </a:lnRef>
-          <a:fillRef idx="0">
-            <a:schemeClr val="accent1"/>
-          </a:fillRef>
-          <a:effectRef idx="0">
-            <a:schemeClr val="accent1"/>
-          </a:effectRef>
-          <a:fontRef idx="minor">
-            <a:schemeClr val="tx1"/>
-          </a:fontRef>
-        </p:style>
-      </p:cxnSp>
-      <p:sp>
-        <p:nvSpPr>
-          <p:cNvPr id="42" name="TextBox 41">
-            <a:extLst>
-              <a:ext uri="{FF2B5EF4-FFF2-40B4-BE49-F238E27FC236}">
-                <a16:creationId xmlns:a16="http://schemas.microsoft.com/office/drawing/2014/main" id="{A65315F1-FD2B-9078-9C44-2367AACD6439}"/>
+          <p:cNvPr id="1045" name="TextBox 1044">
+            <a:extLst>
+              <a:ext uri="{FF2B5EF4-FFF2-40B4-BE49-F238E27FC236}">
+                <a16:creationId xmlns:a16="http://schemas.microsoft.com/office/drawing/2014/main" id="{7AE593D6-4D6F-F226-6938-DEE12E1EFF8C}"/>
               </a:ext>
             </a:extLst>
           </p:cNvPr>
@@ -4611,209 +5777,7 @@
         </p:nvSpPr>
         <p:spPr>
           <a:xfrm>
-            <a:off x="4152322" y="7473954"/>
-            <a:ext cx="3610227" cy="584775"/>
-          </a:xfrm>
-          <a:prstGeom prst="rect">
-            <a:avLst/>
-          </a:prstGeom>
-          <a:noFill/>
-        </p:spPr>
-        <p:txBody>
-          <a:bodyPr wrap="square" rtlCol="0">
-            <a:spAutoFit/>
-          </a:bodyPr>
-          <a:lstStyle/>
-          <a:p>
-            <a:pPr algn="ctr"/>
-            <a:r>
-              <a:rPr lang="en-US" sz="1600" dirty="0">
-                <a:latin typeface="Arial" panose="020B0604020202020204" pitchFamily="34" charset="0"/>
-                <a:cs typeface="Arial" panose="020B0604020202020204" pitchFamily="34" charset="0"/>
-              </a:rPr>
-              <a:t>Minimum of potential dispersal rate and velocity of climate change (km/yr)</a:t>
-            </a:r>
-          </a:p>
-        </p:txBody>
-      </p:sp>
-      <p:sp>
-        <p:nvSpPr>
-          <p:cNvPr id="43" name="TextBox 42">
-            <a:extLst>
-              <a:ext uri="{FF2B5EF4-FFF2-40B4-BE49-F238E27FC236}">
-                <a16:creationId xmlns:a16="http://schemas.microsoft.com/office/drawing/2014/main" id="{F7E81AD1-9BE2-8851-3F5F-C9A721D7075B}"/>
-              </a:ext>
-            </a:extLst>
-          </p:cNvPr>
-          <p:cNvSpPr txBox="1"/>
-          <p:nvPr/>
-        </p:nvSpPr>
-        <p:spPr>
-          <a:xfrm>
-            <a:off x="4262617" y="4276841"/>
-            <a:ext cx="269626" cy="2677656"/>
-          </a:xfrm>
-          <a:prstGeom prst="rect">
-            <a:avLst/>
-          </a:prstGeom>
-          <a:noFill/>
-        </p:spPr>
-        <p:txBody>
-          <a:bodyPr wrap="none" rtlCol="0">
-            <a:spAutoFit/>
-          </a:bodyPr>
-          <a:lstStyle/>
-          <a:p>
-            <a:endParaRPr lang="en-US" sz="1200" dirty="0">
-              <a:latin typeface="Arial" panose="020B0604020202020204" pitchFamily="34" charset="0"/>
-              <a:cs typeface="Arial" panose="020B0604020202020204" pitchFamily="34" charset="0"/>
-            </a:endParaRPr>
-          </a:p>
-          <a:p>
-            <a:endParaRPr lang="en-US" sz="1200" dirty="0">
-              <a:latin typeface="Arial" panose="020B0604020202020204" pitchFamily="34" charset="0"/>
-              <a:cs typeface="Arial" panose="020B0604020202020204" pitchFamily="34" charset="0"/>
-            </a:endParaRPr>
-          </a:p>
-          <a:p>
-            <a:endParaRPr lang="en-US" sz="1200" dirty="0">
-              <a:latin typeface="Arial" panose="020B0604020202020204" pitchFamily="34" charset="0"/>
-              <a:cs typeface="Arial" panose="020B0604020202020204" pitchFamily="34" charset="0"/>
-            </a:endParaRPr>
-          </a:p>
-          <a:p>
-            <a:r>
-              <a:rPr lang="en-US" sz="1200" dirty="0">
-                <a:latin typeface="Arial" panose="020B0604020202020204" pitchFamily="34" charset="0"/>
-                <a:cs typeface="Arial" panose="020B0604020202020204" pitchFamily="34" charset="0"/>
-              </a:rPr>
-              <a:t>4</a:t>
-            </a:r>
-          </a:p>
-          <a:p>
-            <a:endParaRPr lang="en-US" sz="1200" dirty="0">
-              <a:latin typeface="Arial" panose="020B0604020202020204" pitchFamily="34" charset="0"/>
-              <a:cs typeface="Arial" panose="020B0604020202020204" pitchFamily="34" charset="0"/>
-            </a:endParaRPr>
-          </a:p>
-          <a:p>
-            <a:endParaRPr lang="en-US" sz="1200" dirty="0">
-              <a:latin typeface="Arial" panose="020B0604020202020204" pitchFamily="34" charset="0"/>
-              <a:cs typeface="Arial" panose="020B0604020202020204" pitchFamily="34" charset="0"/>
-            </a:endParaRPr>
-          </a:p>
-          <a:p>
-            <a:r>
-              <a:rPr lang="en-US" sz="1200" dirty="0">
-                <a:latin typeface="Arial" panose="020B0604020202020204" pitchFamily="34" charset="0"/>
-                <a:cs typeface="Arial" panose="020B0604020202020204" pitchFamily="34" charset="0"/>
-              </a:rPr>
-              <a:t>3</a:t>
-            </a:r>
-          </a:p>
-          <a:p>
-            <a:endParaRPr lang="en-US" sz="1200" dirty="0">
-              <a:latin typeface="Arial" panose="020B0604020202020204" pitchFamily="34" charset="0"/>
-              <a:cs typeface="Arial" panose="020B0604020202020204" pitchFamily="34" charset="0"/>
-            </a:endParaRPr>
-          </a:p>
-          <a:p>
-            <a:endParaRPr lang="en-US" sz="1200" dirty="0">
-              <a:latin typeface="Arial" panose="020B0604020202020204" pitchFamily="34" charset="0"/>
-              <a:cs typeface="Arial" panose="020B0604020202020204" pitchFamily="34" charset="0"/>
-            </a:endParaRPr>
-          </a:p>
-          <a:p>
-            <a:r>
-              <a:rPr lang="en-US" sz="1200" dirty="0">
-                <a:latin typeface="Arial" panose="020B0604020202020204" pitchFamily="34" charset="0"/>
-                <a:cs typeface="Arial" panose="020B0604020202020204" pitchFamily="34" charset="0"/>
-              </a:rPr>
-              <a:t>2</a:t>
-            </a:r>
-          </a:p>
-          <a:p>
-            <a:endParaRPr lang="en-US" sz="1200" dirty="0">
-              <a:latin typeface="Arial" panose="020B0604020202020204" pitchFamily="34" charset="0"/>
-              <a:cs typeface="Arial" panose="020B0604020202020204" pitchFamily="34" charset="0"/>
-            </a:endParaRPr>
-          </a:p>
-          <a:p>
-            <a:endParaRPr lang="en-US" sz="1200" dirty="0">
-              <a:latin typeface="Arial" panose="020B0604020202020204" pitchFamily="34" charset="0"/>
-              <a:cs typeface="Arial" panose="020B0604020202020204" pitchFamily="34" charset="0"/>
-            </a:endParaRPr>
-          </a:p>
-          <a:p>
-            <a:r>
-              <a:rPr lang="en-US" sz="1200" dirty="0">
-                <a:latin typeface="Arial" panose="020B0604020202020204" pitchFamily="34" charset="0"/>
-                <a:cs typeface="Arial" panose="020B0604020202020204" pitchFamily="34" charset="0"/>
-              </a:rPr>
-              <a:t>1</a:t>
-            </a:r>
-          </a:p>
-          <a:p>
-            <a:endParaRPr lang="en-US" sz="1200" dirty="0">
-              <a:latin typeface="Arial" panose="020B0604020202020204" pitchFamily="34" charset="0"/>
-              <a:cs typeface="Arial" panose="020B0604020202020204" pitchFamily="34" charset="0"/>
-            </a:endParaRPr>
-          </a:p>
-        </p:txBody>
-      </p:sp>
-      <p:sp>
-        <p:nvSpPr>
-          <p:cNvPr id="44" name="TextBox 43">
-            <a:extLst>
-              <a:ext uri="{FF2B5EF4-FFF2-40B4-BE49-F238E27FC236}">
-                <a16:creationId xmlns:a16="http://schemas.microsoft.com/office/drawing/2014/main" id="{D1618240-1B4F-D3A8-8997-1D703EBC5607}"/>
-              </a:ext>
-            </a:extLst>
-          </p:cNvPr>
-          <p:cNvSpPr txBox="1"/>
-          <p:nvPr/>
-        </p:nvSpPr>
-        <p:spPr>
-          <a:xfrm>
-            <a:off x="5040051" y="7286259"/>
-            <a:ext cx="2891743" cy="276999"/>
-          </a:xfrm>
-          <a:prstGeom prst="rect">
-            <a:avLst/>
-          </a:prstGeom>
-          <a:noFill/>
-        </p:spPr>
-        <p:txBody>
-          <a:bodyPr wrap="square" rtlCol="0">
-            <a:spAutoFit/>
-          </a:bodyPr>
-          <a:lstStyle/>
-          <a:p>
-            <a:r>
-              <a:rPr lang="en-US" sz="1200" dirty="0">
-                <a:latin typeface="Arial" panose="020B0604020202020204" pitchFamily="34" charset="0"/>
-                <a:cs typeface="Arial" panose="020B0604020202020204" pitchFamily="34" charset="0"/>
-              </a:rPr>
-              <a:t>1            2            3            4            </a:t>
-            </a:r>
-          </a:p>
-        </p:txBody>
-      </p:sp>
-      <p:sp>
-        <p:nvSpPr>
-          <p:cNvPr id="59" name="TextBox 58">
-            <a:extLst>
-              <a:ext uri="{FF2B5EF4-FFF2-40B4-BE49-F238E27FC236}">
-                <a16:creationId xmlns:a16="http://schemas.microsoft.com/office/drawing/2014/main" id="{A27BEDD4-7EE8-86A2-AC37-766D65FFEB9F}"/>
-              </a:ext>
-            </a:extLst>
-          </p:cNvPr>
-          <p:cNvSpPr txBox="1"/>
-          <p:nvPr/>
-        </p:nvSpPr>
-        <p:spPr>
-          <a:xfrm>
-            <a:off x="4484133" y="4680299"/>
+            <a:off x="6388968" y="409168"/>
             <a:ext cx="569481" cy="338554"/>
           </a:xfrm>
           <a:prstGeom prst="rect">
@@ -4845,684 +5809,10 @@
       </p:sp>
       <p:sp>
         <p:nvSpPr>
-          <p:cNvPr id="60" name="Oval 59">
-            <a:extLst>
-              <a:ext uri="{FF2B5EF4-FFF2-40B4-BE49-F238E27FC236}">
-                <a16:creationId xmlns:a16="http://schemas.microsoft.com/office/drawing/2014/main" id="{4C5D6DC3-B351-79DF-ACBA-5621C4D99514}"/>
-              </a:ext>
-            </a:extLst>
-          </p:cNvPr>
-          <p:cNvSpPr/>
-          <p:nvPr/>
-        </p:nvSpPr>
-        <p:spPr>
-          <a:xfrm>
-            <a:off x="2253085" y="6155908"/>
-            <a:ext cx="141515" cy="130629"/>
-          </a:xfrm>
-          <a:prstGeom prst="ellipse">
-            <a:avLst/>
-          </a:prstGeom>
-          <a:solidFill>
-            <a:srgbClr val="F3CABA"/>
-          </a:solidFill>
-          <a:ln w="19050">
-            <a:solidFill>
-              <a:schemeClr val="tx1"/>
-            </a:solidFill>
-          </a:ln>
-        </p:spPr>
-        <p:style>
-          <a:lnRef idx="2">
-            <a:schemeClr val="accent1">
-              <a:shade val="50000"/>
-            </a:schemeClr>
-          </a:lnRef>
-          <a:fillRef idx="1">
-            <a:schemeClr val="accent1"/>
-          </a:fillRef>
-          <a:effectRef idx="0">
-            <a:schemeClr val="accent1"/>
-          </a:effectRef>
-          <a:fontRef idx="minor">
-            <a:schemeClr val="lt1"/>
-          </a:fontRef>
-        </p:style>
-        <p:txBody>
-          <a:bodyPr rtlCol="0" anchor="ctr"/>
-          <a:lstStyle/>
-          <a:p>
-            <a:pPr algn="ctr"/>
-            <a:endParaRPr lang="en-US">
-              <a:solidFill>
-                <a:schemeClr val="accent2">
-                  <a:lumMod val="50000"/>
-                </a:schemeClr>
-              </a:solidFill>
-            </a:endParaRPr>
-          </a:p>
-        </p:txBody>
-      </p:sp>
-      <p:sp>
-        <p:nvSpPr>
-          <p:cNvPr id="61" name="Oval 60">
-            <a:extLst>
-              <a:ext uri="{FF2B5EF4-FFF2-40B4-BE49-F238E27FC236}">
-                <a16:creationId xmlns:a16="http://schemas.microsoft.com/office/drawing/2014/main" id="{EB55F448-5A3A-7678-679C-EF543653C5E6}"/>
-              </a:ext>
-            </a:extLst>
-          </p:cNvPr>
-          <p:cNvSpPr/>
-          <p:nvPr/>
-        </p:nvSpPr>
-        <p:spPr>
-          <a:xfrm>
-            <a:off x="2085921" y="6336883"/>
-            <a:ext cx="141515" cy="130629"/>
-          </a:xfrm>
-          <a:prstGeom prst="ellipse">
-            <a:avLst/>
-          </a:prstGeom>
-          <a:solidFill>
-            <a:srgbClr val="F3CABA"/>
-          </a:solidFill>
-          <a:ln w="19050">
-            <a:solidFill>
-              <a:schemeClr val="tx1"/>
-            </a:solidFill>
-          </a:ln>
-        </p:spPr>
-        <p:style>
-          <a:lnRef idx="2">
-            <a:schemeClr val="accent1">
-              <a:shade val="50000"/>
-            </a:schemeClr>
-          </a:lnRef>
-          <a:fillRef idx="1">
-            <a:schemeClr val="accent1"/>
-          </a:fillRef>
-          <a:effectRef idx="0">
-            <a:schemeClr val="accent1"/>
-          </a:effectRef>
-          <a:fontRef idx="minor">
-            <a:schemeClr val="lt1"/>
-          </a:fontRef>
-        </p:style>
-        <p:txBody>
-          <a:bodyPr rtlCol="0" anchor="ctr"/>
-          <a:lstStyle/>
-          <a:p>
-            <a:pPr algn="ctr"/>
-            <a:endParaRPr lang="en-US">
-              <a:solidFill>
-                <a:schemeClr val="accent2">
-                  <a:lumMod val="50000"/>
-                </a:schemeClr>
-              </a:solidFill>
-            </a:endParaRPr>
-          </a:p>
-        </p:txBody>
-      </p:sp>
-      <p:sp>
-        <p:nvSpPr>
-          <p:cNvPr id="62" name="Oval 61">
-            <a:extLst>
-              <a:ext uri="{FF2B5EF4-FFF2-40B4-BE49-F238E27FC236}">
-                <a16:creationId xmlns:a16="http://schemas.microsoft.com/office/drawing/2014/main" id="{C568E85D-55A1-9036-1E99-C41BE5AA6547}"/>
-              </a:ext>
-            </a:extLst>
-          </p:cNvPr>
-          <p:cNvSpPr/>
-          <p:nvPr/>
-        </p:nvSpPr>
-        <p:spPr>
-          <a:xfrm>
-            <a:off x="1341805" y="7046501"/>
-            <a:ext cx="141515" cy="130629"/>
-          </a:xfrm>
-          <a:prstGeom prst="ellipse">
-            <a:avLst/>
-          </a:prstGeom>
-          <a:solidFill>
-            <a:srgbClr val="F3CABA"/>
-          </a:solidFill>
-          <a:ln w="19050">
-            <a:solidFill>
-              <a:schemeClr val="tx1"/>
-            </a:solidFill>
-          </a:ln>
-        </p:spPr>
-        <p:style>
-          <a:lnRef idx="2">
-            <a:schemeClr val="accent1">
-              <a:shade val="50000"/>
-            </a:schemeClr>
-          </a:lnRef>
-          <a:fillRef idx="1">
-            <a:schemeClr val="accent1"/>
-          </a:fillRef>
-          <a:effectRef idx="0">
-            <a:schemeClr val="accent1"/>
-          </a:effectRef>
-          <a:fontRef idx="minor">
-            <a:schemeClr val="lt1"/>
-          </a:fontRef>
-        </p:style>
-        <p:txBody>
-          <a:bodyPr rtlCol="0" anchor="ctr"/>
-          <a:lstStyle/>
-          <a:p>
-            <a:pPr algn="ctr"/>
-            <a:endParaRPr lang="en-US">
-              <a:solidFill>
-                <a:schemeClr val="accent2">
-                  <a:lumMod val="50000"/>
-                </a:schemeClr>
-              </a:solidFill>
-            </a:endParaRPr>
-          </a:p>
-        </p:txBody>
-      </p:sp>
-      <p:sp>
-        <p:nvSpPr>
-          <p:cNvPr id="63" name="Oval 62">
-            <a:extLst>
-              <a:ext uri="{FF2B5EF4-FFF2-40B4-BE49-F238E27FC236}">
-                <a16:creationId xmlns:a16="http://schemas.microsoft.com/office/drawing/2014/main" id="{EFFD6B70-1A5B-7BE6-2F22-D286152D13B0}"/>
-              </a:ext>
-            </a:extLst>
-          </p:cNvPr>
-          <p:cNvSpPr/>
-          <p:nvPr/>
-        </p:nvSpPr>
-        <p:spPr>
-          <a:xfrm>
-            <a:off x="1589203" y="6798851"/>
-            <a:ext cx="141515" cy="130629"/>
-          </a:xfrm>
-          <a:prstGeom prst="ellipse">
-            <a:avLst/>
-          </a:prstGeom>
-          <a:solidFill>
-            <a:srgbClr val="F3CABA"/>
-          </a:solidFill>
-          <a:ln w="19050">
-            <a:solidFill>
-              <a:schemeClr val="tx1"/>
-            </a:solidFill>
-          </a:ln>
-        </p:spPr>
-        <p:style>
-          <a:lnRef idx="2">
-            <a:schemeClr val="accent1">
-              <a:shade val="50000"/>
-            </a:schemeClr>
-          </a:lnRef>
-          <a:fillRef idx="1">
-            <a:schemeClr val="accent1"/>
-          </a:fillRef>
-          <a:effectRef idx="0">
-            <a:schemeClr val="accent1"/>
-          </a:effectRef>
-          <a:fontRef idx="minor">
-            <a:schemeClr val="lt1"/>
-          </a:fontRef>
-        </p:style>
-        <p:txBody>
-          <a:bodyPr rtlCol="0" anchor="ctr"/>
-          <a:lstStyle/>
-          <a:p>
-            <a:pPr algn="ctr"/>
-            <a:endParaRPr lang="en-US">
-              <a:solidFill>
-                <a:schemeClr val="accent2">
-                  <a:lumMod val="50000"/>
-                </a:schemeClr>
-              </a:solidFill>
-            </a:endParaRPr>
-          </a:p>
-        </p:txBody>
-      </p:sp>
-      <p:sp>
-        <p:nvSpPr>
-          <p:cNvPr id="1024" name="Oval 1023">
-            <a:extLst>
-              <a:ext uri="{FF2B5EF4-FFF2-40B4-BE49-F238E27FC236}">
-                <a16:creationId xmlns:a16="http://schemas.microsoft.com/office/drawing/2014/main" id="{4D051B26-BA83-93C1-3718-04FF78D315FC}"/>
-              </a:ext>
-            </a:extLst>
-          </p:cNvPr>
-          <p:cNvSpPr/>
-          <p:nvPr/>
-        </p:nvSpPr>
-        <p:spPr>
-          <a:xfrm>
-            <a:off x="2869295" y="6054471"/>
-            <a:ext cx="141515" cy="130629"/>
-          </a:xfrm>
-          <a:prstGeom prst="ellipse">
-            <a:avLst/>
-          </a:prstGeom>
-          <a:solidFill>
-            <a:srgbClr val="F3CABA"/>
-          </a:solidFill>
-          <a:ln w="19050">
-            <a:noFill/>
-          </a:ln>
-        </p:spPr>
-        <p:style>
-          <a:lnRef idx="2">
-            <a:schemeClr val="accent1">
-              <a:shade val="50000"/>
-            </a:schemeClr>
-          </a:lnRef>
-          <a:fillRef idx="1">
-            <a:schemeClr val="accent1"/>
-          </a:fillRef>
-          <a:effectRef idx="0">
-            <a:schemeClr val="accent1"/>
-          </a:effectRef>
-          <a:fontRef idx="minor">
-            <a:schemeClr val="lt1"/>
-          </a:fontRef>
-        </p:style>
-        <p:txBody>
-          <a:bodyPr rtlCol="0" anchor="ctr"/>
-          <a:lstStyle/>
-          <a:p>
-            <a:pPr algn="ctr"/>
-            <a:endParaRPr lang="en-US">
-              <a:solidFill>
-                <a:schemeClr val="accent2">
-                  <a:lumMod val="50000"/>
-                </a:schemeClr>
-              </a:solidFill>
-            </a:endParaRPr>
-          </a:p>
-        </p:txBody>
-      </p:sp>
-      <p:sp>
-        <p:nvSpPr>
-          <p:cNvPr id="1025" name="Oval 1024">
-            <a:extLst>
-              <a:ext uri="{FF2B5EF4-FFF2-40B4-BE49-F238E27FC236}">
-                <a16:creationId xmlns:a16="http://schemas.microsoft.com/office/drawing/2014/main" id="{CC525035-B838-0910-CEF9-79A16B107641}"/>
-              </a:ext>
-            </a:extLst>
-          </p:cNvPr>
-          <p:cNvSpPr/>
-          <p:nvPr/>
-        </p:nvSpPr>
-        <p:spPr>
-          <a:xfrm>
-            <a:off x="3267022" y="6060340"/>
-            <a:ext cx="141515" cy="130629"/>
-          </a:xfrm>
-          <a:prstGeom prst="ellipse">
-            <a:avLst/>
-          </a:prstGeom>
-          <a:solidFill>
-            <a:srgbClr val="F3CABA"/>
-          </a:solidFill>
-          <a:ln w="19050">
-            <a:noFill/>
-          </a:ln>
-        </p:spPr>
-        <p:style>
-          <a:lnRef idx="2">
-            <a:schemeClr val="accent1">
-              <a:shade val="50000"/>
-            </a:schemeClr>
-          </a:lnRef>
-          <a:fillRef idx="1">
-            <a:schemeClr val="accent1"/>
-          </a:fillRef>
-          <a:effectRef idx="0">
-            <a:schemeClr val="accent1"/>
-          </a:effectRef>
-          <a:fontRef idx="minor">
-            <a:schemeClr val="lt1"/>
-          </a:fontRef>
-        </p:style>
-        <p:txBody>
-          <a:bodyPr rtlCol="0" anchor="ctr"/>
-          <a:lstStyle/>
-          <a:p>
-            <a:pPr algn="ctr"/>
-            <a:endParaRPr lang="en-US">
-              <a:solidFill>
-                <a:schemeClr val="accent2">
-                  <a:lumMod val="50000"/>
-                </a:schemeClr>
-              </a:solidFill>
-            </a:endParaRPr>
-          </a:p>
-        </p:txBody>
-      </p:sp>
-      <p:sp>
-        <p:nvSpPr>
-          <p:cNvPr id="1027" name="Oval 1026">
-            <a:extLst>
-              <a:ext uri="{FF2B5EF4-FFF2-40B4-BE49-F238E27FC236}">
-                <a16:creationId xmlns:a16="http://schemas.microsoft.com/office/drawing/2014/main" id="{18F2381D-1FE8-6B2B-448E-5F9F6974851A}"/>
-              </a:ext>
-            </a:extLst>
-          </p:cNvPr>
-          <p:cNvSpPr/>
-          <p:nvPr/>
-        </p:nvSpPr>
-        <p:spPr>
-          <a:xfrm>
-            <a:off x="3742807" y="6058188"/>
-            <a:ext cx="141515" cy="130629"/>
-          </a:xfrm>
-          <a:prstGeom prst="ellipse">
-            <a:avLst/>
-          </a:prstGeom>
-          <a:solidFill>
-            <a:srgbClr val="F3CABA"/>
-          </a:solidFill>
-          <a:ln w="19050">
-            <a:noFill/>
-          </a:ln>
-        </p:spPr>
-        <p:style>
-          <a:lnRef idx="2">
-            <a:schemeClr val="accent1">
-              <a:shade val="50000"/>
-            </a:schemeClr>
-          </a:lnRef>
-          <a:fillRef idx="1">
-            <a:schemeClr val="accent1"/>
-          </a:fillRef>
-          <a:effectRef idx="0">
-            <a:schemeClr val="accent1"/>
-          </a:effectRef>
-          <a:fontRef idx="minor">
-            <a:schemeClr val="lt1"/>
-          </a:fontRef>
-        </p:style>
-        <p:txBody>
-          <a:bodyPr rtlCol="0" anchor="ctr"/>
-          <a:lstStyle/>
-          <a:p>
-            <a:pPr algn="ctr"/>
-            <a:endParaRPr lang="en-US">
-              <a:solidFill>
-                <a:schemeClr val="accent2">
-                  <a:lumMod val="50000"/>
-                </a:schemeClr>
-              </a:solidFill>
-            </a:endParaRPr>
-          </a:p>
-        </p:txBody>
-      </p:sp>
-      <p:sp>
-        <p:nvSpPr>
-          <p:cNvPr id="1028" name="Oval 1027">
-            <a:extLst>
-              <a:ext uri="{FF2B5EF4-FFF2-40B4-BE49-F238E27FC236}">
-                <a16:creationId xmlns:a16="http://schemas.microsoft.com/office/drawing/2014/main" id="{21937490-E407-683C-3052-B73439CE7ED2}"/>
-              </a:ext>
-            </a:extLst>
-          </p:cNvPr>
-          <p:cNvSpPr/>
-          <p:nvPr/>
-        </p:nvSpPr>
-        <p:spPr>
-          <a:xfrm>
-            <a:off x="2233676" y="6633224"/>
-            <a:ext cx="141515" cy="130629"/>
-          </a:xfrm>
-          <a:prstGeom prst="ellipse">
-            <a:avLst/>
-          </a:prstGeom>
-          <a:solidFill>
-            <a:srgbClr val="9C9EBE"/>
-          </a:solidFill>
-          <a:ln w="19050">
-            <a:noFill/>
-          </a:ln>
-        </p:spPr>
-        <p:style>
-          <a:lnRef idx="2">
-            <a:schemeClr val="accent1">
-              <a:shade val="50000"/>
-            </a:schemeClr>
-          </a:lnRef>
-          <a:fillRef idx="1">
-            <a:schemeClr val="accent1"/>
-          </a:fillRef>
-          <a:effectRef idx="0">
-            <a:schemeClr val="accent1"/>
-          </a:effectRef>
-          <a:fontRef idx="minor">
-            <a:schemeClr val="lt1"/>
-          </a:fontRef>
-        </p:style>
-        <p:txBody>
-          <a:bodyPr rtlCol="0" anchor="ctr"/>
-          <a:lstStyle/>
-          <a:p>
-            <a:pPr algn="ctr"/>
-            <a:endParaRPr lang="en-US">
-              <a:solidFill>
-                <a:schemeClr val="accent2">
-                  <a:lumMod val="50000"/>
-                </a:schemeClr>
-              </a:solidFill>
-            </a:endParaRPr>
-          </a:p>
-        </p:txBody>
-      </p:sp>
-      <p:sp>
-        <p:nvSpPr>
-          <p:cNvPr id="1029" name="Oval 1028">
-            <a:extLst>
-              <a:ext uri="{FF2B5EF4-FFF2-40B4-BE49-F238E27FC236}">
-                <a16:creationId xmlns:a16="http://schemas.microsoft.com/office/drawing/2014/main" id="{269DEF91-D307-5ADC-DE88-857F4A707774}"/>
-              </a:ext>
-            </a:extLst>
-          </p:cNvPr>
-          <p:cNvSpPr/>
-          <p:nvPr/>
-        </p:nvSpPr>
-        <p:spPr>
-          <a:xfrm>
-            <a:off x="2772651" y="6626900"/>
-            <a:ext cx="141515" cy="130629"/>
-          </a:xfrm>
-          <a:prstGeom prst="ellipse">
-            <a:avLst/>
-          </a:prstGeom>
-          <a:solidFill>
-            <a:srgbClr val="9C9EBE"/>
-          </a:solidFill>
-          <a:ln w="19050">
-            <a:noFill/>
-          </a:ln>
-        </p:spPr>
-        <p:style>
-          <a:lnRef idx="2">
-            <a:schemeClr val="accent1">
-              <a:shade val="50000"/>
-            </a:schemeClr>
-          </a:lnRef>
-          <a:fillRef idx="1">
-            <a:schemeClr val="accent1"/>
-          </a:fillRef>
-          <a:effectRef idx="0">
-            <a:schemeClr val="accent1"/>
-          </a:effectRef>
-          <a:fontRef idx="minor">
-            <a:schemeClr val="lt1"/>
-          </a:fontRef>
-        </p:style>
-        <p:txBody>
-          <a:bodyPr rtlCol="0" anchor="ctr"/>
-          <a:lstStyle/>
-          <a:p>
-            <a:pPr algn="ctr"/>
-            <a:endParaRPr lang="en-US">
-              <a:solidFill>
-                <a:schemeClr val="accent2">
-                  <a:lumMod val="50000"/>
-                </a:schemeClr>
-              </a:solidFill>
-            </a:endParaRPr>
-          </a:p>
-        </p:txBody>
-      </p:sp>
-      <p:sp>
-        <p:nvSpPr>
-          <p:cNvPr id="1030" name="Oval 1029">
-            <a:extLst>
-              <a:ext uri="{FF2B5EF4-FFF2-40B4-BE49-F238E27FC236}">
-                <a16:creationId xmlns:a16="http://schemas.microsoft.com/office/drawing/2014/main" id="{A87EEE3C-B534-3721-4898-0D709A2EB822}"/>
-              </a:ext>
-            </a:extLst>
-          </p:cNvPr>
-          <p:cNvSpPr/>
-          <p:nvPr/>
-        </p:nvSpPr>
-        <p:spPr>
-          <a:xfrm>
-            <a:off x="3575539" y="6621620"/>
-            <a:ext cx="141515" cy="130629"/>
-          </a:xfrm>
-          <a:prstGeom prst="ellipse">
-            <a:avLst/>
-          </a:prstGeom>
-          <a:solidFill>
-            <a:srgbClr val="9C9EBE"/>
-          </a:solidFill>
-          <a:ln w="19050">
-            <a:noFill/>
-          </a:ln>
-        </p:spPr>
-        <p:style>
-          <a:lnRef idx="2">
-            <a:schemeClr val="accent1">
-              <a:shade val="50000"/>
-            </a:schemeClr>
-          </a:lnRef>
-          <a:fillRef idx="1">
-            <a:schemeClr val="accent1"/>
-          </a:fillRef>
-          <a:effectRef idx="0">
-            <a:schemeClr val="accent1"/>
-          </a:effectRef>
-          <a:fontRef idx="minor">
-            <a:schemeClr val="lt1"/>
-          </a:fontRef>
-        </p:style>
-        <p:txBody>
-          <a:bodyPr rtlCol="0" anchor="ctr"/>
-          <a:lstStyle/>
-          <a:p>
-            <a:pPr algn="ctr"/>
-            <a:endParaRPr lang="en-US">
-              <a:solidFill>
-                <a:schemeClr val="accent2">
-                  <a:lumMod val="50000"/>
-                </a:schemeClr>
-              </a:solidFill>
-            </a:endParaRPr>
-          </a:p>
-        </p:txBody>
-      </p:sp>
-      <p:cxnSp>
-        <p:nvCxnSpPr>
-          <p:cNvPr id="1031" name="Straight Connector 1030">
-            <a:extLst>
-              <a:ext uri="{FF2B5EF4-FFF2-40B4-BE49-F238E27FC236}">
-                <a16:creationId xmlns:a16="http://schemas.microsoft.com/office/drawing/2014/main" id="{9DC352BB-5D5F-FD38-8565-9B9F0DB1A9CF}"/>
-              </a:ext>
-            </a:extLst>
-          </p:cNvPr>
-          <p:cNvCxnSpPr>
-            <a:cxnSpLocks/>
-          </p:cNvCxnSpPr>
-          <p:nvPr/>
-        </p:nvCxnSpPr>
-        <p:spPr>
-          <a:xfrm flipH="1">
-            <a:off x="1294075" y="7250495"/>
-            <a:ext cx="2645901" cy="0"/>
-          </a:xfrm>
-          <a:prstGeom prst="line">
-            <a:avLst/>
-          </a:prstGeom>
-          <a:ln w="28575">
-            <a:solidFill>
-              <a:schemeClr val="tx1"/>
-            </a:solidFill>
-          </a:ln>
-        </p:spPr>
-        <p:style>
-          <a:lnRef idx="1">
-            <a:schemeClr val="accent1"/>
-          </a:lnRef>
-          <a:fillRef idx="0">
-            <a:schemeClr val="accent1"/>
-          </a:fillRef>
-          <a:effectRef idx="0">
-            <a:schemeClr val="accent1"/>
-          </a:effectRef>
-          <a:fontRef idx="minor">
-            <a:schemeClr val="tx1"/>
-          </a:fontRef>
-        </p:style>
-      </p:cxnSp>
-      <p:cxnSp>
-        <p:nvCxnSpPr>
-          <p:cNvPr id="1032" name="Straight Connector 1031">
-            <a:extLst>
-              <a:ext uri="{FF2B5EF4-FFF2-40B4-BE49-F238E27FC236}">
-                <a16:creationId xmlns:a16="http://schemas.microsoft.com/office/drawing/2014/main" id="{FFADD811-A3E1-5070-9969-4ACD8E3346DD}"/>
-              </a:ext>
-            </a:extLst>
-          </p:cNvPr>
-          <p:cNvCxnSpPr>
-            <a:cxnSpLocks/>
-          </p:cNvCxnSpPr>
-          <p:nvPr/>
-        </p:nvCxnSpPr>
-        <p:spPr>
-          <a:xfrm>
-            <a:off x="1283188" y="4757271"/>
-            <a:ext cx="0" cy="2504110"/>
-          </a:xfrm>
-          <a:prstGeom prst="line">
-            <a:avLst/>
-          </a:prstGeom>
-          <a:ln w="28575">
-            <a:solidFill>
-              <a:schemeClr val="tx1"/>
-            </a:solidFill>
-          </a:ln>
-        </p:spPr>
-        <p:style>
-          <a:lnRef idx="1">
-            <a:schemeClr val="accent1"/>
-          </a:lnRef>
-          <a:fillRef idx="0">
-            <a:schemeClr val="accent1"/>
-          </a:fillRef>
-          <a:effectRef idx="0">
-            <a:schemeClr val="accent1"/>
-          </a:effectRef>
-          <a:fontRef idx="minor">
-            <a:schemeClr val="tx1"/>
-          </a:fontRef>
-        </p:style>
-      </p:cxnSp>
-      <p:sp>
-        <p:nvSpPr>
-          <p:cNvPr id="1033" name="TextBox 1032">
-            <a:extLst>
-              <a:ext uri="{FF2B5EF4-FFF2-40B4-BE49-F238E27FC236}">
-                <a16:creationId xmlns:a16="http://schemas.microsoft.com/office/drawing/2014/main" id="{AFAB3690-8F19-403D-1359-8FF4B9F82E8B}"/>
+          <p:cNvPr id="1046" name="TextBox 1045">
+            <a:extLst>
+              <a:ext uri="{FF2B5EF4-FFF2-40B4-BE49-F238E27FC236}">
+                <a16:creationId xmlns:a16="http://schemas.microsoft.com/office/drawing/2014/main" id="{846EEA31-9A99-17EF-B08B-9C844758696B}"/>
               </a:ext>
             </a:extLst>
           </p:cNvPr>
@@ -5531,7 +5821,7 @@
         </p:nvSpPr>
         <p:spPr>
           <a:xfrm>
-            <a:off x="2095183" y="4925351"/>
+            <a:off x="2007763" y="1080517"/>
             <a:ext cx="2032232" cy="338554"/>
           </a:xfrm>
           <a:prstGeom prst="rect">
@@ -5563,10 +5853,10 @@
       </p:sp>
       <p:sp>
         <p:nvSpPr>
-          <p:cNvPr id="1035" name="TextBox 1034">
-            <a:extLst>
-              <a:ext uri="{FF2B5EF4-FFF2-40B4-BE49-F238E27FC236}">
-                <a16:creationId xmlns:a16="http://schemas.microsoft.com/office/drawing/2014/main" id="{401F6452-4BCF-D391-4EE7-FBE4E6C7DB24}"/>
+          <p:cNvPr id="1047" name="TextBox 1046">
+            <a:extLst>
+              <a:ext uri="{FF2B5EF4-FFF2-40B4-BE49-F238E27FC236}">
+                <a16:creationId xmlns:a16="http://schemas.microsoft.com/office/drawing/2014/main" id="{362CE27A-8293-CE36-E89A-B2F8F08F33A7}"/>
               </a:ext>
             </a:extLst>
           </p:cNvPr>
@@ -5574,176 +5864,8 @@
           <p:nvPr/>
         </p:nvSpPr>
         <p:spPr>
-          <a:xfrm rot="16200000">
-            <a:off x="-624630" y="5840607"/>
-            <a:ext cx="2900904" cy="338554"/>
-          </a:xfrm>
-          <a:prstGeom prst="rect">
-            <a:avLst/>
-          </a:prstGeom>
-          <a:noFill/>
-        </p:spPr>
-        <p:txBody>
-          <a:bodyPr wrap="square" rtlCol="0">
-            <a:spAutoFit/>
-          </a:bodyPr>
-          <a:lstStyle/>
-          <a:p>
-            <a:pPr algn="ctr"/>
-            <a:r>
-              <a:rPr lang="en-US" sz="1600" dirty="0">
-                <a:latin typeface="Arial" panose="020B0604020202020204" pitchFamily="34" charset="0"/>
-                <a:cs typeface="Arial" panose="020B0604020202020204" pitchFamily="34" charset="0"/>
-              </a:rPr>
-              <a:t>Range expansion rate (km/yr)</a:t>
-            </a:r>
-          </a:p>
-        </p:txBody>
-      </p:sp>
-      <p:sp>
-        <p:nvSpPr>
-          <p:cNvPr id="1036" name="Oval 1035">
-            <a:extLst>
-              <a:ext uri="{FF2B5EF4-FFF2-40B4-BE49-F238E27FC236}">
-                <a16:creationId xmlns:a16="http://schemas.microsoft.com/office/drawing/2014/main" id="{D2AA29B6-45C0-D1E7-02BF-7B7437742845}"/>
-              </a:ext>
-            </a:extLst>
-          </p:cNvPr>
-          <p:cNvSpPr/>
-          <p:nvPr/>
-        </p:nvSpPr>
-        <p:spPr>
-          <a:xfrm>
-            <a:off x="3322721" y="4343409"/>
-            <a:ext cx="141515" cy="130629"/>
-          </a:xfrm>
-          <a:prstGeom prst="ellipse">
-            <a:avLst/>
-          </a:prstGeom>
-          <a:solidFill>
-            <a:schemeClr val="bg1"/>
-          </a:solidFill>
-          <a:ln w="19050">
-            <a:solidFill>
-              <a:schemeClr val="bg1"/>
-            </a:solidFill>
-          </a:ln>
-        </p:spPr>
-        <p:style>
-          <a:lnRef idx="2">
-            <a:schemeClr val="accent1">
-              <a:shade val="50000"/>
-            </a:schemeClr>
-          </a:lnRef>
-          <a:fillRef idx="1">
-            <a:schemeClr val="accent1"/>
-          </a:fillRef>
-          <a:effectRef idx="0">
-            <a:schemeClr val="accent1"/>
-          </a:effectRef>
-          <a:fontRef idx="minor">
-            <a:schemeClr val="lt1"/>
-          </a:fontRef>
-        </p:style>
-        <p:txBody>
-          <a:bodyPr rtlCol="0" anchor="ctr"/>
-          <a:lstStyle/>
-          <a:p>
-            <a:pPr algn="ctr"/>
-            <a:endParaRPr lang="en-US">
-              <a:solidFill>
-                <a:schemeClr val="accent2">
-                  <a:lumMod val="50000"/>
-                </a:schemeClr>
-              </a:solidFill>
-            </a:endParaRPr>
-          </a:p>
-        </p:txBody>
-      </p:sp>
-      <p:sp>
-        <p:nvSpPr>
-          <p:cNvPr id="1037" name="TextBox 1036">
-            <a:extLst>
-              <a:ext uri="{FF2B5EF4-FFF2-40B4-BE49-F238E27FC236}">
-                <a16:creationId xmlns:a16="http://schemas.microsoft.com/office/drawing/2014/main" id="{4F7285F9-E473-3351-BF40-14F3A0626619}"/>
-              </a:ext>
-            </a:extLst>
-          </p:cNvPr>
-          <p:cNvSpPr txBox="1"/>
-          <p:nvPr/>
-        </p:nvSpPr>
-        <p:spPr>
-          <a:xfrm>
-            <a:off x="7189911" y="5012654"/>
-            <a:ext cx="1655294" cy="830997"/>
-          </a:xfrm>
-          <a:prstGeom prst="rect">
-            <a:avLst/>
-          </a:prstGeom>
-          <a:noFill/>
-        </p:spPr>
-        <p:txBody>
-          <a:bodyPr wrap="square" rtlCol="0">
-            <a:spAutoFit/>
-          </a:bodyPr>
-          <a:lstStyle/>
-          <a:p>
-            <a:pPr algn="ctr"/>
-            <a:r>
-              <a:rPr lang="en-US" sz="1600" dirty="0">
-                <a:latin typeface="Arial" panose="020B0604020202020204" pitchFamily="34" charset="0"/>
-                <a:cs typeface="Arial" panose="020B0604020202020204" pitchFamily="34" charset="0"/>
-              </a:rPr>
-              <a:t>Velocity of climate change (km/yr)</a:t>
-            </a:r>
-          </a:p>
-        </p:txBody>
-      </p:sp>
-      <p:pic>
-        <p:nvPicPr>
-          <p:cNvPr id="1041" name="Picture 1040">
-            <a:extLst>
-              <a:ext uri="{FF2B5EF4-FFF2-40B4-BE49-F238E27FC236}">
-                <a16:creationId xmlns:a16="http://schemas.microsoft.com/office/drawing/2014/main" id="{F9E775AE-8FE8-E0E4-329B-53DF68A23EB7}"/>
-              </a:ext>
-            </a:extLst>
-          </p:cNvPr>
-          <p:cNvPicPr>
-            <a:picLocks noChangeAspect="1"/>
-          </p:cNvPicPr>
-          <p:nvPr/>
-        </p:nvPicPr>
-        <p:blipFill>
-          <a:blip r:embed="rId6"/>
-          <a:stretch>
-            <a:fillRect/>
-          </a:stretch>
-        </p:blipFill>
-        <p:spPr>
-          <a:xfrm>
-            <a:off x="8233777" y="8881407"/>
-            <a:ext cx="1004705" cy="2466095"/>
-          </a:xfrm>
-          <a:prstGeom prst="rect">
-            <a:avLst/>
-          </a:prstGeom>
-        </p:spPr>
-      </p:pic>
-      <p:sp>
-        <p:nvSpPr>
-          <p:cNvPr id="1042" name="TextBox 1041">
-            <a:extLst>
-              <a:ext uri="{FF2B5EF4-FFF2-40B4-BE49-F238E27FC236}">
-                <a16:creationId xmlns:a16="http://schemas.microsoft.com/office/drawing/2014/main" id="{59A37552-565B-73B7-D48B-0D208304874F}"/>
-              </a:ext>
-            </a:extLst>
-          </p:cNvPr>
-          <p:cNvSpPr txBox="1"/>
-          <p:nvPr/>
-        </p:nvSpPr>
-        <p:spPr>
-          <a:xfrm>
-            <a:off x="2484857" y="409168"/>
+          <a:xfrm>
+            <a:off x="10290072" y="409168"/>
             <a:ext cx="569481" cy="338554"/>
           </a:xfrm>
           <a:prstGeom prst="rect">
@@ -5768,17 +5890,17 @@
                 <a:latin typeface="Arial" panose="020B0604020202020204" pitchFamily="34" charset="0"/>
                 <a:cs typeface="Arial" panose="020B0604020202020204" pitchFamily="34" charset="0"/>
               </a:rPr>
-              <a:t>a)</a:t>
+              <a:t>c)</a:t>
             </a:r>
           </a:p>
         </p:txBody>
       </p:sp>
       <p:sp>
         <p:nvSpPr>
-          <p:cNvPr id="1045" name="TextBox 1044">
-            <a:extLst>
-              <a:ext uri="{FF2B5EF4-FFF2-40B4-BE49-F238E27FC236}">
-                <a16:creationId xmlns:a16="http://schemas.microsoft.com/office/drawing/2014/main" id="{7AE593D6-4D6F-F226-6938-DEE12E1EFF8C}"/>
+          <p:cNvPr id="1049" name="TextBox 1048">
+            <a:extLst>
+              <a:ext uri="{FF2B5EF4-FFF2-40B4-BE49-F238E27FC236}">
+                <a16:creationId xmlns:a16="http://schemas.microsoft.com/office/drawing/2014/main" id="{35574FFE-88A9-EBA9-93A0-8D480D091E6E}"/>
               </a:ext>
             </a:extLst>
           </p:cNvPr>
@@ -5787,7 +5909,7 @@
         </p:nvSpPr>
         <p:spPr>
           <a:xfrm>
-            <a:off x="6388968" y="409168"/>
+            <a:off x="4720173" y="8597354"/>
             <a:ext cx="569481" cy="338554"/>
           </a:xfrm>
           <a:prstGeom prst="rect">
@@ -5819,10 +5941,10 @@
       </p:sp>
       <p:sp>
         <p:nvSpPr>
-          <p:cNvPr id="1046" name="TextBox 1045">
-            <a:extLst>
-              <a:ext uri="{FF2B5EF4-FFF2-40B4-BE49-F238E27FC236}">
-                <a16:creationId xmlns:a16="http://schemas.microsoft.com/office/drawing/2014/main" id="{846EEA31-9A99-17EF-B08B-9C844758696B}"/>
+          <p:cNvPr id="1050" name="TextBox 1049">
+            <a:extLst>
+              <a:ext uri="{FF2B5EF4-FFF2-40B4-BE49-F238E27FC236}">
+                <a16:creationId xmlns:a16="http://schemas.microsoft.com/office/drawing/2014/main" id="{AE510EC9-F2D5-C6FB-6A49-9E5238F66796}"/>
               </a:ext>
             </a:extLst>
           </p:cNvPr>
@@ -5831,7 +5953,7 @@
         </p:nvSpPr>
         <p:spPr>
           <a:xfrm>
-            <a:off x="2007763" y="1080517"/>
+            <a:off x="2705730" y="10045223"/>
             <a:ext cx="2032232" cy="338554"/>
           </a:xfrm>
           <a:prstGeom prst="rect">
@@ -5863,138 +5985,6 @@
       </p:sp>
       <p:sp>
         <p:nvSpPr>
-          <p:cNvPr id="1047" name="TextBox 1046">
-            <a:extLst>
-              <a:ext uri="{FF2B5EF4-FFF2-40B4-BE49-F238E27FC236}">
-                <a16:creationId xmlns:a16="http://schemas.microsoft.com/office/drawing/2014/main" id="{362CE27A-8293-CE36-E89A-B2F8F08F33A7}"/>
-              </a:ext>
-            </a:extLst>
-          </p:cNvPr>
-          <p:cNvSpPr txBox="1"/>
-          <p:nvPr/>
-        </p:nvSpPr>
-        <p:spPr>
-          <a:xfrm>
-            <a:off x="10290072" y="409168"/>
-            <a:ext cx="569481" cy="338554"/>
-          </a:xfrm>
-          <a:prstGeom prst="rect">
-            <a:avLst/>
-          </a:prstGeom>
-          <a:noFill/>
-        </p:spPr>
-        <p:txBody>
-          <a:bodyPr wrap="square" rtlCol="0">
-            <a:spAutoFit/>
-          </a:bodyPr>
-          <a:lstStyle/>
-          <a:p>
-            <a:pPr algn="ctr"/>
-            <a:r>
-              <a:rPr lang="en-US" sz="1600" dirty="0">
-                <a:solidFill>
-                  <a:schemeClr val="bg2">
-                    <a:lumMod val="75000"/>
-                  </a:schemeClr>
-                </a:solidFill>
-                <a:latin typeface="Arial" panose="020B0604020202020204" pitchFamily="34" charset="0"/>
-                <a:cs typeface="Arial" panose="020B0604020202020204" pitchFamily="34" charset="0"/>
-              </a:rPr>
-              <a:t>c)</a:t>
-            </a:r>
-          </a:p>
-        </p:txBody>
-      </p:sp>
-      <p:sp>
-        <p:nvSpPr>
-          <p:cNvPr id="1049" name="TextBox 1048">
-            <a:extLst>
-              <a:ext uri="{FF2B5EF4-FFF2-40B4-BE49-F238E27FC236}">
-                <a16:creationId xmlns:a16="http://schemas.microsoft.com/office/drawing/2014/main" id="{35574FFE-88A9-EBA9-93A0-8D480D091E6E}"/>
-              </a:ext>
-            </a:extLst>
-          </p:cNvPr>
-          <p:cNvSpPr txBox="1"/>
-          <p:nvPr/>
-        </p:nvSpPr>
-        <p:spPr>
-          <a:xfrm>
-            <a:off x="4720173" y="8597354"/>
-            <a:ext cx="569481" cy="338554"/>
-          </a:xfrm>
-          <a:prstGeom prst="rect">
-            <a:avLst/>
-          </a:prstGeom>
-          <a:noFill/>
-        </p:spPr>
-        <p:txBody>
-          <a:bodyPr wrap="square" rtlCol="0">
-            <a:spAutoFit/>
-          </a:bodyPr>
-          <a:lstStyle/>
-          <a:p>
-            <a:pPr algn="ctr"/>
-            <a:r>
-              <a:rPr lang="en-US" sz="1600" dirty="0">
-                <a:solidFill>
-                  <a:schemeClr val="bg2">
-                    <a:lumMod val="75000"/>
-                  </a:schemeClr>
-                </a:solidFill>
-                <a:latin typeface="Arial" panose="020B0604020202020204" pitchFamily="34" charset="0"/>
-                <a:cs typeface="Arial" panose="020B0604020202020204" pitchFamily="34" charset="0"/>
-              </a:rPr>
-              <a:t>b)</a:t>
-            </a:r>
-          </a:p>
-        </p:txBody>
-      </p:sp>
-      <p:sp>
-        <p:nvSpPr>
-          <p:cNvPr id="1050" name="TextBox 1049">
-            <a:extLst>
-              <a:ext uri="{FF2B5EF4-FFF2-40B4-BE49-F238E27FC236}">
-                <a16:creationId xmlns:a16="http://schemas.microsoft.com/office/drawing/2014/main" id="{AE510EC9-F2D5-C6FB-6A49-9E5238F66796}"/>
-              </a:ext>
-            </a:extLst>
-          </p:cNvPr>
-          <p:cNvSpPr txBox="1"/>
-          <p:nvPr/>
-        </p:nvSpPr>
-        <p:spPr>
-          <a:xfrm>
-            <a:off x="2705730" y="10045223"/>
-            <a:ext cx="2032232" cy="338554"/>
-          </a:xfrm>
-          <a:prstGeom prst="rect">
-            <a:avLst/>
-          </a:prstGeom>
-          <a:noFill/>
-        </p:spPr>
-        <p:txBody>
-          <a:bodyPr wrap="square" rtlCol="0">
-            <a:spAutoFit/>
-          </a:bodyPr>
-          <a:lstStyle/>
-          <a:p>
-            <a:pPr algn="ctr"/>
-            <a:r>
-              <a:rPr lang="en-US" sz="1600" i="1" dirty="0">
-                <a:solidFill>
-                  <a:schemeClr val="bg2">
-                    <a:lumMod val="75000"/>
-                  </a:schemeClr>
-                </a:solidFill>
-                <a:latin typeface="Arial" panose="020B0604020202020204" pitchFamily="34" charset="0"/>
-                <a:cs typeface="Arial" panose="020B0604020202020204" pitchFamily="34" charset="0"/>
-              </a:rPr>
-              <a:t>1:1</a:t>
-            </a:r>
-          </a:p>
-        </p:txBody>
-      </p:sp>
-      <p:sp>
-        <p:nvSpPr>
           <p:cNvPr id="1058" name="Oval 1057">
             <a:extLst>
               <a:ext uri="{FF2B5EF4-FFF2-40B4-BE49-F238E27FC236}">
@@ -6007,7 +5997,7 @@
         </p:nvSpPr>
         <p:spPr>
           <a:xfrm>
-            <a:off x="5195298" y="6530540"/>
+            <a:off x="5430431" y="6530540"/>
             <a:ext cx="141515" cy="130629"/>
           </a:xfrm>
           <a:prstGeom prst="ellipse">
@@ -6067,7 +6057,7 @@
         </p:nvSpPr>
         <p:spPr>
           <a:xfrm>
-            <a:off x="6048299" y="5669466"/>
+            <a:off x="6283432" y="5669466"/>
             <a:ext cx="141515" cy="130629"/>
           </a:xfrm>
           <a:prstGeom prst="ellipse">
@@ -6127,7 +6117,7 @@
         </p:nvSpPr>
         <p:spPr>
           <a:xfrm>
-            <a:off x="6178006" y="5558675"/>
+            <a:off x="6413139" y="5558675"/>
             <a:ext cx="141515" cy="130629"/>
           </a:xfrm>
           <a:prstGeom prst="ellipse">
@@ -6187,7 +6177,7 @@
         </p:nvSpPr>
         <p:spPr>
           <a:xfrm>
-            <a:off x="5761372" y="5973441"/>
+            <a:off x="5996505" y="5973441"/>
             <a:ext cx="141515" cy="130629"/>
           </a:xfrm>
           <a:prstGeom prst="ellipse">
@@ -6247,7 +6237,7 @@
         </p:nvSpPr>
         <p:spPr>
           <a:xfrm>
-            <a:off x="5553534" y="6168705"/>
+            <a:off x="5788667" y="6168705"/>
             <a:ext cx="141515" cy="130629"/>
           </a:xfrm>
           <a:prstGeom prst="ellipse">
@@ -6307,7 +6297,7 @@
         </p:nvSpPr>
         <p:spPr>
           <a:xfrm>
-            <a:off x="5386370" y="6349680"/>
+            <a:off x="5621503" y="6349680"/>
             <a:ext cx="141515" cy="130629"/>
           </a:xfrm>
           <a:prstGeom prst="ellipse">
@@ -6367,7 +6357,7 @@
         </p:nvSpPr>
         <p:spPr>
           <a:xfrm>
-            <a:off x="4642254" y="7059298"/>
+            <a:off x="4877387" y="7059298"/>
             <a:ext cx="141515" cy="130629"/>
           </a:xfrm>
           <a:prstGeom prst="ellipse">
@@ -6427,7 +6417,7 @@
         </p:nvSpPr>
         <p:spPr>
           <a:xfrm>
-            <a:off x="4889652" y="6811648"/>
+            <a:off x="5124785" y="6811648"/>
             <a:ext cx="141515" cy="130629"/>
           </a:xfrm>
           <a:prstGeom prst="ellipse">
@@ -6487,7 +6477,7 @@
         </p:nvSpPr>
         <p:spPr>
           <a:xfrm>
-            <a:off x="5653215" y="6067268"/>
+            <a:off x="5888348" y="6067268"/>
             <a:ext cx="141515" cy="130629"/>
           </a:xfrm>
           <a:prstGeom prst="ellipse">
@@ -6545,7 +6535,7 @@
         </p:nvSpPr>
         <p:spPr>
           <a:xfrm>
-            <a:off x="5073438" y="6646021"/>
+            <a:off x="5308571" y="6646021"/>
             <a:ext cx="141515" cy="130629"/>
           </a:xfrm>
           <a:prstGeom prst="ellipse">
@@ -6603,7 +6593,7 @@
         </p:nvGrpSpPr>
         <p:grpSpPr>
           <a:xfrm>
-            <a:off x="8630225" y="5499892"/>
+            <a:off x="8734728" y="5499892"/>
             <a:ext cx="3024597" cy="1136931"/>
             <a:chOff x="8524560" y="7193781"/>
             <a:chExt cx="2682403" cy="951930"/>
@@ -6826,7 +6816,7 @@
         </p:nvSpPr>
         <p:spPr>
           <a:xfrm>
-            <a:off x="8660591" y="6332818"/>
+            <a:off x="8895724" y="6332818"/>
             <a:ext cx="1979542" cy="527839"/>
           </a:xfrm>
           <a:prstGeom prst="ellipse">
@@ -8416,7 +8406,7 @@
         </p:nvGrpSpPr>
         <p:grpSpPr>
           <a:xfrm>
-            <a:off x="7839325" y="5955494"/>
+            <a:off x="8074458" y="5955494"/>
             <a:ext cx="444660" cy="1384995"/>
             <a:chOff x="9460088" y="7144053"/>
             <a:chExt cx="444660" cy="1384995"/>
@@ -8815,7 +8805,7 @@
                 <a:latin typeface="Arial" panose="020B0604020202020204" pitchFamily="34" charset="0"/>
                 <a:cs typeface="Arial" panose="020B0604020202020204" pitchFamily="34" charset="0"/>
               </a:rPr>
-              <a:t>Minimum of potential dispersal rate and velocity of isotherm shift (km/yr)</a:t>
+              <a:t>Minimum of potential dispersal rate and velocity of climate change (km/yr)</a:t>
             </a:r>
           </a:p>
         </p:txBody>
@@ -8933,8 +8923,8 @@
         </p:nvSpPr>
         <p:spPr>
           <a:xfrm>
-            <a:off x="9366738" y="6460308"/>
-            <a:ext cx="1259588" cy="830997"/>
+            <a:off x="9240982" y="6474162"/>
+            <a:ext cx="1551599" cy="830997"/>
           </a:xfrm>
           <a:prstGeom prst="rect">
             <a:avLst/>
@@ -8953,7 +8943,7 @@
                 <a:latin typeface="Arial" panose="020B0604020202020204" pitchFamily="34" charset="0"/>
                 <a:cs typeface="Arial" panose="020B0604020202020204" pitchFamily="34" charset="0"/>
               </a:rPr>
-              <a:t>Velocity of isotherm shift (km/yr)</a:t>
+              <a:t>Velocity of climate change (km/yr)</a:t>
             </a:r>
           </a:p>
         </p:txBody>
@@ -11301,7 +11291,7 @@
         </p:nvGrpSpPr>
         <p:grpSpPr>
           <a:xfrm>
-            <a:off x="10457352" y="6830165"/>
+            <a:off x="10637463" y="6830165"/>
             <a:ext cx="3024597" cy="1305849"/>
             <a:chOff x="8524560" y="6991381"/>
             <a:chExt cx="2682403" cy="1101530"/>
@@ -11361,7 +11351,7 @@
                   <a:latin typeface="Arial" panose="020B0604020202020204" pitchFamily="34" charset="0"/>
                   <a:cs typeface="Arial" panose="020B0604020202020204" pitchFamily="34" charset="0"/>
                 </a:rPr>
-                <a:t>Dispersal rate &lt; velocity of isotherm shift</a:t>
+                <a:t>Dispersal rate &lt; velocity of climate change</a:t>
               </a:r>
             </a:p>
             <a:p>
@@ -11384,7 +11374,7 @@
                   <a:latin typeface="Arial" panose="020B0604020202020204" pitchFamily="34" charset="0"/>
                   <a:cs typeface="Arial" panose="020B0604020202020204" pitchFamily="34" charset="0"/>
                 </a:rPr>
-                <a:t>Dispersal rate &gt; velocity of isotherm shift</a:t>
+                <a:t>Dispersal rate &gt; velocity of climate change</a:t>
               </a:r>
             </a:p>
             <a:p>
@@ -13035,10 +13025,10 @@
       </p:grpSpPr>
       <p:pic>
         <p:nvPicPr>
-          <p:cNvPr id="31" name="Picture 30" descr="A comparison of a graph&#10;&#10;Description automatically generated with medium confidence">
-            <a:extLst>
-              <a:ext uri="{FF2B5EF4-FFF2-40B4-BE49-F238E27FC236}">
-                <a16:creationId xmlns:a16="http://schemas.microsoft.com/office/drawing/2014/main" id="{FD967F5D-40FB-9A39-587D-9FD92A58B836}"/>
+          <p:cNvPr id="42" name="Picture 41" descr="A comparison of a number of objects&#10;&#10;Description automatically generated with medium confidence">
+            <a:extLst>
+              <a:ext uri="{FF2B5EF4-FFF2-40B4-BE49-F238E27FC236}">
+                <a16:creationId xmlns:a16="http://schemas.microsoft.com/office/drawing/2014/main" id="{D4337A6E-724D-8388-5BE0-8ADAECE33732}"/>
               </a:ext>
             </a:extLst>
           </p:cNvPr>
@@ -13049,13 +13039,13 @@
         </p:nvPicPr>
         <p:blipFill rotWithShape="1">
           <a:blip r:embed="rId3"/>
-          <a:srcRect l="54016"/>
+          <a:srcRect l="53566"/>
           <a:stretch/>
         </p:blipFill>
         <p:spPr>
           <a:xfrm>
-            <a:off x="5446644" y="9892215"/>
-            <a:ext cx="3624290" cy="3817160"/>
+            <a:off x="5769622" y="5616876"/>
+            <a:ext cx="4024002" cy="4076033"/>
           </a:xfrm>
           <a:prstGeom prst="rect">
             <a:avLst/>
@@ -13064,10 +13054,10 @@
       </p:pic>
       <p:pic>
         <p:nvPicPr>
-          <p:cNvPr id="30" name="Picture 29" descr="A comparison of a graph&#10;&#10;Description automatically generated with medium confidence">
-            <a:extLst>
-              <a:ext uri="{FF2B5EF4-FFF2-40B4-BE49-F238E27FC236}">
-                <a16:creationId xmlns:a16="http://schemas.microsoft.com/office/drawing/2014/main" id="{5D074197-EA9A-99A3-D218-C3A8314A74AD}"/>
+          <p:cNvPr id="41" name="Picture 40" descr="A comparison of a number of objects&#10;&#10;Description automatically generated with medium confidence">
+            <a:extLst>
+              <a:ext uri="{FF2B5EF4-FFF2-40B4-BE49-F238E27FC236}">
+                <a16:creationId xmlns:a16="http://schemas.microsoft.com/office/drawing/2014/main" id="{9CB35665-4F1C-524F-85C5-BB962161AAB0}"/>
               </a:ext>
             </a:extLst>
           </p:cNvPr>
@@ -13078,13 +13068,13 @@
         </p:nvPicPr>
         <p:blipFill rotWithShape="1">
           <a:blip r:embed="rId3"/>
-          <a:srcRect r="51314"/>
+          <a:srcRect r="51119"/>
           <a:stretch/>
         </p:blipFill>
         <p:spPr>
           <a:xfrm>
-            <a:off x="1601348" y="9898841"/>
-            <a:ext cx="3837344" cy="3817160"/>
+            <a:off x="1501206" y="5618224"/>
+            <a:ext cx="4236048" cy="4076033"/>
           </a:xfrm>
           <a:prstGeom prst="rect">
             <a:avLst/>
@@ -13093,10 +13083,10 @@
       </p:pic>
       <p:pic>
         <p:nvPicPr>
-          <p:cNvPr id="21" name="Picture 20" descr="A comparison of a number of numbers and a number of numbers&#10;&#10;Description automatically generated with medium confidence">
-            <a:extLst>
-              <a:ext uri="{FF2B5EF4-FFF2-40B4-BE49-F238E27FC236}">
-                <a16:creationId xmlns:a16="http://schemas.microsoft.com/office/drawing/2014/main" id="{C17B695D-04FD-663D-8510-93C8A73C9C50}"/>
+          <p:cNvPr id="6" name="Picture 5" descr="A comparison of a graph&#10;&#10;Description automatically generated with medium confidence">
+            <a:extLst>
+              <a:ext uri="{FF2B5EF4-FFF2-40B4-BE49-F238E27FC236}">
+                <a16:creationId xmlns:a16="http://schemas.microsoft.com/office/drawing/2014/main" id="{4FC85D9A-B0F0-0A20-9911-409F75CAB9BB}"/>
               </a:ext>
             </a:extLst>
           </p:cNvPr>
@@ -13107,13 +13097,13 @@
         </p:nvPicPr>
         <p:blipFill rotWithShape="1">
           <a:blip r:embed="rId4"/>
-          <a:srcRect l="53663"/>
+          <a:srcRect l="53885"/>
           <a:stretch/>
         </p:blipFill>
         <p:spPr>
           <a:xfrm>
-            <a:off x="5649239" y="5616433"/>
-            <a:ext cx="3885156" cy="3943626"/>
+            <a:off x="5407742" y="9923640"/>
+            <a:ext cx="3653164" cy="3836603"/>
           </a:xfrm>
           <a:prstGeom prst="rect">
             <a:avLst/>
@@ -13122,10 +13112,10 @@
       </p:pic>
       <p:pic>
         <p:nvPicPr>
-          <p:cNvPr id="20" name="Picture 19" descr="A comparison of a number of numbers and a number of numbers&#10;&#10;Description automatically generated with medium confidence">
-            <a:extLst>
-              <a:ext uri="{FF2B5EF4-FFF2-40B4-BE49-F238E27FC236}">
-                <a16:creationId xmlns:a16="http://schemas.microsoft.com/office/drawing/2014/main" id="{2F16FE57-1DD9-5FA1-18C7-797869B49C16}"/>
+          <p:cNvPr id="5" name="Picture 4" descr="A comparison of a graph&#10;&#10;Description automatically generated with medium confidence">
+            <a:extLst>
+              <a:ext uri="{FF2B5EF4-FFF2-40B4-BE49-F238E27FC236}">
+                <a16:creationId xmlns:a16="http://schemas.microsoft.com/office/drawing/2014/main" id="{00C137BC-AAEC-9B39-3FBC-6508B38E5E71}"/>
               </a:ext>
             </a:extLst>
           </p:cNvPr>
@@ -13136,13 +13126,13 @@
         </p:nvPicPr>
         <p:blipFill rotWithShape="1">
           <a:blip r:embed="rId4"/>
-          <a:srcRect r="51093"/>
+          <a:srcRect r="53003"/>
           <a:stretch/>
         </p:blipFill>
         <p:spPr>
           <a:xfrm>
-            <a:off x="1536124" y="5601819"/>
-            <a:ext cx="4100588" cy="3943626"/>
+            <a:off x="1566735" y="9918725"/>
+            <a:ext cx="3723020" cy="3836603"/>
           </a:xfrm>
           <a:prstGeom prst="rect">
             <a:avLst/>
@@ -13151,10 +13141,10 @@
       </p:pic>
       <p:pic>
         <p:nvPicPr>
-          <p:cNvPr id="18" name="Picture 17" descr="A graph of a number of points&#10;&#10;Description automatically generated with medium confidence">
-            <a:extLst>
-              <a:ext uri="{FF2B5EF4-FFF2-40B4-BE49-F238E27FC236}">
-                <a16:creationId xmlns:a16="http://schemas.microsoft.com/office/drawing/2014/main" id="{75729CAA-DB62-8B43-1DE2-11E16E7B7FDF}"/>
+          <p:cNvPr id="3" name="Picture 2" descr="A graph of a number of objects&#10;&#10;Description automatically generated with medium confidence">
+            <a:extLst>
+              <a:ext uri="{FF2B5EF4-FFF2-40B4-BE49-F238E27FC236}">
+                <a16:creationId xmlns:a16="http://schemas.microsoft.com/office/drawing/2014/main" id="{55C24E93-6E3C-7352-5CD4-6220EAD0F8B5}"/>
               </a:ext>
             </a:extLst>
           </p:cNvPr>
@@ -13165,13 +13155,13 @@
         </p:nvPicPr>
         <p:blipFill rotWithShape="1">
           <a:blip r:embed="rId5"/>
-          <a:srcRect r="12855"/>
+          <a:srcRect r="13483"/>
           <a:stretch/>
         </p:blipFill>
         <p:spPr>
           <a:xfrm>
-            <a:off x="937549" y="967139"/>
-            <a:ext cx="8370520" cy="4116545"/>
+            <a:off x="944901" y="1060563"/>
+            <a:ext cx="8242641" cy="4083067"/>
           </a:xfrm>
           <a:prstGeom prst="rect">
             <a:avLst/>
@@ -13209,15 +13199,10 @@
             <a:pPr algn="ctr"/>
             <a:r>
               <a:rPr lang="en-US" sz="1600" dirty="0">
-                <a:solidFill>
-                  <a:schemeClr val="bg2">
-                    <a:lumMod val="75000"/>
-                  </a:schemeClr>
-                </a:solidFill>
                 <a:latin typeface="Arial" panose="020B0604020202020204" pitchFamily="34" charset="0"/>
                 <a:cs typeface="Arial" panose="020B0604020202020204" pitchFamily="34" charset="0"/>
               </a:rPr>
-              <a:t>a)</a:t>
+              <a:t>(a)</a:t>
             </a:r>
           </a:p>
         </p:txBody>
@@ -13236,7 +13221,7 @@
         </p:nvSpPr>
         <p:spPr>
           <a:xfrm>
-            <a:off x="5797313" y="5589557"/>
+            <a:off x="5951062" y="5581465"/>
             <a:ext cx="569481" cy="338554"/>
           </a:xfrm>
           <a:prstGeom prst="rect">
@@ -13253,15 +13238,10 @@
             <a:pPr algn="ctr"/>
             <a:r>
               <a:rPr lang="en-US" sz="1600" dirty="0">
-                <a:solidFill>
-                  <a:schemeClr val="bg2">
-                    <a:lumMod val="75000"/>
-                  </a:schemeClr>
-                </a:solidFill>
                 <a:latin typeface="Arial" panose="020B0604020202020204" pitchFamily="34" charset="0"/>
                 <a:cs typeface="Arial" panose="020B0604020202020204" pitchFamily="34" charset="0"/>
               </a:rPr>
-              <a:t>b)</a:t>
+              <a:t>(b)</a:t>
             </a:r>
           </a:p>
         </p:txBody>
@@ -13280,7 +13260,7 @@
         </p:nvSpPr>
         <p:spPr>
           <a:xfrm>
-            <a:off x="1491729" y="6288152"/>
+            <a:off x="1474311" y="6288152"/>
             <a:ext cx="2032232" cy="323165"/>
           </a:xfrm>
           <a:prstGeom prst="rect">
@@ -13324,7 +13304,7 @@
         </p:nvSpPr>
         <p:spPr>
           <a:xfrm>
-            <a:off x="6830083" y="7185135"/>
+            <a:off x="7039088" y="7307055"/>
             <a:ext cx="2032232" cy="323165"/>
           </a:xfrm>
           <a:prstGeom prst="rect">
@@ -13368,7 +13348,7 @@
         </p:nvGrpSpPr>
         <p:grpSpPr>
           <a:xfrm>
-            <a:off x="9440113" y="6095999"/>
+            <a:off x="9746595" y="6128657"/>
             <a:ext cx="1491510" cy="2329544"/>
             <a:chOff x="9440113" y="6095999"/>
             <a:chExt cx="1491510" cy="2329544"/>
@@ -13497,7 +13477,7 @@
         </p:nvSpPr>
         <p:spPr>
           <a:xfrm>
-            <a:off x="5598603" y="10142347"/>
+            <a:off x="5598603" y="10171843"/>
             <a:ext cx="569481" cy="338554"/>
           </a:xfrm>
           <a:prstGeom prst="rect">
@@ -13514,15 +13494,10 @@
             <a:pPr algn="ctr"/>
             <a:r>
               <a:rPr lang="en-US" sz="1600" dirty="0">
-                <a:solidFill>
-                  <a:schemeClr val="bg2">
-                    <a:lumMod val="75000"/>
-                  </a:schemeClr>
-                </a:solidFill>
                 <a:latin typeface="Arial" panose="020B0604020202020204" pitchFamily="34" charset="0"/>
                 <a:cs typeface="Arial" panose="020B0604020202020204" pitchFamily="34" charset="0"/>
               </a:rPr>
-              <a:t>b)</a:t>
+              <a:t>(b)</a:t>
             </a:r>
           </a:p>
         </p:txBody>
@@ -13673,7 +13648,7 @@
         </p:nvSpPr>
         <p:spPr>
           <a:xfrm>
-            <a:off x="2058970" y="10131835"/>
+            <a:off x="2058970" y="10161331"/>
             <a:ext cx="569481" cy="338554"/>
           </a:xfrm>
           <a:prstGeom prst="rect">
@@ -13690,15 +13665,10 @@
             <a:pPr algn="ctr"/>
             <a:r>
               <a:rPr lang="en-US" sz="1600" dirty="0">
-                <a:solidFill>
-                  <a:schemeClr val="bg2">
-                    <a:lumMod val="75000"/>
-                  </a:schemeClr>
-                </a:solidFill>
                 <a:latin typeface="Arial" panose="020B0604020202020204" pitchFamily="34" charset="0"/>
                 <a:cs typeface="Arial" panose="020B0604020202020204" pitchFamily="34" charset="0"/>
               </a:rPr>
-              <a:t>a)</a:t>
+              <a:t>(a)</a:t>
             </a:r>
           </a:p>
         </p:txBody>
@@ -13945,7 +13915,7 @@
         </p:nvSpPr>
         <p:spPr>
           <a:xfrm>
-            <a:off x="4652535" y="8613673"/>
+            <a:off x="4749638" y="8735053"/>
             <a:ext cx="989437" cy="307777"/>
           </a:xfrm>
           <a:prstGeom prst="rect">
@@ -13989,7 +13959,7 @@
         </p:nvSpPr>
         <p:spPr>
           <a:xfrm>
-            <a:off x="8457082" y="8604708"/>
+            <a:off x="8724118" y="8734180"/>
             <a:ext cx="989437" cy="307777"/>
           </a:xfrm>
           <a:prstGeom prst="rect">
@@ -14215,7 +14185,7 @@
         <p:spPr>
           <a:xfrm>
             <a:off x="6975029" y="3104941"/>
-            <a:ext cx="2019920" cy="692652"/>
+            <a:ext cx="2026184" cy="694800"/>
           </a:xfrm>
           <a:prstGeom prst="rect">
             <a:avLst/>
@@ -14236,7 +14206,7 @@
         </p:nvGrpSpPr>
         <p:grpSpPr>
           <a:xfrm>
-            <a:off x="10359012" y="6857205"/>
+            <a:off x="10665494" y="6889863"/>
             <a:ext cx="3024597" cy="1136931"/>
             <a:chOff x="8524560" y="7193781"/>
             <a:chExt cx="2682403" cy="951930"/>
@@ -14296,7 +14266,7 @@
                   <a:latin typeface="Arial" panose="020B0604020202020204" pitchFamily="34" charset="0"/>
                   <a:cs typeface="Arial" panose="020B0604020202020204" pitchFamily="34" charset="0"/>
                 </a:rPr>
-                <a:t>Dispersal rate &lt; velocity of climate change</a:t>
+                <a:t>Dispersal rate &lt; velocity of isotherm shifts</a:t>
               </a:r>
             </a:p>
             <a:p>
@@ -14319,7 +14289,7 @@
                   <a:latin typeface="Arial" panose="020B0604020202020204" pitchFamily="34" charset="0"/>
                   <a:cs typeface="Arial" panose="020B0604020202020204" pitchFamily="34" charset="0"/>
                 </a:rPr>
-                <a:t>Dispersal rate &gt; velocity of climate change</a:t>
+                <a:t>Dispersal rate &gt; velocity of isotherm shifts</a:t>
               </a:r>
             </a:p>
           </p:txBody>
@@ -14461,98 +14431,150 @@
         </p:nvPicPr>
         <p:blipFill rotWithShape="1">
           <a:blip r:embed="rId10"/>
-          <a:srcRect t="52768" r="9760"/>
+          <a:srcRect t="54119" r="9760"/>
           <a:stretch/>
         </p:blipFill>
         <p:spPr>
           <a:xfrm>
-            <a:off x="9167866" y="11241742"/>
-            <a:ext cx="1091342" cy="2284826"/>
+            <a:off x="9167866" y="11307096"/>
+            <a:ext cx="1091342" cy="2219471"/>
           </a:xfrm>
           <a:prstGeom prst="rect">
             <a:avLst/>
           </a:prstGeom>
         </p:spPr>
       </p:pic>
-      <p:grpSp>
-        <p:nvGrpSpPr>
-          <p:cNvPr id="56" name="Group 55">
-            <a:extLst>
-              <a:ext uri="{FF2B5EF4-FFF2-40B4-BE49-F238E27FC236}">
-                <a16:creationId xmlns:a16="http://schemas.microsoft.com/office/drawing/2014/main" id="{263E802A-B09E-36EB-5B7B-78EAD2081113}"/>
-              </a:ext>
-            </a:extLst>
-          </p:cNvPr>
-          <p:cNvGrpSpPr/>
-          <p:nvPr/>
-        </p:nvGrpSpPr>
-        <p:grpSpPr>
-          <a:xfrm>
-            <a:off x="8914781" y="10572974"/>
-            <a:ext cx="1339109" cy="683623"/>
-            <a:chOff x="8914781" y="10572974"/>
-            <a:chExt cx="1339109" cy="683623"/>
-          </a:xfrm>
-        </p:grpSpPr>
-        <p:pic>
-          <p:nvPicPr>
-            <p:cNvPr id="33" name="Picture 32" descr="A graph of a speed limit&#10;&#10;Description automatically generated">
-              <a:extLst>
-                <a:ext uri="{FF2B5EF4-FFF2-40B4-BE49-F238E27FC236}">
-                  <a16:creationId xmlns:a16="http://schemas.microsoft.com/office/drawing/2014/main" id="{D41A4FC7-0DF7-393B-9764-ABC1BC6FFEE3}"/>
-                </a:ext>
-              </a:extLst>
-            </p:cNvPr>
-            <p:cNvPicPr>
-              <a:picLocks noChangeAspect="1"/>
-            </p:cNvPicPr>
-            <p:nvPr/>
-          </p:nvPicPr>
-          <p:blipFill rotWithShape="1">
-            <a:blip r:embed="rId6"/>
-            <a:srcRect t="39218" b="47132"/>
-            <a:stretch/>
-          </p:blipFill>
-          <p:spPr>
-            <a:xfrm>
-              <a:off x="8914781" y="10572974"/>
-              <a:ext cx="1252024" cy="683623"/>
-            </a:xfrm>
-            <a:prstGeom prst="rect">
-              <a:avLst/>
-            </a:prstGeom>
-          </p:spPr>
-        </p:pic>
-        <p:pic>
-          <p:nvPicPr>
-            <p:cNvPr id="43" name="Picture 42" descr="A graph of a speed limit&#10;&#10;Description automatically generated">
-              <a:extLst>
-                <a:ext uri="{FF2B5EF4-FFF2-40B4-BE49-F238E27FC236}">
-                  <a16:creationId xmlns:a16="http://schemas.microsoft.com/office/drawing/2014/main" id="{ED5ECB59-09CC-7D65-6243-10CC267B7B9B}"/>
-                </a:ext>
-              </a:extLst>
-            </p:cNvPr>
-            <p:cNvPicPr>
-              <a:picLocks noChangeAspect="1"/>
-            </p:cNvPicPr>
-            <p:nvPr/>
-          </p:nvPicPr>
-          <p:blipFill rotWithShape="1">
-            <a:blip r:embed="rId6"/>
-            <a:srcRect t="44870" b="50957"/>
-            <a:stretch/>
-          </p:blipFill>
-          <p:spPr>
-            <a:xfrm>
-              <a:off x="9001866" y="10851648"/>
-              <a:ext cx="1252024" cy="209005"/>
-            </a:xfrm>
-            <a:prstGeom prst="rect">
-              <a:avLst/>
-            </a:prstGeom>
-          </p:spPr>
-        </p:pic>
-      </p:grpSp>
+      <p:pic>
+        <p:nvPicPr>
+          <p:cNvPr id="4" name="Picture 3" descr="A diagram of a bird&#10;&#10;Description automatically generated">
+            <a:extLst>
+              <a:ext uri="{FF2B5EF4-FFF2-40B4-BE49-F238E27FC236}">
+                <a16:creationId xmlns:a16="http://schemas.microsoft.com/office/drawing/2014/main" id="{11CC1B4D-134F-DE57-F106-62E648A021B5}"/>
+              </a:ext>
+            </a:extLst>
+          </p:cNvPr>
+          <p:cNvPicPr>
+            <a:picLocks noChangeAspect="1"/>
+          </p:cNvPicPr>
+          <p:nvPr/>
+        </p:nvPicPr>
+        <p:blipFill rotWithShape="1">
+          <a:blip r:embed="rId9"/>
+          <a:srcRect l="23995" t="89331" r="71284" b="5412"/>
+          <a:stretch/>
+        </p:blipFill>
+        <p:spPr>
+          <a:xfrm>
+            <a:off x="8455981" y="3538345"/>
+            <a:ext cx="95649" cy="130082"/>
+          </a:xfrm>
+          <a:prstGeom prst="rect">
+            <a:avLst/>
+          </a:prstGeom>
+        </p:spPr>
+      </p:pic>
+      <p:pic>
+        <p:nvPicPr>
+          <p:cNvPr id="22" name="Picture 21" descr="A graph of a speed limit&#10;&#10;Description automatically generated with medium confidence">
+            <a:extLst>
+              <a:ext uri="{FF2B5EF4-FFF2-40B4-BE49-F238E27FC236}">
+                <a16:creationId xmlns:a16="http://schemas.microsoft.com/office/drawing/2014/main" id="{8020DB17-F0E9-858A-A7EF-CE76784DE51E}"/>
+              </a:ext>
+            </a:extLst>
+          </p:cNvPr>
+          <p:cNvPicPr>
+            <a:picLocks noChangeAspect="1"/>
+          </p:cNvPicPr>
+          <p:nvPr/>
+        </p:nvPicPr>
+        <p:blipFill rotWithShape="1">
+          <a:blip r:embed="rId11"/>
+          <a:srcRect t="39404" b="47019"/>
+          <a:stretch/>
+        </p:blipFill>
+        <p:spPr>
+          <a:xfrm>
+            <a:off x="8882888" y="10547553"/>
+            <a:ext cx="1261574" cy="685092"/>
+          </a:xfrm>
+          <a:prstGeom prst="rect">
+            <a:avLst/>
+          </a:prstGeom>
+        </p:spPr>
+      </p:pic>
+      <p:pic>
+        <p:nvPicPr>
+          <p:cNvPr id="29" name="Picture 28" descr="A graph of a speed limit&#10;&#10;Description automatically generated with medium confidence">
+            <a:extLst>
+              <a:ext uri="{FF2B5EF4-FFF2-40B4-BE49-F238E27FC236}">
+                <a16:creationId xmlns:a16="http://schemas.microsoft.com/office/drawing/2014/main" id="{82842D58-4A3E-41C9-BBA6-1A3C76D35F86}"/>
+              </a:ext>
+            </a:extLst>
+          </p:cNvPr>
+          <p:cNvPicPr>
+            <a:picLocks noChangeAspect="1"/>
+          </p:cNvPicPr>
+          <p:nvPr/>
+        </p:nvPicPr>
+        <p:blipFill rotWithShape="1">
+          <a:blip r:embed="rId11"/>
+          <a:srcRect t="39404" b="47019"/>
+          <a:stretch/>
+        </p:blipFill>
+        <p:spPr>
+          <a:xfrm>
+            <a:off x="9686015" y="6149854"/>
+            <a:ext cx="1261574" cy="685092"/>
+          </a:xfrm>
+          <a:prstGeom prst="rect">
+            <a:avLst/>
+          </a:prstGeom>
+        </p:spPr>
+      </p:pic>
+      <p:sp>
+        <p:nvSpPr>
+          <p:cNvPr id="39" name="TextBox 38">
+            <a:extLst>
+              <a:ext uri="{FF2B5EF4-FFF2-40B4-BE49-F238E27FC236}">
+                <a16:creationId xmlns:a16="http://schemas.microsoft.com/office/drawing/2014/main" id="{3973EEDF-2A40-A18D-AC8C-2575743C4E16}"/>
+              </a:ext>
+            </a:extLst>
+          </p:cNvPr>
+          <p:cNvSpPr txBox="1"/>
+          <p:nvPr/>
+        </p:nvSpPr>
+        <p:spPr>
+          <a:xfrm>
+            <a:off x="7152518" y="11716587"/>
+            <a:ext cx="2032232" cy="323165"/>
+          </a:xfrm>
+          <a:prstGeom prst="rect">
+            <a:avLst/>
+          </a:prstGeom>
+          <a:noFill/>
+        </p:spPr>
+        <p:txBody>
+          <a:bodyPr wrap="square" rtlCol="0">
+            <a:spAutoFit/>
+          </a:bodyPr>
+          <a:lstStyle/>
+          <a:p>
+            <a:pPr algn="ctr"/>
+            <a:r>
+              <a:rPr lang="en-US" sz="1500" i="1" dirty="0">
+                <a:solidFill>
+                  <a:schemeClr val="bg2">
+                    <a:lumMod val="75000"/>
+                  </a:schemeClr>
+                </a:solidFill>
+                <a:latin typeface="Arial" panose="020B0604020202020204" pitchFamily="34" charset="0"/>
+                <a:cs typeface="Arial" panose="020B0604020202020204" pitchFamily="34" charset="0"/>
+              </a:rPr>
+              <a:t>1:1</a:t>
+            </a:r>
+          </a:p>
+        </p:txBody>
+      </p:sp>
     </p:spTree>
     <p:extLst>
       <p:ext uri="{BB962C8B-B14F-4D97-AF65-F5344CB8AC3E}">

</xml_diff>